<commit_message>
10.13 updates on kfold
</commit_message>
<xml_diff>
--- a/midterm_presentation.pptx
+++ b/midterm_presentation.pptx
@@ -14884,7 +14884,7 @@
             </a:r>
             <a:r>
               <a:rPr lang="en-US" altLang="zh-CN" sz="2000" dirty="0"/>
-              <a:t>poison?</a:t>
+              <a:t>poisonous?</a:t>
             </a:r>
           </a:p>
           <a:p>
@@ -14931,6 +14931,14 @@
             <a:r>
               <a:rPr lang="en-US" altLang="zh-CN" sz="2000" dirty="0"/>
               <a:t>because</a:t>
+            </a:r>
+            <a:r>
+              <a:rPr lang="zh-CN" altLang="en-US" sz="2000" dirty="0"/>
+              <a:t> </a:t>
+            </a:r>
+            <a:r>
+              <a:rPr lang="en-US" altLang="zh-CN" sz="2000" dirty="0"/>
+              <a:t>as</a:t>
             </a:r>
             <a:r>
               <a:rPr lang="zh-CN" altLang="en-US" sz="2000" dirty="0"/>

</xml_diff>

<commit_message>
10.15 adding eda figures
</commit_message>
<xml_diff>
--- a/midterm_presentation.pptx
+++ b/midterm_presentation.pptx
@@ -4,13 +4,19 @@
   <p:sldMasterIdLst>
     <p:sldMasterId id="2147483726" r:id="rId1"/>
   </p:sldMasterIdLst>
+  <p:notesMasterIdLst>
+    <p:notesMasterId r:id="rId11"/>
+  </p:notesMasterIdLst>
   <p:sldIdLst>
     <p:sldId id="256" r:id="rId2"/>
     <p:sldId id="257" r:id="rId3"/>
-    <p:sldId id="258" r:id="rId4"/>
-    <p:sldId id="259" r:id="rId5"/>
-    <p:sldId id="260" r:id="rId6"/>
-    <p:sldId id="261" r:id="rId7"/>
+    <p:sldId id="262" r:id="rId4"/>
+    <p:sldId id="258" r:id="rId5"/>
+    <p:sldId id="263" r:id="rId6"/>
+    <p:sldId id="264" r:id="rId7"/>
+    <p:sldId id="259" r:id="rId8"/>
+    <p:sldId id="260" r:id="rId9"/>
+    <p:sldId id="261" r:id="rId10"/>
   </p:sldIdLst>
   <p:sldSz cx="12192000" cy="6858000"/>
   <p:notesSz cx="6858000" cy="9144000"/>
@@ -115,6 +121,831 @@
     </p:ext>
   </p:extLst>
 </p:presentation>
+</file>
+
+<file path=ppt/notesMasters/notesMaster1.xml><?xml version="1.0" encoding="utf-8"?>
+<p:notesMaster xmlns:a="http://schemas.openxmlformats.org/drawingml/2006/main" xmlns:r="http://schemas.openxmlformats.org/officeDocument/2006/relationships" xmlns:p="http://schemas.openxmlformats.org/presentationml/2006/main">
+  <p:cSld>
+    <p:bg>
+      <p:bgRef idx="1001">
+        <a:schemeClr val="bg1"/>
+      </p:bgRef>
+    </p:bg>
+    <p:spTree>
+      <p:nvGrpSpPr>
+        <p:cNvPr id="1" name=""/>
+        <p:cNvGrpSpPr/>
+        <p:nvPr/>
+      </p:nvGrpSpPr>
+      <p:grpSpPr>
+        <a:xfrm>
+          <a:off x="0" y="0"/>
+          <a:ext cx="0" cy="0"/>
+          <a:chOff x="0" y="0"/>
+          <a:chExt cx="0" cy="0"/>
+        </a:xfrm>
+      </p:grpSpPr>
+      <p:sp>
+        <p:nvSpPr>
+          <p:cNvPr id="2" name="Header Placeholder 1"/>
+          <p:cNvSpPr>
+            <a:spLocks noGrp="1"/>
+          </p:cNvSpPr>
+          <p:nvPr>
+            <p:ph type="hdr" sz="quarter"/>
+          </p:nvPr>
+        </p:nvSpPr>
+        <p:spPr>
+          <a:xfrm>
+            <a:off x="0" y="0"/>
+            <a:ext cx="2971800" cy="458788"/>
+          </a:xfrm>
+          <a:prstGeom prst="rect">
+            <a:avLst/>
+          </a:prstGeom>
+        </p:spPr>
+        <p:txBody>
+          <a:bodyPr vert="horz" lIns="91440" tIns="45720" rIns="91440" bIns="45720" rtlCol="0"/>
+          <a:lstStyle>
+            <a:lvl1pPr algn="l">
+              <a:defRPr sz="1200"/>
+            </a:lvl1pPr>
+          </a:lstStyle>
+          <a:p>
+            <a:endParaRPr lang="en-US"/>
+          </a:p>
+        </p:txBody>
+      </p:sp>
+      <p:sp>
+        <p:nvSpPr>
+          <p:cNvPr id="3" name="Date Placeholder 2"/>
+          <p:cNvSpPr>
+            <a:spLocks noGrp="1"/>
+          </p:cNvSpPr>
+          <p:nvPr>
+            <p:ph type="dt" idx="1"/>
+          </p:nvPr>
+        </p:nvSpPr>
+        <p:spPr>
+          <a:xfrm>
+            <a:off x="3884613" y="0"/>
+            <a:ext cx="2971800" cy="458788"/>
+          </a:xfrm>
+          <a:prstGeom prst="rect">
+            <a:avLst/>
+          </a:prstGeom>
+        </p:spPr>
+        <p:txBody>
+          <a:bodyPr vert="horz" lIns="91440" tIns="45720" rIns="91440" bIns="45720" rtlCol="0"/>
+          <a:lstStyle>
+            <a:lvl1pPr algn="r">
+              <a:defRPr sz="1200"/>
+            </a:lvl1pPr>
+          </a:lstStyle>
+          <a:p>
+            <a:fld id="{D1896B15-7E27-084A-B6F0-AF59B4FBFD21}" type="datetimeFigureOut">
+              <a:rPr lang="en-US" smtClean="0"/>
+              <a:t>10/15/23</a:t>
+            </a:fld>
+            <a:endParaRPr lang="en-US"/>
+          </a:p>
+        </p:txBody>
+      </p:sp>
+      <p:sp>
+        <p:nvSpPr>
+          <p:cNvPr id="4" name="Slide Image Placeholder 3"/>
+          <p:cNvSpPr>
+            <a:spLocks noGrp="1" noRot="1" noChangeAspect="1"/>
+          </p:cNvSpPr>
+          <p:nvPr>
+            <p:ph type="sldImg" idx="2"/>
+          </p:nvPr>
+        </p:nvSpPr>
+        <p:spPr>
+          <a:xfrm>
+            <a:off x="685800" y="1143000"/>
+            <a:ext cx="5486400" cy="3086100"/>
+          </a:xfrm>
+          <a:prstGeom prst="rect">
+            <a:avLst/>
+          </a:prstGeom>
+          <a:noFill/>
+          <a:ln w="12700">
+            <a:solidFill>
+              <a:prstClr val="black"/>
+            </a:solidFill>
+          </a:ln>
+        </p:spPr>
+        <p:txBody>
+          <a:bodyPr vert="horz" lIns="91440" tIns="45720" rIns="91440" bIns="45720" rtlCol="0" anchor="ctr"/>
+          <a:lstStyle/>
+          <a:p>
+            <a:endParaRPr lang="en-US"/>
+          </a:p>
+        </p:txBody>
+      </p:sp>
+      <p:sp>
+        <p:nvSpPr>
+          <p:cNvPr id="5" name="Notes Placeholder 4"/>
+          <p:cNvSpPr>
+            <a:spLocks noGrp="1"/>
+          </p:cNvSpPr>
+          <p:nvPr>
+            <p:ph type="body" sz="quarter" idx="3"/>
+          </p:nvPr>
+        </p:nvSpPr>
+        <p:spPr>
+          <a:xfrm>
+            <a:off x="685800" y="4400550"/>
+            <a:ext cx="5486400" cy="3600450"/>
+          </a:xfrm>
+          <a:prstGeom prst="rect">
+            <a:avLst/>
+          </a:prstGeom>
+        </p:spPr>
+        <p:txBody>
+          <a:bodyPr vert="horz" lIns="91440" tIns="45720" rIns="91440" bIns="45720" rtlCol="0"/>
+          <a:lstStyle/>
+          <a:p>
+            <a:pPr lvl="0"/>
+            <a:r>
+              <a:rPr lang="en-US"/>
+              <a:t>Click to edit Master text styles</a:t>
+            </a:r>
+          </a:p>
+          <a:p>
+            <a:pPr lvl="1"/>
+            <a:r>
+              <a:rPr lang="en-US"/>
+              <a:t>Second level</a:t>
+            </a:r>
+          </a:p>
+          <a:p>
+            <a:pPr lvl="2"/>
+            <a:r>
+              <a:rPr lang="en-US"/>
+              <a:t>Third level</a:t>
+            </a:r>
+          </a:p>
+          <a:p>
+            <a:pPr lvl="3"/>
+            <a:r>
+              <a:rPr lang="en-US"/>
+              <a:t>Fourth level</a:t>
+            </a:r>
+          </a:p>
+          <a:p>
+            <a:pPr lvl="4"/>
+            <a:r>
+              <a:rPr lang="en-US"/>
+              <a:t>Fifth level</a:t>
+            </a:r>
+          </a:p>
+        </p:txBody>
+      </p:sp>
+      <p:sp>
+        <p:nvSpPr>
+          <p:cNvPr id="6" name="Footer Placeholder 5"/>
+          <p:cNvSpPr>
+            <a:spLocks noGrp="1"/>
+          </p:cNvSpPr>
+          <p:nvPr>
+            <p:ph type="ftr" sz="quarter" idx="4"/>
+          </p:nvPr>
+        </p:nvSpPr>
+        <p:spPr>
+          <a:xfrm>
+            <a:off x="0" y="8685213"/>
+            <a:ext cx="2971800" cy="458787"/>
+          </a:xfrm>
+          <a:prstGeom prst="rect">
+            <a:avLst/>
+          </a:prstGeom>
+        </p:spPr>
+        <p:txBody>
+          <a:bodyPr vert="horz" lIns="91440" tIns="45720" rIns="91440" bIns="45720" rtlCol="0" anchor="b"/>
+          <a:lstStyle>
+            <a:lvl1pPr algn="l">
+              <a:defRPr sz="1200"/>
+            </a:lvl1pPr>
+          </a:lstStyle>
+          <a:p>
+            <a:endParaRPr lang="en-US"/>
+          </a:p>
+        </p:txBody>
+      </p:sp>
+      <p:sp>
+        <p:nvSpPr>
+          <p:cNvPr id="7" name="Slide Number Placeholder 6"/>
+          <p:cNvSpPr>
+            <a:spLocks noGrp="1"/>
+          </p:cNvSpPr>
+          <p:nvPr>
+            <p:ph type="sldNum" sz="quarter" idx="5"/>
+          </p:nvPr>
+        </p:nvSpPr>
+        <p:spPr>
+          <a:xfrm>
+            <a:off x="3884613" y="8685213"/>
+            <a:ext cx="2971800" cy="458787"/>
+          </a:xfrm>
+          <a:prstGeom prst="rect">
+            <a:avLst/>
+          </a:prstGeom>
+        </p:spPr>
+        <p:txBody>
+          <a:bodyPr vert="horz" lIns="91440" tIns="45720" rIns="91440" bIns="45720" rtlCol="0" anchor="b"/>
+          <a:lstStyle>
+            <a:lvl1pPr algn="r">
+              <a:defRPr sz="1200"/>
+            </a:lvl1pPr>
+          </a:lstStyle>
+          <a:p>
+            <a:fld id="{7D2FF3FF-56DF-6C4D-875B-8D0CAFDF751D}" type="slidenum">
+              <a:rPr lang="en-US" smtClean="0"/>
+              <a:t>‹#›</a:t>
+            </a:fld>
+            <a:endParaRPr lang="en-US"/>
+          </a:p>
+        </p:txBody>
+      </p:sp>
+    </p:spTree>
+    <p:extLst>
+      <p:ext uri="{BB962C8B-B14F-4D97-AF65-F5344CB8AC3E}">
+        <p14:creationId xmlns:p14="http://schemas.microsoft.com/office/powerpoint/2010/main" val="4272935905"/>
+      </p:ext>
+    </p:extLst>
+  </p:cSld>
+  <p:clrMap bg1="lt1" tx1="dk1" bg2="lt2" tx2="dk2" accent1="accent1" accent2="accent2" accent3="accent3" accent4="accent4" accent5="accent5" accent6="accent6" hlink="hlink" folHlink="folHlink"/>
+  <p:notesStyle>
+    <a:lvl1pPr marL="0" algn="l" defTabSz="914400" rtl="0" eaLnBrk="1" latinLnBrk="0" hangingPunct="1">
+      <a:defRPr sz="1200" kern="1200">
+        <a:solidFill>
+          <a:schemeClr val="tx1"/>
+        </a:solidFill>
+        <a:latin typeface="+mn-lt"/>
+        <a:ea typeface="+mn-ea"/>
+        <a:cs typeface="+mn-cs"/>
+      </a:defRPr>
+    </a:lvl1pPr>
+    <a:lvl2pPr marL="457200" algn="l" defTabSz="914400" rtl="0" eaLnBrk="1" latinLnBrk="0" hangingPunct="1">
+      <a:defRPr sz="1200" kern="1200">
+        <a:solidFill>
+          <a:schemeClr val="tx1"/>
+        </a:solidFill>
+        <a:latin typeface="+mn-lt"/>
+        <a:ea typeface="+mn-ea"/>
+        <a:cs typeface="+mn-cs"/>
+      </a:defRPr>
+    </a:lvl2pPr>
+    <a:lvl3pPr marL="914400" algn="l" defTabSz="914400" rtl="0" eaLnBrk="1" latinLnBrk="0" hangingPunct="1">
+      <a:defRPr sz="1200" kern="1200">
+        <a:solidFill>
+          <a:schemeClr val="tx1"/>
+        </a:solidFill>
+        <a:latin typeface="+mn-lt"/>
+        <a:ea typeface="+mn-ea"/>
+        <a:cs typeface="+mn-cs"/>
+      </a:defRPr>
+    </a:lvl3pPr>
+    <a:lvl4pPr marL="1371600" algn="l" defTabSz="914400" rtl="0" eaLnBrk="1" latinLnBrk="0" hangingPunct="1">
+      <a:defRPr sz="1200" kern="1200">
+        <a:solidFill>
+          <a:schemeClr val="tx1"/>
+        </a:solidFill>
+        <a:latin typeface="+mn-lt"/>
+        <a:ea typeface="+mn-ea"/>
+        <a:cs typeface="+mn-cs"/>
+      </a:defRPr>
+    </a:lvl4pPr>
+    <a:lvl5pPr marL="1828800" algn="l" defTabSz="914400" rtl="0" eaLnBrk="1" latinLnBrk="0" hangingPunct="1">
+      <a:defRPr sz="1200" kern="1200">
+        <a:solidFill>
+          <a:schemeClr val="tx1"/>
+        </a:solidFill>
+        <a:latin typeface="+mn-lt"/>
+        <a:ea typeface="+mn-ea"/>
+        <a:cs typeface="+mn-cs"/>
+      </a:defRPr>
+    </a:lvl5pPr>
+    <a:lvl6pPr marL="2286000" algn="l" defTabSz="914400" rtl="0" eaLnBrk="1" latinLnBrk="0" hangingPunct="1">
+      <a:defRPr sz="1200" kern="1200">
+        <a:solidFill>
+          <a:schemeClr val="tx1"/>
+        </a:solidFill>
+        <a:latin typeface="+mn-lt"/>
+        <a:ea typeface="+mn-ea"/>
+        <a:cs typeface="+mn-cs"/>
+      </a:defRPr>
+    </a:lvl6pPr>
+    <a:lvl7pPr marL="2743200" algn="l" defTabSz="914400" rtl="0" eaLnBrk="1" latinLnBrk="0" hangingPunct="1">
+      <a:defRPr sz="1200" kern="1200">
+        <a:solidFill>
+          <a:schemeClr val="tx1"/>
+        </a:solidFill>
+        <a:latin typeface="+mn-lt"/>
+        <a:ea typeface="+mn-ea"/>
+        <a:cs typeface="+mn-cs"/>
+      </a:defRPr>
+    </a:lvl7pPr>
+    <a:lvl8pPr marL="3200400" algn="l" defTabSz="914400" rtl="0" eaLnBrk="1" latinLnBrk="0" hangingPunct="1">
+      <a:defRPr sz="1200" kern="1200">
+        <a:solidFill>
+          <a:schemeClr val="tx1"/>
+        </a:solidFill>
+        <a:latin typeface="+mn-lt"/>
+        <a:ea typeface="+mn-ea"/>
+        <a:cs typeface="+mn-cs"/>
+      </a:defRPr>
+    </a:lvl8pPr>
+    <a:lvl9pPr marL="3657600" algn="l" defTabSz="914400" rtl="0" eaLnBrk="1" latinLnBrk="0" hangingPunct="1">
+      <a:defRPr sz="1200" kern="1200">
+        <a:solidFill>
+          <a:schemeClr val="tx1"/>
+        </a:solidFill>
+        <a:latin typeface="+mn-lt"/>
+        <a:ea typeface="+mn-ea"/>
+        <a:cs typeface="+mn-cs"/>
+      </a:defRPr>
+    </a:lvl9pPr>
+  </p:notesStyle>
+</p:notesMaster>
+</file>
+
+<file path=ppt/notesSlides/notesSlide1.xml><?xml version="1.0" encoding="utf-8"?>
+<p:notes xmlns:a="http://schemas.openxmlformats.org/drawingml/2006/main" xmlns:r="http://schemas.openxmlformats.org/officeDocument/2006/relationships" xmlns:p="http://schemas.openxmlformats.org/presentationml/2006/main">
+  <p:cSld>
+    <p:spTree>
+      <p:nvGrpSpPr>
+        <p:cNvPr id="1" name=""/>
+        <p:cNvGrpSpPr/>
+        <p:nvPr/>
+      </p:nvGrpSpPr>
+      <p:grpSpPr>
+        <a:xfrm>
+          <a:off x="0" y="0"/>
+          <a:ext cx="0" cy="0"/>
+          <a:chOff x="0" y="0"/>
+          <a:chExt cx="0" cy="0"/>
+        </a:xfrm>
+      </p:grpSpPr>
+      <p:sp>
+        <p:nvSpPr>
+          <p:cNvPr id="2" name="Slide Image Placeholder 1"/>
+          <p:cNvSpPr>
+            <a:spLocks noGrp="1" noRot="1" noChangeAspect="1"/>
+          </p:cNvSpPr>
+          <p:nvPr>
+            <p:ph type="sldImg"/>
+          </p:nvPr>
+        </p:nvSpPr>
+        <p:spPr/>
+      </p:sp>
+      <p:sp>
+        <p:nvSpPr>
+          <p:cNvPr id="3" name="Notes Placeholder 2"/>
+          <p:cNvSpPr>
+            <a:spLocks noGrp="1"/>
+          </p:cNvSpPr>
+          <p:nvPr>
+            <p:ph type="body" idx="1"/>
+          </p:nvPr>
+        </p:nvSpPr>
+        <p:spPr/>
+        <p:txBody>
+          <a:bodyPr/>
+          <a:lstStyle/>
+          <a:p>
+            <a:r>
+              <a:rPr lang="en-US" altLang="zh-CN" dirty="0"/>
+              <a:t>I</a:t>
+            </a:r>
+            <a:r>
+              <a:rPr lang="zh-CN" altLang="en-US" dirty="0"/>
+              <a:t> </a:t>
+            </a:r>
+            <a:r>
+              <a:rPr lang="en-US" altLang="zh-CN" dirty="0"/>
+              <a:t>would</a:t>
+            </a:r>
+            <a:r>
+              <a:rPr lang="zh-CN" altLang="en-US" dirty="0"/>
+              <a:t> </a:t>
+            </a:r>
+            <a:r>
+              <a:rPr lang="en-US" altLang="zh-CN" dirty="0"/>
+              <a:t>like</a:t>
+            </a:r>
+            <a:r>
+              <a:rPr lang="zh-CN" altLang="en-US" dirty="0"/>
+              <a:t> </a:t>
+            </a:r>
+            <a:r>
+              <a:rPr lang="en-US" altLang="zh-CN" dirty="0"/>
+              <a:t>to</a:t>
+            </a:r>
+            <a:r>
+              <a:rPr lang="zh-CN" altLang="en-US" dirty="0"/>
+              <a:t> </a:t>
+            </a:r>
+            <a:r>
+              <a:rPr lang="en-US" altLang="zh-CN" dirty="0"/>
+              <a:t>use</a:t>
+            </a:r>
+            <a:r>
+              <a:rPr lang="zh-CN" altLang="en-US" dirty="0"/>
+              <a:t> </a:t>
+            </a:r>
+            <a:r>
+              <a:rPr lang="en-US" altLang="zh-CN" dirty="0"/>
+              <a:t>this</a:t>
+            </a:r>
+            <a:r>
+              <a:rPr lang="zh-CN" altLang="en-US" dirty="0"/>
+              <a:t> </a:t>
+            </a:r>
+            <a:r>
+              <a:rPr lang="en-US" altLang="zh-CN" dirty="0"/>
+              <a:t>ML</a:t>
+            </a:r>
+            <a:r>
+              <a:rPr lang="zh-CN" altLang="en-US" dirty="0"/>
+              <a:t> </a:t>
+            </a:r>
+            <a:r>
+              <a:rPr lang="en-US" altLang="zh-CN" dirty="0"/>
+              <a:t>model</a:t>
+            </a:r>
+            <a:r>
+              <a:rPr lang="zh-CN" altLang="en-US" dirty="0"/>
+              <a:t> </a:t>
+            </a:r>
+            <a:r>
+              <a:rPr lang="en-US" altLang="zh-CN" dirty="0"/>
+              <a:t>to</a:t>
+            </a:r>
+            <a:r>
+              <a:rPr lang="zh-CN" altLang="en-US" dirty="0"/>
+              <a:t> </a:t>
+            </a:r>
+            <a:r>
+              <a:rPr lang="en-US" altLang="zh-CN" dirty="0"/>
+              <a:t>reduce</a:t>
+            </a:r>
+            <a:r>
+              <a:rPr lang="zh-CN" altLang="en-US" dirty="0"/>
+              <a:t> </a:t>
+            </a:r>
+            <a:r>
+              <a:rPr lang="en-US" altLang="zh-CN" dirty="0"/>
+              <a:t>the</a:t>
+            </a:r>
+            <a:r>
+              <a:rPr lang="zh-CN" altLang="en-US" dirty="0"/>
+              <a:t> </a:t>
+            </a:r>
+            <a:r>
+              <a:rPr lang="en-US" altLang="zh-CN" dirty="0"/>
+              <a:t>dangerous</a:t>
+            </a:r>
+            <a:r>
+              <a:rPr lang="zh-CN" altLang="en-US" dirty="0"/>
+              <a:t> </a:t>
+            </a:r>
+            <a:r>
+              <a:rPr lang="en-US" altLang="zh-CN" dirty="0"/>
+              <a:t>of</a:t>
+            </a:r>
+            <a:r>
+              <a:rPr lang="zh-CN" altLang="en-US" dirty="0"/>
+              <a:t> </a:t>
+            </a:r>
+            <a:r>
+              <a:rPr lang="en-US" altLang="zh-CN" dirty="0"/>
+              <a:t>people</a:t>
+            </a:r>
+            <a:r>
+              <a:rPr lang="zh-CN" altLang="en-US" dirty="0"/>
+              <a:t> </a:t>
+            </a:r>
+            <a:r>
+              <a:rPr lang="en-US" altLang="zh-CN" dirty="0"/>
+              <a:t>who</a:t>
+            </a:r>
+            <a:r>
+              <a:rPr lang="zh-CN" altLang="en-US" dirty="0"/>
+              <a:t> </a:t>
+            </a:r>
+            <a:r>
+              <a:rPr lang="en-US" altLang="zh-CN" dirty="0"/>
+              <a:t>are</a:t>
+            </a:r>
+            <a:r>
+              <a:rPr lang="zh-CN" altLang="en-US" dirty="0"/>
+              <a:t> </a:t>
+            </a:r>
+            <a:r>
+              <a:rPr lang="en-US" altLang="zh-CN" dirty="0"/>
+              <a:t>trying</a:t>
+            </a:r>
+            <a:r>
+              <a:rPr lang="zh-CN" altLang="en-US" dirty="0"/>
+              <a:t> </a:t>
+            </a:r>
+            <a:r>
+              <a:rPr lang="en-US" altLang="zh-CN" dirty="0"/>
+              <a:t>to</a:t>
+            </a:r>
+            <a:r>
+              <a:rPr lang="zh-CN" altLang="en-US" dirty="0"/>
+              <a:t> </a:t>
+            </a:r>
+            <a:r>
+              <a:rPr lang="en-US" altLang="zh-CN" dirty="0"/>
+              <a:t>identify</a:t>
+            </a:r>
+            <a:r>
+              <a:rPr lang="zh-CN" altLang="en-US" dirty="0"/>
+              <a:t> </a:t>
+            </a:r>
+            <a:r>
+              <a:rPr lang="en-US" altLang="zh-CN" dirty="0"/>
+              <a:t>the</a:t>
+            </a:r>
+            <a:r>
+              <a:rPr lang="zh-CN" altLang="en-US" dirty="0"/>
+              <a:t> </a:t>
+            </a:r>
+            <a:r>
+              <a:rPr lang="en-US" altLang="zh-CN" dirty="0"/>
+              <a:t>edibility</a:t>
+            </a:r>
+            <a:r>
+              <a:rPr lang="zh-CN" altLang="en-US" dirty="0"/>
+              <a:t> </a:t>
+            </a:r>
+            <a:r>
+              <a:rPr lang="en-US" altLang="zh-CN" dirty="0"/>
+              <a:t>of</a:t>
+            </a:r>
+            <a:r>
+              <a:rPr lang="zh-CN" altLang="en-US" dirty="0"/>
+              <a:t> </a:t>
+            </a:r>
+            <a:r>
+              <a:rPr lang="en-US" altLang="zh-CN" dirty="0"/>
+              <a:t>an</a:t>
+            </a:r>
+            <a:r>
+              <a:rPr lang="zh-CN" altLang="en-US" dirty="0"/>
+              <a:t> </a:t>
+            </a:r>
+            <a:r>
+              <a:rPr lang="en-US" altLang="zh-CN" dirty="0"/>
+              <a:t>unseen</a:t>
+            </a:r>
+            <a:r>
+              <a:rPr lang="zh-CN" altLang="en-US" dirty="0"/>
+              <a:t> </a:t>
+            </a:r>
+            <a:r>
+              <a:rPr lang="en-US" altLang="zh-CN" dirty="0"/>
+              <a:t>type</a:t>
+            </a:r>
+            <a:r>
+              <a:rPr lang="zh-CN" altLang="en-US" dirty="0"/>
+              <a:t> </a:t>
+            </a:r>
+            <a:r>
+              <a:rPr lang="en-US" altLang="zh-CN" dirty="0"/>
+              <a:t>of</a:t>
+            </a:r>
+            <a:r>
+              <a:rPr lang="zh-CN" altLang="en-US" dirty="0"/>
+              <a:t> </a:t>
+            </a:r>
+            <a:r>
+              <a:rPr lang="en-US" altLang="zh-CN" dirty="0"/>
+              <a:t>mushroom.</a:t>
+            </a:r>
+            <a:r>
+              <a:rPr lang="zh-CN" altLang="en-US" dirty="0"/>
+              <a:t> </a:t>
+            </a:r>
+            <a:r>
+              <a:rPr lang="en-US" altLang="zh-CN" dirty="0"/>
+              <a:t>Before</a:t>
+            </a:r>
+            <a:r>
+              <a:rPr lang="zh-CN" altLang="en-US" dirty="0"/>
+              <a:t> </a:t>
+            </a:r>
+            <a:r>
+              <a:rPr lang="en-US" altLang="zh-CN" dirty="0"/>
+              <a:t>the</a:t>
+            </a:r>
+            <a:r>
+              <a:rPr lang="zh-CN" altLang="en-US" dirty="0"/>
+              <a:t> </a:t>
+            </a:r>
+            <a:r>
+              <a:rPr lang="en-US" altLang="zh-CN" dirty="0"/>
+              <a:t>arising</a:t>
+            </a:r>
+            <a:r>
+              <a:rPr lang="zh-CN" altLang="en-US" dirty="0"/>
+              <a:t> </a:t>
+            </a:r>
+            <a:r>
+              <a:rPr lang="en-US" altLang="zh-CN" dirty="0"/>
+              <a:t>of</a:t>
+            </a:r>
+            <a:r>
+              <a:rPr lang="zh-CN" altLang="en-US" dirty="0"/>
+              <a:t> </a:t>
+            </a:r>
+            <a:r>
+              <a:rPr lang="en-US" altLang="zh-CN" dirty="0"/>
+              <a:t>technology,</a:t>
+            </a:r>
+            <a:r>
+              <a:rPr lang="zh-CN" altLang="en-US" dirty="0"/>
+              <a:t> </a:t>
+            </a:r>
+            <a:r>
+              <a:rPr lang="en-US" altLang="zh-CN" dirty="0"/>
+              <a:t>the</a:t>
+            </a:r>
+            <a:r>
+              <a:rPr lang="zh-CN" altLang="en-US" dirty="0"/>
+              <a:t> </a:t>
+            </a:r>
+            <a:r>
+              <a:rPr lang="en-US" altLang="zh-CN" dirty="0"/>
+              <a:t>people</a:t>
+            </a:r>
+            <a:r>
+              <a:rPr lang="zh-CN" altLang="en-US" dirty="0"/>
+              <a:t> </a:t>
+            </a:r>
+            <a:r>
+              <a:rPr lang="en-US" altLang="zh-CN" dirty="0"/>
+              <a:t>who</a:t>
+            </a:r>
+            <a:r>
+              <a:rPr lang="zh-CN" altLang="en-US" dirty="0"/>
+              <a:t> </a:t>
+            </a:r>
+            <a:r>
+              <a:rPr lang="en-US" altLang="zh-CN" dirty="0"/>
+              <a:t>discovered</a:t>
+            </a:r>
+            <a:r>
+              <a:rPr lang="zh-CN" altLang="en-US" dirty="0"/>
+              <a:t> </a:t>
+            </a:r>
+            <a:r>
+              <a:rPr lang="en-US" altLang="zh-CN" dirty="0"/>
+              <a:t>new</a:t>
+            </a:r>
+            <a:r>
+              <a:rPr lang="zh-CN" altLang="en-US" dirty="0"/>
+              <a:t> </a:t>
+            </a:r>
+            <a:r>
+              <a:rPr lang="en-US" altLang="zh-CN" dirty="0"/>
+              <a:t>mushroom</a:t>
+            </a:r>
+            <a:r>
+              <a:rPr lang="zh-CN" altLang="en-US" dirty="0"/>
+              <a:t> </a:t>
+            </a:r>
+            <a:r>
+              <a:rPr lang="en-US" altLang="zh-CN" dirty="0"/>
+              <a:t>can</a:t>
+            </a:r>
+            <a:r>
+              <a:rPr lang="zh-CN" altLang="en-US" dirty="0"/>
+              <a:t> </a:t>
+            </a:r>
+            <a:r>
+              <a:rPr lang="en-US" altLang="zh-CN" dirty="0"/>
+              <a:t>only</a:t>
+            </a:r>
+            <a:r>
+              <a:rPr lang="zh-CN" altLang="en-US" dirty="0"/>
+              <a:t> </a:t>
+            </a:r>
+            <a:r>
+              <a:rPr lang="en-US" altLang="zh-CN" dirty="0"/>
+              <a:t>identify</a:t>
+            </a:r>
+            <a:r>
+              <a:rPr lang="zh-CN" altLang="en-US" dirty="0"/>
+              <a:t> </a:t>
+            </a:r>
+            <a:r>
+              <a:rPr lang="en-US" altLang="zh-CN" dirty="0"/>
+              <a:t>them</a:t>
+            </a:r>
+            <a:r>
+              <a:rPr lang="zh-CN" altLang="en-US" dirty="0"/>
+              <a:t> </a:t>
+            </a:r>
+            <a:r>
+              <a:rPr lang="en-US" altLang="zh-CN" dirty="0"/>
+              <a:t>by</a:t>
+            </a:r>
+            <a:r>
+              <a:rPr lang="zh-CN" altLang="en-US" dirty="0"/>
+              <a:t> </a:t>
+            </a:r>
+            <a:r>
+              <a:rPr lang="en-US" altLang="zh-CN" dirty="0"/>
+              <a:t>tasting</a:t>
+            </a:r>
+            <a:r>
+              <a:rPr lang="zh-CN" altLang="en-US" dirty="0"/>
+              <a:t> </a:t>
+            </a:r>
+            <a:r>
+              <a:rPr lang="en-US" altLang="zh-CN" dirty="0"/>
+              <a:t>them</a:t>
+            </a:r>
+            <a:r>
+              <a:rPr lang="zh-CN" altLang="en-US" dirty="0"/>
+              <a:t> </a:t>
+            </a:r>
+            <a:r>
+              <a:rPr lang="en-US" altLang="zh-CN" dirty="0"/>
+              <a:t>which</a:t>
+            </a:r>
+            <a:r>
+              <a:rPr lang="zh-CN" altLang="en-US" dirty="0"/>
+              <a:t> </a:t>
+            </a:r>
+            <a:r>
+              <a:rPr lang="en-US" altLang="zh-CN" dirty="0"/>
+              <a:t>is</a:t>
+            </a:r>
+            <a:r>
+              <a:rPr lang="zh-CN" altLang="en-US" dirty="0"/>
+              <a:t> </a:t>
+            </a:r>
+            <a:r>
+              <a:rPr lang="en-US" altLang="zh-CN" dirty="0"/>
+              <a:t>high</a:t>
+            </a:r>
+            <a:r>
+              <a:rPr lang="zh-CN" altLang="en-US" dirty="0"/>
+              <a:t> </a:t>
+            </a:r>
+            <a:r>
+              <a:rPr lang="en-US" altLang="zh-CN" dirty="0"/>
+              <a:t>risk.</a:t>
+            </a:r>
+            <a:r>
+              <a:rPr lang="zh-CN" altLang="en-US" dirty="0"/>
+              <a:t> </a:t>
+            </a:r>
+            <a:endParaRPr lang="en-US" dirty="0"/>
+          </a:p>
+        </p:txBody>
+      </p:sp>
+      <p:sp>
+        <p:nvSpPr>
+          <p:cNvPr id="4" name="Slide Number Placeholder 3"/>
+          <p:cNvSpPr>
+            <a:spLocks noGrp="1"/>
+          </p:cNvSpPr>
+          <p:nvPr>
+            <p:ph type="sldNum" sz="quarter" idx="5"/>
+          </p:nvPr>
+        </p:nvSpPr>
+        <p:spPr/>
+        <p:txBody>
+          <a:bodyPr/>
+          <a:lstStyle/>
+          <a:p>
+            <a:fld id="{7D2FF3FF-56DF-6C4D-875B-8D0CAFDF751D}" type="slidenum">
+              <a:rPr lang="en-US" smtClean="0"/>
+              <a:t>2</a:t>
+            </a:fld>
+            <a:endParaRPr lang="en-US"/>
+          </a:p>
+        </p:txBody>
+      </p:sp>
+    </p:spTree>
+    <p:extLst>
+      <p:ext uri="{BB962C8B-B14F-4D97-AF65-F5344CB8AC3E}">
+        <p14:creationId xmlns:p14="http://schemas.microsoft.com/office/powerpoint/2010/main" val="2730399546"/>
+      </p:ext>
+    </p:extLst>
+  </p:cSld>
+  <p:clrMapOvr>
+    <a:masterClrMapping/>
+  </p:clrMapOvr>
+</p:notes>
 </file>
 
 <file path=ppt/slideLayouts/slideLayout1.xml><?xml version="1.0" encoding="utf-8"?>
@@ -14299,7 +15130,7 @@
         </p:nvSpPr>
         <p:spPr>
           <a:xfrm>
-            <a:off x="6513788" y="365125"/>
+            <a:off x="6444003" y="139838"/>
             <a:ext cx="4840010" cy="1807305"/>
           </a:xfrm>
         </p:spPr>
@@ -14356,13 +15187,13 @@
           <p:nvPr/>
         </p:nvPicPr>
         <p:blipFill rotWithShape="1">
-          <a:blip r:embed="rId2"/>
+          <a:blip r:embed="rId3"/>
           <a:srcRect l="32145" r="8321" b="-1"/>
           <a:stretch/>
         </p:blipFill>
         <p:spPr>
           <a:xfrm>
-            <a:off x="2" y="10"/>
+            <a:off x="-139147" y="10"/>
             <a:ext cx="5678211" cy="6857990"/>
           </a:xfrm>
           <a:custGeom>
@@ -14736,673 +15567,659 @@
         </p:nvSpPr>
         <p:spPr>
           <a:xfrm>
-            <a:off x="5678213" y="2054087"/>
-            <a:ext cx="6275248" cy="4122876"/>
+            <a:off x="5225143" y="1855088"/>
+            <a:ext cx="6847113" cy="4757530"/>
           </a:xfrm>
         </p:spPr>
         <p:txBody>
           <a:bodyPr>
-            <a:normAutofit/>
+            <a:noAutofit/>
           </a:bodyPr>
           <a:lstStyle/>
           <a:p>
             <a:r>
-              <a:rPr lang="en-US" altLang="zh-CN" sz="2000" dirty="0"/>
+              <a:rPr lang="en-US" altLang="zh-CN" sz="2300" dirty="0"/>
               <a:t>If</a:t>
             </a:r>
             <a:r>
-              <a:rPr lang="zh-CN" altLang="en-US" sz="2000" dirty="0"/>
-              <a:t> </a:t>
-            </a:r>
-            <a:r>
-              <a:rPr lang="en-US" altLang="zh-CN" sz="2000" dirty="0"/>
+              <a:rPr lang="zh-CN" altLang="en-US" sz="2300" dirty="0"/>
+              <a:t> </a:t>
+            </a:r>
+            <a:r>
+              <a:rPr lang="en-US" altLang="zh-CN" sz="2300" dirty="0"/>
               <a:t>there</a:t>
             </a:r>
             <a:r>
-              <a:rPr lang="zh-CN" altLang="en-US" sz="2000" dirty="0"/>
-              <a:t> </a:t>
-            </a:r>
-            <a:r>
-              <a:rPr lang="en-US" altLang="zh-CN" sz="2000" dirty="0"/>
+              <a:rPr lang="zh-CN" altLang="en-US" sz="2300" dirty="0"/>
+              <a:t> </a:t>
+            </a:r>
+            <a:r>
+              <a:rPr lang="en-US" altLang="zh-CN" sz="2300" dirty="0"/>
               <a:t>exists</a:t>
             </a:r>
             <a:r>
-              <a:rPr lang="zh-CN" altLang="en-US" sz="2000" dirty="0"/>
-              <a:t> </a:t>
-            </a:r>
-            <a:r>
-              <a:rPr lang="en-US" altLang="zh-CN" sz="2000" dirty="0"/>
+              <a:rPr lang="zh-CN" altLang="en-US" sz="2300" dirty="0"/>
+              <a:t> </a:t>
+            </a:r>
+            <a:r>
+              <a:rPr lang="en-US" altLang="zh-CN" sz="2300" dirty="0"/>
               <a:t>a</a:t>
             </a:r>
             <a:r>
-              <a:rPr lang="zh-CN" altLang="en-US" sz="2000" dirty="0"/>
-              <a:t> </a:t>
-            </a:r>
-            <a:r>
-              <a:rPr lang="en-US" altLang="zh-CN" sz="2000" dirty="0"/>
+              <a:rPr lang="zh-CN" altLang="en-US" sz="2300" dirty="0"/>
+              <a:t> </a:t>
+            </a:r>
+            <a:r>
+              <a:rPr lang="en-US" altLang="zh-CN" sz="2300" dirty="0"/>
               <a:t>mushroom</a:t>
             </a:r>
             <a:r>
-              <a:rPr lang="zh-CN" altLang="en-US" sz="2000" dirty="0"/>
-              <a:t> </a:t>
-            </a:r>
-            <a:r>
-              <a:rPr lang="en-US" altLang="zh-CN" sz="2000" dirty="0"/>
+              <a:rPr lang="zh-CN" altLang="en-US" sz="2300" dirty="0"/>
+              <a:t> </a:t>
+            </a:r>
+            <a:r>
+              <a:rPr lang="en-US" altLang="zh-CN" sz="2300" dirty="0"/>
               <a:t>that</a:t>
             </a:r>
             <a:r>
-              <a:rPr lang="zh-CN" altLang="en-US" sz="2000" dirty="0"/>
-              <a:t> </a:t>
-            </a:r>
-            <a:r>
-              <a:rPr lang="en-US" altLang="zh-CN" sz="2000" dirty="0"/>
+              <a:rPr lang="zh-CN" altLang="en-US" sz="2300" dirty="0"/>
+              <a:t> </a:t>
+            </a:r>
+            <a:r>
+              <a:rPr lang="en-US" altLang="zh-CN" sz="2300" dirty="0"/>
               <a:t>has</a:t>
             </a:r>
             <a:r>
-              <a:rPr lang="zh-CN" altLang="en-US" sz="2000" dirty="0"/>
-              <a:t> </a:t>
-            </a:r>
-            <a:r>
-              <a:rPr lang="en-US" altLang="zh-CN" sz="2000" dirty="0"/>
+              <a:rPr lang="zh-CN" altLang="en-US" sz="2300" dirty="0"/>
+              <a:t> </a:t>
+            </a:r>
+            <a:r>
+              <a:rPr lang="en-US" altLang="zh-CN" sz="2300" dirty="0"/>
               <a:t>never</a:t>
             </a:r>
             <a:r>
-              <a:rPr lang="zh-CN" altLang="en-US" sz="2000" dirty="0"/>
-              <a:t> </a:t>
-            </a:r>
-            <a:r>
-              <a:rPr lang="en-US" altLang="zh-CN" sz="2000" dirty="0"/>
+              <a:rPr lang="zh-CN" altLang="en-US" sz="2300" dirty="0"/>
+              <a:t> </a:t>
+            </a:r>
+            <a:r>
+              <a:rPr lang="en-US" altLang="zh-CN" sz="2300" dirty="0"/>
               <a:t>seen</a:t>
             </a:r>
             <a:r>
-              <a:rPr lang="zh-CN" altLang="en-US" sz="2000" dirty="0"/>
-              <a:t> </a:t>
-            </a:r>
-            <a:r>
-              <a:rPr lang="en-US" altLang="zh-CN" sz="2000" dirty="0"/>
+              <a:rPr lang="zh-CN" altLang="en-US" sz="2300" dirty="0"/>
+              <a:t> </a:t>
+            </a:r>
+            <a:r>
+              <a:rPr lang="en-US" altLang="zh-CN" sz="2300" dirty="0"/>
               <a:t>before,</a:t>
             </a:r>
             <a:r>
-              <a:rPr lang="zh-CN" altLang="en-US" sz="2000" dirty="0"/>
-              <a:t> </a:t>
-            </a:r>
-            <a:r>
-              <a:rPr lang="en-US" altLang="zh-CN" sz="2000" dirty="0"/>
+              <a:rPr lang="zh-CN" altLang="en-US" sz="2300" dirty="0"/>
+              <a:t> </a:t>
+            </a:r>
+            <a:r>
+              <a:rPr lang="en-US" altLang="zh-CN" sz="2300" dirty="0"/>
               <a:t>will</a:t>
             </a:r>
             <a:r>
-              <a:rPr lang="zh-CN" altLang="en-US" sz="2000" dirty="0"/>
-              <a:t> </a:t>
-            </a:r>
-            <a:r>
-              <a:rPr lang="en-US" altLang="zh-CN" sz="2000" dirty="0"/>
+              <a:rPr lang="zh-CN" altLang="en-US" sz="2300" dirty="0"/>
+              <a:t> </a:t>
+            </a:r>
+            <a:r>
+              <a:rPr lang="en-US" altLang="zh-CN" sz="2300" dirty="0"/>
               <a:t>it</a:t>
             </a:r>
             <a:r>
-              <a:rPr lang="zh-CN" altLang="en-US" sz="2000" dirty="0"/>
-              <a:t> </a:t>
-            </a:r>
-            <a:r>
-              <a:rPr lang="en-US" altLang="zh-CN" sz="2000" dirty="0"/>
+              <a:rPr lang="zh-CN" altLang="en-US" sz="2300" dirty="0"/>
+              <a:t> </a:t>
+            </a:r>
+            <a:r>
+              <a:rPr lang="en-US" altLang="zh-CN" sz="2300" dirty="0"/>
               <a:t>be</a:t>
             </a:r>
             <a:r>
-              <a:rPr lang="zh-CN" altLang="en-US" sz="2000" dirty="0"/>
-              <a:t> </a:t>
-            </a:r>
-            <a:r>
-              <a:rPr lang="en-US" altLang="zh-CN" sz="2000" dirty="0"/>
+              <a:rPr lang="zh-CN" altLang="en-US" sz="2300" dirty="0"/>
+              <a:t> </a:t>
+            </a:r>
+            <a:r>
+              <a:rPr lang="en-US" altLang="zh-CN" sz="2300" dirty="0"/>
               <a:t>edible</a:t>
             </a:r>
             <a:r>
-              <a:rPr lang="zh-CN" altLang="en-US" sz="2000" dirty="0"/>
-              <a:t> </a:t>
-            </a:r>
-            <a:r>
-              <a:rPr lang="en-US" altLang="zh-CN" sz="2000" dirty="0"/>
+              <a:rPr lang="zh-CN" altLang="en-US" sz="2300" dirty="0"/>
+              <a:t> </a:t>
+            </a:r>
+            <a:r>
+              <a:rPr lang="en-US" altLang="zh-CN" sz="2300" dirty="0"/>
               <a:t>or</a:t>
             </a:r>
             <a:r>
-              <a:rPr lang="zh-CN" altLang="en-US" sz="2000" dirty="0"/>
-              <a:t> </a:t>
-            </a:r>
-            <a:r>
-              <a:rPr lang="en-US" altLang="zh-CN" sz="2000" dirty="0"/>
+              <a:rPr lang="zh-CN" altLang="en-US" sz="2300" dirty="0"/>
+              <a:t> </a:t>
+            </a:r>
+            <a:r>
+              <a:rPr lang="en-US" altLang="zh-CN" sz="2300" dirty="0"/>
               <a:t>it</a:t>
             </a:r>
             <a:r>
-              <a:rPr lang="zh-CN" altLang="en-US" sz="2000" dirty="0"/>
-              <a:t> </a:t>
-            </a:r>
-            <a:r>
-              <a:rPr lang="en-US" altLang="zh-CN" sz="2000" dirty="0"/>
+              <a:rPr lang="zh-CN" altLang="en-US" sz="2300" dirty="0"/>
+              <a:t> </a:t>
+            </a:r>
+            <a:r>
+              <a:rPr lang="en-US" altLang="zh-CN" sz="2300" dirty="0"/>
               <a:t>is</a:t>
             </a:r>
             <a:r>
-              <a:rPr lang="zh-CN" altLang="en-US" sz="2000" dirty="0"/>
-              <a:t> </a:t>
-            </a:r>
-            <a:r>
-              <a:rPr lang="en-US" altLang="zh-CN" sz="2000" dirty="0"/>
+              <a:rPr lang="zh-CN" altLang="en-US" sz="2300" dirty="0"/>
+              <a:t> </a:t>
+            </a:r>
+            <a:r>
+              <a:rPr lang="en-US" altLang="zh-CN" sz="2300" dirty="0"/>
               <a:t>poisonous?</a:t>
             </a:r>
           </a:p>
           <a:p>
             <a:r>
-              <a:rPr lang="en-US" altLang="zh-CN" sz="2000" dirty="0"/>
+              <a:rPr lang="en-US" altLang="zh-CN" sz="2300" dirty="0"/>
               <a:t>I</a:t>
             </a:r>
             <a:r>
-              <a:rPr lang="zh-CN" altLang="en-US" sz="2000" dirty="0"/>
-              <a:t> </a:t>
-            </a:r>
-            <a:r>
-              <a:rPr lang="en-US" altLang="zh-CN" sz="2000" dirty="0"/>
+              <a:rPr lang="zh-CN" altLang="en-US" sz="2300" dirty="0"/>
+              <a:t> </a:t>
+            </a:r>
+            <a:r>
+              <a:rPr lang="en-US" altLang="zh-CN" sz="2300" dirty="0"/>
               <a:t>find</a:t>
             </a:r>
             <a:r>
-              <a:rPr lang="zh-CN" altLang="en-US" sz="2000" dirty="0"/>
-              <a:t> </a:t>
-            </a:r>
-            <a:r>
-              <a:rPr lang="en-US" altLang="zh-CN" sz="2000" dirty="0"/>
+              <a:rPr lang="zh-CN" altLang="en-US" sz="2300" dirty="0"/>
+              <a:t> </a:t>
+            </a:r>
+            <a:r>
+              <a:rPr lang="en-US" altLang="zh-CN" sz="2300" dirty="0"/>
               <a:t>it</a:t>
             </a:r>
             <a:r>
-              <a:rPr lang="zh-CN" altLang="en-US" sz="2000" dirty="0"/>
-              <a:t> </a:t>
-            </a:r>
-            <a:r>
-              <a:rPr lang="en-US" altLang="zh-CN" sz="2000" dirty="0"/>
+              <a:rPr lang="zh-CN" altLang="en-US" sz="2300" dirty="0"/>
+              <a:t> </a:t>
+            </a:r>
+            <a:r>
+              <a:rPr lang="en-US" altLang="zh-CN" sz="2300" dirty="0"/>
               <a:t>very</a:t>
             </a:r>
             <a:r>
-              <a:rPr lang="zh-CN" altLang="en-US" sz="2000" dirty="0"/>
-              <a:t> </a:t>
-            </a:r>
-            <a:r>
-              <a:rPr lang="en-US" altLang="zh-CN" sz="2000" dirty="0"/>
+              <a:rPr lang="zh-CN" altLang="en-US" sz="2300" dirty="0"/>
+              <a:t> </a:t>
+            </a:r>
+            <a:r>
+              <a:rPr lang="en-US" altLang="zh-CN" sz="2300" dirty="0"/>
               <a:t>important</a:t>
             </a:r>
             <a:r>
-              <a:rPr lang="zh-CN" altLang="en-US" sz="2000" dirty="0"/>
-              <a:t> </a:t>
-            </a:r>
-            <a:r>
-              <a:rPr lang="en-US" altLang="zh-CN" sz="2000" dirty="0"/>
+              <a:rPr lang="zh-CN" altLang="en-US" sz="2300" dirty="0"/>
+              <a:t> </a:t>
+            </a:r>
+            <a:r>
+              <a:rPr lang="en-US" altLang="zh-CN" sz="2300" dirty="0"/>
               <a:t>because</a:t>
             </a:r>
             <a:r>
-              <a:rPr lang="zh-CN" altLang="en-US" sz="2000" dirty="0"/>
-              <a:t> </a:t>
-            </a:r>
-            <a:r>
-              <a:rPr lang="en-US" altLang="zh-CN" sz="2000" dirty="0"/>
+              <a:rPr lang="zh-CN" altLang="en-US" sz="2300" dirty="0"/>
+              <a:t> </a:t>
+            </a:r>
+            <a:r>
+              <a:rPr lang="en-US" altLang="zh-CN" sz="2300" dirty="0"/>
               <a:t>as</a:t>
             </a:r>
             <a:r>
-              <a:rPr lang="zh-CN" altLang="en-US" sz="2000" dirty="0"/>
-              <a:t> </a:t>
-            </a:r>
-            <a:r>
-              <a:rPr lang="en-US" altLang="zh-CN" sz="2000" dirty="0"/>
+              <a:rPr lang="zh-CN" altLang="en-US" sz="2300" dirty="0"/>
+              <a:t> </a:t>
+            </a:r>
+            <a:r>
+              <a:rPr lang="en-US" altLang="zh-CN" sz="2300" dirty="0"/>
               <a:t>the</a:t>
             </a:r>
             <a:r>
-              <a:rPr lang="zh-CN" altLang="en-US" sz="2000" dirty="0"/>
-              <a:t> </a:t>
-            </a:r>
-            <a:r>
-              <a:rPr lang="en-US" altLang="zh-CN" sz="2000" dirty="0"/>
+              <a:rPr lang="zh-CN" altLang="en-US" sz="2300" dirty="0"/>
+              <a:t> </a:t>
+            </a:r>
+            <a:r>
+              <a:rPr lang="en-US" altLang="zh-CN" sz="2300" dirty="0"/>
               <a:t>nature</a:t>
             </a:r>
             <a:r>
-              <a:rPr lang="zh-CN" altLang="en-US" sz="2000" dirty="0"/>
-              <a:t> </a:t>
-            </a:r>
-            <a:r>
-              <a:rPr lang="en-US" altLang="zh-CN" sz="2000" dirty="0"/>
+              <a:rPr lang="zh-CN" altLang="en-US" sz="2300" dirty="0"/>
+              <a:t> </a:t>
+            </a:r>
+            <a:r>
+              <a:rPr lang="en-US" altLang="zh-CN" sz="2300" dirty="0"/>
               <a:t>is</a:t>
             </a:r>
             <a:r>
-              <a:rPr lang="zh-CN" altLang="en-US" sz="2000" dirty="0"/>
-              <a:t> </a:t>
-            </a:r>
-            <a:r>
-              <a:rPr lang="en-US" altLang="zh-CN" sz="2000" dirty="0"/>
+              <a:rPr lang="zh-CN" altLang="en-US" sz="2300" dirty="0"/>
+              <a:t> </a:t>
+            </a:r>
+            <a:r>
+              <a:rPr lang="en-US" altLang="zh-CN" sz="2300" dirty="0"/>
               <a:t>evolving,</a:t>
             </a:r>
             <a:r>
-              <a:rPr lang="zh-CN" altLang="en-US" sz="2000" dirty="0"/>
-              <a:t> </a:t>
-            </a:r>
-            <a:r>
-              <a:rPr lang="en-US" altLang="zh-CN" sz="2000" dirty="0"/>
+              <a:rPr lang="zh-CN" altLang="en-US" sz="2300" dirty="0"/>
+              <a:t> </a:t>
+            </a:r>
+            <a:r>
+              <a:rPr lang="en-US" altLang="zh-CN" sz="2300" dirty="0"/>
               <a:t>it</a:t>
             </a:r>
             <a:r>
-              <a:rPr lang="zh-CN" altLang="en-US" sz="2000" dirty="0"/>
-              <a:t> </a:t>
-            </a:r>
-            <a:r>
-              <a:rPr lang="en-US" altLang="zh-CN" sz="2000" dirty="0"/>
+              <a:rPr lang="zh-CN" altLang="en-US" sz="2300" dirty="0"/>
+              <a:t> </a:t>
+            </a:r>
+            <a:r>
+              <a:rPr lang="en-US" altLang="zh-CN" sz="2300" dirty="0"/>
               <a:t>is</a:t>
             </a:r>
             <a:r>
-              <a:rPr lang="zh-CN" altLang="en-US" sz="2000" dirty="0"/>
-              <a:t> </a:t>
-            </a:r>
-            <a:r>
-              <a:rPr lang="en-US" altLang="zh-CN" sz="2000" dirty="0"/>
+              <a:rPr lang="zh-CN" altLang="en-US" sz="2300" dirty="0"/>
+              <a:t> </a:t>
+            </a:r>
+            <a:r>
+              <a:rPr lang="en-US" altLang="zh-CN" sz="2300" dirty="0"/>
               <a:t>possible</a:t>
             </a:r>
             <a:r>
-              <a:rPr lang="zh-CN" altLang="en-US" sz="2000" dirty="0"/>
-              <a:t> </a:t>
-            </a:r>
-            <a:r>
-              <a:rPr lang="en-US" altLang="zh-CN" sz="2000" dirty="0"/>
+              <a:rPr lang="zh-CN" altLang="en-US" sz="2300" dirty="0"/>
+              <a:t> </a:t>
+            </a:r>
+            <a:r>
+              <a:rPr lang="en-US" altLang="zh-CN" sz="2300" dirty="0"/>
               <a:t>that</a:t>
             </a:r>
             <a:r>
-              <a:rPr lang="zh-CN" altLang="en-US" sz="2000" dirty="0"/>
-              <a:t> </a:t>
-            </a:r>
-            <a:r>
-              <a:rPr lang="en-US" altLang="zh-CN" sz="2000" dirty="0"/>
+              <a:rPr lang="zh-CN" altLang="en-US" sz="2300" dirty="0"/>
+              <a:t> </a:t>
+            </a:r>
+            <a:r>
+              <a:rPr lang="en-US" altLang="zh-CN" sz="2300" dirty="0"/>
               <a:t>one</a:t>
             </a:r>
             <a:r>
-              <a:rPr lang="zh-CN" altLang="en-US" sz="2000" dirty="0"/>
-              <a:t> </a:t>
-            </a:r>
-            <a:r>
-              <a:rPr lang="en-US" altLang="zh-CN" sz="2000" dirty="0"/>
+              <a:rPr lang="zh-CN" altLang="en-US" sz="2300" dirty="0"/>
+              <a:t> </a:t>
+            </a:r>
+            <a:r>
+              <a:rPr lang="en-US" altLang="zh-CN" sz="2300" dirty="0"/>
               <a:t>day</a:t>
             </a:r>
             <a:r>
-              <a:rPr lang="zh-CN" altLang="en-US" sz="2000" dirty="0"/>
-              <a:t> </a:t>
-            </a:r>
-            <a:r>
-              <a:rPr lang="en-US" altLang="zh-CN" sz="2000" dirty="0"/>
+              <a:rPr lang="zh-CN" altLang="en-US" sz="2300" dirty="0"/>
+              <a:t> </a:t>
+            </a:r>
+            <a:r>
+              <a:rPr lang="en-US" altLang="zh-CN" sz="2300" dirty="0"/>
               <a:t>in</a:t>
             </a:r>
             <a:r>
-              <a:rPr lang="zh-CN" altLang="en-US" sz="2000" dirty="0"/>
-              <a:t> </a:t>
-            </a:r>
-            <a:r>
-              <a:rPr lang="en-US" altLang="zh-CN" sz="2000" dirty="0"/>
+              <a:rPr lang="zh-CN" altLang="en-US" sz="2300" dirty="0"/>
+              <a:t> </a:t>
+            </a:r>
+            <a:r>
+              <a:rPr lang="en-US" altLang="zh-CN" sz="2300" dirty="0"/>
               <a:t>the</a:t>
             </a:r>
             <a:r>
-              <a:rPr lang="zh-CN" altLang="en-US" sz="2000" dirty="0"/>
-              <a:t> </a:t>
-            </a:r>
-            <a:r>
-              <a:rPr lang="en-US" altLang="zh-CN" sz="2000" dirty="0"/>
+              <a:rPr lang="zh-CN" altLang="en-US" sz="2300" dirty="0"/>
+              <a:t> </a:t>
+            </a:r>
+            <a:r>
+              <a:rPr lang="en-US" altLang="zh-CN" sz="2300" dirty="0"/>
               <a:t>future</a:t>
             </a:r>
             <a:r>
-              <a:rPr lang="zh-CN" altLang="en-US" sz="2000" dirty="0"/>
-              <a:t> </a:t>
-            </a:r>
-            <a:r>
-              <a:rPr lang="en-US" altLang="zh-CN" sz="2000" dirty="0"/>
+              <a:rPr lang="zh-CN" altLang="en-US" sz="2300" dirty="0"/>
+              <a:t> </a:t>
+            </a:r>
+            <a:r>
+              <a:rPr lang="en-US" altLang="zh-CN" sz="2300" dirty="0"/>
               <a:t>there</a:t>
             </a:r>
             <a:r>
-              <a:rPr lang="zh-CN" altLang="en-US" sz="2000" dirty="0"/>
-              <a:t> </a:t>
-            </a:r>
-            <a:r>
-              <a:rPr lang="en-US" altLang="zh-CN" sz="2000" dirty="0"/>
+              <a:rPr lang="zh-CN" altLang="en-US" sz="2300" dirty="0"/>
+              <a:t> </a:t>
+            </a:r>
+            <a:r>
+              <a:rPr lang="en-US" altLang="zh-CN" sz="2300" dirty="0"/>
               <a:t>comes</a:t>
             </a:r>
             <a:r>
-              <a:rPr lang="zh-CN" altLang="en-US" sz="2000" dirty="0"/>
-              <a:t> </a:t>
-            </a:r>
-            <a:r>
-              <a:rPr lang="en-US" altLang="zh-CN" sz="2000" dirty="0"/>
+              <a:rPr lang="zh-CN" altLang="en-US" sz="2300" dirty="0"/>
+              <a:t> </a:t>
+            </a:r>
+            <a:r>
+              <a:rPr lang="en-US" altLang="zh-CN" sz="2300" dirty="0"/>
               <a:t>a</a:t>
             </a:r>
             <a:r>
-              <a:rPr lang="zh-CN" altLang="en-US" sz="2000" dirty="0"/>
-              <a:t> </a:t>
-            </a:r>
-            <a:r>
-              <a:rPr lang="en-US" altLang="zh-CN" sz="2000" dirty="0"/>
+              <a:rPr lang="zh-CN" altLang="en-US" sz="2300" dirty="0"/>
+              <a:t> </a:t>
+            </a:r>
+            <a:r>
+              <a:rPr lang="en-US" altLang="zh-CN" sz="2300" dirty="0"/>
               <a:t>new</a:t>
             </a:r>
             <a:r>
-              <a:rPr lang="zh-CN" altLang="en-US" sz="2000" dirty="0"/>
-              <a:t> </a:t>
-            </a:r>
-            <a:r>
-              <a:rPr lang="en-US" altLang="zh-CN" sz="2000" dirty="0"/>
+              <a:rPr lang="zh-CN" altLang="en-US" sz="2300" dirty="0"/>
+              <a:t> </a:t>
+            </a:r>
+            <a:r>
+              <a:rPr lang="en-US" altLang="zh-CN" sz="2300" dirty="0"/>
               <a:t>type</a:t>
             </a:r>
             <a:r>
-              <a:rPr lang="zh-CN" altLang="en-US" sz="2000" dirty="0"/>
-              <a:t> </a:t>
-            </a:r>
-            <a:r>
-              <a:rPr lang="en-US" altLang="zh-CN" sz="2000" dirty="0"/>
+              <a:rPr lang="zh-CN" altLang="en-US" sz="2300" dirty="0"/>
+              <a:t> </a:t>
+            </a:r>
+            <a:r>
+              <a:rPr lang="en-US" altLang="zh-CN" sz="2300" dirty="0"/>
               <a:t>of</a:t>
             </a:r>
             <a:r>
-              <a:rPr lang="zh-CN" altLang="en-US" sz="2000" dirty="0"/>
-              <a:t> </a:t>
-            </a:r>
-            <a:r>
-              <a:rPr lang="en-US" altLang="zh-CN" sz="2000" dirty="0"/>
+              <a:rPr lang="zh-CN" altLang="en-US" sz="2300" dirty="0"/>
+              <a:t> </a:t>
+            </a:r>
+            <a:r>
+              <a:rPr lang="en-US" altLang="zh-CN" sz="2300" dirty="0"/>
               <a:t>fungi,</a:t>
             </a:r>
             <a:r>
-              <a:rPr lang="zh-CN" altLang="en-US" sz="2000" dirty="0"/>
-              <a:t> </a:t>
-            </a:r>
-            <a:r>
-              <a:rPr lang="en-US" altLang="zh-CN" sz="2000" dirty="0"/>
+              <a:rPr lang="zh-CN" altLang="en-US" sz="2300" dirty="0"/>
+              <a:t> </a:t>
+            </a:r>
+            <a:r>
+              <a:rPr lang="en-US" altLang="zh-CN" sz="2300" dirty="0"/>
               <a:t>but</a:t>
             </a:r>
             <a:r>
-              <a:rPr lang="zh-CN" altLang="en-US" sz="2000" dirty="0"/>
-              <a:t> </a:t>
-            </a:r>
-            <a:r>
-              <a:rPr lang="en-US" altLang="zh-CN" sz="2000" dirty="0"/>
+              <a:rPr lang="zh-CN" altLang="en-US" sz="2300" dirty="0"/>
+              <a:t> </a:t>
+            </a:r>
+            <a:r>
+              <a:rPr lang="en-US" altLang="zh-CN" sz="2300" dirty="0"/>
               <a:t>how</a:t>
             </a:r>
             <a:r>
-              <a:rPr lang="zh-CN" altLang="en-US" sz="2000" dirty="0"/>
-              <a:t> </a:t>
-            </a:r>
-            <a:r>
-              <a:rPr lang="en-US" altLang="zh-CN" sz="2000" dirty="0"/>
+              <a:rPr lang="zh-CN" altLang="en-US" sz="2300" dirty="0"/>
+              <a:t> </a:t>
+            </a:r>
+            <a:r>
+              <a:rPr lang="en-US" altLang="zh-CN" sz="2300" dirty="0"/>
               <a:t>do</a:t>
             </a:r>
             <a:r>
-              <a:rPr lang="zh-CN" altLang="en-US" sz="2000" dirty="0"/>
-              <a:t> </a:t>
-            </a:r>
-            <a:r>
-              <a:rPr lang="en-US" altLang="zh-CN" sz="2000" dirty="0"/>
+              <a:rPr lang="zh-CN" altLang="en-US" sz="2300" dirty="0"/>
+              <a:t> </a:t>
+            </a:r>
+            <a:r>
+              <a:rPr lang="en-US" altLang="zh-CN" sz="2300" dirty="0"/>
               <a:t>we</a:t>
             </a:r>
             <a:r>
-              <a:rPr lang="zh-CN" altLang="en-US" sz="2000" dirty="0"/>
-              <a:t> </a:t>
-            </a:r>
-            <a:r>
-              <a:rPr lang="en-US" altLang="zh-CN" sz="2000" dirty="0"/>
+              <a:rPr lang="zh-CN" altLang="en-US" sz="2300" dirty="0"/>
+              <a:t> </a:t>
+            </a:r>
+            <a:r>
+              <a:rPr lang="en-US" altLang="zh-CN" sz="2300" dirty="0"/>
               <a:t>know</a:t>
             </a:r>
             <a:r>
-              <a:rPr lang="zh-CN" altLang="en-US" sz="2000" dirty="0"/>
-              <a:t> </a:t>
-            </a:r>
-            <a:r>
-              <a:rPr lang="en-US" altLang="zh-CN" sz="2000" dirty="0"/>
+              <a:rPr lang="zh-CN" altLang="en-US" sz="2300" dirty="0"/>
+              <a:t> </a:t>
+            </a:r>
+            <a:r>
+              <a:rPr lang="en-US" altLang="zh-CN" sz="2300" dirty="0"/>
               <a:t>if</a:t>
             </a:r>
             <a:r>
-              <a:rPr lang="zh-CN" altLang="en-US" sz="2000" dirty="0"/>
-              <a:t> </a:t>
-            </a:r>
-            <a:r>
-              <a:rPr lang="en-US" altLang="zh-CN" sz="2000" dirty="0"/>
+              <a:rPr lang="zh-CN" altLang="en-US" sz="2300" dirty="0"/>
+              <a:t> </a:t>
+            </a:r>
+            <a:r>
+              <a:rPr lang="en-US" altLang="zh-CN" sz="2300" dirty="0"/>
               <a:t>we</a:t>
             </a:r>
             <a:r>
-              <a:rPr lang="zh-CN" altLang="en-US" sz="2000" dirty="0"/>
-              <a:t> </a:t>
-            </a:r>
-            <a:r>
-              <a:rPr lang="en-US" altLang="zh-CN" sz="2000" dirty="0"/>
+              <a:rPr lang="zh-CN" altLang="en-US" sz="2300" dirty="0"/>
+              <a:t> </a:t>
+            </a:r>
+            <a:r>
+              <a:rPr lang="en-US" altLang="zh-CN" sz="2300" dirty="0"/>
               <a:t>are</a:t>
             </a:r>
             <a:r>
-              <a:rPr lang="zh-CN" altLang="en-US" sz="2000" dirty="0"/>
-              <a:t> </a:t>
-            </a:r>
-            <a:r>
-              <a:rPr lang="en-US" altLang="zh-CN" sz="2000" dirty="0"/>
+              <a:rPr lang="zh-CN" altLang="en-US" sz="2300" dirty="0"/>
+              <a:t> </a:t>
+            </a:r>
+            <a:r>
+              <a:rPr lang="en-US" altLang="zh-CN" sz="2300" dirty="0"/>
               <a:t>safe</a:t>
             </a:r>
             <a:r>
-              <a:rPr lang="zh-CN" altLang="en-US" sz="2000" dirty="0"/>
-              <a:t> </a:t>
-            </a:r>
-            <a:r>
-              <a:rPr lang="en-US" altLang="zh-CN" sz="2000" dirty="0"/>
+              <a:rPr lang="zh-CN" altLang="en-US" sz="2300" dirty="0"/>
+              <a:t> </a:t>
+            </a:r>
+            <a:r>
+              <a:rPr lang="en-US" altLang="zh-CN" sz="2300" dirty="0"/>
               <a:t>to</a:t>
             </a:r>
             <a:r>
-              <a:rPr lang="zh-CN" altLang="en-US" sz="2000" dirty="0"/>
-              <a:t> </a:t>
-            </a:r>
-            <a:r>
-              <a:rPr lang="en-US" altLang="zh-CN" sz="2000" dirty="0"/>
+              <a:rPr lang="zh-CN" altLang="en-US" sz="2300" dirty="0"/>
+              <a:t> </a:t>
+            </a:r>
+            <a:r>
+              <a:rPr lang="en-US" altLang="zh-CN" sz="2300" dirty="0"/>
               <a:t>eat</a:t>
             </a:r>
             <a:r>
-              <a:rPr lang="zh-CN" altLang="en-US" sz="2000" dirty="0"/>
-              <a:t> </a:t>
-            </a:r>
-            <a:r>
-              <a:rPr lang="en-US" altLang="zh-CN" sz="2000" dirty="0"/>
+              <a:rPr lang="zh-CN" altLang="en-US" sz="2300" dirty="0"/>
+              <a:t> </a:t>
+            </a:r>
+            <a:r>
+              <a:rPr lang="en-US" altLang="zh-CN" sz="2300" dirty="0"/>
               <a:t>it?</a:t>
             </a:r>
           </a:p>
           <a:p>
             <a:r>
-              <a:rPr lang="en-US" altLang="zh-CN" sz="2000" dirty="0"/>
-              <a:t>This</a:t>
-            </a:r>
-            <a:r>
-              <a:rPr lang="zh-CN" altLang="en-US" sz="2000" dirty="0"/>
-              <a:t> </a:t>
-            </a:r>
-            <a:r>
-              <a:rPr lang="en-US" altLang="zh-CN" sz="2000" dirty="0"/>
-              <a:t>dataset</a:t>
-            </a:r>
-            <a:r>
-              <a:rPr lang="zh-CN" altLang="en-US" sz="2000" dirty="0"/>
-              <a:t> </a:t>
-            </a:r>
-            <a:r>
-              <a:rPr lang="en-US" altLang="zh-CN" sz="2000" dirty="0"/>
-              <a:t>will</a:t>
-            </a:r>
-            <a:r>
-              <a:rPr lang="zh-CN" altLang="en-US" sz="2000" dirty="0"/>
-              <a:t> </a:t>
-            </a:r>
-            <a:r>
-              <a:rPr lang="en-US" altLang="zh-CN" sz="2000" dirty="0"/>
-              <a:t>be</a:t>
-            </a:r>
-            <a:r>
-              <a:rPr lang="zh-CN" altLang="en-US" sz="2000" dirty="0"/>
-              <a:t> </a:t>
-            </a:r>
-            <a:r>
-              <a:rPr lang="en-US" altLang="zh-CN" sz="2000" dirty="0"/>
-              <a:t>a</a:t>
-            </a:r>
-            <a:r>
-              <a:rPr lang="zh-CN" altLang="en-US" sz="2000" dirty="0"/>
-              <a:t> </a:t>
-            </a:r>
-            <a:r>
-              <a:rPr lang="en-US" altLang="zh-CN" sz="2000" dirty="0"/>
-              <a:t>classification</a:t>
-            </a:r>
-            <a:r>
-              <a:rPr lang="zh-CN" altLang="en-US" sz="2000" dirty="0"/>
-              <a:t> </a:t>
-            </a:r>
-            <a:r>
-              <a:rPr lang="en-US" altLang="zh-CN" sz="2000" dirty="0"/>
-              <a:t>problem</a:t>
-            </a:r>
-            <a:r>
-              <a:rPr lang="zh-CN" altLang="en-US" sz="2000" dirty="0"/>
-              <a:t> </a:t>
-            </a:r>
-            <a:r>
-              <a:rPr lang="en-US" altLang="zh-CN" sz="2000" dirty="0"/>
-              <a:t>identifying</a:t>
-            </a:r>
-            <a:r>
-              <a:rPr lang="zh-CN" altLang="en-US" sz="2000" dirty="0"/>
-              <a:t> </a:t>
-            </a:r>
-            <a:r>
-              <a:rPr lang="en-US" altLang="zh-CN" sz="2000" dirty="0"/>
-              <a:t>if</a:t>
-            </a:r>
-            <a:r>
-              <a:rPr lang="zh-CN" altLang="en-US" sz="2000" dirty="0"/>
-              <a:t> </a:t>
-            </a:r>
-            <a:r>
-              <a:rPr lang="en-US" altLang="zh-CN" sz="2000" dirty="0"/>
-              <a:t>a</a:t>
-            </a:r>
-            <a:r>
-              <a:rPr lang="zh-CN" altLang="en-US" sz="2000" dirty="0"/>
-              <a:t> </a:t>
-            </a:r>
-            <a:r>
-              <a:rPr lang="en-US" altLang="zh-CN" sz="2000" dirty="0"/>
-              <a:t>new</a:t>
-            </a:r>
-            <a:r>
-              <a:rPr lang="zh-CN" altLang="en-US" sz="2000" dirty="0"/>
-              <a:t> </a:t>
-            </a:r>
-            <a:r>
-              <a:rPr lang="en-US" altLang="zh-CN" sz="2000" dirty="0"/>
-              <a:t>fungi</a:t>
-            </a:r>
-            <a:r>
-              <a:rPr lang="zh-CN" altLang="en-US" sz="2000" dirty="0"/>
-              <a:t> </a:t>
-            </a:r>
-            <a:r>
-              <a:rPr lang="en-US" altLang="zh-CN" sz="2000" dirty="0"/>
-              <a:t>is</a:t>
-            </a:r>
-            <a:r>
-              <a:rPr lang="zh-CN" altLang="en-US" sz="2000" dirty="0"/>
-              <a:t> </a:t>
-            </a:r>
-            <a:r>
-              <a:rPr lang="en-US" altLang="zh-CN" sz="2000" dirty="0"/>
-              <a:t>poisonous</a:t>
-            </a:r>
-            <a:r>
-              <a:rPr lang="zh-CN" altLang="en-US" sz="2000" dirty="0"/>
-              <a:t> </a:t>
-            </a:r>
-            <a:r>
-              <a:rPr lang="en-US" altLang="zh-CN" sz="2000" dirty="0"/>
-              <a:t>or</a:t>
-            </a:r>
-            <a:r>
-              <a:rPr lang="zh-CN" altLang="en-US" sz="2000" dirty="0"/>
-              <a:t> </a:t>
-            </a:r>
-            <a:r>
-              <a:rPr lang="en-US" altLang="zh-CN" sz="2000" dirty="0"/>
-              <a:t>not.</a:t>
+              <a:rPr lang="en-US" altLang="zh-CN" sz="2300" dirty="0"/>
+              <a:t>Create</a:t>
+            </a:r>
+            <a:r>
+              <a:rPr lang="zh-CN" altLang="en-US" sz="2300" dirty="0"/>
+              <a:t> </a:t>
+            </a:r>
+            <a:r>
+              <a:rPr lang="en-US" altLang="zh-CN" sz="2300" dirty="0"/>
+              <a:t>an</a:t>
+            </a:r>
+            <a:r>
+              <a:rPr lang="zh-CN" altLang="en-US" sz="2300" dirty="0"/>
+              <a:t> </a:t>
+            </a:r>
+            <a:r>
+              <a:rPr lang="en-US" altLang="zh-CN" sz="2300" dirty="0"/>
+              <a:t>app</a:t>
+            </a:r>
+            <a:r>
+              <a:rPr lang="zh-CN" altLang="en-US" sz="2300" dirty="0"/>
+              <a:t> </a:t>
+            </a:r>
+            <a:r>
+              <a:rPr lang="en-US" altLang="zh-CN" sz="2300" dirty="0"/>
+              <a:t>for</a:t>
+            </a:r>
+            <a:r>
+              <a:rPr lang="zh-CN" altLang="en-US" sz="2300" dirty="0"/>
+              <a:t> </a:t>
+            </a:r>
+            <a:r>
+              <a:rPr lang="en-US" altLang="zh-CN" sz="2300" dirty="0"/>
+              <a:t>people</a:t>
+            </a:r>
+            <a:r>
+              <a:rPr lang="zh-CN" altLang="en-US" sz="2300" dirty="0"/>
+              <a:t> </a:t>
+            </a:r>
+            <a:r>
+              <a:rPr lang="en-US" altLang="zh-CN" sz="2300" dirty="0"/>
+              <a:t>who</a:t>
+            </a:r>
+            <a:r>
+              <a:rPr lang="zh-CN" altLang="en-US" sz="2300" dirty="0"/>
+              <a:t> </a:t>
+            </a:r>
+            <a:r>
+              <a:rPr lang="en-US" altLang="zh-CN" sz="2300" dirty="0"/>
+              <a:t>are</a:t>
+            </a:r>
+            <a:r>
+              <a:rPr lang="zh-CN" altLang="en-US" sz="2300" dirty="0"/>
+              <a:t> </a:t>
+            </a:r>
+            <a:r>
+              <a:rPr lang="en-US" altLang="zh-CN" sz="2300" dirty="0"/>
+              <a:t>interested</a:t>
+            </a:r>
+            <a:r>
+              <a:rPr lang="zh-CN" altLang="en-US" sz="2300" dirty="0"/>
+              <a:t> </a:t>
+            </a:r>
+            <a:r>
+              <a:rPr lang="en-US" altLang="zh-CN" sz="2300" dirty="0"/>
+              <a:t>in</a:t>
+            </a:r>
+            <a:r>
+              <a:rPr lang="zh-CN" altLang="en-US" sz="2300" dirty="0"/>
+              <a:t> </a:t>
+            </a:r>
+            <a:r>
+              <a:rPr lang="en-US" altLang="zh-CN" sz="2300" dirty="0"/>
+              <a:t>picking</a:t>
+            </a:r>
+            <a:r>
+              <a:rPr lang="zh-CN" altLang="en-US" sz="2300" dirty="0"/>
+              <a:t> </a:t>
+            </a:r>
+            <a:r>
+              <a:rPr lang="en-US" altLang="zh-CN" sz="2300" dirty="0"/>
+              <a:t>wild</a:t>
+            </a:r>
+            <a:r>
+              <a:rPr lang="zh-CN" altLang="en-US" sz="2300" dirty="0"/>
+              <a:t> </a:t>
+            </a:r>
+            <a:r>
+              <a:rPr lang="en-US" altLang="zh-CN" sz="2300" dirty="0"/>
+              <a:t>mushroom</a:t>
+            </a:r>
+            <a:r>
+              <a:rPr lang="zh-CN" altLang="en-US" sz="2300" dirty="0"/>
+              <a:t> </a:t>
+            </a:r>
+            <a:r>
+              <a:rPr lang="en-US" altLang="zh-CN" sz="2300" dirty="0"/>
+              <a:t>themselves.</a:t>
             </a:r>
           </a:p>
           <a:p>
             <a:r>
-              <a:rPr lang="en-US" altLang="zh-CN" sz="2000" dirty="0"/>
-              <a:t>I</a:t>
-            </a:r>
-            <a:r>
-              <a:rPr lang="zh-CN" altLang="en-US" sz="2000" dirty="0"/>
-              <a:t> </a:t>
-            </a:r>
-            <a:r>
-              <a:rPr lang="en-US" altLang="zh-CN" sz="2000" dirty="0"/>
-              <a:t>get</a:t>
-            </a:r>
-            <a:r>
-              <a:rPr lang="zh-CN" altLang="en-US" sz="2000" dirty="0"/>
-              <a:t> </a:t>
-            </a:r>
-            <a:r>
-              <a:rPr lang="en-US" altLang="zh-CN" sz="2000" dirty="0"/>
-              <a:t>this</a:t>
-            </a:r>
-            <a:r>
-              <a:rPr lang="zh-CN" altLang="en-US" sz="2000" dirty="0"/>
-              <a:t> </a:t>
-            </a:r>
-            <a:r>
-              <a:rPr lang="en-US" altLang="zh-CN" sz="2000" dirty="0"/>
-              <a:t>data</a:t>
-            </a:r>
-            <a:r>
-              <a:rPr lang="zh-CN" altLang="en-US" sz="2000" dirty="0"/>
-              <a:t> </a:t>
-            </a:r>
-            <a:r>
-              <a:rPr lang="en-US" altLang="zh-CN" sz="2000" dirty="0"/>
-              <a:t>from</a:t>
-            </a:r>
-            <a:r>
-              <a:rPr lang="zh-CN" altLang="en-US" sz="2000" dirty="0"/>
-              <a:t> </a:t>
-            </a:r>
-            <a:r>
-              <a:rPr lang="en-US" altLang="zh-CN" sz="2000" dirty="0">
-                <a:hlinkClick r:id="rId3"/>
-              </a:rPr>
-              <a:t>Kaggle,</a:t>
-            </a:r>
-            <a:r>
-              <a:rPr lang="zh-CN" altLang="en-US" sz="2000" dirty="0"/>
-              <a:t> </a:t>
-            </a:r>
-            <a:r>
-              <a:rPr lang="en-US" altLang="zh-CN" sz="2000" dirty="0"/>
-              <a:t>and</a:t>
-            </a:r>
-            <a:r>
-              <a:rPr lang="zh-CN" altLang="en-US" sz="2000" dirty="0"/>
-              <a:t> </a:t>
-            </a:r>
-            <a:r>
-              <a:rPr lang="en-US" altLang="zh-CN" sz="2000" dirty="0"/>
-              <a:t>it</a:t>
-            </a:r>
-            <a:r>
-              <a:rPr lang="zh-CN" altLang="en-US" sz="2000" dirty="0"/>
-              <a:t> </a:t>
-            </a:r>
-            <a:r>
-              <a:rPr lang="en-US" altLang="zh-CN" sz="2000" dirty="0"/>
-              <a:t>was</a:t>
-            </a:r>
-            <a:r>
-              <a:rPr lang="zh-CN" altLang="en-US" sz="2000" dirty="0"/>
-              <a:t> </a:t>
-            </a:r>
-            <a:r>
-              <a:rPr lang="en-US" altLang="zh-CN" sz="2000" dirty="0"/>
-              <a:t>includes 61069 hypothetical mushrooms with caps based on 173 species.</a:t>
-            </a:r>
-            <a:endParaRPr lang="en-US" sz="2000" dirty="0"/>
+              <a:rPr lang="en-US" altLang="zh-CN" sz="2300" dirty="0"/>
+              <a:t>Help</a:t>
+            </a:r>
+            <a:r>
+              <a:rPr lang="zh-CN" altLang="en-US" sz="2300" dirty="0"/>
+              <a:t> </a:t>
+            </a:r>
+            <a:r>
+              <a:rPr lang="en-US" altLang="zh-CN" sz="2300" dirty="0"/>
+              <a:t>them</a:t>
+            </a:r>
+            <a:r>
+              <a:rPr lang="zh-CN" altLang="en-US" sz="2300" dirty="0"/>
+              <a:t> </a:t>
+            </a:r>
+            <a:r>
+              <a:rPr lang="en-US" altLang="zh-CN" sz="2300" dirty="0"/>
+              <a:t>to</a:t>
+            </a:r>
+            <a:r>
+              <a:rPr lang="zh-CN" altLang="en-US" sz="2300" dirty="0"/>
+              <a:t> </a:t>
+            </a:r>
+            <a:r>
+              <a:rPr lang="en-US" altLang="zh-CN" sz="2300" dirty="0"/>
+              <a:t>identify</a:t>
+            </a:r>
+            <a:r>
+              <a:rPr lang="zh-CN" altLang="en-US" sz="2300" dirty="0"/>
+              <a:t> </a:t>
+            </a:r>
+            <a:r>
+              <a:rPr lang="en-US" altLang="zh-CN" sz="2300" dirty="0"/>
+              <a:t>if</a:t>
+            </a:r>
+            <a:r>
+              <a:rPr lang="zh-CN" altLang="en-US" sz="2300" dirty="0"/>
+              <a:t> </a:t>
+            </a:r>
+            <a:r>
+              <a:rPr lang="en-US" altLang="zh-CN" sz="2300" dirty="0"/>
+              <a:t>the</a:t>
+            </a:r>
+            <a:r>
+              <a:rPr lang="zh-CN" altLang="en-US" sz="2300" dirty="0"/>
+              <a:t> </a:t>
+            </a:r>
+            <a:r>
+              <a:rPr lang="en-US" altLang="zh-CN" sz="2300" dirty="0"/>
+              <a:t>mushroom</a:t>
+            </a:r>
+            <a:r>
+              <a:rPr lang="zh-CN" altLang="en-US" sz="2300" dirty="0"/>
+              <a:t> </a:t>
+            </a:r>
+            <a:r>
+              <a:rPr lang="en-US" altLang="zh-CN" sz="2300" dirty="0"/>
+              <a:t>is</a:t>
+            </a:r>
+            <a:r>
+              <a:rPr lang="zh-CN" altLang="en-US" sz="2300" dirty="0"/>
+              <a:t> </a:t>
+            </a:r>
+            <a:r>
+              <a:rPr lang="en-US" altLang="zh-CN" sz="2300" dirty="0"/>
+              <a:t>safe</a:t>
+            </a:r>
+            <a:r>
+              <a:rPr lang="zh-CN" altLang="en-US" sz="2300" dirty="0"/>
+              <a:t> </a:t>
+            </a:r>
+            <a:r>
+              <a:rPr lang="en-US" altLang="zh-CN" sz="2300" dirty="0"/>
+              <a:t>to</a:t>
+            </a:r>
+            <a:r>
+              <a:rPr lang="zh-CN" altLang="en-US" sz="2300" dirty="0"/>
+              <a:t> </a:t>
+            </a:r>
+            <a:r>
+              <a:rPr lang="en-US" altLang="zh-CN" sz="2300" dirty="0"/>
+              <a:t>consume.</a:t>
+            </a:r>
+            <a:r>
+              <a:rPr lang="zh-CN" altLang="en-US" sz="2300" dirty="0"/>
+              <a:t> </a:t>
+            </a:r>
+            <a:endParaRPr lang="en-US" altLang="zh-CN" sz="2300" dirty="0"/>
           </a:p>
         </p:txBody>
       </p:sp>
@@ -15420,6 +16237,889 @@
 </file>
 
 <file path=ppt/slides/slide3.xml><?xml version="1.0" encoding="utf-8"?>
+<p:sld xmlns:a="http://schemas.openxmlformats.org/drawingml/2006/main" xmlns:r="http://schemas.openxmlformats.org/officeDocument/2006/relationships" xmlns:p="http://schemas.openxmlformats.org/presentationml/2006/main">
+  <p:cSld>
+    <p:bg>
+      <p:bgPr>
+        <a:solidFill>
+          <a:schemeClr val="bg1"/>
+        </a:solidFill>
+        <a:effectLst/>
+      </p:bgPr>
+    </p:bg>
+    <p:spTree>
+      <p:nvGrpSpPr>
+        <p:cNvPr id="1" name=""/>
+        <p:cNvGrpSpPr/>
+        <p:nvPr/>
+      </p:nvGrpSpPr>
+      <p:grpSpPr>
+        <a:xfrm>
+          <a:off x="0" y="0"/>
+          <a:ext cx="0" cy="0"/>
+          <a:chOff x="0" y="0"/>
+          <a:chExt cx="0" cy="0"/>
+        </a:xfrm>
+      </p:grpSpPr>
+      <p:sp useBgFill="1">
+        <p:nvSpPr>
+          <p:cNvPr id="9" name="Rectangle 8">
+            <a:extLst>
+              <a:ext uri="{FF2B5EF4-FFF2-40B4-BE49-F238E27FC236}">
+                <a16:creationId xmlns:a16="http://schemas.microsoft.com/office/drawing/2014/main" id="{94C5663A-0CE3-4AEE-B47E-FB68D9EBFE1A}"/>
+              </a:ext>
+              <a:ext uri="{C183D7F6-B498-43B3-948B-1728B52AA6E4}">
+                <adec:decorative xmlns:adec="http://schemas.microsoft.com/office/drawing/2017/decorative" val="1"/>
+              </a:ext>
+            </a:extLst>
+          </p:cNvPr>
+          <p:cNvSpPr>
+            <a:spLocks noGrp="1" noRot="1" noChangeAspect="1" noMove="1" noResize="1" noEditPoints="1" noAdjustHandles="1" noChangeArrowheads="1" noChangeShapeType="1" noTextEdit="1"/>
+          </p:cNvSpPr>
+          <p:nvPr>
+            <p:extLst>
+              <p:ext uri="{386F3935-93C4-4BCD-93E2-E3B085C9AB24}">
+                <p16:designElem xmlns:p16="http://schemas.microsoft.com/office/powerpoint/2015/main" val="1"/>
+              </p:ext>
+            </p:extLst>
+          </p:nvPr>
+        </p:nvSpPr>
+        <p:spPr>
+          <a:xfrm>
+            <a:off x="0" y="0"/>
+            <a:ext cx="12188952" cy="6858000"/>
+          </a:xfrm>
+          <a:prstGeom prst="rect">
+            <a:avLst/>
+          </a:prstGeom>
+          <a:ln>
+            <a:noFill/>
+          </a:ln>
+        </p:spPr>
+        <p:style>
+          <a:lnRef idx="2">
+            <a:schemeClr val="accent1">
+              <a:shade val="50000"/>
+            </a:schemeClr>
+          </a:lnRef>
+          <a:fillRef idx="1">
+            <a:schemeClr val="accent1"/>
+          </a:fillRef>
+          <a:effectRef idx="0">
+            <a:schemeClr val="accent1"/>
+          </a:effectRef>
+          <a:fontRef idx="minor">
+            <a:schemeClr val="lt1"/>
+          </a:fontRef>
+        </p:style>
+        <p:txBody>
+          <a:bodyPr rtlCol="0" anchor="ctr"/>
+          <a:lstStyle/>
+          <a:p>
+            <a:pPr algn="ctr"/>
+            <a:endParaRPr lang="en-US"/>
+          </a:p>
+        </p:txBody>
+      </p:sp>
+      <p:sp>
+        <p:nvSpPr>
+          <p:cNvPr id="2" name="Title 1">
+            <a:extLst>
+              <a:ext uri="{FF2B5EF4-FFF2-40B4-BE49-F238E27FC236}">
+                <a16:creationId xmlns:a16="http://schemas.microsoft.com/office/drawing/2014/main" id="{C2FC8D3D-69C6-A0BC-A001-FB89BBD96A01}"/>
+              </a:ext>
+            </a:extLst>
+          </p:cNvPr>
+          <p:cNvSpPr>
+            <a:spLocks noGrp="1"/>
+          </p:cNvSpPr>
+          <p:nvPr>
+            <p:ph type="title"/>
+          </p:nvPr>
+        </p:nvSpPr>
+        <p:spPr>
+          <a:xfrm>
+            <a:off x="838201" y="365125"/>
+            <a:ext cx="3816095" cy="1807305"/>
+          </a:xfrm>
+        </p:spPr>
+        <p:txBody>
+          <a:bodyPr>
+            <a:normAutofit/>
+          </a:bodyPr>
+          <a:lstStyle/>
+          <a:p>
+            <a:r>
+              <a:rPr lang="en-US" altLang="zh-CN" dirty="0"/>
+              <a:t>Data</a:t>
+            </a:r>
+            <a:r>
+              <a:rPr lang="zh-CN" altLang="en-US" dirty="0"/>
+              <a:t> </a:t>
+            </a:r>
+            <a:r>
+              <a:rPr lang="en-US" altLang="zh-CN" dirty="0"/>
+              <a:t>Descriptions</a:t>
+            </a:r>
+            <a:endParaRPr lang="en-US" dirty="0"/>
+          </a:p>
+        </p:txBody>
+      </p:sp>
+      <p:sp>
+        <p:nvSpPr>
+          <p:cNvPr id="3" name="Content Placeholder 2">
+            <a:extLst>
+              <a:ext uri="{FF2B5EF4-FFF2-40B4-BE49-F238E27FC236}">
+                <a16:creationId xmlns:a16="http://schemas.microsoft.com/office/drawing/2014/main" id="{210168A8-E21A-F4CC-BDA9-A876B54A6C4C}"/>
+              </a:ext>
+            </a:extLst>
+          </p:cNvPr>
+          <p:cNvSpPr>
+            <a:spLocks noGrp="1"/>
+          </p:cNvSpPr>
+          <p:nvPr>
+            <p:ph idx="1"/>
+          </p:nvPr>
+        </p:nvSpPr>
+        <p:spPr>
+          <a:xfrm>
+            <a:off x="391886" y="2333297"/>
+            <a:ext cx="5562600" cy="3843666"/>
+          </a:xfrm>
+        </p:spPr>
+        <p:txBody>
+          <a:bodyPr>
+            <a:normAutofit/>
+          </a:bodyPr>
+          <a:lstStyle/>
+          <a:p>
+            <a:r>
+              <a:rPr lang="en-US" altLang="zh-CN" sz="2400" dirty="0"/>
+              <a:t>This</a:t>
+            </a:r>
+            <a:r>
+              <a:rPr lang="zh-CN" altLang="en-US" sz="2400" dirty="0"/>
+              <a:t> </a:t>
+            </a:r>
+            <a:r>
+              <a:rPr lang="en-US" altLang="zh-CN" sz="2400" dirty="0"/>
+              <a:t>dataset</a:t>
+            </a:r>
+            <a:r>
+              <a:rPr lang="zh-CN" altLang="en-US" sz="2400" dirty="0"/>
+              <a:t> </a:t>
+            </a:r>
+            <a:r>
+              <a:rPr lang="en-US" altLang="zh-CN" sz="2400" dirty="0"/>
+              <a:t>will</a:t>
+            </a:r>
+            <a:r>
+              <a:rPr lang="zh-CN" altLang="en-US" sz="2400" dirty="0"/>
+              <a:t> </a:t>
+            </a:r>
+            <a:r>
+              <a:rPr lang="en-US" altLang="zh-CN" sz="2400" dirty="0"/>
+              <a:t>be</a:t>
+            </a:r>
+            <a:r>
+              <a:rPr lang="zh-CN" altLang="en-US" sz="2400" dirty="0"/>
+              <a:t> </a:t>
+            </a:r>
+            <a:r>
+              <a:rPr lang="en-US" altLang="zh-CN" sz="2400" dirty="0"/>
+              <a:t>a</a:t>
+            </a:r>
+            <a:r>
+              <a:rPr lang="zh-CN" altLang="en-US" sz="2400" dirty="0"/>
+              <a:t> </a:t>
+            </a:r>
+            <a:r>
+              <a:rPr lang="en-US" altLang="zh-CN" sz="2400" dirty="0"/>
+              <a:t>classification</a:t>
+            </a:r>
+            <a:r>
+              <a:rPr lang="zh-CN" altLang="en-US" sz="2400" dirty="0"/>
+              <a:t> </a:t>
+            </a:r>
+            <a:r>
+              <a:rPr lang="en-US" altLang="zh-CN" sz="2400" dirty="0"/>
+              <a:t>problem</a:t>
+            </a:r>
+            <a:r>
+              <a:rPr lang="zh-CN" altLang="en-US" sz="2400" dirty="0"/>
+              <a:t> </a:t>
+            </a:r>
+            <a:r>
+              <a:rPr lang="en-US" altLang="zh-CN" sz="2400" dirty="0"/>
+              <a:t>identifying</a:t>
+            </a:r>
+            <a:r>
+              <a:rPr lang="zh-CN" altLang="en-US" sz="2400" dirty="0"/>
+              <a:t> </a:t>
+            </a:r>
+            <a:r>
+              <a:rPr lang="en-US" altLang="zh-CN" sz="2400" dirty="0"/>
+              <a:t>if</a:t>
+            </a:r>
+            <a:r>
+              <a:rPr lang="zh-CN" altLang="en-US" sz="2400" dirty="0"/>
+              <a:t> </a:t>
+            </a:r>
+            <a:r>
+              <a:rPr lang="en-US" altLang="zh-CN" sz="2400" dirty="0"/>
+              <a:t>a</a:t>
+            </a:r>
+            <a:r>
+              <a:rPr lang="zh-CN" altLang="en-US" sz="2400" dirty="0"/>
+              <a:t> </a:t>
+            </a:r>
+            <a:r>
+              <a:rPr lang="en-US" altLang="zh-CN" sz="2400" dirty="0"/>
+              <a:t>new</a:t>
+            </a:r>
+            <a:r>
+              <a:rPr lang="zh-CN" altLang="en-US" sz="2400" dirty="0"/>
+              <a:t> </a:t>
+            </a:r>
+            <a:r>
+              <a:rPr lang="en-US" altLang="zh-CN" sz="2400" dirty="0"/>
+              <a:t>fungi</a:t>
+            </a:r>
+            <a:r>
+              <a:rPr lang="zh-CN" altLang="en-US" sz="2400" dirty="0"/>
+              <a:t> </a:t>
+            </a:r>
+            <a:r>
+              <a:rPr lang="en-US" altLang="zh-CN" sz="2400" dirty="0"/>
+              <a:t>is</a:t>
+            </a:r>
+            <a:r>
+              <a:rPr lang="zh-CN" altLang="en-US" sz="2400" dirty="0"/>
+              <a:t> </a:t>
+            </a:r>
+            <a:r>
+              <a:rPr lang="en-US" altLang="zh-CN" sz="2400" dirty="0"/>
+              <a:t>poisonous</a:t>
+            </a:r>
+            <a:r>
+              <a:rPr lang="zh-CN" altLang="en-US" sz="2400" dirty="0"/>
+              <a:t> </a:t>
+            </a:r>
+            <a:r>
+              <a:rPr lang="en-US" altLang="zh-CN" sz="2400" dirty="0"/>
+              <a:t>or</a:t>
+            </a:r>
+            <a:r>
+              <a:rPr lang="zh-CN" altLang="en-US" sz="2400" dirty="0"/>
+              <a:t> </a:t>
+            </a:r>
+            <a:r>
+              <a:rPr lang="en-US" altLang="zh-CN" sz="2400" dirty="0"/>
+              <a:t>not.</a:t>
+            </a:r>
+          </a:p>
+          <a:p>
+            <a:r>
+              <a:rPr lang="en-US" altLang="zh-CN" sz="2400" dirty="0"/>
+              <a:t>I</a:t>
+            </a:r>
+            <a:r>
+              <a:rPr lang="zh-CN" altLang="en-US" sz="2400" dirty="0"/>
+              <a:t> </a:t>
+            </a:r>
+            <a:r>
+              <a:rPr lang="en-US" altLang="zh-CN" sz="2400" dirty="0"/>
+              <a:t>get</a:t>
+            </a:r>
+            <a:r>
+              <a:rPr lang="zh-CN" altLang="en-US" sz="2400" dirty="0"/>
+              <a:t> </a:t>
+            </a:r>
+            <a:r>
+              <a:rPr lang="en-US" altLang="zh-CN" sz="2400" dirty="0"/>
+              <a:t>this</a:t>
+            </a:r>
+            <a:r>
+              <a:rPr lang="zh-CN" altLang="en-US" sz="2400" dirty="0"/>
+              <a:t> </a:t>
+            </a:r>
+            <a:r>
+              <a:rPr lang="en-US" altLang="zh-CN" sz="2400" dirty="0"/>
+              <a:t>data</a:t>
+            </a:r>
+            <a:r>
+              <a:rPr lang="zh-CN" altLang="en-US" sz="2400" dirty="0"/>
+              <a:t> </a:t>
+            </a:r>
+            <a:r>
+              <a:rPr lang="en-US" altLang="zh-CN" sz="2400" dirty="0"/>
+              <a:t>from</a:t>
+            </a:r>
+            <a:r>
+              <a:rPr lang="zh-CN" altLang="en-US" sz="2400" dirty="0"/>
+              <a:t> </a:t>
+            </a:r>
+            <a:r>
+              <a:rPr lang="en-US" altLang="zh-CN" sz="2400" dirty="0">
+                <a:hlinkClick r:id="rId2"/>
+              </a:rPr>
+              <a:t>Kaggle,</a:t>
+            </a:r>
+            <a:r>
+              <a:rPr lang="zh-CN" altLang="en-US" sz="2400" dirty="0"/>
+              <a:t> </a:t>
+            </a:r>
+            <a:r>
+              <a:rPr lang="en-US" altLang="zh-CN" sz="2400" dirty="0"/>
+              <a:t>and</a:t>
+            </a:r>
+            <a:r>
+              <a:rPr lang="zh-CN" altLang="en-US" sz="2400" dirty="0"/>
+              <a:t> </a:t>
+            </a:r>
+            <a:r>
+              <a:rPr lang="en-US" altLang="zh-CN" sz="2400" dirty="0"/>
+              <a:t>it</a:t>
+            </a:r>
+            <a:r>
+              <a:rPr lang="zh-CN" altLang="en-US" sz="2400" dirty="0"/>
+              <a:t> </a:t>
+            </a:r>
+            <a:r>
+              <a:rPr lang="en-US" altLang="zh-CN" sz="2400" dirty="0"/>
+              <a:t>was</a:t>
+            </a:r>
+            <a:r>
+              <a:rPr lang="zh-CN" altLang="en-US" sz="2400" dirty="0"/>
+              <a:t> </a:t>
+            </a:r>
+            <a:r>
+              <a:rPr lang="en-US" altLang="zh-CN" sz="2400" dirty="0"/>
+              <a:t>includes 61069 hypothetical mushrooms with caps based on 173 species.</a:t>
+            </a:r>
+            <a:endParaRPr lang="en-US" sz="2400" dirty="0"/>
+          </a:p>
+          <a:p>
+            <a:pPr marL="0" indent="0">
+              <a:buNone/>
+            </a:pPr>
+            <a:endParaRPr lang="en-US" sz="2400" dirty="0"/>
+          </a:p>
+        </p:txBody>
+      </p:sp>
+      <p:pic>
+        <p:nvPicPr>
+          <p:cNvPr id="5" name="Picture 4" descr="Magnifying glass showing decling performance">
+            <a:extLst>
+              <a:ext uri="{FF2B5EF4-FFF2-40B4-BE49-F238E27FC236}">
+                <a16:creationId xmlns:a16="http://schemas.microsoft.com/office/drawing/2014/main" id="{79C44912-AB33-E7E0-897A-DE1691A5BF57}"/>
+              </a:ext>
+            </a:extLst>
+          </p:cNvPr>
+          <p:cNvPicPr>
+            <a:picLocks noChangeAspect="1"/>
+          </p:cNvPicPr>
+          <p:nvPr/>
+        </p:nvPicPr>
+        <p:blipFill rotWithShape="1">
+          <a:blip r:embed="rId3"/>
+          <a:srcRect r="27269" b="-1"/>
+          <a:stretch/>
+        </p:blipFill>
+        <p:spPr>
+          <a:xfrm>
+            <a:off x="5874226" y="10"/>
+            <a:ext cx="6706612" cy="6857990"/>
+          </a:xfrm>
+          <a:custGeom>
+            <a:avLst/>
+            <a:gdLst/>
+            <a:ahLst/>
+            <a:cxnLst/>
+            <a:rect l="l" t="t" r="r" b="b"/>
+            <a:pathLst>
+              <a:path w="7472381" h="6886575">
+                <a:moveTo>
+                  <a:pt x="1232666" y="0"/>
+                </a:moveTo>
+                <a:lnTo>
+                  <a:pt x="7472381" y="0"/>
+                </a:lnTo>
+                <a:lnTo>
+                  <a:pt x="7472381" y="814388"/>
+                </a:lnTo>
+                <a:lnTo>
+                  <a:pt x="7472381" y="6411516"/>
+                </a:lnTo>
+                <a:lnTo>
+                  <a:pt x="7472381" y="6886575"/>
+                </a:lnTo>
+                <a:lnTo>
+                  <a:pt x="6992676" y="6886575"/>
+                </a:lnTo>
+                <a:lnTo>
+                  <a:pt x="1946893" y="6886575"/>
+                </a:lnTo>
+                <a:cubicBezTo>
+                  <a:pt x="1801205" y="6815137"/>
+                  <a:pt x="1662624" y="6729412"/>
+                  <a:pt x="1506276" y="6686550"/>
+                </a:cubicBezTo>
+                <a:cubicBezTo>
+                  <a:pt x="1399675" y="6657975"/>
+                  <a:pt x="1296627" y="6607969"/>
+                  <a:pt x="1314394" y="6457949"/>
+                </a:cubicBezTo>
+                <a:cubicBezTo>
+                  <a:pt x="1317947" y="6415087"/>
+                  <a:pt x="1289520" y="6382941"/>
+                  <a:pt x="1246880" y="6393656"/>
+                </a:cubicBezTo>
+                <a:cubicBezTo>
+                  <a:pt x="1165153" y="6415087"/>
+                  <a:pt x="1126065" y="6354365"/>
+                  <a:pt x="1079872" y="6307931"/>
+                </a:cubicBezTo>
+                <a:cubicBezTo>
+                  <a:pt x="998144" y="6225779"/>
+                  <a:pt x="919970" y="6140052"/>
+                  <a:pt x="788495" y="6125765"/>
+                </a:cubicBezTo>
+                <a:cubicBezTo>
+                  <a:pt x="813369" y="6061471"/>
+                  <a:pt x="856009" y="6068615"/>
+                  <a:pt x="895097" y="6082903"/>
+                </a:cubicBezTo>
+                <a:cubicBezTo>
+                  <a:pt x="998144" y="6118622"/>
+                  <a:pt x="1101192" y="6157912"/>
+                  <a:pt x="1204239" y="6193631"/>
+                </a:cubicBezTo>
+                <a:cubicBezTo>
+                  <a:pt x="1271754" y="6215062"/>
+                  <a:pt x="1339267" y="6247209"/>
+                  <a:pt x="1428102" y="6222206"/>
+                </a:cubicBezTo>
+                <a:cubicBezTo>
+                  <a:pt x="1349928" y="6093619"/>
+                  <a:pt x="1218453" y="6068615"/>
+                  <a:pt x="1111852" y="6029325"/>
+                </a:cubicBezTo>
+                <a:cubicBezTo>
+                  <a:pt x="980377" y="5979319"/>
+                  <a:pt x="902203" y="5886450"/>
+                  <a:pt x="806262" y="5779294"/>
+                </a:cubicBezTo>
+                <a:cubicBezTo>
+                  <a:pt x="902203" y="5750719"/>
+                  <a:pt x="962610" y="5829300"/>
+                  <a:pt x="1040785" y="5825728"/>
+                </a:cubicBezTo>
+                <a:cubicBezTo>
+                  <a:pt x="1044338" y="5815012"/>
+                  <a:pt x="1051445" y="5793581"/>
+                  <a:pt x="1051445" y="5793581"/>
+                </a:cubicBezTo>
+                <a:cubicBezTo>
+                  <a:pt x="923523" y="5736431"/>
+                  <a:pt x="866670" y="5629275"/>
+                  <a:pt x="845349" y="5497115"/>
+                </a:cubicBezTo>
+                <a:cubicBezTo>
+                  <a:pt x="838243" y="5429250"/>
+                  <a:pt x="792049" y="5407819"/>
+                  <a:pt x="745855" y="5375672"/>
+                </a:cubicBezTo>
+                <a:cubicBezTo>
+                  <a:pt x="589507" y="5264943"/>
+                  <a:pt x="422499" y="5164931"/>
+                  <a:pt x="291024" y="5014913"/>
+                </a:cubicBezTo>
+                <a:cubicBezTo>
+                  <a:pt x="443819" y="5032771"/>
+                  <a:pt x="564633" y="5132784"/>
+                  <a:pt x="724535" y="5175647"/>
+                </a:cubicBezTo>
+                <a:cubicBezTo>
+                  <a:pt x="596614" y="5011340"/>
+                  <a:pt x="429605" y="4925615"/>
+                  <a:pt x="276811" y="4825603"/>
+                </a:cubicBezTo>
+                <a:cubicBezTo>
+                  <a:pt x="205743" y="4779169"/>
+                  <a:pt x="141783" y="4722018"/>
+                  <a:pt x="60055" y="4697016"/>
+                </a:cubicBezTo>
+                <a:cubicBezTo>
+                  <a:pt x="31628" y="4689872"/>
+                  <a:pt x="-18119" y="4672013"/>
+                  <a:pt x="6755" y="4622006"/>
+                </a:cubicBezTo>
+                <a:cubicBezTo>
+                  <a:pt x="28075" y="4579144"/>
+                  <a:pt x="67162" y="4593432"/>
+                  <a:pt x="102696" y="4604146"/>
+                </a:cubicBezTo>
+                <a:cubicBezTo>
+                  <a:pt x="187976" y="4632722"/>
+                  <a:pt x="280364" y="4632722"/>
+                  <a:pt x="397625" y="4632722"/>
+                </a:cubicBezTo>
+                <a:cubicBezTo>
+                  <a:pt x="298131" y="4496990"/>
+                  <a:pt x="116909" y="4539853"/>
+                  <a:pt x="31628" y="4396978"/>
+                </a:cubicBezTo>
+                <a:cubicBezTo>
+                  <a:pt x="138229" y="4371976"/>
+                  <a:pt x="219957" y="4421982"/>
+                  <a:pt x="305237" y="4432697"/>
+                </a:cubicBezTo>
+                <a:cubicBezTo>
+                  <a:pt x="383412" y="4443413"/>
+                  <a:pt x="401178" y="4418409"/>
+                  <a:pt x="383412" y="4339828"/>
+                </a:cubicBezTo>
+                <a:cubicBezTo>
+                  <a:pt x="354985" y="4218385"/>
+                  <a:pt x="397625" y="4157662"/>
+                  <a:pt x="511333" y="4189810"/>
+                </a:cubicBezTo>
+                <a:cubicBezTo>
+                  <a:pt x="617934" y="4221956"/>
+                  <a:pt x="628594" y="4175522"/>
+                  <a:pt x="600167" y="4107656"/>
+                </a:cubicBezTo>
+                <a:cubicBezTo>
+                  <a:pt x="557527" y="4007644"/>
+                  <a:pt x="603720" y="3929063"/>
+                  <a:pt x="635701" y="3843337"/>
+                </a:cubicBezTo>
+                <a:cubicBezTo>
+                  <a:pt x="685448" y="3714750"/>
+                  <a:pt x="664128" y="3650456"/>
+                  <a:pt x="561080" y="3554015"/>
+                </a:cubicBezTo>
+                <a:cubicBezTo>
+                  <a:pt x="500673" y="3500438"/>
+                  <a:pt x="440265" y="3454003"/>
+                  <a:pt x="354985" y="3407569"/>
+                </a:cubicBezTo>
+                <a:cubicBezTo>
+                  <a:pt x="550420" y="3382565"/>
+                  <a:pt x="347878" y="3296841"/>
+                  <a:pt x="415392" y="3243263"/>
+                </a:cubicBezTo>
+                <a:cubicBezTo>
+                  <a:pt x="553973" y="3221831"/>
+                  <a:pt x="664128" y="3393282"/>
+                  <a:pt x="852456" y="3343275"/>
+                </a:cubicBezTo>
+                <a:cubicBezTo>
+                  <a:pt x="625041" y="3196828"/>
+                  <a:pt x="369198" y="3150393"/>
+                  <a:pt x="202190" y="2953940"/>
+                </a:cubicBezTo>
+                <a:cubicBezTo>
+                  <a:pt x="241277" y="2911078"/>
+                  <a:pt x="280364" y="2953940"/>
+                  <a:pt x="312344" y="2936081"/>
+                </a:cubicBezTo>
+                <a:cubicBezTo>
+                  <a:pt x="312344" y="2925365"/>
+                  <a:pt x="685448" y="2993232"/>
+                  <a:pt x="706768" y="2714625"/>
+                </a:cubicBezTo>
+                <a:cubicBezTo>
+                  <a:pt x="713875" y="2714625"/>
+                  <a:pt x="720982" y="2714625"/>
+                  <a:pt x="728088" y="2703909"/>
+                </a:cubicBezTo>
+                <a:cubicBezTo>
+                  <a:pt x="767175" y="2664619"/>
+                  <a:pt x="731642" y="2571750"/>
+                  <a:pt x="795602" y="2564606"/>
+                </a:cubicBezTo>
+                <a:cubicBezTo>
+                  <a:pt x="866670" y="2557462"/>
+                  <a:pt x="934184" y="2525315"/>
+                  <a:pt x="1008804" y="2543175"/>
+                </a:cubicBezTo>
+                <a:cubicBezTo>
+                  <a:pt x="1065658" y="2557462"/>
+                  <a:pt x="1126065" y="2575322"/>
+                  <a:pt x="1186473" y="2575322"/>
+                </a:cubicBezTo>
+                <a:cubicBezTo>
+                  <a:pt x="1250433" y="2575322"/>
+                  <a:pt x="1339267" y="2696766"/>
+                  <a:pt x="1378355" y="2536031"/>
+                </a:cubicBezTo>
+                <a:cubicBezTo>
+                  <a:pt x="1378355" y="2528888"/>
+                  <a:pt x="1488509" y="2546747"/>
+                  <a:pt x="1548916" y="2553891"/>
+                </a:cubicBezTo>
+                <a:cubicBezTo>
+                  <a:pt x="1598663" y="2561035"/>
+                  <a:pt x="1659071" y="2593181"/>
+                  <a:pt x="1694604" y="2528888"/>
+                </a:cubicBezTo>
+                <a:cubicBezTo>
+                  <a:pt x="1712371" y="2489596"/>
+                  <a:pt x="1627090" y="2418159"/>
+                  <a:pt x="1552469" y="2411015"/>
+                </a:cubicBezTo>
+                <a:cubicBezTo>
+                  <a:pt x="1484956" y="2403872"/>
+                  <a:pt x="1417442" y="2396728"/>
+                  <a:pt x="1353481" y="2411015"/>
+                </a:cubicBezTo>
+                <a:cubicBezTo>
+                  <a:pt x="1275307" y="2428875"/>
+                  <a:pt x="1232666" y="2400300"/>
+                  <a:pt x="1211346" y="2336007"/>
+                </a:cubicBezTo>
+                <a:cubicBezTo>
+                  <a:pt x="1186473" y="2268141"/>
+                  <a:pt x="1140279" y="2232422"/>
+                  <a:pt x="1076318" y="2200275"/>
+                </a:cubicBezTo>
+                <a:cubicBezTo>
+                  <a:pt x="919970" y="2121694"/>
+                  <a:pt x="770729" y="2028825"/>
+                  <a:pt x="600167" y="1982390"/>
+                </a:cubicBezTo>
+                <a:cubicBezTo>
+                  <a:pt x="568187" y="1975246"/>
+                  <a:pt x="529100" y="1960959"/>
+                  <a:pt x="514886" y="1900238"/>
+                </a:cubicBezTo>
+                <a:cubicBezTo>
+                  <a:pt x="976824" y="1993106"/>
+                  <a:pt x="1396121" y="2232422"/>
+                  <a:pt x="1872273" y="2218135"/>
+                </a:cubicBezTo>
+                <a:cubicBezTo>
+                  <a:pt x="1744351" y="2143125"/>
+                  <a:pt x="1591557" y="2139554"/>
+                  <a:pt x="1452975" y="2085975"/>
+                </a:cubicBezTo>
+                <a:cubicBezTo>
+                  <a:pt x="1552469" y="2046685"/>
+                  <a:pt x="1644857" y="2089547"/>
+                  <a:pt x="1737245" y="2110978"/>
+                </a:cubicBezTo>
+                <a:cubicBezTo>
+                  <a:pt x="1815419" y="2128837"/>
+                  <a:pt x="1886486" y="2132410"/>
+                  <a:pt x="1893593" y="2021681"/>
+                </a:cubicBezTo>
+                <a:cubicBezTo>
+                  <a:pt x="1893593" y="2010965"/>
+                  <a:pt x="1893593" y="2003821"/>
+                  <a:pt x="1893593" y="1993106"/>
+                </a:cubicBezTo>
+                <a:cubicBezTo>
+                  <a:pt x="1865166" y="1946672"/>
+                  <a:pt x="1826079" y="1925240"/>
+                  <a:pt x="1776332" y="1910953"/>
+                </a:cubicBezTo>
+                <a:cubicBezTo>
+                  <a:pt x="1747905" y="1903809"/>
+                  <a:pt x="1708818" y="1889522"/>
+                  <a:pt x="1708818" y="1857375"/>
+                </a:cubicBezTo>
+                <a:cubicBezTo>
+                  <a:pt x="1712371" y="1735931"/>
+                  <a:pt x="1616430" y="1700212"/>
+                  <a:pt x="1524043" y="1664493"/>
+                </a:cubicBezTo>
+                <a:cubicBezTo>
+                  <a:pt x="1573790" y="1603772"/>
+                  <a:pt x="1616430" y="1646635"/>
+                  <a:pt x="1655517" y="1643062"/>
+                </a:cubicBezTo>
+                <a:cubicBezTo>
+                  <a:pt x="1680391" y="1639491"/>
+                  <a:pt x="1705264" y="1635919"/>
+                  <a:pt x="1705264" y="1603772"/>
+                </a:cubicBezTo>
+                <a:cubicBezTo>
+                  <a:pt x="1705264" y="1578769"/>
+                  <a:pt x="1694604" y="1546622"/>
+                  <a:pt x="1669731" y="1546622"/>
+                </a:cubicBezTo>
+                <a:cubicBezTo>
+                  <a:pt x="1513383" y="1543050"/>
+                  <a:pt x="1424548" y="1371600"/>
+                  <a:pt x="1261093" y="1371600"/>
+                </a:cubicBezTo>
+                <a:cubicBezTo>
+                  <a:pt x="1161599" y="1371600"/>
+                  <a:pt x="1310841" y="1275159"/>
+                  <a:pt x="1229113" y="1235869"/>
+                </a:cubicBezTo>
+                <a:cubicBezTo>
+                  <a:pt x="1211346" y="1225153"/>
+                  <a:pt x="1278860" y="1210866"/>
+                  <a:pt x="1307287" y="1214437"/>
+                </a:cubicBezTo>
+                <a:cubicBezTo>
+                  <a:pt x="1335714" y="1218009"/>
+                  <a:pt x="1360588" y="1243013"/>
+                  <a:pt x="1396121" y="1225153"/>
+                </a:cubicBezTo>
+                <a:cubicBezTo>
+                  <a:pt x="1413888" y="1160860"/>
+                  <a:pt x="1367694" y="1135856"/>
+                  <a:pt x="1325054" y="1117997"/>
+                </a:cubicBezTo>
+                <a:cubicBezTo>
+                  <a:pt x="1232666" y="1075135"/>
+                  <a:pt x="1140279" y="1025129"/>
+                  <a:pt x="1037231" y="1010841"/>
+                </a:cubicBezTo>
+                <a:cubicBezTo>
+                  <a:pt x="1001698" y="1007269"/>
+                  <a:pt x="980377" y="989409"/>
+                  <a:pt x="983931" y="953690"/>
+                </a:cubicBezTo>
+                <a:cubicBezTo>
+                  <a:pt x="991037" y="907256"/>
+                  <a:pt x="1026571" y="921544"/>
+                  <a:pt x="1054998" y="925115"/>
+                </a:cubicBezTo>
+                <a:cubicBezTo>
+                  <a:pt x="1072765" y="928688"/>
+                  <a:pt x="1090532" y="939403"/>
+                  <a:pt x="1108299" y="914400"/>
+                </a:cubicBezTo>
+                <a:cubicBezTo>
+                  <a:pt x="692555" y="660797"/>
+                  <a:pt x="472246" y="675085"/>
+                  <a:pt x="6755" y="467915"/>
+                </a:cubicBezTo>
+                <a:cubicBezTo>
+                  <a:pt x="109802" y="428625"/>
+                  <a:pt x="184423" y="457200"/>
+                  <a:pt x="255490" y="464344"/>
+                </a:cubicBezTo>
+                <a:cubicBezTo>
+                  <a:pt x="433159" y="482203"/>
+                  <a:pt x="323004" y="514350"/>
+                  <a:pt x="500673" y="535781"/>
+                </a:cubicBezTo>
+                <a:cubicBezTo>
+                  <a:pt x="585954" y="546497"/>
+                  <a:pt x="664128" y="582216"/>
+                  <a:pt x="760069" y="525066"/>
+                </a:cubicBezTo>
+                <a:cubicBezTo>
+                  <a:pt x="824029" y="485775"/>
+                  <a:pt x="927077" y="528637"/>
+                  <a:pt x="1005251" y="560785"/>
+                </a:cubicBezTo>
+                <a:cubicBezTo>
+                  <a:pt x="1069212" y="589360"/>
+                  <a:pt x="1133172" y="596503"/>
+                  <a:pt x="1218453" y="560785"/>
+                </a:cubicBezTo>
+                <a:cubicBezTo>
+                  <a:pt x="1140279" y="539354"/>
+                  <a:pt x="1079872" y="521494"/>
+                  <a:pt x="1019464" y="507206"/>
+                </a:cubicBezTo>
+                <a:cubicBezTo>
+                  <a:pt x="969717" y="496491"/>
+                  <a:pt x="941290" y="471488"/>
+                  <a:pt x="944844" y="417909"/>
+                </a:cubicBezTo>
+                <a:cubicBezTo>
+                  <a:pt x="944844" y="389334"/>
+                  <a:pt x="934184" y="350044"/>
+                  <a:pt x="969717" y="335757"/>
+                </a:cubicBezTo>
+                <a:cubicBezTo>
+                  <a:pt x="998144" y="321469"/>
+                  <a:pt x="1037231" y="335757"/>
+                  <a:pt x="1051445" y="360759"/>
+                </a:cubicBezTo>
+                <a:cubicBezTo>
+                  <a:pt x="1069212" y="407194"/>
+                  <a:pt x="1086978" y="450056"/>
+                  <a:pt x="1147386" y="453629"/>
+                </a:cubicBezTo>
+                <a:cubicBezTo>
+                  <a:pt x="1229113" y="460771"/>
+                  <a:pt x="1182919" y="432197"/>
+                  <a:pt x="1168706" y="396478"/>
+                </a:cubicBezTo>
+                <a:cubicBezTo>
+                  <a:pt x="1154492" y="357188"/>
+                  <a:pt x="1197133" y="346472"/>
+                  <a:pt x="1225560" y="353615"/>
+                </a:cubicBezTo>
+                <a:cubicBezTo>
+                  <a:pt x="1332161" y="385763"/>
+                  <a:pt x="1442315" y="328613"/>
+                  <a:pt x="1552469" y="375047"/>
+                </a:cubicBezTo>
+                <a:cubicBezTo>
+                  <a:pt x="1524043" y="260747"/>
+                  <a:pt x="1463635" y="210741"/>
+                  <a:pt x="1335714" y="192881"/>
+                </a:cubicBezTo>
+                <a:cubicBezTo>
+                  <a:pt x="1289520" y="189310"/>
+                  <a:pt x="1239773" y="196453"/>
+                  <a:pt x="1197133" y="164306"/>
+                </a:cubicBezTo>
+                <a:cubicBezTo>
+                  <a:pt x="1172259" y="146447"/>
+                  <a:pt x="1147386" y="125016"/>
+                  <a:pt x="1165153" y="89297"/>
+                </a:cubicBezTo>
+                <a:cubicBezTo>
+                  <a:pt x="1175813" y="64294"/>
+                  <a:pt x="1204239" y="64294"/>
+                  <a:pt x="1229113" y="71437"/>
+                </a:cubicBezTo>
+                <a:cubicBezTo>
+                  <a:pt x="1332161" y="110728"/>
+                  <a:pt x="1442315" y="121444"/>
+                  <a:pt x="1548916" y="135731"/>
+                </a:cubicBezTo>
+                <a:cubicBezTo>
+                  <a:pt x="1566683" y="139303"/>
+                  <a:pt x="1584450" y="146447"/>
+                  <a:pt x="1602217" y="110728"/>
+                </a:cubicBezTo>
+                <a:cubicBezTo>
+                  <a:pt x="1477849" y="78581"/>
+                  <a:pt x="1357034" y="35719"/>
+                  <a:pt x="1232666" y="0"/>
+                </a:cubicBezTo>
+                <a:close/>
+              </a:path>
+            </a:pathLst>
+          </a:custGeom>
+        </p:spPr>
+      </p:pic>
+    </p:spTree>
+    <p:extLst>
+      <p:ext uri="{BB962C8B-B14F-4D97-AF65-F5344CB8AC3E}">
+        <p14:creationId xmlns:p14="http://schemas.microsoft.com/office/powerpoint/2010/main" val="4267184047"/>
+      </p:ext>
+    </p:extLst>
+  </p:cSld>
+  <p:clrMapOvr>
+    <a:masterClrMapping/>
+  </p:clrMapOvr>
+</p:sld>
+</file>
+
+<file path=ppt/slides/slide4.xml><?xml version="1.0" encoding="utf-8"?>
 <p:sld xmlns:a="http://schemas.openxmlformats.org/drawingml/2006/main" xmlns:r="http://schemas.openxmlformats.org/officeDocument/2006/relationships" xmlns:p="http://schemas.openxmlformats.org/presentationml/2006/main">
   <p:cSld>
     <p:spTree>
@@ -15454,42 +17154,189 @@
         </p:nvSpPr>
         <p:spPr/>
         <p:txBody>
-          <a:bodyPr/>
+          <a:bodyPr>
+            <a:normAutofit/>
+          </a:bodyPr>
           <a:lstStyle/>
           <a:p>
             <a:r>
-              <a:rPr lang="en-US" altLang="zh-CN" dirty="0"/>
-              <a:t>EDA</a:t>
-            </a:r>
+              <a:rPr lang="en-US" dirty="0"/>
+              <a:t>By Cap Colors - Stacked Bar Plot</a:t>
+            </a:r>
+            <a:br>
+              <a:rPr lang="en-US" dirty="0"/>
+            </a:br>
             <a:endParaRPr lang="en-US" dirty="0"/>
           </a:p>
         </p:txBody>
       </p:sp>
-      <p:sp>
-        <p:nvSpPr>
-          <p:cNvPr id="3" name="Content Placeholder 2">
+      <p:pic>
+        <p:nvPicPr>
+          <p:cNvPr id="5" name="Picture 4" descr="A graph with green and pink bars&#10;&#10;Description automatically generated">
             <a:extLst>
               <a:ext uri="{FF2B5EF4-FFF2-40B4-BE49-F238E27FC236}">
-                <a16:creationId xmlns:a16="http://schemas.microsoft.com/office/drawing/2014/main" id="{9922980C-52CF-7A7D-0815-36FDA2B3C9DF}"/>
+                <a16:creationId xmlns:a16="http://schemas.microsoft.com/office/drawing/2014/main" id="{196BC289-8626-6983-891D-700161BEC8A5}"/>
               </a:ext>
             </a:extLst>
           </p:cNvPr>
-          <p:cNvSpPr>
-            <a:spLocks noGrp="1"/>
-          </p:cNvSpPr>
-          <p:nvPr>
-            <p:ph idx="1"/>
-          </p:nvPr>
-        </p:nvSpPr>
-        <p:spPr/>
-        <p:txBody>
-          <a:bodyPr/>
-          <a:lstStyle/>
-          <a:p>
-            <a:endParaRPr lang="en-US" dirty="0"/>
-          </a:p>
-        </p:txBody>
-      </p:sp>
+          <p:cNvPicPr>
+            <a:picLocks noChangeAspect="1"/>
+          </p:cNvPicPr>
+          <p:nvPr/>
+        </p:nvPicPr>
+        <p:blipFill>
+          <a:blip r:embed="rId2"/>
+          <a:stretch>
+            <a:fillRect/>
+          </a:stretch>
+        </p:blipFill>
+        <p:spPr>
+          <a:xfrm>
+            <a:off x="2949200" y="1430590"/>
+            <a:ext cx="7385286" cy="5334643"/>
+          </a:xfrm>
+          <a:prstGeom prst="rect">
+            <a:avLst/>
+          </a:prstGeom>
+        </p:spPr>
+      </p:pic>
+      <p:pic>
+        <p:nvPicPr>
+          <p:cNvPr id="2050" name="Picture 2" descr="Buff Color HEX Code: #f0dc82">
+            <a:extLst>
+              <a:ext uri="{FF2B5EF4-FFF2-40B4-BE49-F238E27FC236}">
+                <a16:creationId xmlns:a16="http://schemas.microsoft.com/office/drawing/2014/main" id="{F687097C-5A05-3D21-B3E6-320C8484C6F8}"/>
+              </a:ext>
+            </a:extLst>
+          </p:cNvPr>
+          <p:cNvPicPr>
+            <a:picLocks noChangeAspect="1" noChangeArrowheads="1"/>
+          </p:cNvPicPr>
+          <p:nvPr/>
+        </p:nvPicPr>
+        <p:blipFill rotWithShape="1">
+          <a:blip r:embed="rId3">
+            <a:extLst>
+              <a:ext uri="{28A0092B-C50C-407E-A947-70E740481C1C}">
+                <a14:useLocalDpi xmlns:a14="http://schemas.microsoft.com/office/drawing/2010/main" val="0"/>
+              </a:ext>
+            </a:extLst>
+          </a:blip>
+          <a:srcRect l="23919" t="29479" r="3237" b="5598"/>
+          <a:stretch/>
+        </p:blipFill>
+        <p:spPr bwMode="auto">
+          <a:xfrm>
+            <a:off x="291548" y="1895061"/>
+            <a:ext cx="1775792" cy="861392"/>
+          </a:xfrm>
+          <a:prstGeom prst="rect">
+            <a:avLst/>
+          </a:prstGeom>
+          <a:noFill/>
+          <a:extLst>
+            <a:ext uri="{909E8E84-426E-40DD-AFC4-6F175D3DCCD1}">
+              <a14:hiddenFill xmlns:a14="http://schemas.microsoft.com/office/drawing/2010/main">
+                <a:solidFill>
+                  <a:srgbClr val="FFFFFF"/>
+                </a:solidFill>
+              </a14:hiddenFill>
+            </a:ext>
+          </a:extLst>
+        </p:spPr>
+      </p:pic>
+      <p:pic>
+        <p:nvPicPr>
+          <p:cNvPr id="2052" name="Picture 4" descr="Stropharia aeruginosa - Wikipedia">
+            <a:extLst>
+              <a:ext uri="{FF2B5EF4-FFF2-40B4-BE49-F238E27FC236}">
+                <a16:creationId xmlns:a16="http://schemas.microsoft.com/office/drawing/2014/main" id="{A1EF7EFB-28EE-9ADE-4AD4-FCFC56F5CFF2}"/>
+              </a:ext>
+            </a:extLst>
+          </p:cNvPr>
+          <p:cNvPicPr>
+            <a:picLocks noChangeAspect="1" noChangeArrowheads="1"/>
+          </p:cNvPicPr>
+          <p:nvPr/>
+        </p:nvPicPr>
+        <p:blipFill>
+          <a:blip r:embed="rId4">
+            <a:extLst>
+              <a:ext uri="{28A0092B-C50C-407E-A947-70E740481C1C}">
+                <a14:useLocalDpi xmlns:a14="http://schemas.microsoft.com/office/drawing/2010/main" val="0"/>
+              </a:ext>
+            </a:extLst>
+          </a:blip>
+          <a:srcRect/>
+          <a:stretch>
+            <a:fillRect/>
+          </a:stretch>
+        </p:blipFill>
+        <p:spPr bwMode="auto">
+          <a:xfrm>
+            <a:off x="10334486" y="3998842"/>
+            <a:ext cx="1844261" cy="2766391"/>
+          </a:xfrm>
+          <a:prstGeom prst="rect">
+            <a:avLst/>
+          </a:prstGeom>
+          <a:noFill/>
+          <a:extLst>
+            <a:ext uri="{909E8E84-426E-40DD-AFC4-6F175D3DCCD1}">
+              <a14:hiddenFill xmlns:a14="http://schemas.microsoft.com/office/drawing/2010/main">
+                <a:solidFill>
+                  <a:srgbClr val="FFFFFF"/>
+                </a:solidFill>
+              </a14:hiddenFill>
+            </a:ext>
+          </a:extLst>
+        </p:spPr>
+      </p:pic>
+      <p:pic>
+        <p:nvPicPr>
+          <p:cNvPr id="2054" name="Picture 6" descr="Cuphophyllus pratensis - Wikipedia">
+            <a:extLst>
+              <a:ext uri="{FF2B5EF4-FFF2-40B4-BE49-F238E27FC236}">
+                <a16:creationId xmlns:a16="http://schemas.microsoft.com/office/drawing/2014/main" id="{D7E1F903-9249-52BC-705D-BFDF62B96BDD}"/>
+              </a:ext>
+            </a:extLst>
+          </p:cNvPr>
+          <p:cNvPicPr>
+            <a:picLocks noChangeAspect="1" noChangeArrowheads="1"/>
+          </p:cNvPicPr>
+          <p:nvPr/>
+        </p:nvPicPr>
+        <p:blipFill rotWithShape="1">
+          <a:blip r:embed="rId5">
+            <a:extLst>
+              <a:ext uri="{28A0092B-C50C-407E-A947-70E740481C1C}">
+                <a14:useLocalDpi xmlns:a14="http://schemas.microsoft.com/office/drawing/2010/main" val="0"/>
+              </a:ext>
+            </a:extLst>
+          </a:blip>
+          <a:srcRect l="3444" t="3285" r="17249" b="1353"/>
+          <a:stretch/>
+        </p:blipFill>
+        <p:spPr bwMode="auto">
+          <a:xfrm flipH="1">
+            <a:off x="0" y="3187147"/>
+            <a:ext cx="2914671" cy="2663685"/>
+          </a:xfrm>
+          <a:prstGeom prst="rect">
+            <a:avLst/>
+          </a:prstGeom>
+          <a:noFill/>
+          <a:extLst>
+            <a:ext uri="{909E8E84-426E-40DD-AFC4-6F175D3DCCD1}">
+              <a14:hiddenFill xmlns:a14="http://schemas.microsoft.com/office/drawing/2010/main">
+                <a:solidFill>
+                  <a:srgbClr val="FFFFFF"/>
+                </a:solidFill>
+              </a14:hiddenFill>
+            </a:ext>
+          </a:extLst>
+        </p:spPr>
+      </p:pic>
     </p:spTree>
     <p:extLst>
       <p:ext uri="{BB962C8B-B14F-4D97-AF65-F5344CB8AC3E}">
@@ -15503,7 +17350,293 @@
 </p:sld>
 </file>
 
-<file path=ppt/slides/slide4.xml><?xml version="1.0" encoding="utf-8"?>
+<file path=ppt/slides/slide5.xml><?xml version="1.0" encoding="utf-8"?>
+<p:sld xmlns:a="http://schemas.openxmlformats.org/drawingml/2006/main" xmlns:r="http://schemas.openxmlformats.org/officeDocument/2006/relationships" xmlns:p="http://schemas.openxmlformats.org/presentationml/2006/main">
+  <p:cSld>
+    <p:spTree>
+      <p:nvGrpSpPr>
+        <p:cNvPr id="1" name=""/>
+        <p:cNvGrpSpPr/>
+        <p:nvPr/>
+      </p:nvGrpSpPr>
+      <p:grpSpPr>
+        <a:xfrm>
+          <a:off x="0" y="0"/>
+          <a:ext cx="0" cy="0"/>
+          <a:chOff x="0" y="0"/>
+          <a:chExt cx="0" cy="0"/>
+        </a:xfrm>
+      </p:grpSpPr>
+      <p:sp>
+        <p:nvSpPr>
+          <p:cNvPr id="2" name="Title 1">
+            <a:extLst>
+              <a:ext uri="{FF2B5EF4-FFF2-40B4-BE49-F238E27FC236}">
+                <a16:creationId xmlns:a16="http://schemas.microsoft.com/office/drawing/2014/main" id="{FD1D56D7-3FC3-9340-94EE-DDFFEB8700BE}"/>
+              </a:ext>
+            </a:extLst>
+          </p:cNvPr>
+          <p:cNvSpPr>
+            <a:spLocks noGrp="1"/>
+          </p:cNvSpPr>
+          <p:nvPr>
+            <p:ph type="title"/>
+          </p:nvPr>
+        </p:nvSpPr>
+        <p:spPr/>
+        <p:txBody>
+          <a:bodyPr/>
+          <a:lstStyle/>
+          <a:p>
+            <a:r>
+              <a:rPr lang="en-US" dirty="0"/>
+              <a:t>By </a:t>
+            </a:r>
+            <a:r>
+              <a:rPr lang="en-US" altLang="zh-CN" dirty="0"/>
+              <a:t>Habitat</a:t>
+            </a:r>
+            <a:r>
+              <a:rPr lang="en-US" dirty="0"/>
+              <a:t>s - Stacked Bar Plot</a:t>
+            </a:r>
+            <a:br>
+              <a:rPr lang="en-US" dirty="0"/>
+            </a:br>
+            <a:endParaRPr lang="en-US" dirty="0"/>
+          </a:p>
+        </p:txBody>
+      </p:sp>
+      <p:pic>
+        <p:nvPicPr>
+          <p:cNvPr id="7" name="Picture 6" descr="A graph of green and pink bars&#10;&#10;Description automatically generated">
+            <a:extLst>
+              <a:ext uri="{FF2B5EF4-FFF2-40B4-BE49-F238E27FC236}">
+                <a16:creationId xmlns:a16="http://schemas.microsoft.com/office/drawing/2014/main" id="{4AB79231-2146-EB72-914C-D53E2BC3AE75}"/>
+              </a:ext>
+            </a:extLst>
+          </p:cNvPr>
+          <p:cNvPicPr>
+            <a:picLocks noChangeAspect="1"/>
+          </p:cNvPicPr>
+          <p:nvPr/>
+        </p:nvPicPr>
+        <p:blipFill>
+          <a:blip r:embed="rId2"/>
+          <a:stretch>
+            <a:fillRect/>
+          </a:stretch>
+        </p:blipFill>
+        <p:spPr>
+          <a:xfrm>
+            <a:off x="2205520" y="1232508"/>
+            <a:ext cx="7780959" cy="5260367"/>
+          </a:xfrm>
+          <a:prstGeom prst="rect">
+            <a:avLst/>
+          </a:prstGeom>
+        </p:spPr>
+      </p:pic>
+      <p:pic>
+        <p:nvPicPr>
+          <p:cNvPr id="3074" name="Picture 2" descr="Urban Fungus Gallery—and ID challenge! - WNPS Blog - Botanical Rambles">
+            <a:extLst>
+              <a:ext uri="{FF2B5EF4-FFF2-40B4-BE49-F238E27FC236}">
+                <a16:creationId xmlns:a16="http://schemas.microsoft.com/office/drawing/2014/main" id="{E9EB0F76-A4BD-9096-9A07-F677A2049190}"/>
+              </a:ext>
+            </a:extLst>
+          </p:cNvPr>
+          <p:cNvPicPr>
+            <a:picLocks noChangeAspect="1" noChangeArrowheads="1"/>
+          </p:cNvPicPr>
+          <p:nvPr/>
+        </p:nvPicPr>
+        <p:blipFill>
+          <a:blip r:embed="rId3">
+            <a:extLst>
+              <a:ext uri="{28A0092B-C50C-407E-A947-70E740481C1C}">
+                <a14:useLocalDpi xmlns:a14="http://schemas.microsoft.com/office/drawing/2010/main" val="0"/>
+              </a:ext>
+            </a:extLst>
+          </a:blip>
+          <a:srcRect/>
+          <a:stretch>
+            <a:fillRect/>
+          </a:stretch>
+        </p:blipFill>
+        <p:spPr bwMode="auto">
+          <a:xfrm>
+            <a:off x="164548" y="2511770"/>
+            <a:ext cx="1838136" cy="1834460"/>
+          </a:xfrm>
+          <a:prstGeom prst="rect">
+            <a:avLst/>
+          </a:prstGeom>
+          <a:noFill/>
+          <a:extLst>
+            <a:ext uri="{909E8E84-426E-40DD-AFC4-6F175D3DCCD1}">
+              <a14:hiddenFill xmlns:a14="http://schemas.microsoft.com/office/drawing/2010/main">
+                <a:solidFill>
+                  <a:srgbClr val="FFFFFF"/>
+                </a:solidFill>
+              </a14:hiddenFill>
+            </a:ext>
+          </a:extLst>
+        </p:spPr>
+      </p:pic>
+    </p:spTree>
+    <p:extLst>
+      <p:ext uri="{BB962C8B-B14F-4D97-AF65-F5344CB8AC3E}">
+        <p14:creationId xmlns:p14="http://schemas.microsoft.com/office/powerpoint/2010/main" val="4244779137"/>
+      </p:ext>
+    </p:extLst>
+  </p:cSld>
+  <p:clrMapOvr>
+    <a:masterClrMapping/>
+  </p:clrMapOvr>
+</p:sld>
+</file>
+
+<file path=ppt/slides/slide6.xml><?xml version="1.0" encoding="utf-8"?>
+<p:sld xmlns:a="http://schemas.openxmlformats.org/drawingml/2006/main" xmlns:r="http://schemas.openxmlformats.org/officeDocument/2006/relationships" xmlns:p="http://schemas.openxmlformats.org/presentationml/2006/main">
+  <p:cSld>
+    <p:spTree>
+      <p:nvGrpSpPr>
+        <p:cNvPr id="1" name=""/>
+        <p:cNvGrpSpPr/>
+        <p:nvPr/>
+      </p:nvGrpSpPr>
+      <p:grpSpPr>
+        <a:xfrm>
+          <a:off x="0" y="0"/>
+          <a:ext cx="0" cy="0"/>
+          <a:chOff x="0" y="0"/>
+          <a:chExt cx="0" cy="0"/>
+        </a:xfrm>
+      </p:grpSpPr>
+      <p:sp>
+        <p:nvSpPr>
+          <p:cNvPr id="2" name="Title 1">
+            <a:extLst>
+              <a:ext uri="{FF2B5EF4-FFF2-40B4-BE49-F238E27FC236}">
+                <a16:creationId xmlns:a16="http://schemas.microsoft.com/office/drawing/2014/main" id="{30E27618-AEF1-6AEE-A744-16313B51E6BA}"/>
+              </a:ext>
+            </a:extLst>
+          </p:cNvPr>
+          <p:cNvSpPr>
+            <a:spLocks noGrp="1"/>
+          </p:cNvSpPr>
+          <p:nvPr>
+            <p:ph type="title"/>
+          </p:nvPr>
+        </p:nvSpPr>
+        <p:spPr/>
+        <p:txBody>
+          <a:bodyPr>
+            <a:normAutofit fontScale="90000"/>
+          </a:bodyPr>
+          <a:lstStyle/>
+          <a:p>
+            <a:r>
+              <a:rPr lang="en-US" dirty="0"/>
+              <a:t>Category-Specific Histogram of Stem Width</a:t>
+            </a:r>
+            <a:br>
+              <a:rPr lang="en-US" dirty="0"/>
+            </a:br>
+            <a:endParaRPr lang="en-US" dirty="0"/>
+          </a:p>
+        </p:txBody>
+      </p:sp>
+      <p:pic>
+        <p:nvPicPr>
+          <p:cNvPr id="5" name="Picture 4" descr="A graph of a graph&#10;&#10;Description automatically generated">
+            <a:extLst>
+              <a:ext uri="{FF2B5EF4-FFF2-40B4-BE49-F238E27FC236}">
+                <a16:creationId xmlns:a16="http://schemas.microsoft.com/office/drawing/2014/main" id="{35F2B4AF-F7DB-D948-5A4D-77C9DA6A2790}"/>
+              </a:ext>
+            </a:extLst>
+          </p:cNvPr>
+          <p:cNvPicPr>
+            <a:picLocks noChangeAspect="1"/>
+          </p:cNvPicPr>
+          <p:nvPr/>
+        </p:nvPicPr>
+        <p:blipFill>
+          <a:blip r:embed="rId2"/>
+          <a:stretch>
+            <a:fillRect/>
+          </a:stretch>
+        </p:blipFill>
+        <p:spPr>
+          <a:xfrm>
+            <a:off x="3561844" y="1470516"/>
+            <a:ext cx="7791956" cy="5194637"/>
+          </a:xfrm>
+          <a:prstGeom prst="rect">
+            <a:avLst/>
+          </a:prstGeom>
+        </p:spPr>
+      </p:pic>
+      <p:pic>
+        <p:nvPicPr>
+          <p:cNvPr id="1026" name="Picture 2" descr="Mushroom Identification Basics - Yellow Elanor">
+            <a:extLst>
+              <a:ext uri="{FF2B5EF4-FFF2-40B4-BE49-F238E27FC236}">
+                <a16:creationId xmlns:a16="http://schemas.microsoft.com/office/drawing/2014/main" id="{BEC96D8F-A442-AD05-5D8A-C7A51B20275B}"/>
+              </a:ext>
+            </a:extLst>
+          </p:cNvPr>
+          <p:cNvPicPr>
+            <a:picLocks noChangeAspect="1" noChangeArrowheads="1"/>
+          </p:cNvPicPr>
+          <p:nvPr/>
+        </p:nvPicPr>
+        <p:blipFill rotWithShape="1">
+          <a:blip r:embed="rId3">
+            <a:extLst>
+              <a:ext uri="{28A0092B-C50C-407E-A947-70E740481C1C}">
+                <a14:useLocalDpi xmlns:a14="http://schemas.microsoft.com/office/drawing/2010/main" val="0"/>
+              </a:ext>
+            </a:extLst>
+          </a:blip>
+          <a:srcRect l="4934" r="4909"/>
+          <a:stretch/>
+        </p:blipFill>
+        <p:spPr bwMode="auto">
+          <a:xfrm>
+            <a:off x="159029" y="1960738"/>
+            <a:ext cx="3127510" cy="4214192"/>
+          </a:xfrm>
+          <a:prstGeom prst="rect">
+            <a:avLst/>
+          </a:prstGeom>
+          <a:noFill/>
+          <a:extLst>
+            <a:ext uri="{909E8E84-426E-40DD-AFC4-6F175D3DCCD1}">
+              <a14:hiddenFill xmlns:a14="http://schemas.microsoft.com/office/drawing/2010/main">
+                <a:solidFill>
+                  <a:srgbClr val="FFFFFF"/>
+                </a:solidFill>
+              </a14:hiddenFill>
+            </a:ext>
+          </a:extLst>
+        </p:spPr>
+      </p:pic>
+    </p:spTree>
+    <p:extLst>
+      <p:ext uri="{BB962C8B-B14F-4D97-AF65-F5344CB8AC3E}">
+        <p14:creationId xmlns:p14="http://schemas.microsoft.com/office/powerpoint/2010/main" val="814622427"/>
+      </p:ext>
+    </p:extLst>
+  </p:cSld>
+  <p:clrMapOvr>
+    <a:masterClrMapping/>
+  </p:clrMapOvr>
+</p:sld>
+</file>
+
+<file path=ppt/slides/slide7.xml><?xml version="1.0" encoding="utf-8"?>
 <p:sld xmlns:a="http://schemas.openxmlformats.org/drawingml/2006/main" xmlns:r="http://schemas.openxmlformats.org/officeDocument/2006/relationships" xmlns:p="http://schemas.openxmlformats.org/presentationml/2006/main">
   <p:cSld>
     <p:spTree>
@@ -15565,7 +17698,12 @@
             <p:ph idx="1"/>
           </p:nvPr>
         </p:nvSpPr>
-        <p:spPr/>
+        <p:spPr>
+          <a:xfrm>
+            <a:off x="838200" y="1690688"/>
+            <a:ext cx="10515600" cy="4160520"/>
+          </a:xfrm>
+        </p:spPr>
         <p:txBody>
           <a:bodyPr/>
           <a:lstStyle/>
@@ -15638,11 +17776,67 @@
               <a:rPr lang="en-US" altLang="zh-CN" dirty="0"/>
               <a:t>4:6</a:t>
             </a:r>
+            <a:r>
+              <a:rPr lang="zh-CN" altLang="en-US" dirty="0"/>
+              <a:t> </a:t>
+            </a:r>
+            <a:r>
+              <a:rPr lang="en-US" altLang="zh-CN" dirty="0"/>
+              <a:t>for</a:t>
+            </a:r>
+            <a:r>
+              <a:rPr lang="zh-CN" altLang="en-US" dirty="0"/>
+              <a:t> </a:t>
+            </a:r>
+            <a:r>
+              <a:rPr lang="en-US" altLang="zh-CN" dirty="0"/>
+              <a:t>edible</a:t>
+            </a:r>
+            <a:r>
+              <a:rPr lang="zh-CN" altLang="en-US" dirty="0"/>
+              <a:t> </a:t>
+            </a:r>
+            <a:r>
+              <a:rPr lang="en-US" altLang="zh-CN" dirty="0"/>
+              <a:t>and</a:t>
+            </a:r>
+            <a:r>
+              <a:rPr lang="zh-CN" altLang="en-US" dirty="0"/>
+              <a:t> </a:t>
+            </a:r>
+            <a:r>
+              <a:rPr lang="en-US" altLang="zh-CN" dirty="0"/>
+              <a:t>poisonous</a:t>
+            </a:r>
+            <a:r>
+              <a:rPr lang="zh-CN" altLang="en-US" dirty="0"/>
+              <a:t> </a:t>
+            </a:r>
+            <a:r>
+              <a:rPr lang="en-US" altLang="zh-CN" dirty="0"/>
+              <a:t>respectively.</a:t>
+            </a:r>
           </a:p>
           <a:p>
             <a:r>
               <a:rPr lang="en-US" altLang="zh-CN" dirty="0"/>
-              <a:t>Decide</a:t>
+              <a:t>Use</a:t>
+            </a:r>
+            <a:r>
+              <a:rPr lang="zh-CN" altLang="en-US" dirty="0"/>
+              <a:t> </a:t>
+            </a:r>
+            <a:r>
+              <a:rPr lang="en-US" altLang="zh-CN" dirty="0"/>
+              <a:t>general</a:t>
+            </a:r>
+            <a:r>
+              <a:rPr lang="zh-CN" altLang="en-US" dirty="0"/>
+              <a:t> </a:t>
+            </a:r>
+            <a:r>
+              <a:rPr lang="en-US" altLang="zh-CN" dirty="0" err="1"/>
+              <a:t>train_test_split</a:t>
             </a:r>
             <a:r>
               <a:rPr lang="zh-CN" altLang="en-US" dirty="0"/>
@@ -15658,7 +17852,7 @@
             </a:r>
             <a:r>
               <a:rPr lang="en-US" altLang="zh-CN" dirty="0"/>
-              <a:t>use</a:t>
+              <a:t>set</a:t>
             </a:r>
             <a:r>
               <a:rPr lang="zh-CN" altLang="en-US" dirty="0"/>
@@ -15666,15 +17860,15 @@
             </a:r>
             <a:r>
               <a:rPr lang="en-US" altLang="zh-CN" dirty="0"/>
-              <a:t>general</a:t>
+              <a:t>15%</a:t>
             </a:r>
             <a:r>
               <a:rPr lang="zh-CN" altLang="en-US" dirty="0"/>
               <a:t> </a:t>
             </a:r>
             <a:r>
-              <a:rPr lang="en-US" altLang="zh-CN" dirty="0" err="1"/>
-              <a:t>train_test_split</a:t>
+              <a:rPr lang="en-US" altLang="zh-CN" dirty="0"/>
+              <a:t>of</a:t>
             </a:r>
             <a:r>
               <a:rPr lang="zh-CN" altLang="en-US" dirty="0"/>
@@ -15682,7 +17876,7 @@
             </a:r>
             <a:r>
               <a:rPr lang="en-US" altLang="zh-CN" dirty="0"/>
-              <a:t>where</a:t>
+              <a:t>the</a:t>
             </a:r>
             <a:r>
               <a:rPr lang="zh-CN" altLang="en-US" dirty="0"/>
@@ -15690,7 +17884,23 @@
             </a:r>
             <a:r>
               <a:rPr lang="en-US" altLang="zh-CN" dirty="0"/>
-              <a:t>train</a:t>
+              <a:t>dataset</a:t>
+            </a:r>
+            <a:r>
+              <a:rPr lang="zh-CN" altLang="en-US" dirty="0"/>
+              <a:t> </a:t>
+            </a:r>
+            <a:r>
+              <a:rPr lang="en-US" altLang="zh-CN" dirty="0"/>
+              <a:t>as</a:t>
+            </a:r>
+            <a:r>
+              <a:rPr lang="zh-CN" altLang="en-US" dirty="0"/>
+              <a:t> </a:t>
+            </a:r>
+            <a:r>
+              <a:rPr lang="en-US" altLang="zh-CN" dirty="0"/>
+              <a:t>test</a:t>
             </a:r>
             <a:r>
               <a:rPr lang="zh-CN" altLang="en-US" dirty="0"/>
@@ -15706,7 +17916,7 @@
             </a:r>
             <a:r>
               <a:rPr lang="en-US" altLang="zh-CN" dirty="0"/>
-              <a:t>is</a:t>
+              <a:t>and</a:t>
             </a:r>
             <a:r>
               <a:rPr lang="zh-CN" altLang="en-US" dirty="0"/>
@@ -15714,7 +17924,7 @@
             </a:r>
             <a:r>
               <a:rPr lang="en-US" altLang="zh-CN" dirty="0"/>
-              <a:t>70%,</a:t>
+              <a:t>the</a:t>
             </a:r>
             <a:r>
               <a:rPr lang="zh-CN" altLang="en-US" dirty="0"/>
@@ -15722,7 +17932,7 @@
             </a:r>
             <a:r>
               <a:rPr lang="en-US" altLang="zh-CN" dirty="0"/>
-              <a:t>validation</a:t>
+              <a:t>rest</a:t>
             </a:r>
             <a:r>
               <a:rPr lang="zh-CN" altLang="en-US" dirty="0"/>
@@ -15730,7 +17940,7 @@
             </a:r>
             <a:r>
               <a:rPr lang="en-US" altLang="zh-CN" dirty="0"/>
-              <a:t>set</a:t>
+              <a:t>85%</a:t>
             </a:r>
             <a:r>
               <a:rPr lang="zh-CN" altLang="en-US" dirty="0"/>
@@ -15738,7 +17948,7 @@
             </a:r>
             <a:r>
               <a:rPr lang="en-US" altLang="zh-CN" dirty="0"/>
-              <a:t>15%,</a:t>
+              <a:t>as</a:t>
             </a:r>
             <a:r>
               <a:rPr lang="zh-CN" altLang="en-US" dirty="0"/>
@@ -15746,7 +17956,7 @@
             </a:r>
             <a:r>
               <a:rPr lang="en-US" altLang="zh-CN" dirty="0"/>
-              <a:t>and</a:t>
+              <a:t>other</a:t>
             </a:r>
             <a:r>
               <a:rPr lang="zh-CN" altLang="en-US" dirty="0"/>
@@ -15754,15 +17964,23 @@
             </a:r>
             <a:r>
               <a:rPr lang="en-US" altLang="zh-CN" dirty="0"/>
-              <a:t>test</a:t>
+              <a:t>for</a:t>
             </a:r>
             <a:r>
               <a:rPr lang="zh-CN" altLang="en-US" dirty="0"/>
               <a:t> </a:t>
             </a:r>
             <a:r>
+              <a:rPr lang="en-US" altLang="zh-CN" dirty="0" err="1"/>
+              <a:t>Kfold</a:t>
+            </a:r>
+            <a:r>
+              <a:rPr lang="zh-CN" altLang="en-US" dirty="0"/>
+              <a:t> </a:t>
+            </a:r>
+            <a:r>
               <a:rPr lang="en-US" altLang="zh-CN" dirty="0"/>
-              <a:t>set</a:t>
+              <a:t>Cross</a:t>
             </a:r>
             <a:r>
               <a:rPr lang="zh-CN" altLang="en-US" dirty="0"/>
@@ -15770,7 +17988,7 @@
             </a:r>
             <a:r>
               <a:rPr lang="en-US" altLang="zh-CN" dirty="0"/>
-              <a:t>15%</a:t>
+              <a:t>Validation.</a:t>
             </a:r>
           </a:p>
           <a:p>
@@ -15784,39 +18002,49 @@
             </a:r>
             <a:r>
               <a:rPr lang="en-US" dirty="0"/>
-              <a:t>, and test set are the following: </a:t>
-            </a:r>
+              <a:t>, and test set are the following:</a:t>
+            </a:r>
+            <a:br>
+              <a:rPr lang="en-US" dirty="0"/>
+            </a:br>
             <a:r>
               <a:rPr lang="en-US" b="1" dirty="0" err="1"/>
-              <a:t>X_train</a:t>
+              <a:t>X_other</a:t>
+            </a:r>
+            <a:r>
+              <a:rPr lang="en-US" b="1" dirty="0"/>
+              <a:t>: </a:t>
             </a:r>
             <a:r>
               <a:rPr lang="en-US" dirty="0"/>
-              <a:t>: (42748, 20), </a:t>
-            </a:r>
-            <a:r>
-              <a:rPr lang="en-US" b="1" dirty="0" err="1"/>
-              <a:t>X_val</a:t>
-            </a:r>
-            <a:r>
-              <a:rPr lang="en-US" dirty="0"/>
-              <a:t>: (9160, 20), </a:t>
+              <a:t>(51908, 20), </a:t>
             </a:r>
             <a:r>
               <a:rPr lang="en-US" b="1" dirty="0" err="1"/>
               <a:t>X_test</a:t>
             </a:r>
             <a:r>
+              <a:rPr lang="en-US" b="1" dirty="0"/>
+              <a:t>: </a:t>
+            </a:r>
+            <a:r>
               <a:rPr lang="en-US" dirty="0"/>
-              <a:t>: (9161, 20) </a:t>
-            </a:r>
+              <a:t>(9161, 20) </a:t>
+            </a:r>
+            <a:br>
+              <a:rPr lang="en-US" dirty="0"/>
+            </a:br>
             <a:r>
               <a:rPr lang="en-US" b="1" dirty="0" err="1"/>
-              <a:t>y_train</a:t>
+              <a:t>y_other</a:t>
+            </a:r>
+            <a:r>
+              <a:rPr lang="en-US" b="1" dirty="0"/>
+              <a:t>: </a:t>
             </a:r>
             <a:r>
               <a:rPr lang="en-US" dirty="0"/>
-              <a:t>: (42748,)</a:t>
+              <a:t>(51908,)</a:t>
             </a:r>
             <a:r>
               <a:rPr lang="zh-CN" altLang="en-US" dirty="0"/>
@@ -15824,26 +18052,6 @@
             </a:r>
             <a:r>
               <a:rPr lang="en-US" dirty="0"/>
-              <a:t>,</a:t>
-            </a:r>
-            <a:r>
-              <a:rPr lang="zh-CN" altLang="en-US" dirty="0"/>
-              <a:t> </a:t>
-            </a:r>
-            <a:r>
-              <a:rPr lang="en-US" b="1" dirty="0" err="1"/>
-              <a:t>y_val</a:t>
-            </a:r>
-            <a:r>
-              <a:rPr lang="en-US" dirty="0"/>
-              <a:t>: (9160,)</a:t>
-            </a:r>
-            <a:r>
-              <a:rPr lang="zh-CN" altLang="en-US" dirty="0"/>
-              <a:t>      </a:t>
-            </a:r>
-            <a:r>
-              <a:rPr lang="en-US" dirty="0"/>
               <a:t>, </a:t>
             </a:r>
             <a:r>
@@ -15851,8 +18059,12 @@
               <a:t>y_test</a:t>
             </a:r>
             <a:r>
+              <a:rPr lang="en-US" b="1" dirty="0"/>
+              <a:t>: </a:t>
+            </a:r>
+            <a:r>
               <a:rPr lang="en-US" dirty="0"/>
-              <a:t>: (9161,)</a:t>
+              <a:t>(9161,)</a:t>
             </a:r>
           </a:p>
         </p:txBody>
@@ -15870,7 +18082,7 @@
 </p:sld>
 </file>
 
-<file path=ppt/slides/slide5.xml><?xml version="1.0" encoding="utf-8"?>
+<file path=ppt/slides/slide8.xml><?xml version="1.0" encoding="utf-8"?>
 <p:sld xmlns:a="http://schemas.openxmlformats.org/drawingml/2006/main" xmlns:r="http://schemas.openxmlformats.org/officeDocument/2006/relationships" xmlns:p="http://schemas.openxmlformats.org/presentationml/2006/main">
   <p:cSld>
     <p:spTree>
@@ -15934,8 +18146,8 @@
         </p:nvSpPr>
         <p:spPr>
           <a:xfrm>
-            <a:off x="838200" y="1815548"/>
-            <a:ext cx="10515600" cy="4356652"/>
+            <a:off x="598004" y="1690688"/>
+            <a:ext cx="11593996" cy="4356652"/>
           </a:xfrm>
         </p:spPr>
         <p:txBody>
@@ -16147,10 +18359,10 @@
       </p:sp>
       <p:pic>
         <p:nvPicPr>
-          <p:cNvPr id="5" name="Picture 4" descr="A graph of a number of objects&#10;&#10;Description automatically generated with medium confidence">
+          <p:cNvPr id="7" name="Picture 6" descr="A graph of a height&#10;&#10;Description automatically generated with medium confidence">
             <a:extLst>
               <a:ext uri="{FF2B5EF4-FFF2-40B4-BE49-F238E27FC236}">
-                <a16:creationId xmlns:a16="http://schemas.microsoft.com/office/drawing/2014/main" id="{AD02BD55-96F6-1B3B-1416-A27EBF4D5C08}"/>
+                <a16:creationId xmlns:a16="http://schemas.microsoft.com/office/drawing/2014/main" id="{2994E964-15A5-6E4F-4D18-0CE6E8F07658}"/>
               </a:ext>
             </a:extLst>
           </p:cNvPr>
@@ -16159,15 +18371,16 @@
           </p:cNvPicPr>
           <p:nvPr/>
         </p:nvPicPr>
-        <p:blipFill rotWithShape="1">
+        <p:blipFill>
           <a:blip r:embed="rId2"/>
-          <a:srcRect l="1084" t="2688" r="876" b="-1"/>
-          <a:stretch/>
+          <a:stretch>
+            <a:fillRect/>
+          </a:stretch>
         </p:blipFill>
         <p:spPr>
           <a:xfrm>
-            <a:off x="4174434" y="4041913"/>
-            <a:ext cx="7620001" cy="2450962"/>
+            <a:off x="2125707" y="3816626"/>
+            <a:ext cx="9772536" cy="2948609"/>
           </a:xfrm>
           <a:prstGeom prst="rect">
             <a:avLst/>
@@ -16187,7 +18400,7 @@
 </p:sld>
 </file>
 
-<file path=ppt/slides/slide6.xml><?xml version="1.0" encoding="utf-8"?>
+<file path=ppt/slides/slide9.xml><?xml version="1.0" encoding="utf-8"?>
 <p:sld xmlns:a="http://schemas.openxmlformats.org/drawingml/2006/main" xmlns:r="http://schemas.openxmlformats.org/officeDocument/2006/relationships" xmlns:p="http://schemas.openxmlformats.org/presentationml/2006/main">
   <p:cSld>
     <p:spTree>
@@ -16278,6 +18491,225 @@
           <a:bodyPr/>
           <a:lstStyle/>
           <a:p>
+            <a:r>
+              <a:rPr lang="en-US" dirty="0"/>
+              <a:t>Shape of </a:t>
+            </a:r>
+            <a:r>
+              <a:rPr lang="en-US" dirty="0" err="1"/>
+              <a:t>X_other</a:t>
+            </a:r>
+            <a:r>
+              <a:rPr lang="en-US" dirty="0"/>
+              <a:t> </a:t>
+            </a:r>
+            <a:r>
+              <a:rPr lang="en-US" b="1" dirty="0"/>
+              <a:t>before</a:t>
+            </a:r>
+            <a:r>
+              <a:rPr lang="en-US" dirty="0"/>
+              <a:t> transformation: (51908, 20) </a:t>
+            </a:r>
+            <a:br>
+              <a:rPr lang="en-US" dirty="0"/>
+            </a:br>
+            <a:r>
+              <a:rPr lang="en-US" dirty="0"/>
+              <a:t>Shape of </a:t>
+            </a:r>
+            <a:r>
+              <a:rPr lang="en-US" dirty="0" err="1"/>
+              <a:t>X_</a:t>
+            </a:r>
+            <a:r>
+              <a:rPr lang="en-US" altLang="zh-CN" dirty="0" err="1"/>
+              <a:t>other</a:t>
+            </a:r>
+            <a:r>
+              <a:rPr lang="en-US" dirty="0"/>
+              <a:t> </a:t>
+            </a:r>
+            <a:r>
+              <a:rPr lang="en-US" b="1" dirty="0"/>
+              <a:t>after</a:t>
+            </a:r>
+            <a:r>
+              <a:rPr lang="en-US" dirty="0"/>
+              <a:t> transformation: (51908, 12</a:t>
+            </a:r>
+            <a:r>
+              <a:rPr lang="en-US" altLang="zh-CN" dirty="0"/>
+              <a:t>4</a:t>
+            </a:r>
+            <a:r>
+              <a:rPr lang="en-US" dirty="0"/>
+              <a:t>)</a:t>
+            </a:r>
+          </a:p>
+          <a:p>
+            <a:r>
+              <a:rPr lang="en-US" altLang="zh-CN" dirty="0"/>
+              <a:t>Most</a:t>
+            </a:r>
+            <a:r>
+              <a:rPr lang="zh-CN" altLang="en-US" dirty="0"/>
+              <a:t> </a:t>
+            </a:r>
+            <a:r>
+              <a:rPr lang="en-US" altLang="zh-CN" dirty="0"/>
+              <a:t>of</a:t>
+            </a:r>
+            <a:r>
+              <a:rPr lang="zh-CN" altLang="en-US" dirty="0"/>
+              <a:t> </a:t>
+            </a:r>
+            <a:r>
+              <a:rPr lang="en-US" altLang="zh-CN" dirty="0"/>
+              <a:t>the</a:t>
+            </a:r>
+            <a:r>
+              <a:rPr lang="zh-CN" altLang="en-US" dirty="0"/>
+              <a:t> </a:t>
+            </a:r>
+            <a:r>
+              <a:rPr lang="en-US" altLang="zh-CN" dirty="0"/>
+              <a:t>features</a:t>
+            </a:r>
+            <a:r>
+              <a:rPr lang="zh-CN" altLang="en-US" dirty="0"/>
+              <a:t> </a:t>
+            </a:r>
+            <a:r>
+              <a:rPr lang="en-US" altLang="zh-CN" dirty="0"/>
+              <a:t>are</a:t>
+            </a:r>
+            <a:r>
+              <a:rPr lang="zh-CN" altLang="en-US" dirty="0"/>
+              <a:t> </a:t>
+            </a:r>
+            <a:r>
+              <a:rPr lang="en-US" altLang="zh-CN" dirty="0"/>
+              <a:t>categorical</a:t>
+            </a:r>
+            <a:r>
+              <a:rPr lang="zh-CN" altLang="en-US" dirty="0"/>
+              <a:t> </a:t>
+            </a:r>
+            <a:r>
+              <a:rPr lang="en-US" altLang="zh-CN" dirty="0"/>
+              <a:t>data,</a:t>
+            </a:r>
+            <a:r>
+              <a:rPr lang="zh-CN" altLang="en-US" dirty="0"/>
+              <a:t> </a:t>
+            </a:r>
+            <a:r>
+              <a:rPr lang="en-US" altLang="zh-CN" dirty="0"/>
+              <a:t>thus</a:t>
+            </a:r>
+            <a:r>
+              <a:rPr lang="zh-CN" altLang="en-US" dirty="0"/>
+              <a:t> </a:t>
+            </a:r>
+            <a:r>
+              <a:rPr lang="en-US" altLang="zh-CN" dirty="0"/>
+              <a:t>the</a:t>
+            </a:r>
+            <a:r>
+              <a:rPr lang="zh-CN" altLang="en-US" dirty="0"/>
+              <a:t> </a:t>
+            </a:r>
+            <a:r>
+              <a:rPr lang="en-US" altLang="zh-CN" dirty="0"/>
+              <a:t>number</a:t>
+            </a:r>
+            <a:r>
+              <a:rPr lang="zh-CN" altLang="en-US" dirty="0"/>
+              <a:t> </a:t>
+            </a:r>
+            <a:r>
+              <a:rPr lang="en-US" altLang="zh-CN" dirty="0"/>
+              <a:t>of</a:t>
+            </a:r>
+            <a:r>
+              <a:rPr lang="zh-CN" altLang="en-US" dirty="0"/>
+              <a:t> </a:t>
+            </a:r>
+            <a:r>
+              <a:rPr lang="en-US" altLang="zh-CN" dirty="0"/>
+              <a:t>features</a:t>
+            </a:r>
+            <a:r>
+              <a:rPr lang="zh-CN" altLang="en-US" dirty="0"/>
+              <a:t> </a:t>
+            </a:r>
+            <a:r>
+              <a:rPr lang="en-US" altLang="zh-CN" dirty="0"/>
+              <a:t>after</a:t>
+            </a:r>
+            <a:r>
+              <a:rPr lang="zh-CN" altLang="en-US" dirty="0"/>
+              <a:t> </a:t>
+            </a:r>
+            <a:r>
+              <a:rPr lang="en-US" altLang="zh-CN" dirty="0"/>
+              <a:t>preprocessing</a:t>
+            </a:r>
+            <a:r>
+              <a:rPr lang="zh-CN" altLang="en-US" dirty="0"/>
+              <a:t> </a:t>
+            </a:r>
+            <a:r>
+              <a:rPr lang="en-US" altLang="zh-CN" dirty="0"/>
+              <a:t>increases</a:t>
+            </a:r>
+          </a:p>
+          <a:p>
+            <a:r>
+              <a:rPr lang="en-US" altLang="zh-CN" dirty="0"/>
+              <a:t>Decide</a:t>
+            </a:r>
+            <a:r>
+              <a:rPr lang="zh-CN" altLang="en-US" dirty="0"/>
+              <a:t> </a:t>
+            </a:r>
+            <a:r>
+              <a:rPr lang="en-US" altLang="zh-CN" dirty="0"/>
+              <a:t>not</a:t>
+            </a:r>
+            <a:r>
+              <a:rPr lang="zh-CN" altLang="en-US" dirty="0"/>
+              <a:t> </a:t>
+            </a:r>
+            <a:r>
+              <a:rPr lang="en-US" altLang="zh-CN" dirty="0"/>
+              <a:t>to</a:t>
+            </a:r>
+            <a:r>
+              <a:rPr lang="zh-CN" altLang="en-US" dirty="0"/>
+              <a:t> </a:t>
+            </a:r>
+            <a:r>
+              <a:rPr lang="en-US" altLang="zh-CN" dirty="0"/>
+              <a:t>drop</a:t>
+            </a:r>
+            <a:r>
+              <a:rPr lang="zh-CN" altLang="en-US" dirty="0"/>
+              <a:t> </a:t>
+            </a:r>
+            <a:r>
+              <a:rPr lang="en-US" altLang="zh-CN" dirty="0"/>
+              <a:t>any</a:t>
+            </a:r>
+            <a:r>
+              <a:rPr lang="zh-CN" altLang="en-US" dirty="0"/>
+              <a:t> </a:t>
+            </a:r>
+            <a:r>
+              <a:rPr lang="en-US" altLang="zh-CN" dirty="0"/>
+              <a:t>features</a:t>
+            </a:r>
             <a:endParaRPr lang="en-US" dirty="0"/>
           </a:p>
         </p:txBody>
@@ -16494,4 +18926,299 @@
     </a:ext>
   </a:extLst>
 </a:theme>
+</file>
+
+<file path=ppt/theme/theme2.xml><?xml version="1.0" encoding="utf-8"?>
+<a:theme xmlns:a="http://schemas.openxmlformats.org/drawingml/2006/main" name="Office Theme">
+  <a:themeElements>
+    <a:clrScheme name="Office">
+      <a:dk1>
+        <a:sysClr val="windowText" lastClr="000000"/>
+      </a:dk1>
+      <a:lt1>
+        <a:sysClr val="window" lastClr="FFFFFF"/>
+      </a:lt1>
+      <a:dk2>
+        <a:srgbClr val="44546A"/>
+      </a:dk2>
+      <a:lt2>
+        <a:srgbClr val="E7E6E6"/>
+      </a:lt2>
+      <a:accent1>
+        <a:srgbClr val="4472C4"/>
+      </a:accent1>
+      <a:accent2>
+        <a:srgbClr val="ED7D31"/>
+      </a:accent2>
+      <a:accent3>
+        <a:srgbClr val="A5A5A5"/>
+      </a:accent3>
+      <a:accent4>
+        <a:srgbClr val="FFC000"/>
+      </a:accent4>
+      <a:accent5>
+        <a:srgbClr val="5B9BD5"/>
+      </a:accent5>
+      <a:accent6>
+        <a:srgbClr val="70AD47"/>
+      </a:accent6>
+      <a:hlink>
+        <a:srgbClr val="0563C1"/>
+      </a:hlink>
+      <a:folHlink>
+        <a:srgbClr val="954F72"/>
+      </a:folHlink>
+    </a:clrScheme>
+    <a:fontScheme name="Office">
+      <a:majorFont>
+        <a:latin typeface="Calibri Light" panose="020F0302020204030204"/>
+        <a:ea typeface=""/>
+        <a:cs typeface=""/>
+        <a:font script="Jpan" typeface="游ゴシック Light"/>
+        <a:font script="Hang" typeface="맑은 고딕"/>
+        <a:font script="Hans" typeface="等线 Light"/>
+        <a:font script="Hant" typeface="新細明體"/>
+        <a:font script="Arab" typeface="Times New Roman"/>
+        <a:font script="Hebr" typeface="Times New Roman"/>
+        <a:font script="Thai" typeface="Angsana New"/>
+        <a:font script="Ethi" typeface="Nyala"/>
+        <a:font script="Beng" typeface="Vrinda"/>
+        <a:font script="Gujr" typeface="Shruti"/>
+        <a:font script="Khmr" typeface="MoolBoran"/>
+        <a:font script="Knda" typeface="Tunga"/>
+        <a:font script="Guru" typeface="Raavi"/>
+        <a:font script="Cans" typeface="Euphemia"/>
+        <a:font script="Cher" typeface="Plantagenet Cherokee"/>
+        <a:font script="Yiii" typeface="Microsoft Yi Baiti"/>
+        <a:font script="Tibt" typeface="Microsoft Himalaya"/>
+        <a:font script="Thaa" typeface="MV Boli"/>
+        <a:font script="Deva" typeface="Mangal"/>
+        <a:font script="Telu" typeface="Gautami"/>
+        <a:font script="Taml" typeface="Latha"/>
+        <a:font script="Syrc" typeface="Estrangelo Edessa"/>
+        <a:font script="Orya" typeface="Kalinga"/>
+        <a:font script="Mlym" typeface="Kartika"/>
+        <a:font script="Laoo" typeface="DokChampa"/>
+        <a:font script="Sinh" typeface="Iskoola Pota"/>
+        <a:font script="Mong" typeface="Mongolian Baiti"/>
+        <a:font script="Viet" typeface="Times New Roman"/>
+        <a:font script="Uigh" typeface="Microsoft Uighur"/>
+        <a:font script="Geor" typeface="Sylfaen"/>
+        <a:font script="Armn" typeface="Arial"/>
+        <a:font script="Bugi" typeface="Leelawadee UI"/>
+        <a:font script="Bopo" typeface="Microsoft JhengHei"/>
+        <a:font script="Java" typeface="Javanese Text"/>
+        <a:font script="Lisu" typeface="Segoe UI"/>
+        <a:font script="Mymr" typeface="Myanmar Text"/>
+        <a:font script="Nkoo" typeface="Ebrima"/>
+        <a:font script="Olck" typeface="Nirmala UI"/>
+        <a:font script="Osma" typeface="Ebrima"/>
+        <a:font script="Phag" typeface="Phagspa"/>
+        <a:font script="Syrn" typeface="Estrangelo Edessa"/>
+        <a:font script="Syrj" typeface="Estrangelo Edessa"/>
+        <a:font script="Syre" typeface="Estrangelo Edessa"/>
+        <a:font script="Sora" typeface="Nirmala UI"/>
+        <a:font script="Tale" typeface="Microsoft Tai Le"/>
+        <a:font script="Talu" typeface="Microsoft New Tai Lue"/>
+        <a:font script="Tfng" typeface="Ebrima"/>
+      </a:majorFont>
+      <a:minorFont>
+        <a:latin typeface="Calibri" panose="020F0502020204030204"/>
+        <a:ea typeface=""/>
+        <a:cs typeface=""/>
+        <a:font script="Jpan" typeface="游ゴシック"/>
+        <a:font script="Hang" typeface="맑은 고딕"/>
+        <a:font script="Hans" typeface="等线"/>
+        <a:font script="Hant" typeface="新細明體"/>
+        <a:font script="Arab" typeface="Arial"/>
+        <a:font script="Hebr" typeface="Arial"/>
+        <a:font script="Thai" typeface="Cordia New"/>
+        <a:font script="Ethi" typeface="Nyala"/>
+        <a:font script="Beng" typeface="Vrinda"/>
+        <a:font script="Gujr" typeface="Shruti"/>
+        <a:font script="Khmr" typeface="DaunPenh"/>
+        <a:font script="Knda" typeface="Tunga"/>
+        <a:font script="Guru" typeface="Raavi"/>
+        <a:font script="Cans" typeface="Euphemia"/>
+        <a:font script="Cher" typeface="Plantagenet Cherokee"/>
+        <a:font script="Yiii" typeface="Microsoft Yi Baiti"/>
+        <a:font script="Tibt" typeface="Microsoft Himalaya"/>
+        <a:font script="Thaa" typeface="MV Boli"/>
+        <a:font script="Deva" typeface="Mangal"/>
+        <a:font script="Telu" typeface="Gautami"/>
+        <a:font script="Taml" typeface="Latha"/>
+        <a:font script="Syrc" typeface="Estrangelo Edessa"/>
+        <a:font script="Orya" typeface="Kalinga"/>
+        <a:font script="Mlym" typeface="Kartika"/>
+        <a:font script="Laoo" typeface="DokChampa"/>
+        <a:font script="Sinh" typeface="Iskoola Pota"/>
+        <a:font script="Mong" typeface="Mongolian Baiti"/>
+        <a:font script="Viet" typeface="Arial"/>
+        <a:font script="Uigh" typeface="Microsoft Uighur"/>
+        <a:font script="Geor" typeface="Sylfaen"/>
+        <a:font script="Armn" typeface="Arial"/>
+        <a:font script="Bugi" typeface="Leelawadee UI"/>
+        <a:font script="Bopo" typeface="Microsoft JhengHei"/>
+        <a:font script="Java" typeface="Javanese Text"/>
+        <a:font script="Lisu" typeface="Segoe UI"/>
+        <a:font script="Mymr" typeface="Myanmar Text"/>
+        <a:font script="Nkoo" typeface="Ebrima"/>
+        <a:font script="Olck" typeface="Nirmala UI"/>
+        <a:font script="Osma" typeface="Ebrima"/>
+        <a:font script="Phag" typeface="Phagspa"/>
+        <a:font script="Syrn" typeface="Estrangelo Edessa"/>
+        <a:font script="Syrj" typeface="Estrangelo Edessa"/>
+        <a:font script="Syre" typeface="Estrangelo Edessa"/>
+        <a:font script="Sora" typeface="Nirmala UI"/>
+        <a:font script="Tale" typeface="Microsoft Tai Le"/>
+        <a:font script="Talu" typeface="Microsoft New Tai Lue"/>
+        <a:font script="Tfng" typeface="Ebrima"/>
+      </a:minorFont>
+    </a:fontScheme>
+    <a:fmtScheme name="Office">
+      <a:fillStyleLst>
+        <a:solidFill>
+          <a:schemeClr val="phClr"/>
+        </a:solidFill>
+        <a:gradFill rotWithShape="1">
+          <a:gsLst>
+            <a:gs pos="0">
+              <a:schemeClr val="phClr">
+                <a:lumMod val="110000"/>
+                <a:satMod val="105000"/>
+                <a:tint val="67000"/>
+              </a:schemeClr>
+            </a:gs>
+            <a:gs pos="50000">
+              <a:schemeClr val="phClr">
+                <a:lumMod val="105000"/>
+                <a:satMod val="103000"/>
+                <a:tint val="73000"/>
+              </a:schemeClr>
+            </a:gs>
+            <a:gs pos="100000">
+              <a:schemeClr val="phClr">
+                <a:lumMod val="105000"/>
+                <a:satMod val="109000"/>
+                <a:tint val="81000"/>
+              </a:schemeClr>
+            </a:gs>
+          </a:gsLst>
+          <a:lin ang="5400000" scaled="0"/>
+        </a:gradFill>
+        <a:gradFill rotWithShape="1">
+          <a:gsLst>
+            <a:gs pos="0">
+              <a:schemeClr val="phClr">
+                <a:satMod val="103000"/>
+                <a:lumMod val="102000"/>
+                <a:tint val="94000"/>
+              </a:schemeClr>
+            </a:gs>
+            <a:gs pos="50000">
+              <a:schemeClr val="phClr">
+                <a:satMod val="110000"/>
+                <a:lumMod val="100000"/>
+                <a:shade val="100000"/>
+              </a:schemeClr>
+            </a:gs>
+            <a:gs pos="100000">
+              <a:schemeClr val="phClr">
+                <a:lumMod val="99000"/>
+                <a:satMod val="120000"/>
+                <a:shade val="78000"/>
+              </a:schemeClr>
+            </a:gs>
+          </a:gsLst>
+          <a:lin ang="5400000" scaled="0"/>
+        </a:gradFill>
+      </a:fillStyleLst>
+      <a:lnStyleLst>
+        <a:ln w="6350" cap="flat" cmpd="sng" algn="ctr">
+          <a:solidFill>
+            <a:schemeClr val="phClr"/>
+          </a:solidFill>
+          <a:prstDash val="solid"/>
+          <a:miter lim="800000"/>
+        </a:ln>
+        <a:ln w="12700" cap="flat" cmpd="sng" algn="ctr">
+          <a:solidFill>
+            <a:schemeClr val="phClr"/>
+          </a:solidFill>
+          <a:prstDash val="solid"/>
+          <a:miter lim="800000"/>
+        </a:ln>
+        <a:ln w="19050" cap="flat" cmpd="sng" algn="ctr">
+          <a:solidFill>
+            <a:schemeClr val="phClr"/>
+          </a:solidFill>
+          <a:prstDash val="solid"/>
+          <a:miter lim="800000"/>
+        </a:ln>
+      </a:lnStyleLst>
+      <a:effectStyleLst>
+        <a:effectStyle>
+          <a:effectLst/>
+        </a:effectStyle>
+        <a:effectStyle>
+          <a:effectLst/>
+        </a:effectStyle>
+        <a:effectStyle>
+          <a:effectLst>
+            <a:outerShdw blurRad="57150" dist="19050" dir="5400000" algn="ctr" rotWithShape="0">
+              <a:srgbClr val="000000">
+                <a:alpha val="63000"/>
+              </a:srgbClr>
+            </a:outerShdw>
+          </a:effectLst>
+        </a:effectStyle>
+      </a:effectStyleLst>
+      <a:bgFillStyleLst>
+        <a:solidFill>
+          <a:schemeClr val="phClr"/>
+        </a:solidFill>
+        <a:solidFill>
+          <a:schemeClr val="phClr">
+            <a:tint val="95000"/>
+            <a:satMod val="170000"/>
+          </a:schemeClr>
+        </a:solidFill>
+        <a:gradFill rotWithShape="1">
+          <a:gsLst>
+            <a:gs pos="0">
+              <a:schemeClr val="phClr">
+                <a:tint val="93000"/>
+                <a:satMod val="150000"/>
+                <a:shade val="98000"/>
+                <a:lumMod val="102000"/>
+              </a:schemeClr>
+            </a:gs>
+            <a:gs pos="50000">
+              <a:schemeClr val="phClr">
+                <a:tint val="98000"/>
+                <a:satMod val="130000"/>
+                <a:shade val="90000"/>
+                <a:lumMod val="103000"/>
+              </a:schemeClr>
+            </a:gs>
+            <a:gs pos="100000">
+              <a:schemeClr val="phClr">
+                <a:shade val="63000"/>
+                <a:satMod val="120000"/>
+              </a:schemeClr>
+            </a:gs>
+          </a:gsLst>
+          <a:lin ang="5400000" scaled="0"/>
+        </a:gradFill>
+      </a:bgFillStyleLst>
+    </a:fmtScheme>
+  </a:themeElements>
+  <a:objectDefaults/>
+  <a:extraClrSchemeLst/>
+  <a:extLst>
+    <a:ext uri="{05A4C25C-085E-4340-85A3-A5531E510DB2}">
+      <thm15:themeFamily xmlns:thm15="http://schemas.microsoft.com/office/thememl/2012/main" name="Office Theme" id="{62F939B6-93AF-4DB8-9C6B-D6C7DFDC589F}" vid="{4A3C46E8-61CC-4603-A589-7422A47A8E4A}"/>
+    </a:ext>
+  </a:extLst>
+</a:theme>
 </file>
</xml_diff>

<commit_message>
10.18 adding scripts and eidting ppt
</commit_message>
<xml_diff>
--- a/midterm_presentation.pptx
+++ b/midterm_presentation.pptx
@@ -5,7 +5,7 @@
     <p:sldMasterId id="2147483726" r:id="rId1"/>
   </p:sldMasterIdLst>
   <p:notesMasterIdLst>
-    <p:notesMasterId r:id="rId11"/>
+    <p:notesMasterId r:id="rId14"/>
   </p:notesMasterIdLst>
   <p:sldIdLst>
     <p:sldId id="256" r:id="rId2"/>
@@ -16,7 +16,10 @@
     <p:sldId id="264" r:id="rId7"/>
     <p:sldId id="259" r:id="rId8"/>
     <p:sldId id="260" r:id="rId9"/>
-    <p:sldId id="261" r:id="rId10"/>
+    <p:sldId id="265" r:id="rId10"/>
+    <p:sldId id="267" r:id="rId11"/>
+    <p:sldId id="261" r:id="rId12"/>
+    <p:sldId id="266" r:id="rId13"/>
   </p:sldIdLst>
   <p:sldSz cx="12192000" cy="6858000"/>
   <p:notesSz cx="6858000" cy="9144000"/>
@@ -15027,6 +15030,2574 @@
 </p:sld>
 </file>
 
+<file path=ppt/slides/slide10.xml><?xml version="1.0" encoding="utf-8"?>
+<p:sld xmlns:a="http://schemas.openxmlformats.org/drawingml/2006/main" xmlns:r="http://schemas.openxmlformats.org/officeDocument/2006/relationships" xmlns:p="http://schemas.openxmlformats.org/presentationml/2006/main">
+  <p:cSld>
+    <p:spTree>
+      <p:nvGrpSpPr>
+        <p:cNvPr id="1" name=""/>
+        <p:cNvGrpSpPr/>
+        <p:nvPr/>
+      </p:nvGrpSpPr>
+      <p:grpSpPr>
+        <a:xfrm>
+          <a:off x="0" y="0"/>
+          <a:ext cx="0" cy="0"/>
+          <a:chOff x="0" y="0"/>
+          <a:chExt cx="0" cy="0"/>
+        </a:xfrm>
+      </p:grpSpPr>
+      <p:sp>
+        <p:nvSpPr>
+          <p:cNvPr id="2" name="Title 1">
+            <a:extLst>
+              <a:ext uri="{FF2B5EF4-FFF2-40B4-BE49-F238E27FC236}">
+                <a16:creationId xmlns:a16="http://schemas.microsoft.com/office/drawing/2014/main" id="{12B3DDD5-0919-2103-F5B8-A8B5685197E5}"/>
+              </a:ext>
+            </a:extLst>
+          </p:cNvPr>
+          <p:cNvSpPr>
+            <a:spLocks noGrp="1"/>
+          </p:cNvSpPr>
+          <p:nvPr>
+            <p:ph type="title"/>
+          </p:nvPr>
+        </p:nvSpPr>
+        <p:spPr/>
+        <p:txBody>
+          <a:bodyPr/>
+          <a:lstStyle/>
+          <a:p>
+            <a:r>
+              <a:rPr lang="en-US" altLang="zh-CN" dirty="0"/>
+              <a:t>Missing</a:t>
+            </a:r>
+            <a:r>
+              <a:rPr lang="zh-CN" altLang="en-US" dirty="0"/>
+              <a:t> </a:t>
+            </a:r>
+            <a:r>
+              <a:rPr lang="en-US" altLang="zh-CN" dirty="0"/>
+              <a:t>Value</a:t>
+            </a:r>
+            <a:endParaRPr lang="en-US" dirty="0"/>
+          </a:p>
+        </p:txBody>
+      </p:sp>
+      <p:sp>
+        <p:nvSpPr>
+          <p:cNvPr id="3" name="Content Placeholder 2">
+            <a:extLst>
+              <a:ext uri="{FF2B5EF4-FFF2-40B4-BE49-F238E27FC236}">
+                <a16:creationId xmlns:a16="http://schemas.microsoft.com/office/drawing/2014/main" id="{D99A78E5-7D9D-6F80-177E-5259AF99D18A}"/>
+              </a:ext>
+            </a:extLst>
+          </p:cNvPr>
+          <p:cNvSpPr>
+            <a:spLocks noGrp="1"/>
+          </p:cNvSpPr>
+          <p:nvPr>
+            <p:ph idx="1"/>
+          </p:nvPr>
+        </p:nvSpPr>
+        <p:spPr>
+          <a:xfrm>
+            <a:off x="419100" y="1603005"/>
+            <a:ext cx="11353800" cy="4160520"/>
+          </a:xfrm>
+        </p:spPr>
+        <p:txBody>
+          <a:bodyPr>
+            <a:normAutofit/>
+          </a:bodyPr>
+          <a:lstStyle/>
+          <a:p>
+            <a:r>
+              <a:rPr lang="en-US" dirty="0"/>
+              <a:t>Among</a:t>
+            </a:r>
+            <a:r>
+              <a:rPr lang="zh-CN" altLang="en-US" dirty="0"/>
+              <a:t> </a:t>
+            </a:r>
+            <a:r>
+              <a:rPr lang="en-US" altLang="zh-CN" dirty="0"/>
+              <a:t>20</a:t>
+            </a:r>
+            <a:r>
+              <a:rPr lang="zh-CN" altLang="en-US" dirty="0"/>
+              <a:t> </a:t>
+            </a:r>
+            <a:r>
+              <a:rPr lang="en-US" altLang="zh-CN" dirty="0"/>
+              <a:t>features,</a:t>
+            </a:r>
+            <a:r>
+              <a:rPr lang="zh-CN" altLang="en-US" dirty="0"/>
+              <a:t> </a:t>
+            </a:r>
+            <a:r>
+              <a:rPr lang="en-US" altLang="zh-CN" dirty="0"/>
+              <a:t>9</a:t>
+            </a:r>
+            <a:r>
+              <a:rPr lang="zh-CN" altLang="en-US" dirty="0"/>
+              <a:t> </a:t>
+            </a:r>
+            <a:r>
+              <a:rPr lang="en-US" altLang="zh-CN" dirty="0"/>
+              <a:t>features</a:t>
+            </a:r>
+            <a:r>
+              <a:rPr lang="zh-CN" altLang="en-US" dirty="0"/>
+              <a:t> </a:t>
+            </a:r>
+            <a:r>
+              <a:rPr lang="en-US" altLang="zh-CN" dirty="0"/>
+              <a:t>contains</a:t>
+            </a:r>
+            <a:r>
+              <a:rPr lang="zh-CN" altLang="en-US" dirty="0"/>
+              <a:t> </a:t>
+            </a:r>
+            <a:r>
+              <a:rPr lang="en-US" altLang="zh-CN" dirty="0"/>
+              <a:t>missing</a:t>
+            </a:r>
+            <a:r>
+              <a:rPr lang="zh-CN" altLang="en-US" dirty="0"/>
+              <a:t> </a:t>
+            </a:r>
+            <a:r>
+              <a:rPr lang="en-US" altLang="zh-CN" dirty="0"/>
+              <a:t>values.</a:t>
+            </a:r>
+          </a:p>
+          <a:p>
+            <a:r>
+              <a:rPr lang="en-US" altLang="zh-CN" dirty="0"/>
+              <a:t>All</a:t>
+            </a:r>
+            <a:r>
+              <a:rPr lang="zh-CN" altLang="en-US" dirty="0"/>
+              <a:t> </a:t>
+            </a:r>
+            <a:r>
+              <a:rPr lang="en-US" altLang="zh-CN" dirty="0"/>
+              <a:t>the</a:t>
+            </a:r>
+            <a:r>
+              <a:rPr lang="zh-CN" altLang="en-US" dirty="0"/>
+              <a:t> </a:t>
+            </a:r>
+            <a:r>
+              <a:rPr lang="en-US" altLang="zh-CN" dirty="0"/>
+              <a:t>missing</a:t>
+            </a:r>
+            <a:r>
+              <a:rPr lang="zh-CN" altLang="en-US" dirty="0"/>
+              <a:t> </a:t>
+            </a:r>
+            <a:r>
+              <a:rPr lang="en-US" altLang="zh-CN" dirty="0"/>
+              <a:t>values</a:t>
+            </a:r>
+            <a:r>
+              <a:rPr lang="zh-CN" altLang="en-US" dirty="0"/>
+              <a:t> </a:t>
+            </a:r>
+            <a:r>
+              <a:rPr lang="en-US" altLang="zh-CN" dirty="0"/>
+              <a:t>are</a:t>
+            </a:r>
+            <a:r>
+              <a:rPr lang="zh-CN" altLang="en-US" dirty="0"/>
+              <a:t> </a:t>
+            </a:r>
+            <a:r>
+              <a:rPr lang="en-US" altLang="zh-CN" dirty="0"/>
+              <a:t>categorical</a:t>
+            </a:r>
+            <a:r>
+              <a:rPr lang="zh-CN" altLang="en-US" dirty="0"/>
+              <a:t> </a:t>
+            </a:r>
+            <a:r>
+              <a:rPr lang="en-US" altLang="zh-CN" dirty="0"/>
+              <a:t>data.</a:t>
+            </a:r>
+          </a:p>
+          <a:p>
+            <a:r>
+              <a:rPr lang="en-US" b="1" dirty="0"/>
+              <a:t>cap-surface</a:t>
+            </a:r>
+            <a:r>
+              <a:rPr lang="en-US" altLang="zh-CN" dirty="0"/>
+              <a:t>,</a:t>
+            </a:r>
+            <a:r>
+              <a:rPr lang="zh-CN" altLang="en-US" dirty="0"/>
+              <a:t> </a:t>
+            </a:r>
+            <a:r>
+              <a:rPr lang="en-US" b="1" dirty="0"/>
+              <a:t>gill-attachment</a:t>
+            </a:r>
+            <a:r>
+              <a:rPr lang="en-US" altLang="zh-CN" dirty="0"/>
+              <a:t>,</a:t>
+            </a:r>
+            <a:r>
+              <a:rPr lang="zh-CN" altLang="en-US" dirty="0"/>
+              <a:t> </a:t>
+            </a:r>
+            <a:r>
+              <a:rPr lang="en-US" b="1" dirty="0"/>
+              <a:t>gill-spacing</a:t>
+            </a:r>
+            <a:r>
+              <a:rPr lang="en-US" altLang="zh-CN" dirty="0"/>
+              <a:t>,</a:t>
+            </a:r>
+            <a:r>
+              <a:rPr lang="zh-CN" altLang="en-US" dirty="0"/>
+              <a:t> </a:t>
+            </a:r>
+            <a:r>
+              <a:rPr lang="en-US" b="1" dirty="0"/>
+              <a:t>ring-type</a:t>
+            </a:r>
+            <a:r>
+              <a:rPr lang="zh-CN" altLang="en-US" dirty="0"/>
+              <a:t> </a:t>
+            </a:r>
+            <a:r>
+              <a:rPr lang="en-US" altLang="zh-CN" dirty="0"/>
+              <a:t>have</a:t>
+            </a:r>
+            <a:r>
+              <a:rPr lang="zh-CN" altLang="en-US" dirty="0"/>
+              <a:t> </a:t>
+            </a:r>
+            <a:r>
+              <a:rPr lang="en-US" altLang="zh-CN" dirty="0"/>
+              <a:t>less</a:t>
+            </a:r>
+            <a:r>
+              <a:rPr lang="zh-CN" altLang="en-US" dirty="0"/>
+              <a:t> </a:t>
+            </a:r>
+            <a:r>
+              <a:rPr lang="en-US" altLang="zh-CN" dirty="0"/>
+              <a:t>than</a:t>
+            </a:r>
+            <a:r>
+              <a:rPr lang="zh-CN" altLang="en-US" dirty="0"/>
+              <a:t> </a:t>
+            </a:r>
+            <a:r>
+              <a:rPr lang="en-US" altLang="zh-CN" dirty="0"/>
+              <a:t>50%</a:t>
+            </a:r>
+            <a:r>
+              <a:rPr lang="zh-CN" altLang="en-US" dirty="0"/>
+              <a:t> </a:t>
+            </a:r>
+            <a:r>
+              <a:rPr lang="en-US" altLang="zh-CN" dirty="0"/>
+              <a:t>of</a:t>
+            </a:r>
+            <a:r>
+              <a:rPr lang="zh-CN" altLang="en-US" dirty="0"/>
+              <a:t> </a:t>
+            </a:r>
+            <a:r>
+              <a:rPr lang="en-US" altLang="zh-CN" dirty="0"/>
+              <a:t>missing</a:t>
+            </a:r>
+          </a:p>
+          <a:p>
+            <a:r>
+              <a:rPr lang="en-US" b="1" dirty="0"/>
+              <a:t>stem-root</a:t>
+            </a:r>
+            <a:r>
+              <a:rPr lang="en-US" altLang="zh-CN" dirty="0"/>
+              <a:t>,</a:t>
+            </a:r>
+            <a:r>
+              <a:rPr lang="zh-CN" altLang="en-US" dirty="0"/>
+              <a:t> </a:t>
+            </a:r>
+            <a:r>
+              <a:rPr lang="en-US" b="1" dirty="0"/>
+              <a:t>stem-surface</a:t>
+            </a:r>
+            <a:r>
+              <a:rPr lang="en-US" altLang="zh-CN" dirty="0"/>
+              <a:t>,</a:t>
+            </a:r>
+            <a:r>
+              <a:rPr lang="zh-CN" altLang="en-US" dirty="0"/>
+              <a:t> </a:t>
+            </a:r>
+            <a:r>
+              <a:rPr lang="en-US" b="1" dirty="0"/>
+              <a:t>veil-type</a:t>
+            </a:r>
+            <a:r>
+              <a:rPr lang="en-US" altLang="zh-CN" dirty="0"/>
+              <a:t>,</a:t>
+            </a:r>
+            <a:r>
+              <a:rPr lang="zh-CN" altLang="en-US" dirty="0"/>
+              <a:t> </a:t>
+            </a:r>
+            <a:r>
+              <a:rPr lang="en-US" b="1" dirty="0"/>
+              <a:t>veil-color</a:t>
+            </a:r>
+            <a:r>
+              <a:rPr lang="en-US" altLang="zh-CN" dirty="0"/>
+              <a:t>,</a:t>
+            </a:r>
+            <a:r>
+              <a:rPr lang="zh-CN" altLang="en-US" dirty="0"/>
+              <a:t> </a:t>
+            </a:r>
+            <a:r>
+              <a:rPr lang="en-US" b="1" dirty="0"/>
+              <a:t>spore-print-colo</a:t>
+            </a:r>
+            <a:r>
+              <a:rPr lang="en-US" altLang="zh-CN" b="1" dirty="0"/>
+              <a:t>r</a:t>
+            </a:r>
+            <a:r>
+              <a:rPr lang="zh-CN" altLang="en-US" dirty="0"/>
+              <a:t> </a:t>
+            </a:r>
+            <a:r>
+              <a:rPr lang="en-US" altLang="zh-CN" dirty="0"/>
+              <a:t>have</a:t>
+            </a:r>
+            <a:r>
+              <a:rPr lang="zh-CN" altLang="en-US" dirty="0"/>
+              <a:t> </a:t>
+            </a:r>
+            <a:r>
+              <a:rPr lang="en-US" altLang="zh-CN" dirty="0"/>
+              <a:t>more</a:t>
+            </a:r>
+            <a:r>
+              <a:rPr lang="zh-CN" altLang="en-US" dirty="0"/>
+              <a:t> </a:t>
+            </a:r>
+            <a:r>
+              <a:rPr lang="en-US" altLang="zh-CN" dirty="0"/>
+              <a:t>than</a:t>
+            </a:r>
+            <a:r>
+              <a:rPr lang="zh-CN" altLang="en-US" dirty="0"/>
+              <a:t> </a:t>
+            </a:r>
+            <a:r>
+              <a:rPr lang="en-US" altLang="zh-CN" dirty="0"/>
+              <a:t>50%</a:t>
+            </a:r>
+            <a:r>
+              <a:rPr lang="zh-CN" altLang="en-US" dirty="0"/>
+              <a:t> </a:t>
+            </a:r>
+            <a:r>
+              <a:rPr lang="en-US" altLang="zh-CN" dirty="0"/>
+              <a:t>of</a:t>
+            </a:r>
+            <a:r>
+              <a:rPr lang="zh-CN" altLang="en-US" dirty="0"/>
+              <a:t> </a:t>
+            </a:r>
+            <a:r>
+              <a:rPr lang="en-US" altLang="zh-CN" dirty="0"/>
+              <a:t>missing</a:t>
+            </a:r>
+            <a:endParaRPr lang="en-US" dirty="0"/>
+          </a:p>
+        </p:txBody>
+      </p:sp>
+      <p:pic>
+        <p:nvPicPr>
+          <p:cNvPr id="5" name="Picture 4" descr="A black screen with white text&#10;&#10;Description automatically generated">
+            <a:extLst>
+              <a:ext uri="{FF2B5EF4-FFF2-40B4-BE49-F238E27FC236}">
+                <a16:creationId xmlns:a16="http://schemas.microsoft.com/office/drawing/2014/main" id="{082888F0-8DEA-2288-2B61-DAFE85C81424}"/>
+              </a:ext>
+            </a:extLst>
+          </p:cNvPr>
+          <p:cNvPicPr>
+            <a:picLocks noChangeAspect="1"/>
+          </p:cNvPicPr>
+          <p:nvPr/>
+        </p:nvPicPr>
+        <p:blipFill>
+          <a:blip r:embed="rId2"/>
+          <a:stretch>
+            <a:fillRect/>
+          </a:stretch>
+        </p:blipFill>
+        <p:spPr>
+          <a:xfrm>
+            <a:off x="8178800" y="4292600"/>
+            <a:ext cx="4013200" cy="2565400"/>
+          </a:xfrm>
+          <a:prstGeom prst="rect">
+            <a:avLst/>
+          </a:prstGeom>
+        </p:spPr>
+      </p:pic>
+    </p:spTree>
+    <p:extLst>
+      <p:ext uri="{BB962C8B-B14F-4D97-AF65-F5344CB8AC3E}">
+        <p14:creationId xmlns:p14="http://schemas.microsoft.com/office/powerpoint/2010/main" val="2692865526"/>
+      </p:ext>
+    </p:extLst>
+  </p:cSld>
+  <p:clrMapOvr>
+    <a:masterClrMapping/>
+  </p:clrMapOvr>
+</p:sld>
+</file>
+
+<file path=ppt/slides/slide11.xml><?xml version="1.0" encoding="utf-8"?>
+<p:sld xmlns:a="http://schemas.openxmlformats.org/drawingml/2006/main" xmlns:r="http://schemas.openxmlformats.org/officeDocument/2006/relationships" xmlns:p="http://schemas.openxmlformats.org/presentationml/2006/main">
+  <p:cSld>
+    <p:spTree>
+      <p:nvGrpSpPr>
+        <p:cNvPr id="1" name=""/>
+        <p:cNvGrpSpPr/>
+        <p:nvPr/>
+      </p:nvGrpSpPr>
+      <p:grpSpPr>
+        <a:xfrm>
+          <a:off x="0" y="0"/>
+          <a:ext cx="0" cy="0"/>
+          <a:chOff x="0" y="0"/>
+          <a:chExt cx="0" cy="0"/>
+        </a:xfrm>
+      </p:grpSpPr>
+      <p:sp>
+        <p:nvSpPr>
+          <p:cNvPr id="2" name="Title 1">
+            <a:extLst>
+              <a:ext uri="{FF2B5EF4-FFF2-40B4-BE49-F238E27FC236}">
+                <a16:creationId xmlns:a16="http://schemas.microsoft.com/office/drawing/2014/main" id="{73DF73C2-E9E7-EAB9-C4D1-11F2C4A31997}"/>
+              </a:ext>
+            </a:extLst>
+          </p:cNvPr>
+          <p:cNvSpPr>
+            <a:spLocks noGrp="1"/>
+          </p:cNvSpPr>
+          <p:nvPr>
+            <p:ph type="title"/>
+          </p:nvPr>
+        </p:nvSpPr>
+        <p:spPr/>
+        <p:txBody>
+          <a:bodyPr/>
+          <a:lstStyle/>
+          <a:p>
+            <a:r>
+              <a:rPr lang="en-US" dirty="0"/>
+              <a:t>After</a:t>
+            </a:r>
+            <a:r>
+              <a:rPr lang="zh-CN" altLang="en-US" dirty="0"/>
+              <a:t> </a:t>
+            </a:r>
+            <a:r>
+              <a:rPr lang="en-US" altLang="zh-CN" dirty="0"/>
+              <a:t>Splitting</a:t>
+            </a:r>
+            <a:r>
+              <a:rPr lang="zh-CN" altLang="en-US" dirty="0"/>
+              <a:t> </a:t>
+            </a:r>
+            <a:r>
+              <a:rPr lang="en-US" altLang="zh-CN" dirty="0"/>
+              <a:t>and</a:t>
+            </a:r>
+            <a:r>
+              <a:rPr lang="zh-CN" altLang="en-US" dirty="0"/>
+              <a:t> </a:t>
+            </a:r>
+            <a:r>
+              <a:rPr lang="en-US" altLang="zh-CN" dirty="0"/>
+              <a:t>Preprocessing…</a:t>
+            </a:r>
+            <a:endParaRPr lang="en-US" dirty="0"/>
+          </a:p>
+        </p:txBody>
+      </p:sp>
+      <p:sp>
+        <p:nvSpPr>
+          <p:cNvPr id="3" name="Content Placeholder 2">
+            <a:extLst>
+              <a:ext uri="{FF2B5EF4-FFF2-40B4-BE49-F238E27FC236}">
+                <a16:creationId xmlns:a16="http://schemas.microsoft.com/office/drawing/2014/main" id="{763CACBB-D7DE-A4D4-F781-73E4BB028231}"/>
+              </a:ext>
+            </a:extLst>
+          </p:cNvPr>
+          <p:cNvSpPr>
+            <a:spLocks noGrp="1"/>
+          </p:cNvSpPr>
+          <p:nvPr>
+            <p:ph idx="1"/>
+          </p:nvPr>
+        </p:nvSpPr>
+        <p:spPr/>
+        <p:txBody>
+          <a:bodyPr>
+            <a:normAutofit/>
+          </a:bodyPr>
+          <a:lstStyle/>
+          <a:p>
+            <a:r>
+              <a:rPr lang="en-US" altLang="zh-CN" dirty="0"/>
+              <a:t>Number</a:t>
+            </a:r>
+            <a:r>
+              <a:rPr lang="zh-CN" altLang="en-US" dirty="0"/>
+              <a:t> </a:t>
+            </a:r>
+            <a:r>
+              <a:rPr lang="en-US" altLang="zh-CN" dirty="0"/>
+              <a:t>of</a:t>
+            </a:r>
+            <a:r>
+              <a:rPr lang="zh-CN" altLang="en-US" dirty="0"/>
+              <a:t> </a:t>
+            </a:r>
+            <a:r>
+              <a:rPr lang="en-US" altLang="zh-CN" dirty="0"/>
+              <a:t>features</a:t>
+            </a:r>
+            <a:r>
+              <a:rPr lang="en-US" dirty="0"/>
+              <a:t> </a:t>
+            </a:r>
+            <a:r>
+              <a:rPr lang="en-US" b="1" dirty="0"/>
+              <a:t>before</a:t>
+            </a:r>
+            <a:r>
+              <a:rPr lang="en-US" dirty="0"/>
+              <a:t> transformation: 20</a:t>
+            </a:r>
+            <a:br>
+              <a:rPr lang="en-US" dirty="0"/>
+            </a:br>
+            <a:r>
+              <a:rPr lang="en-US" altLang="zh-CN" dirty="0"/>
+              <a:t>Number</a:t>
+            </a:r>
+            <a:r>
+              <a:rPr lang="zh-CN" altLang="en-US" dirty="0"/>
+              <a:t> </a:t>
+            </a:r>
+            <a:r>
+              <a:rPr lang="en-US" altLang="zh-CN" dirty="0"/>
+              <a:t>of</a:t>
+            </a:r>
+            <a:r>
+              <a:rPr lang="zh-CN" altLang="en-US" dirty="0"/>
+              <a:t> </a:t>
+            </a:r>
+            <a:r>
+              <a:rPr lang="en-US" altLang="zh-CN" dirty="0"/>
+              <a:t>features</a:t>
+            </a:r>
+            <a:r>
+              <a:rPr lang="en-US" dirty="0"/>
+              <a:t> </a:t>
+            </a:r>
+            <a:r>
+              <a:rPr lang="en-US" b="1" dirty="0"/>
+              <a:t>after</a:t>
+            </a:r>
+            <a:r>
+              <a:rPr lang="en-US" dirty="0"/>
+              <a:t> transformation: 12</a:t>
+            </a:r>
+            <a:r>
+              <a:rPr lang="en-US" altLang="zh-CN" dirty="0"/>
+              <a:t>4</a:t>
+            </a:r>
+          </a:p>
+          <a:p>
+            <a:r>
+              <a:rPr lang="en-US" altLang="zh-CN" dirty="0"/>
+              <a:t>Most</a:t>
+            </a:r>
+            <a:r>
+              <a:rPr lang="zh-CN" altLang="en-US" dirty="0"/>
+              <a:t> </a:t>
+            </a:r>
+            <a:r>
+              <a:rPr lang="en-US" altLang="zh-CN" dirty="0"/>
+              <a:t>of</a:t>
+            </a:r>
+            <a:r>
+              <a:rPr lang="zh-CN" altLang="en-US" dirty="0"/>
+              <a:t> </a:t>
+            </a:r>
+            <a:r>
+              <a:rPr lang="en-US" altLang="zh-CN" dirty="0"/>
+              <a:t>the</a:t>
+            </a:r>
+            <a:r>
+              <a:rPr lang="zh-CN" altLang="en-US" dirty="0"/>
+              <a:t> </a:t>
+            </a:r>
+            <a:r>
+              <a:rPr lang="en-US" altLang="zh-CN" dirty="0"/>
+              <a:t>features</a:t>
+            </a:r>
+            <a:r>
+              <a:rPr lang="zh-CN" altLang="en-US" dirty="0"/>
+              <a:t> </a:t>
+            </a:r>
+            <a:r>
+              <a:rPr lang="en-US" altLang="zh-CN" dirty="0"/>
+              <a:t>are</a:t>
+            </a:r>
+            <a:r>
+              <a:rPr lang="zh-CN" altLang="en-US" dirty="0"/>
+              <a:t> </a:t>
+            </a:r>
+            <a:r>
+              <a:rPr lang="en-US" altLang="zh-CN" dirty="0"/>
+              <a:t>categorical</a:t>
+            </a:r>
+            <a:r>
+              <a:rPr lang="zh-CN" altLang="en-US" dirty="0"/>
+              <a:t> </a:t>
+            </a:r>
+            <a:r>
+              <a:rPr lang="en-US" altLang="zh-CN" dirty="0"/>
+              <a:t>data,</a:t>
+            </a:r>
+            <a:r>
+              <a:rPr lang="zh-CN" altLang="en-US" dirty="0"/>
+              <a:t> </a:t>
+            </a:r>
+            <a:r>
+              <a:rPr lang="en-US" altLang="zh-CN" dirty="0"/>
+              <a:t>thus</a:t>
+            </a:r>
+            <a:r>
+              <a:rPr lang="zh-CN" altLang="en-US" dirty="0"/>
+              <a:t> </a:t>
+            </a:r>
+            <a:r>
+              <a:rPr lang="en-US" altLang="zh-CN" dirty="0"/>
+              <a:t>the</a:t>
+            </a:r>
+            <a:r>
+              <a:rPr lang="zh-CN" altLang="en-US" dirty="0"/>
+              <a:t> </a:t>
+            </a:r>
+            <a:r>
+              <a:rPr lang="en-US" altLang="zh-CN" dirty="0"/>
+              <a:t>number</a:t>
+            </a:r>
+            <a:r>
+              <a:rPr lang="zh-CN" altLang="en-US" dirty="0"/>
+              <a:t> </a:t>
+            </a:r>
+            <a:r>
+              <a:rPr lang="en-US" altLang="zh-CN" dirty="0"/>
+              <a:t>of</a:t>
+            </a:r>
+            <a:r>
+              <a:rPr lang="zh-CN" altLang="en-US" dirty="0"/>
+              <a:t> </a:t>
+            </a:r>
+            <a:r>
+              <a:rPr lang="en-US" altLang="zh-CN" dirty="0"/>
+              <a:t>features</a:t>
+            </a:r>
+            <a:r>
+              <a:rPr lang="zh-CN" altLang="en-US" dirty="0"/>
+              <a:t> </a:t>
+            </a:r>
+            <a:r>
+              <a:rPr lang="en-US" altLang="zh-CN" dirty="0"/>
+              <a:t>after</a:t>
+            </a:r>
+            <a:r>
+              <a:rPr lang="zh-CN" altLang="en-US" dirty="0"/>
+              <a:t> </a:t>
+            </a:r>
+            <a:r>
+              <a:rPr lang="en-US" altLang="zh-CN" dirty="0"/>
+              <a:t>preprocessing</a:t>
+            </a:r>
+            <a:r>
+              <a:rPr lang="zh-CN" altLang="en-US" dirty="0"/>
+              <a:t> </a:t>
+            </a:r>
+            <a:r>
+              <a:rPr lang="en-US" altLang="zh-CN" b="1" dirty="0"/>
+              <a:t>increases</a:t>
+            </a:r>
+          </a:p>
+          <a:p>
+            <a:r>
+              <a:rPr lang="en-US" altLang="zh-CN" b="1" dirty="0"/>
+              <a:t>No</a:t>
+            </a:r>
+            <a:r>
+              <a:rPr lang="zh-CN" altLang="en-US" b="1" dirty="0"/>
+              <a:t> </a:t>
+            </a:r>
+            <a:r>
+              <a:rPr lang="en-US" altLang="zh-CN" b="1" dirty="0"/>
+              <a:t>features</a:t>
+            </a:r>
+            <a:r>
+              <a:rPr lang="zh-CN" altLang="en-US" dirty="0"/>
+              <a:t> </a:t>
+            </a:r>
+            <a:r>
+              <a:rPr lang="en-US" altLang="zh-CN" dirty="0"/>
+              <a:t>contain</a:t>
+            </a:r>
+            <a:r>
+              <a:rPr lang="zh-CN" altLang="en-US" dirty="0"/>
+              <a:t> </a:t>
+            </a:r>
+            <a:r>
+              <a:rPr lang="en-US" altLang="zh-CN" dirty="0"/>
+              <a:t>missing</a:t>
+            </a:r>
+            <a:r>
+              <a:rPr lang="zh-CN" altLang="en-US" dirty="0"/>
+              <a:t> </a:t>
+            </a:r>
+            <a:r>
+              <a:rPr lang="en-US" altLang="zh-CN" dirty="0"/>
+              <a:t>values</a:t>
+            </a:r>
+            <a:r>
+              <a:rPr lang="zh-CN" altLang="en-US" dirty="0"/>
+              <a:t> </a:t>
+            </a:r>
+            <a:r>
+              <a:rPr lang="en-US" altLang="zh-CN" dirty="0"/>
+              <a:t>after</a:t>
+            </a:r>
+            <a:r>
+              <a:rPr lang="zh-CN" altLang="en-US" dirty="0"/>
+              <a:t> </a:t>
+            </a:r>
+            <a:r>
+              <a:rPr lang="en-US" altLang="zh-CN" dirty="0"/>
+              <a:t>transformation</a:t>
+            </a:r>
+            <a:endParaRPr lang="en-US" dirty="0"/>
+          </a:p>
+        </p:txBody>
+      </p:sp>
+    </p:spTree>
+    <p:extLst>
+      <p:ext uri="{BB962C8B-B14F-4D97-AF65-F5344CB8AC3E}">
+        <p14:creationId xmlns:p14="http://schemas.microsoft.com/office/powerpoint/2010/main" val="1423192065"/>
+      </p:ext>
+    </p:extLst>
+  </p:cSld>
+  <p:clrMapOvr>
+    <a:masterClrMapping/>
+  </p:clrMapOvr>
+</p:sld>
+</file>
+
+<file path=ppt/slides/slide12.xml><?xml version="1.0" encoding="utf-8"?>
+<p:sld xmlns:a="http://schemas.openxmlformats.org/drawingml/2006/main" xmlns:r="http://schemas.openxmlformats.org/officeDocument/2006/relationships" xmlns:p="http://schemas.openxmlformats.org/presentationml/2006/main">
+  <p:cSld>
+    <p:bg>
+      <p:bgPr>
+        <a:solidFill>
+          <a:schemeClr val="bg1"/>
+        </a:solidFill>
+        <a:effectLst/>
+      </p:bgPr>
+    </p:bg>
+    <p:spTree>
+      <p:nvGrpSpPr>
+        <p:cNvPr id="1" name=""/>
+        <p:cNvGrpSpPr/>
+        <p:nvPr/>
+      </p:nvGrpSpPr>
+      <p:grpSpPr>
+        <a:xfrm>
+          <a:off x="0" y="0"/>
+          <a:ext cx="0" cy="0"/>
+          <a:chOff x="0" y="0"/>
+          <a:chExt cx="0" cy="0"/>
+        </a:xfrm>
+      </p:grpSpPr>
+      <p:sp>
+        <p:nvSpPr>
+          <p:cNvPr id="9" name="Graphic 1">
+            <a:extLst>
+              <a:ext uri="{FF2B5EF4-FFF2-40B4-BE49-F238E27FC236}">
+                <a16:creationId xmlns:a16="http://schemas.microsoft.com/office/drawing/2014/main" id="{0D57E7FA-E8FC-45AC-868F-CDC8144939D6}"/>
+              </a:ext>
+              <a:ext uri="{C183D7F6-B498-43B3-948B-1728B52AA6E4}">
+                <adec:decorative xmlns:adec="http://schemas.microsoft.com/office/drawing/2017/decorative" val="1"/>
+              </a:ext>
+            </a:extLst>
+          </p:cNvPr>
+          <p:cNvSpPr>
+            <a:spLocks noGrp="1" noRot="1" noChangeAspect="1" noMove="1" noResize="1" noEditPoints="1" noAdjustHandles="1" noChangeArrowheads="1" noChangeShapeType="1" noTextEdit="1"/>
+          </p:cNvSpPr>
+          <p:nvPr>
+            <p:extLst>
+              <p:ext uri="{386F3935-93C4-4BCD-93E2-E3B085C9AB24}">
+                <p16:designElem xmlns:p16="http://schemas.microsoft.com/office/powerpoint/2015/main" val="1"/>
+              </p:ext>
+            </p:extLst>
+          </p:nvPr>
+        </p:nvSpPr>
+        <p:spPr>
+          <a:xfrm rot="10800000" flipV="1">
+            <a:off x="2599854" y="527562"/>
+            <a:ext cx="6992292" cy="5102484"/>
+          </a:xfrm>
+          <a:custGeom>
+            <a:avLst/>
+            <a:gdLst/>
+            <a:ahLst/>
+            <a:cxnLst/>
+            <a:rect l="l" t="t" r="r" b="b"/>
+            <a:pathLst>
+              <a:path w="6886274" h="5025119">
+                <a:moveTo>
+                  <a:pt x="5458905" y="754119"/>
+                </a:moveTo>
+                <a:cubicBezTo>
+                  <a:pt x="5417216" y="775336"/>
+                  <a:pt x="4594585" y="1111088"/>
+                  <a:pt x="3455557" y="1027709"/>
+                </a:cubicBezTo>
+                <a:cubicBezTo>
+                  <a:pt x="3415356" y="1024731"/>
+                  <a:pt x="3377389" y="1022869"/>
+                  <a:pt x="3338677" y="1021381"/>
+                </a:cubicBezTo>
+                <a:cubicBezTo>
+                  <a:pt x="2996224" y="1006119"/>
+                  <a:pt x="2660100" y="998674"/>
+                  <a:pt x="2518280" y="980435"/>
+                </a:cubicBezTo>
+                <a:cubicBezTo>
+                  <a:pt x="2407355" y="965918"/>
+                  <a:pt x="1840075" y="843082"/>
+                  <a:pt x="1673687" y="739229"/>
+                </a:cubicBezTo>
+                <a:cubicBezTo>
+                  <a:pt x="1503578" y="632771"/>
+                  <a:pt x="1343146" y="515146"/>
+                  <a:pt x="1183459" y="397149"/>
+                </a:cubicBezTo>
+                <a:cubicBezTo>
+                  <a:pt x="1114224" y="346153"/>
+                  <a:pt x="1040522" y="299624"/>
+                  <a:pt x="977987" y="241184"/>
+                </a:cubicBezTo>
+                <a:cubicBezTo>
+                  <a:pt x="915453" y="182372"/>
+                  <a:pt x="855896" y="121326"/>
+                  <a:pt x="788150" y="66980"/>
+                </a:cubicBezTo>
+                <a:cubicBezTo>
+                  <a:pt x="768794" y="51346"/>
+                  <a:pt x="749438" y="34596"/>
+                  <a:pt x="721148" y="31990"/>
+                </a:cubicBezTo>
+                <a:cubicBezTo>
+                  <a:pt x="714820" y="31246"/>
+                  <a:pt x="708120" y="31618"/>
+                  <a:pt x="701792" y="32362"/>
+                </a:cubicBezTo>
+                <a:cubicBezTo>
+                  <a:pt x="694720" y="33107"/>
+                  <a:pt x="689136" y="36829"/>
+                  <a:pt x="686530" y="43157"/>
+                </a:cubicBezTo>
+                <a:cubicBezTo>
+                  <a:pt x="683925" y="50230"/>
+                  <a:pt x="688392" y="54324"/>
+                  <a:pt x="693603" y="58046"/>
+                </a:cubicBezTo>
+                <a:cubicBezTo>
+                  <a:pt x="697325" y="60652"/>
+                  <a:pt x="701047" y="64747"/>
+                  <a:pt x="705886" y="65491"/>
+                </a:cubicBezTo>
+                <a:cubicBezTo>
+                  <a:pt x="736782" y="69958"/>
+                  <a:pt x="748321" y="92664"/>
+                  <a:pt x="762838" y="112764"/>
+                </a:cubicBezTo>
+                <a:cubicBezTo>
+                  <a:pt x="769166" y="121326"/>
+                  <a:pt x="775866" y="128026"/>
+                  <a:pt x="764327" y="140309"/>
+                </a:cubicBezTo>
+                <a:cubicBezTo>
+                  <a:pt x="754277" y="151104"/>
+                  <a:pt x="764699" y="156688"/>
+                  <a:pt x="775121" y="159666"/>
+                </a:cubicBezTo>
+                <a:cubicBezTo>
+                  <a:pt x="789638" y="163760"/>
+                  <a:pt x="806761" y="163016"/>
+                  <a:pt x="823139" y="176416"/>
+                </a:cubicBezTo>
+                <a:cubicBezTo>
+                  <a:pt x="761721" y="177533"/>
+                  <a:pt x="735665" y="142171"/>
+                  <a:pt x="707748" y="109414"/>
+                </a:cubicBezTo>
+                <a:cubicBezTo>
+                  <a:pt x="697325" y="97503"/>
+                  <a:pt x="690253" y="83358"/>
+                  <a:pt x="681319" y="69958"/>
+                </a:cubicBezTo>
+                <a:cubicBezTo>
+                  <a:pt x="670152" y="53580"/>
+                  <a:pt x="657124" y="52835"/>
+                  <a:pt x="640746" y="67352"/>
+                </a:cubicBezTo>
+                <a:cubicBezTo>
+                  <a:pt x="626229" y="80380"/>
+                  <a:pt x="619157" y="79264"/>
+                  <a:pt x="614318" y="61396"/>
+                </a:cubicBezTo>
+                <a:cubicBezTo>
+                  <a:pt x="606873" y="33479"/>
+                  <a:pt x="589750" y="13751"/>
+                  <a:pt x="560716" y="3701"/>
+                </a:cubicBezTo>
+                <a:cubicBezTo>
+                  <a:pt x="554388" y="1467"/>
+                  <a:pt x="546572" y="-3372"/>
+                  <a:pt x="540616" y="3701"/>
+                </a:cubicBezTo>
+                <a:cubicBezTo>
+                  <a:pt x="535405" y="9656"/>
+                  <a:pt x="539871" y="16729"/>
+                  <a:pt x="543594" y="21940"/>
+                </a:cubicBezTo>
+                <a:cubicBezTo>
+                  <a:pt x="550294" y="31246"/>
+                  <a:pt x="556250" y="40179"/>
+                  <a:pt x="558855" y="51346"/>
+                </a:cubicBezTo>
+                <a:cubicBezTo>
+                  <a:pt x="560716" y="58791"/>
+                  <a:pt x="562578" y="66980"/>
+                  <a:pt x="557366" y="72563"/>
+                </a:cubicBezTo>
+                <a:cubicBezTo>
+                  <a:pt x="535777" y="96386"/>
+                  <a:pt x="551411" y="107553"/>
+                  <a:pt x="570022" y="120209"/>
+                </a:cubicBezTo>
+                <a:cubicBezTo>
+                  <a:pt x="595706" y="137332"/>
+                  <a:pt x="605756" y="162643"/>
+                  <a:pt x="599801" y="192794"/>
+                </a:cubicBezTo>
+                <a:cubicBezTo>
+                  <a:pt x="597567" y="205078"/>
+                  <a:pt x="599056" y="212522"/>
+                  <a:pt x="614318" y="212150"/>
+                </a:cubicBezTo>
+                <a:cubicBezTo>
+                  <a:pt x="620273" y="212150"/>
+                  <a:pt x="621762" y="216245"/>
+                  <a:pt x="623996" y="220711"/>
+                </a:cubicBezTo>
+                <a:cubicBezTo>
+                  <a:pt x="671641" y="326053"/>
+                  <a:pt x="740504" y="418366"/>
+                  <a:pt x="821278" y="503235"/>
+                </a:cubicBezTo>
+                <a:cubicBezTo>
+                  <a:pt x="886791" y="572098"/>
+                  <a:pt x="959004" y="634260"/>
+                  <a:pt x="1033822" y="694562"/>
+                </a:cubicBezTo>
+                <a:cubicBezTo>
+                  <a:pt x="1036055" y="696423"/>
+                  <a:pt x="1038289" y="698656"/>
+                  <a:pt x="1039406" y="702378"/>
+                </a:cubicBezTo>
+                <a:cubicBezTo>
+                  <a:pt x="1004044" y="694934"/>
+                  <a:pt x="973521" y="679672"/>
+                  <a:pt x="944114" y="662550"/>
+                </a:cubicBezTo>
+                <a:cubicBezTo>
+                  <a:pt x="865946" y="617138"/>
+                  <a:pt x="800061" y="558325"/>
+                  <a:pt x="733432" y="500629"/>
+                </a:cubicBezTo>
+                <a:cubicBezTo>
+                  <a:pt x="692858" y="465267"/>
+                  <a:pt x="651169" y="431022"/>
+                  <a:pt x="606501" y="399755"/>
+                </a:cubicBezTo>
+                <a:cubicBezTo>
+                  <a:pt x="599056" y="394543"/>
+                  <a:pt x="593845" y="387843"/>
+                  <a:pt x="588634" y="381143"/>
+                </a:cubicBezTo>
+                <a:cubicBezTo>
+                  <a:pt x="585656" y="377421"/>
+                  <a:pt x="581934" y="374071"/>
+                  <a:pt x="575978" y="375560"/>
+                </a:cubicBezTo>
+                <a:cubicBezTo>
+                  <a:pt x="568533" y="377421"/>
+                  <a:pt x="567789" y="383004"/>
+                  <a:pt x="567044" y="388588"/>
+                </a:cubicBezTo>
+                <a:cubicBezTo>
+                  <a:pt x="564811" y="406455"/>
+                  <a:pt x="569650" y="422461"/>
+                  <a:pt x="578956" y="437722"/>
+                </a:cubicBezTo>
+                <a:cubicBezTo>
+                  <a:pt x="603151" y="476806"/>
+                  <a:pt x="638885" y="506957"/>
+                  <a:pt x="675736" y="535619"/>
+                </a:cubicBezTo>
+                <a:cubicBezTo>
+                  <a:pt x="723381" y="572470"/>
+                  <a:pt x="769538" y="610810"/>
+                  <a:pt x="811600" y="652872"/>
+                </a:cubicBezTo>
+                <a:cubicBezTo>
+                  <a:pt x="814578" y="655850"/>
+                  <a:pt x="820161" y="657711"/>
+                  <a:pt x="818300" y="666272"/>
+                </a:cubicBezTo>
+                <a:cubicBezTo>
+                  <a:pt x="791872" y="646544"/>
+                  <a:pt x="766932" y="627188"/>
+                  <a:pt x="741621" y="608576"/>
+                </a:cubicBezTo>
+                <a:cubicBezTo>
+                  <a:pt x="716681" y="589965"/>
+                  <a:pt x="691369" y="571353"/>
+                  <a:pt x="666430" y="553114"/>
+                </a:cubicBezTo>
+                <a:cubicBezTo>
+                  <a:pt x="660474" y="548647"/>
+                  <a:pt x="654146" y="542319"/>
+                  <a:pt x="645585" y="547903"/>
+                </a:cubicBezTo>
+                <a:cubicBezTo>
+                  <a:pt x="636652" y="553486"/>
+                  <a:pt x="637768" y="562792"/>
+                  <a:pt x="640002" y="570236"/>
+                </a:cubicBezTo>
+                <a:cubicBezTo>
+                  <a:pt x="647074" y="592198"/>
+                  <a:pt x="659358" y="611554"/>
+                  <a:pt x="675736" y="628677"/>
+                </a:cubicBezTo>
+                <a:cubicBezTo>
+                  <a:pt x="731570" y="685256"/>
+                  <a:pt x="795966" y="734018"/>
+                  <a:pt x="855896" y="786875"/>
+                </a:cubicBezTo>
+                <a:cubicBezTo>
+                  <a:pt x="888280" y="815537"/>
+                  <a:pt x="918058" y="846060"/>
+                  <a:pt x="946348" y="877699"/>
+                </a:cubicBezTo>
+                <a:cubicBezTo>
+                  <a:pt x="952676" y="884772"/>
+                  <a:pt x="952303" y="891472"/>
+                  <a:pt x="950442" y="899661"/>
+                </a:cubicBezTo>
+                <a:cubicBezTo>
+                  <a:pt x="942998" y="932790"/>
+                  <a:pt x="954537" y="943957"/>
+                  <a:pt x="991760" y="937629"/>
+                </a:cubicBezTo>
+                <a:cubicBezTo>
+                  <a:pt x="1003299" y="935767"/>
+                  <a:pt x="1011116" y="937629"/>
+                  <a:pt x="1018188" y="945445"/>
+                </a:cubicBezTo>
+                <a:cubicBezTo>
+                  <a:pt x="1103802" y="1042225"/>
+                  <a:pt x="1205048" y="1123744"/>
+                  <a:pt x="1315601" y="1196329"/>
+                </a:cubicBezTo>
+                <a:cubicBezTo>
+                  <a:pt x="1360641" y="1225735"/>
+                  <a:pt x="1407170" y="1253653"/>
+                  <a:pt x="1454443" y="1279709"/>
+                </a:cubicBezTo>
+                <a:cubicBezTo>
+                  <a:pt x="1454443" y="1281570"/>
+                  <a:pt x="1454443" y="1283804"/>
+                  <a:pt x="1454443" y="1285665"/>
+                </a:cubicBezTo>
+                <a:cubicBezTo>
+                  <a:pt x="1454071" y="1288270"/>
+                  <a:pt x="1453699" y="1289759"/>
+                  <a:pt x="1453327" y="1291993"/>
+                </a:cubicBezTo>
+                <a:cubicBezTo>
+                  <a:pt x="1386697" y="1251792"/>
+                  <a:pt x="1320812" y="1210474"/>
+                  <a:pt x="1256416" y="1166923"/>
+                </a:cubicBezTo>
+                <a:cubicBezTo>
+                  <a:pt x="1081840" y="1048926"/>
+                  <a:pt x="915080" y="922367"/>
+                  <a:pt x="745715" y="798786"/>
+                </a:cubicBezTo>
+                <a:cubicBezTo>
+                  <a:pt x="688764" y="757096"/>
+                  <a:pt x="643724" y="703867"/>
+                  <a:pt x="592356" y="656966"/>
+                </a:cubicBezTo>
+                <a:cubicBezTo>
+                  <a:pt x="558111" y="625699"/>
+                  <a:pt x="525354" y="592943"/>
+                  <a:pt x="485526" y="567259"/>
+                </a:cubicBezTo>
+                <a:cubicBezTo>
+                  <a:pt x="469148" y="556836"/>
+                  <a:pt x="452025" y="547530"/>
+                  <a:pt x="430063" y="550136"/>
+                </a:cubicBezTo>
+                <a:cubicBezTo>
+                  <a:pt x="421502" y="551253"/>
+                  <a:pt x="411824" y="553486"/>
+                  <a:pt x="408846" y="563164"/>
+                </a:cubicBezTo>
+                <a:cubicBezTo>
+                  <a:pt x="406240" y="572842"/>
+                  <a:pt x="414057" y="577309"/>
+                  <a:pt x="421130" y="581403"/>
+                </a:cubicBezTo>
+                <a:cubicBezTo>
+                  <a:pt x="422991" y="582520"/>
+                  <a:pt x="424852" y="584009"/>
+                  <a:pt x="426713" y="584009"/>
+                </a:cubicBezTo>
+                <a:cubicBezTo>
+                  <a:pt x="462075" y="586242"/>
+                  <a:pt x="470264" y="614532"/>
+                  <a:pt x="487015" y="635005"/>
+                </a:cubicBezTo>
+                <a:cubicBezTo>
+                  <a:pt x="492226" y="641333"/>
+                  <a:pt x="492598" y="647661"/>
+                  <a:pt x="487015" y="655105"/>
+                </a:cubicBezTo>
+                <a:cubicBezTo>
+                  <a:pt x="476964" y="668505"/>
+                  <a:pt x="484037" y="674461"/>
+                  <a:pt x="497437" y="678183"/>
+                </a:cubicBezTo>
+                <a:cubicBezTo>
+                  <a:pt x="510837" y="681906"/>
+                  <a:pt x="525354" y="683022"/>
+                  <a:pt x="539871" y="691584"/>
+                </a:cubicBezTo>
+                <a:cubicBezTo>
+                  <a:pt x="516793" y="698656"/>
+                  <a:pt x="500787" y="691212"/>
+                  <a:pt x="485898" y="681906"/>
+                </a:cubicBezTo>
+                <a:cubicBezTo>
+                  <a:pt x="452397" y="661433"/>
+                  <a:pt x="430808" y="631282"/>
+                  <a:pt x="410335" y="600387"/>
+                </a:cubicBezTo>
+                <a:cubicBezTo>
+                  <a:pt x="406240" y="594431"/>
+                  <a:pt x="402890" y="587731"/>
+                  <a:pt x="397307" y="582892"/>
+                </a:cubicBezTo>
+                <a:cubicBezTo>
+                  <a:pt x="386884" y="573214"/>
+                  <a:pt x="375717" y="572098"/>
+                  <a:pt x="363062" y="584009"/>
+                </a:cubicBezTo>
+                <a:cubicBezTo>
+                  <a:pt x="346311" y="599643"/>
+                  <a:pt x="340356" y="598526"/>
+                  <a:pt x="334772" y="578426"/>
+                </a:cubicBezTo>
+                <a:cubicBezTo>
+                  <a:pt x="327327" y="551253"/>
+                  <a:pt x="310577" y="532269"/>
+                  <a:pt x="281915" y="522219"/>
+                </a:cubicBezTo>
+                <a:cubicBezTo>
+                  <a:pt x="275960" y="519985"/>
+                  <a:pt x="269632" y="517007"/>
+                  <a:pt x="263304" y="521846"/>
+                </a:cubicBezTo>
+                <a:cubicBezTo>
+                  <a:pt x="256604" y="527430"/>
+                  <a:pt x="261070" y="533013"/>
+                  <a:pt x="263676" y="538225"/>
+                </a:cubicBezTo>
+                <a:cubicBezTo>
+                  <a:pt x="267398" y="546414"/>
+                  <a:pt x="271865" y="554603"/>
+                  <a:pt x="275215" y="563164"/>
+                </a:cubicBezTo>
+                <a:cubicBezTo>
+                  <a:pt x="281171" y="576937"/>
+                  <a:pt x="282288" y="591454"/>
+                  <a:pt x="271121" y="604854"/>
+                </a:cubicBezTo>
+                <a:cubicBezTo>
+                  <a:pt x="262931" y="614532"/>
+                  <a:pt x="263676" y="620860"/>
+                  <a:pt x="274471" y="627560"/>
+                </a:cubicBezTo>
+                <a:cubicBezTo>
+                  <a:pt x="309088" y="648405"/>
+                  <a:pt x="331050" y="675578"/>
+                  <a:pt x="319138" y="718012"/>
+                </a:cubicBezTo>
+                <a:cubicBezTo>
+                  <a:pt x="317277" y="723968"/>
+                  <a:pt x="319511" y="729924"/>
+                  <a:pt x="326583" y="729551"/>
+                </a:cubicBezTo>
+                <a:cubicBezTo>
+                  <a:pt x="342217" y="728435"/>
+                  <a:pt x="344822" y="738113"/>
+                  <a:pt x="349289" y="748163"/>
+                </a:cubicBezTo>
+                <a:cubicBezTo>
+                  <a:pt x="392840" y="844571"/>
+                  <a:pt x="455747" y="928695"/>
+                  <a:pt x="528332" y="1007608"/>
+                </a:cubicBezTo>
+                <a:cubicBezTo>
+                  <a:pt x="600173" y="1085777"/>
+                  <a:pt x="680947" y="1155756"/>
+                  <a:pt x="766932" y="1222758"/>
+                </a:cubicBezTo>
+                <a:cubicBezTo>
+                  <a:pt x="742737" y="1220524"/>
+                  <a:pt x="711470" y="1206752"/>
+                  <a:pt x="681319" y="1190746"/>
+                </a:cubicBezTo>
+                <a:cubicBezTo>
+                  <a:pt x="601662" y="1147939"/>
+                  <a:pt x="536149" y="1089871"/>
+                  <a:pt x="469520" y="1032920"/>
+                </a:cubicBezTo>
+                <a:cubicBezTo>
+                  <a:pt x="422991" y="993091"/>
+                  <a:pt x="377579" y="952146"/>
+                  <a:pt x="325466" y="917900"/>
+                </a:cubicBezTo>
+                <a:cubicBezTo>
+                  <a:pt x="319511" y="914178"/>
+                  <a:pt x="315416" y="909339"/>
+                  <a:pt x="312066" y="903383"/>
+                </a:cubicBezTo>
+                <a:cubicBezTo>
+                  <a:pt x="309088" y="898172"/>
+                  <a:pt x="304621" y="893333"/>
+                  <a:pt x="296805" y="895566"/>
+                </a:cubicBezTo>
+                <a:cubicBezTo>
+                  <a:pt x="288988" y="898172"/>
+                  <a:pt x="288243" y="904872"/>
+                  <a:pt x="288243" y="910828"/>
+                </a:cubicBezTo>
+                <a:cubicBezTo>
+                  <a:pt x="289360" y="933162"/>
+                  <a:pt x="295688" y="953262"/>
+                  <a:pt x="309460" y="971129"/>
+                </a:cubicBezTo>
+                <a:cubicBezTo>
+                  <a:pt x="336261" y="1006864"/>
+                  <a:pt x="371995" y="1034781"/>
+                  <a:pt x="407729" y="1062698"/>
+                </a:cubicBezTo>
+                <a:cubicBezTo>
+                  <a:pt x="457236" y="1101038"/>
+                  <a:pt x="503021" y="1142728"/>
+                  <a:pt x="544338" y="1189257"/>
+                </a:cubicBezTo>
+                <a:cubicBezTo>
+                  <a:pt x="514560" y="1166551"/>
+                  <a:pt x="484781" y="1143472"/>
+                  <a:pt x="454630" y="1120766"/>
+                </a:cubicBezTo>
+                <a:cubicBezTo>
+                  <a:pt x="431924" y="1103644"/>
+                  <a:pt x="408474" y="1087265"/>
+                  <a:pt x="385396" y="1070515"/>
+                </a:cubicBezTo>
+                <a:cubicBezTo>
+                  <a:pt x="379812" y="1066421"/>
+                  <a:pt x="373856" y="1061954"/>
+                  <a:pt x="366040" y="1067537"/>
+                </a:cubicBezTo>
+                <a:cubicBezTo>
+                  <a:pt x="358967" y="1072376"/>
+                  <a:pt x="360084" y="1079449"/>
+                  <a:pt x="361573" y="1086149"/>
+                </a:cubicBezTo>
+                <a:cubicBezTo>
+                  <a:pt x="367156" y="1112577"/>
+                  <a:pt x="382790" y="1133794"/>
+                  <a:pt x="402146" y="1152778"/>
+                </a:cubicBezTo>
+                <a:cubicBezTo>
+                  <a:pt x="425596" y="1175484"/>
+                  <a:pt x="450164" y="1197074"/>
+                  <a:pt x="475475" y="1218663"/>
+                </a:cubicBezTo>
+                <a:cubicBezTo>
+                  <a:pt x="448303" y="1212707"/>
+                  <a:pt x="421130" y="1206752"/>
+                  <a:pt x="393957" y="1201913"/>
+                </a:cubicBezTo>
+                <a:cubicBezTo>
+                  <a:pt x="406240" y="1245091"/>
+                  <a:pt x="434902" y="1253653"/>
+                  <a:pt x="460586" y="1260353"/>
+                </a:cubicBezTo>
+                <a:cubicBezTo>
+                  <a:pt x="495204" y="1268914"/>
+                  <a:pt x="528332" y="1279709"/>
+                  <a:pt x="561089" y="1291993"/>
+                </a:cubicBezTo>
+                <a:cubicBezTo>
+                  <a:pt x="574861" y="1304276"/>
+                  <a:pt x="588634" y="1316188"/>
+                  <a:pt x="602034" y="1328843"/>
+                </a:cubicBezTo>
+                <a:cubicBezTo>
+                  <a:pt x="615807" y="1341872"/>
+                  <a:pt x="628835" y="1354900"/>
+                  <a:pt x="641863" y="1368672"/>
+                </a:cubicBezTo>
+                <a:cubicBezTo>
+                  <a:pt x="651169" y="1378722"/>
+                  <a:pt x="662335" y="1387284"/>
+                  <a:pt x="651541" y="1404406"/>
+                </a:cubicBezTo>
+                <a:cubicBezTo>
+                  <a:pt x="646702" y="1412223"/>
+                  <a:pt x="678341" y="1454658"/>
+                  <a:pt x="688392" y="1457263"/>
+                </a:cubicBezTo>
+                <a:cubicBezTo>
+                  <a:pt x="689881" y="1457635"/>
+                  <a:pt x="691369" y="1458008"/>
+                  <a:pt x="692486" y="1458008"/>
+                </a:cubicBezTo>
+                <a:cubicBezTo>
+                  <a:pt x="714076" y="1456519"/>
+                  <a:pt x="718915" y="1469175"/>
+                  <a:pt x="719287" y="1485181"/>
+                </a:cubicBezTo>
+                <a:cubicBezTo>
+                  <a:pt x="719659" y="1500814"/>
+                  <a:pt x="715937" y="1520170"/>
+                  <a:pt x="745343" y="1512353"/>
+                </a:cubicBezTo>
+                <a:cubicBezTo>
+                  <a:pt x="748693" y="1511609"/>
+                  <a:pt x="749438" y="1513842"/>
+                  <a:pt x="750926" y="1516448"/>
+                </a:cubicBezTo>
+                <a:cubicBezTo>
+                  <a:pt x="782938" y="1583077"/>
+                  <a:pt x="836912" y="1634445"/>
+                  <a:pt x="890141" y="1685813"/>
+                </a:cubicBezTo>
+                <a:cubicBezTo>
+                  <a:pt x="893119" y="1688419"/>
+                  <a:pt x="896097" y="1691024"/>
+                  <a:pt x="899074" y="1693630"/>
+                </a:cubicBezTo>
+                <a:cubicBezTo>
+                  <a:pt x="843240" y="1680602"/>
+                  <a:pt x="658985" y="1663851"/>
+                  <a:pt x="605012" y="1669435"/>
+                </a:cubicBezTo>
+                <a:cubicBezTo>
+                  <a:pt x="556994" y="1674274"/>
+                  <a:pt x="285638" y="1593128"/>
+                  <a:pt x="229431" y="1545110"/>
+                </a:cubicBezTo>
+                <a:cubicBezTo>
+                  <a:pt x="221614" y="1582705"/>
+                  <a:pt x="238364" y="1597594"/>
+                  <a:pt x="251765" y="1614717"/>
+                </a:cubicBezTo>
+                <a:cubicBezTo>
+                  <a:pt x="270748" y="1638912"/>
+                  <a:pt x="273726" y="1656035"/>
+                  <a:pt x="237992" y="1675391"/>
+                </a:cubicBezTo>
+                <a:cubicBezTo>
+                  <a:pt x="135628" y="1730481"/>
+                  <a:pt x="136745" y="1732342"/>
+                  <a:pt x="232781" y="1807160"/>
+                </a:cubicBezTo>
+                <a:cubicBezTo>
+                  <a:pt x="237248" y="1810511"/>
+                  <a:pt x="235014" y="1821305"/>
+                  <a:pt x="236131" y="1828750"/>
+                </a:cubicBezTo>
+                <a:cubicBezTo>
+                  <a:pt x="211191" y="1839917"/>
+                  <a:pt x="181785" y="1810883"/>
+                  <a:pt x="152007" y="1842150"/>
+                </a:cubicBezTo>
+                <a:cubicBezTo>
+                  <a:pt x="280426" y="1979503"/>
+                  <a:pt x="475848" y="2110157"/>
+                  <a:pt x="653030" y="2213265"/>
+                </a:cubicBezTo>
+                <a:cubicBezTo>
+                  <a:pt x="509721" y="2247138"/>
+                  <a:pt x="423735" y="2128024"/>
+                  <a:pt x="318394" y="2143285"/>
+                </a:cubicBezTo>
+                <a:cubicBezTo>
+                  <a:pt x="265909" y="2180508"/>
+                  <a:pt x="422246" y="2240810"/>
+                  <a:pt x="272982" y="2258305"/>
+                </a:cubicBezTo>
+                <a:cubicBezTo>
+                  <a:pt x="337750" y="2291061"/>
+                  <a:pt x="385768" y="2323073"/>
+                  <a:pt x="430435" y="2360668"/>
+                </a:cubicBezTo>
+                <a:cubicBezTo>
+                  <a:pt x="509721" y="2428042"/>
+                  <a:pt x="525354" y="2472710"/>
+                  <a:pt x="488876" y="2563162"/>
+                </a:cubicBezTo>
+                <a:cubicBezTo>
+                  <a:pt x="464681" y="2622719"/>
+                  <a:pt x="429691" y="2677437"/>
+                  <a:pt x="460586" y="2748533"/>
+                </a:cubicBezTo>
+                <a:cubicBezTo>
+                  <a:pt x="481803" y="2797295"/>
+                  <a:pt x="473614" y="2829307"/>
+                  <a:pt x="393212" y="2807345"/>
+                </a:cubicBezTo>
+                <a:cubicBezTo>
+                  <a:pt x="306483" y="2783895"/>
+                  <a:pt x="273726" y="2827818"/>
+                  <a:pt x="295688" y="2913059"/>
+                </a:cubicBezTo>
+                <a:cubicBezTo>
+                  <a:pt x="309833" y="2967777"/>
+                  <a:pt x="294943" y="2984900"/>
+                  <a:pt x="235386" y="2978572"/>
+                </a:cubicBezTo>
+                <a:cubicBezTo>
+                  <a:pt x="169501" y="2971499"/>
+                  <a:pt x="106967" y="2935765"/>
+                  <a:pt x="25448" y="2952888"/>
+                </a:cubicBezTo>
+                <a:cubicBezTo>
+                  <a:pt x="90588" y="3052646"/>
+                  <a:pt x="229803" y="3024356"/>
+                  <a:pt x="305738" y="3119275"/>
+                </a:cubicBezTo>
+                <a:cubicBezTo>
+                  <a:pt x="215286" y="3119647"/>
+                  <a:pt x="146051" y="3119275"/>
+                  <a:pt x="79049" y="3098430"/>
+                </a:cubicBezTo>
+                <a:cubicBezTo>
+                  <a:pt x="51132" y="3089869"/>
+                  <a:pt x="20609" y="3081308"/>
+                  <a:pt x="4975" y="3109969"/>
+                </a:cubicBezTo>
+                <a:cubicBezTo>
+                  <a:pt x="-13636" y="3144587"/>
+                  <a:pt x="24331" y="3157615"/>
+                  <a:pt x="47037" y="3163943"/>
+                </a:cubicBezTo>
+                <a:cubicBezTo>
+                  <a:pt x="111061" y="3181438"/>
+                  <a:pt x="160196" y="3222755"/>
+                  <a:pt x="213425" y="3255139"/>
+                </a:cubicBezTo>
+                <a:cubicBezTo>
+                  <a:pt x="329933" y="3326236"/>
+                  <a:pt x="457981" y="3385420"/>
+                  <a:pt x="556622" y="3502301"/>
+                </a:cubicBezTo>
+                <a:cubicBezTo>
+                  <a:pt x="432669" y="3472523"/>
+                  <a:pt x="339983" y="3402915"/>
+                  <a:pt x="224592" y="3388771"/>
+                </a:cubicBezTo>
+                <a:cubicBezTo>
+                  <a:pt x="324722" y="3495601"/>
+                  <a:pt x="453142" y="3565208"/>
+                  <a:pt x="574861" y="3643004"/>
+                </a:cubicBezTo>
+                <a:cubicBezTo>
+                  <a:pt x="609479" y="3664966"/>
+                  <a:pt x="644841" y="3679855"/>
+                  <a:pt x="652657" y="3727501"/>
+                </a:cubicBezTo>
+                <a:cubicBezTo>
+                  <a:pt x="667919" y="3819814"/>
+                  <a:pt x="712959" y="3896494"/>
+                  <a:pt x="810111" y="3937067"/>
+                </a:cubicBezTo>
+                <a:cubicBezTo>
+                  <a:pt x="810856" y="3937439"/>
+                  <a:pt x="805644" y="3951212"/>
+                  <a:pt x="802294" y="3960890"/>
+                </a:cubicBezTo>
+                <a:cubicBezTo>
+                  <a:pt x="743110" y="3963868"/>
+                  <a:pt x="696581" y="3909149"/>
+                  <a:pt x="620646" y="3927017"/>
+                </a:cubicBezTo>
+                <a:cubicBezTo>
+                  <a:pt x="692858" y="4001091"/>
+                  <a:pt x="753532" y="4067720"/>
+                  <a:pt x="856268" y="4103082"/>
+                </a:cubicBezTo>
+                <a:cubicBezTo>
+                  <a:pt x="938531" y="4131372"/>
+                  <a:pt x="1040150" y="4147377"/>
+                  <a:pt x="1099707" y="4238574"/>
+                </a:cubicBezTo>
+                <a:cubicBezTo>
+                  <a:pt x="1030472" y="4256441"/>
+                  <a:pt x="978732" y="4234107"/>
+                  <a:pt x="926992" y="4218102"/>
+                </a:cubicBezTo>
+                <a:cubicBezTo>
+                  <a:pt x="847334" y="4193534"/>
+                  <a:pt x="769166" y="4165617"/>
+                  <a:pt x="689508" y="4140677"/>
+                </a:cubicBezTo>
+                <a:cubicBezTo>
+                  <a:pt x="659358" y="4131372"/>
+                  <a:pt x="626229" y="4124299"/>
+                  <a:pt x="606873" y="4169711"/>
+                </a:cubicBezTo>
+                <a:cubicBezTo>
+                  <a:pt x="707748" y="4179389"/>
+                  <a:pt x="768421" y="4240435"/>
+                  <a:pt x="831701" y="4297759"/>
+                </a:cubicBezTo>
+                <a:cubicBezTo>
+                  <a:pt x="867435" y="4330143"/>
+                  <a:pt x="896469" y="4373322"/>
+                  <a:pt x="960493" y="4356944"/>
+                </a:cubicBezTo>
+                <a:cubicBezTo>
+                  <a:pt x="994366" y="4348382"/>
+                  <a:pt x="1015955" y="4372578"/>
+                  <a:pt x="1012233" y="4402356"/>
+                </a:cubicBezTo>
+                <a:cubicBezTo>
+                  <a:pt x="999577" y="4507325"/>
+                  <a:pt x="1078118" y="4544176"/>
+                  <a:pt x="1159636" y="4564276"/>
+                </a:cubicBezTo>
+                <a:cubicBezTo>
+                  <a:pt x="1313740" y="4602616"/>
+                  <a:pt x="1442160" y="4692324"/>
+                  <a:pt x="1592169" y="4741458"/>
+                </a:cubicBezTo>
+                <a:cubicBezTo>
+                  <a:pt x="1738083" y="4789104"/>
+                  <a:pt x="2833187" y="5010209"/>
+                  <a:pt x="3110499" y="5032171"/>
+                </a:cubicBezTo>
+                <a:cubicBezTo>
+                  <a:pt x="4807501" y="5166546"/>
+                  <a:pt x="6028047" y="4106432"/>
+                  <a:pt x="6033630" y="4091915"/>
+                </a:cubicBezTo>
+                <a:cubicBezTo>
+                  <a:pt x="6059314" y="4023797"/>
+                  <a:pt x="6122965" y="3994390"/>
+                  <a:pt x="6180661" y="3957912"/>
+                </a:cubicBezTo>
+                <a:cubicBezTo>
+                  <a:pt x="6230913" y="3925900"/>
+                  <a:pt x="6284514" y="3892027"/>
+                  <a:pt x="6305359" y="3837309"/>
+                </a:cubicBezTo>
+                <a:cubicBezTo>
+                  <a:pt x="6332904" y="3764724"/>
+                  <a:pt x="6254735" y="3824281"/>
+                  <a:pt x="6240218" y="3796364"/>
+                </a:cubicBezTo>
+                <a:cubicBezTo>
+                  <a:pt x="6269997" y="3758768"/>
+                  <a:pt x="6316153" y="3724151"/>
+                  <a:pt x="6328437" y="3681344"/>
+                </a:cubicBezTo>
+                <a:cubicBezTo>
+                  <a:pt x="6372361" y="3526496"/>
+                  <a:pt x="6466907" y="3413710"/>
+                  <a:pt x="6608355" y="3326236"/>
+                </a:cubicBezTo>
+                <a:cubicBezTo>
+                  <a:pt x="6648928" y="3300924"/>
+                  <a:pt x="6675729" y="3255512"/>
+                  <a:pt x="6731191" y="3248067"/>
+                </a:cubicBezTo>
+                <a:cubicBezTo>
+                  <a:pt x="6854400" y="3232061"/>
+                  <a:pt x="6815315" y="3106992"/>
+                  <a:pt x="6880456" y="3051529"/>
+                </a:cubicBezTo>
+                <a:cubicBezTo>
+                  <a:pt x="6892739" y="3041107"/>
+                  <a:pt x="6903907" y="2777939"/>
+                  <a:pt x="6901673" y="2763795"/>
+                </a:cubicBezTo>
+                <a:cubicBezTo>
+                  <a:pt x="6898323" y="2743322"/>
+                  <a:pt x="6883806" y="2966288"/>
+                  <a:pt x="6871150" y="2948421"/>
+                </a:cubicBezTo>
+                <a:cubicBezTo>
+                  <a:pt x="6858494" y="2930182"/>
+                  <a:pt x="6839138" y="2914176"/>
+                  <a:pt x="6848444" y="2890353"/>
+                </a:cubicBezTo>
+                <a:cubicBezTo>
+                  <a:pt x="6852166" y="2880303"/>
+                  <a:pt x="6849561" y="2846058"/>
+                  <a:pt x="6878223" y="2873230"/>
+                </a:cubicBezTo>
+                <a:cubicBezTo>
+                  <a:pt x="6956763" y="2946932"/>
+                  <a:pt x="6870778" y="2578051"/>
+                  <a:pt x="6762459" y="2568745"/>
+                </a:cubicBezTo>
+                <a:cubicBezTo>
+                  <a:pt x="6801915" y="2465637"/>
+                  <a:pt x="6801915" y="2465637"/>
+                  <a:pt x="6673123" y="2451493"/>
+                </a:cubicBezTo>
+                <a:cubicBezTo>
+                  <a:pt x="6722630" y="2385980"/>
+                  <a:pt x="6722630" y="2369229"/>
+                  <a:pt x="6662700" y="2346896"/>
+                </a:cubicBezTo>
+                <a:cubicBezTo>
+                  <a:pt x="6605005" y="2325306"/>
+                  <a:pt x="6540981" y="2318234"/>
+                  <a:pt x="6487752" y="2285105"/>
+                </a:cubicBezTo>
+                <a:cubicBezTo>
+                  <a:pt x="6536887" y="2201353"/>
+                  <a:pt x="6550659" y="2104573"/>
+                  <a:pt x="6652278" y="2063628"/>
+                </a:cubicBezTo>
+                <a:cubicBezTo>
+                  <a:pt x="6668284" y="2057300"/>
+                  <a:pt x="6679079" y="2031988"/>
+                  <a:pt x="6668656" y="2017843"/>
+                </a:cubicBezTo>
+                <a:cubicBezTo>
+                  <a:pt x="6631805" y="1965359"/>
+                  <a:pt x="6684662" y="1864856"/>
+                  <a:pt x="6570015" y="1854062"/>
+                </a:cubicBezTo>
+                <a:cubicBezTo>
+                  <a:pt x="6555870" y="1852573"/>
+                  <a:pt x="6542842" y="1842150"/>
+                  <a:pt x="6554009" y="1827633"/>
+                </a:cubicBezTo>
+                <a:cubicBezTo>
+                  <a:pt x="6592349" y="1778126"/>
+                  <a:pt x="6545820" y="1781476"/>
+                  <a:pt x="6517531" y="1775149"/>
+                </a:cubicBezTo>
+                <a:cubicBezTo>
+                  <a:pt x="6483285" y="1767704"/>
+                  <a:pt x="6444573" y="1789293"/>
+                  <a:pt x="6412934" y="1762493"/>
+                </a:cubicBezTo>
+                <a:cubicBezTo>
+                  <a:pt x="6420378" y="1734203"/>
+                  <a:pt x="6447923" y="1734575"/>
+                  <a:pt x="6467279" y="1725642"/>
+                </a:cubicBezTo>
+                <a:cubicBezTo>
+                  <a:pt x="6523858" y="1699213"/>
+                  <a:pt x="6570015" y="1667946"/>
+                  <a:pt x="6572621" y="1600200"/>
+                </a:cubicBezTo>
+                <a:cubicBezTo>
+                  <a:pt x="6574854" y="1545482"/>
+                  <a:pt x="6580810" y="1497092"/>
+                  <a:pt x="6502641" y="1480341"/>
+                </a:cubicBezTo>
+                <a:cubicBezTo>
+                  <a:pt x="6490358" y="1477736"/>
+                  <a:pt x="6484030" y="1470664"/>
+                  <a:pt x="6481796" y="1461358"/>
+                </a:cubicBezTo>
+                <a:cubicBezTo>
+                  <a:pt x="6490730" y="1452424"/>
+                  <a:pt x="6499291" y="1443118"/>
+                  <a:pt x="6509713" y="1436418"/>
+                </a:cubicBezTo>
+                <a:cubicBezTo>
+                  <a:pt x="6544703" y="1414457"/>
+                  <a:pt x="6556615" y="1382072"/>
+                  <a:pt x="6567037" y="1348199"/>
+                </a:cubicBezTo>
+                <a:cubicBezTo>
+                  <a:pt x="6573737" y="1326610"/>
+                  <a:pt x="6581554" y="1305393"/>
+                  <a:pt x="6596816" y="1286781"/>
+                </a:cubicBezTo>
+                <a:cubicBezTo>
+                  <a:pt x="6606122" y="1275242"/>
+                  <a:pt x="6617661" y="1266681"/>
+                  <a:pt x="6632178" y="1261842"/>
+                </a:cubicBezTo>
+                <a:cubicBezTo>
+                  <a:pt x="6644833" y="1257375"/>
+                  <a:pt x="6648556" y="1251419"/>
+                  <a:pt x="6639994" y="1240625"/>
+                </a:cubicBezTo>
+                <a:cubicBezTo>
+                  <a:pt x="6615799" y="1209729"/>
+                  <a:pt x="6606122" y="1175856"/>
+                  <a:pt x="6622127" y="1136400"/>
+                </a:cubicBezTo>
+                <a:cubicBezTo>
+                  <a:pt x="6626967" y="1124489"/>
+                  <a:pt x="6623617" y="1114066"/>
+                  <a:pt x="6612077" y="1109599"/>
+                </a:cubicBezTo>
+                <a:cubicBezTo>
+                  <a:pt x="6564059" y="1090616"/>
+                  <a:pt x="6552148" y="1046692"/>
+                  <a:pt x="6531675" y="1009469"/>
+                </a:cubicBezTo>
+                <a:cubicBezTo>
+                  <a:pt x="6502641" y="956612"/>
+                  <a:pt x="6476213" y="902639"/>
+                  <a:pt x="6456113" y="845315"/>
+                </a:cubicBezTo>
+                <a:cubicBezTo>
+                  <a:pt x="6444201" y="811070"/>
+                  <a:pt x="6432662" y="777197"/>
+                  <a:pt x="6440851" y="739229"/>
+                </a:cubicBezTo>
+                <a:cubicBezTo>
+                  <a:pt x="6442712" y="729924"/>
+                  <a:pt x="6439362" y="722107"/>
+                  <a:pt x="6434523" y="715034"/>
+                </a:cubicBezTo>
+                <a:cubicBezTo>
+                  <a:pt x="6414050" y="684139"/>
+                  <a:pt x="6416656" y="651383"/>
+                  <a:pt x="6432290" y="617510"/>
+                </a:cubicBezTo>
+                <a:cubicBezTo>
+                  <a:pt x="6441968" y="597037"/>
+                  <a:pt x="6440851" y="594431"/>
+                  <a:pt x="6416284" y="595176"/>
+                </a:cubicBezTo>
+                <a:cubicBezTo>
+                  <a:pt x="6366405" y="596293"/>
+                  <a:pt x="6316898" y="598154"/>
+                  <a:pt x="6267763" y="591826"/>
+                </a:cubicBezTo>
+                <a:cubicBezTo>
+                  <a:pt x="6212673" y="584753"/>
+                  <a:pt x="6194806" y="568375"/>
+                  <a:pt x="6236496" y="521102"/>
+                </a:cubicBezTo>
+                <a:cubicBezTo>
+                  <a:pt x="6245430" y="511052"/>
+                  <a:pt x="6253246" y="499885"/>
+                  <a:pt x="6257341" y="487229"/>
+                </a:cubicBezTo>
+                <a:cubicBezTo>
+                  <a:pt x="6260319" y="477179"/>
+                  <a:pt x="6257713" y="470106"/>
+                  <a:pt x="6248780" y="465267"/>
+                </a:cubicBezTo>
+                <a:cubicBezTo>
+                  <a:pt x="6238357" y="459312"/>
+                  <a:pt x="6232774" y="467501"/>
+                  <a:pt x="6226818" y="473456"/>
+                </a:cubicBezTo>
+                <a:cubicBezTo>
+                  <a:pt x="6194434" y="505468"/>
+                  <a:pt x="6153861" y="527430"/>
+                  <a:pt x="6115149" y="551625"/>
+                </a:cubicBezTo>
+                <a:cubicBezTo>
+                  <a:pt x="6059686" y="586615"/>
+                  <a:pt x="6001246" y="617510"/>
+                  <a:pt x="5951739" y="659944"/>
+                </a:cubicBezTo>
+                <a:cubicBezTo>
+                  <a:pt x="5939084" y="670739"/>
+                  <a:pt x="5918611" y="662550"/>
+                  <a:pt x="5917122" y="644310"/>
+                </a:cubicBezTo>
+                <a:cubicBezTo>
+                  <a:pt x="5915633" y="626071"/>
+                  <a:pt x="5905583" y="626071"/>
+                  <a:pt x="5890694" y="630538"/>
+                </a:cubicBezTo>
+                <a:cubicBezTo>
+                  <a:pt x="5872826" y="635749"/>
+                  <a:pt x="5854959" y="640960"/>
+                  <a:pt x="5837464" y="646916"/>
+                </a:cubicBezTo>
+                <a:cubicBezTo>
+                  <a:pt x="5819225" y="653244"/>
+                  <a:pt x="5811036" y="666644"/>
+                  <a:pt x="5809175" y="683395"/>
+                </a:cubicBezTo>
+                <a:cubicBezTo>
+                  <a:pt x="5808430" y="689723"/>
+                  <a:pt x="5808803" y="697539"/>
+                  <a:pt x="5815503" y="698656"/>
+                </a:cubicBezTo>
+                <a:cubicBezTo>
+                  <a:pt x="5843048" y="703495"/>
+                  <a:pt x="5755201" y="682278"/>
+                  <a:pt x="5746268" y="667389"/>
+                </a:cubicBezTo>
+                <a:cubicBezTo>
+                  <a:pt x="5745896" y="666644"/>
+                  <a:pt x="5525907" y="720246"/>
+                  <a:pt x="5458905" y="754119"/>
+                </a:cubicBezTo>
+                <a:close/>
+                <a:moveTo>
+                  <a:pt x="885302" y="1333310"/>
+                </a:moveTo>
+                <a:cubicBezTo>
+                  <a:pt x="877857" y="1326982"/>
+                  <a:pt x="870040" y="1321027"/>
+                  <a:pt x="862596" y="1314326"/>
+                </a:cubicBezTo>
+                <a:cubicBezTo>
+                  <a:pt x="863712" y="1312837"/>
+                  <a:pt x="865201" y="1311349"/>
+                  <a:pt x="866318" y="1309860"/>
+                </a:cubicBezTo>
+                <a:cubicBezTo>
+                  <a:pt x="881580" y="1320282"/>
+                  <a:pt x="896841" y="1330705"/>
+                  <a:pt x="912103" y="1341127"/>
+                </a:cubicBezTo>
+                <a:cubicBezTo>
+                  <a:pt x="903541" y="1338522"/>
+                  <a:pt x="894235" y="1335916"/>
+                  <a:pt x="885302" y="1333310"/>
+                </a:cubicBezTo>
+                <a:close/>
+                <a:moveTo>
+                  <a:pt x="1140280" y="787619"/>
+                </a:moveTo>
+                <a:cubicBezTo>
+                  <a:pt x="1231849" y="850154"/>
+                  <a:pt x="1323418" y="913061"/>
+                  <a:pt x="1414987" y="975596"/>
+                </a:cubicBezTo>
+                <a:cubicBezTo>
+                  <a:pt x="1413498" y="977085"/>
+                  <a:pt x="1412381" y="978574"/>
+                  <a:pt x="1410892" y="980063"/>
+                </a:cubicBezTo>
+                <a:cubicBezTo>
+                  <a:pt x="1310390" y="927206"/>
+                  <a:pt x="1215471" y="868394"/>
+                  <a:pt x="1140280" y="787619"/>
+                </a:cubicBezTo>
+                <a:close/>
+              </a:path>
+            </a:pathLst>
+          </a:custGeom>
+          <a:solidFill>
+            <a:schemeClr val="accent1">
+              <a:alpha val="20000"/>
+            </a:schemeClr>
+          </a:solidFill>
+          <a:ln w="32707" cap="flat">
+            <a:noFill/>
+            <a:prstDash val="solid"/>
+            <a:miter/>
+          </a:ln>
+        </p:spPr>
+        <p:txBody>
+          <a:bodyPr rtlCol="0" anchor="ctr"/>
+          <a:lstStyle/>
+          <a:p>
+            <a:endParaRPr lang="en-US" dirty="0"/>
+          </a:p>
+        </p:txBody>
+      </p:sp>
+      <p:sp useBgFill="1">
+        <p:nvSpPr>
+          <p:cNvPr id="11" name="Rectangle 10">
+            <a:extLst>
+              <a:ext uri="{FF2B5EF4-FFF2-40B4-BE49-F238E27FC236}">
+                <a16:creationId xmlns:a16="http://schemas.microsoft.com/office/drawing/2014/main" id="{764E0904-5ABD-4DC7-8562-C38580C953A2}"/>
+              </a:ext>
+              <a:ext uri="{C183D7F6-B498-43B3-948B-1728B52AA6E4}">
+                <adec:decorative xmlns:adec="http://schemas.microsoft.com/office/drawing/2017/decorative" val="1"/>
+              </a:ext>
+            </a:extLst>
+          </p:cNvPr>
+          <p:cNvSpPr>
+            <a:spLocks noGrp="1" noRot="1" noChangeAspect="1" noMove="1" noResize="1" noEditPoints="1" noAdjustHandles="1" noChangeArrowheads="1" noChangeShapeType="1" noTextEdit="1"/>
+          </p:cNvSpPr>
+          <p:nvPr>
+            <p:extLst>
+              <p:ext uri="{386F3935-93C4-4BCD-93E2-E3B085C9AB24}">
+                <p16:designElem xmlns:p16="http://schemas.microsoft.com/office/powerpoint/2015/main" val="1"/>
+              </p:ext>
+            </p:extLst>
+          </p:nvPr>
+        </p:nvSpPr>
+        <p:spPr>
+          <a:xfrm>
+            <a:off x="0" y="0"/>
+            <a:ext cx="12188952" cy="6858000"/>
+          </a:xfrm>
+          <a:prstGeom prst="rect">
+            <a:avLst/>
+          </a:prstGeom>
+          <a:ln>
+            <a:noFill/>
+          </a:ln>
+        </p:spPr>
+        <p:style>
+          <a:lnRef idx="2">
+            <a:schemeClr val="accent1">
+              <a:shade val="50000"/>
+            </a:schemeClr>
+          </a:lnRef>
+          <a:fillRef idx="1">
+            <a:schemeClr val="accent1"/>
+          </a:fillRef>
+          <a:effectRef idx="0">
+            <a:schemeClr val="accent1"/>
+          </a:effectRef>
+          <a:fontRef idx="minor">
+            <a:schemeClr val="lt1"/>
+          </a:fontRef>
+        </p:style>
+        <p:txBody>
+          <a:bodyPr rtlCol="0" anchor="ctr"/>
+          <a:lstStyle/>
+          <a:p>
+            <a:pPr algn="ctr"/>
+            <a:endParaRPr lang="en-US"/>
+          </a:p>
+        </p:txBody>
+      </p:sp>
+      <p:pic>
+        <p:nvPicPr>
+          <p:cNvPr id="5" name="Picture 4" descr="Empty speech bubbles">
+            <a:extLst>
+              <a:ext uri="{FF2B5EF4-FFF2-40B4-BE49-F238E27FC236}">
+                <a16:creationId xmlns:a16="http://schemas.microsoft.com/office/drawing/2014/main" id="{6E2FB5C2-08E8-91E9-5B5C-4D827A9F8226}"/>
+              </a:ext>
+            </a:extLst>
+          </p:cNvPr>
+          <p:cNvPicPr>
+            <a:picLocks noChangeAspect="1"/>
+          </p:cNvPicPr>
+          <p:nvPr/>
+        </p:nvPicPr>
+        <p:blipFill rotWithShape="1">
+          <a:blip r:embed="rId2"/>
+          <a:srcRect t="5516" b="10215"/>
+          <a:stretch/>
+        </p:blipFill>
+        <p:spPr>
+          <a:xfrm>
+            <a:off x="20" y="10"/>
+            <a:ext cx="12191980" cy="6857990"/>
+          </a:xfrm>
+          <a:custGeom>
+            <a:avLst/>
+            <a:gdLst/>
+            <a:ahLst/>
+            <a:cxnLst/>
+            <a:rect l="l" t="t" r="r" b="b"/>
+            <a:pathLst>
+              <a:path w="12192000" h="6858000">
+                <a:moveTo>
+                  <a:pt x="0" y="0"/>
+                </a:moveTo>
+                <a:lnTo>
+                  <a:pt x="12192000" y="0"/>
+                </a:lnTo>
+                <a:lnTo>
+                  <a:pt x="12192000" y="6858000"/>
+                </a:lnTo>
+                <a:lnTo>
+                  <a:pt x="11560655" y="6858000"/>
+                </a:lnTo>
+                <a:lnTo>
+                  <a:pt x="11572884" y="6759738"/>
+                </a:lnTo>
+                <a:cubicBezTo>
+                  <a:pt x="11663744" y="6693104"/>
+                  <a:pt x="11749315" y="6619456"/>
+                  <a:pt x="11812292" y="6532282"/>
+                </a:cubicBezTo>
+                <a:cubicBezTo>
+                  <a:pt x="11851232" y="6478675"/>
+                  <a:pt x="11886807" y="6425068"/>
+                  <a:pt x="11956995" y="6386992"/>
+                </a:cubicBezTo>
+                <a:cubicBezTo>
+                  <a:pt x="11918054" y="6334888"/>
+                  <a:pt x="11851232" y="6322863"/>
+                  <a:pt x="11801234" y="6284788"/>
+                </a:cubicBezTo>
+                <a:cubicBezTo>
+                  <a:pt x="11797390" y="6253224"/>
+                  <a:pt x="11876711" y="6262743"/>
+                  <a:pt x="11856520" y="6193604"/>
+                </a:cubicBezTo>
+                <a:cubicBezTo>
+                  <a:pt x="11829119" y="6101419"/>
+                  <a:pt x="11858923" y="5996209"/>
+                  <a:pt x="11722875" y="5956630"/>
+                </a:cubicBezTo>
+                <a:cubicBezTo>
+                  <a:pt x="11686819" y="5866950"/>
+                  <a:pt x="11676724" y="5723664"/>
+                  <a:pt x="11763258" y="5635988"/>
+                </a:cubicBezTo>
+                <a:cubicBezTo>
+                  <a:pt x="11892094" y="5505226"/>
+                  <a:pt x="11871424" y="5422059"/>
+                  <a:pt x="11706050" y="5351418"/>
+                </a:cubicBezTo>
+                <a:cubicBezTo>
+                  <a:pt x="11684896" y="5342400"/>
+                  <a:pt x="11707491" y="4786287"/>
+                  <a:pt x="11697876" y="4763241"/>
+                </a:cubicBezTo>
+                <a:cubicBezTo>
+                  <a:pt x="11713260" y="4731677"/>
+                  <a:pt x="11749315" y="4739192"/>
+                  <a:pt x="11776236" y="4730675"/>
+                </a:cubicBezTo>
+                <a:cubicBezTo>
+                  <a:pt x="11894018" y="4694603"/>
+                  <a:pt x="11897864" y="4694603"/>
+                  <a:pt x="11868540" y="4584884"/>
+                </a:cubicBezTo>
+                <a:cubicBezTo>
+                  <a:pt x="11859884" y="4551817"/>
+                  <a:pt x="11880076" y="4538289"/>
+                  <a:pt x="11898825" y="4517749"/>
+                </a:cubicBezTo>
+                <a:cubicBezTo>
+                  <a:pt x="11969013" y="4441095"/>
+                  <a:pt x="11969494" y="4440094"/>
+                  <a:pt x="11897864" y="4375464"/>
+                </a:cubicBezTo>
+                <a:cubicBezTo>
+                  <a:pt x="11877192" y="4356928"/>
+                  <a:pt x="11863252" y="4336887"/>
+                  <a:pt x="11854116" y="4311838"/>
+                </a:cubicBezTo>
+                <a:cubicBezTo>
+                  <a:pt x="11837290" y="4266245"/>
+                  <a:pt x="11837771" y="4228169"/>
+                  <a:pt x="11901709" y="4203620"/>
+                </a:cubicBezTo>
+                <a:cubicBezTo>
+                  <a:pt x="11946418" y="4186086"/>
+                  <a:pt x="11971897" y="4166044"/>
+                  <a:pt x="11974782" y="4114442"/>
+                </a:cubicBezTo>
+                <a:cubicBezTo>
+                  <a:pt x="11976706" y="4071355"/>
+                  <a:pt x="11981993" y="4043299"/>
+                  <a:pt x="11932476" y="4024762"/>
+                </a:cubicBezTo>
+                <a:cubicBezTo>
+                  <a:pt x="11892576" y="4009732"/>
+                  <a:pt x="11881038" y="3977668"/>
+                  <a:pt x="11885365" y="3939592"/>
+                </a:cubicBezTo>
+                <a:cubicBezTo>
+                  <a:pt x="11895460" y="3846405"/>
+                  <a:pt x="11841137" y="3791796"/>
+                  <a:pt x="11751719" y="3749211"/>
+                </a:cubicBezTo>
+                <a:cubicBezTo>
+                  <a:pt x="11666628" y="3708629"/>
+                  <a:pt x="11592115" y="3654019"/>
+                  <a:pt x="11513754" y="3604420"/>
+                </a:cubicBezTo>
+                <a:cubicBezTo>
+                  <a:pt x="11426740" y="3549310"/>
+                  <a:pt x="11325786" y="3516243"/>
+                  <a:pt x="11220504" y="3488188"/>
+                </a:cubicBezTo>
+                <a:cubicBezTo>
+                  <a:pt x="11239734" y="3448108"/>
+                  <a:pt x="11306076" y="3470653"/>
+                  <a:pt x="11312805" y="3414541"/>
+                </a:cubicBezTo>
+                <a:cubicBezTo>
+                  <a:pt x="11148394" y="3366945"/>
+                  <a:pt x="10991193" y="3295301"/>
+                  <a:pt x="10805146" y="3277767"/>
+                </a:cubicBezTo>
+                <a:cubicBezTo>
+                  <a:pt x="10955618" y="3286784"/>
+                  <a:pt x="11092147" y="3222154"/>
+                  <a:pt x="11234926" y="3203117"/>
+                </a:cubicBezTo>
+                <a:cubicBezTo>
+                  <a:pt x="11248386" y="3171554"/>
+                  <a:pt x="11217140" y="3179569"/>
+                  <a:pt x="11204640" y="3174060"/>
+                </a:cubicBezTo>
+                <a:cubicBezTo>
+                  <a:pt x="11192140" y="3168047"/>
+                  <a:pt x="11176757" y="3166042"/>
+                  <a:pt x="11174834" y="3143498"/>
+                </a:cubicBezTo>
+                <a:cubicBezTo>
+                  <a:pt x="11243580" y="3110932"/>
+                  <a:pt x="11329632" y="3132475"/>
+                  <a:pt x="11400780" y="3099410"/>
+                </a:cubicBezTo>
+                <a:cubicBezTo>
+                  <a:pt x="11384916" y="3051314"/>
+                  <a:pt x="11323382" y="3080371"/>
+                  <a:pt x="11297902" y="3041793"/>
+                </a:cubicBezTo>
+                <a:cubicBezTo>
+                  <a:pt x="11364246" y="3034780"/>
+                  <a:pt x="11425779" y="3031774"/>
+                  <a:pt x="11485870" y="3021253"/>
+                </a:cubicBezTo>
+                <a:cubicBezTo>
+                  <a:pt x="11532984" y="3013236"/>
+                  <a:pt x="11545964" y="2972154"/>
+                  <a:pt x="11513754" y="2944098"/>
+                </a:cubicBezTo>
+                <a:cubicBezTo>
+                  <a:pt x="11484909" y="2919049"/>
+                  <a:pt x="11442604" y="2917044"/>
+                  <a:pt x="11405107" y="2906523"/>
+                </a:cubicBezTo>
+                <a:cubicBezTo>
+                  <a:pt x="11137817" y="2833377"/>
+                  <a:pt x="10857066" y="2809829"/>
+                  <a:pt x="10572950" y="2803317"/>
+                </a:cubicBezTo>
+                <a:cubicBezTo>
+                  <a:pt x="10117210" y="2792795"/>
+                  <a:pt x="9660028" y="2793297"/>
+                  <a:pt x="9205250" y="2778767"/>
+                </a:cubicBezTo>
+                <a:cubicBezTo>
+                  <a:pt x="8996489" y="2772379"/>
+                  <a:pt x="8788540" y="2761765"/>
+                  <a:pt x="8579578" y="2759181"/>
+                </a:cubicBezTo>
+                <a:cubicBezTo>
+                  <a:pt x="8509922" y="2758320"/>
+                  <a:pt x="8440155" y="2758352"/>
+                  <a:pt x="8370208" y="2759730"/>
+                </a:cubicBezTo>
+                <a:cubicBezTo>
+                  <a:pt x="8070708" y="2765742"/>
+                  <a:pt x="7771690" y="2764238"/>
+                  <a:pt x="7470748" y="2819849"/>
+                </a:cubicBezTo>
+                <a:cubicBezTo>
+                  <a:pt x="7316911" y="2848407"/>
+                  <a:pt x="7156825" y="2838887"/>
+                  <a:pt x="7001547" y="2861432"/>
+                </a:cubicBezTo>
+                <a:cubicBezTo>
+                  <a:pt x="6765024" y="2896002"/>
+                  <a:pt x="6528501" y="2936583"/>
+                  <a:pt x="6295343" y="2988688"/>
+                </a:cubicBezTo>
+                <a:cubicBezTo>
+                  <a:pt x="6222271" y="3005220"/>
+                  <a:pt x="6131892" y="3015241"/>
+                  <a:pt x="6075166" y="3078367"/>
+                </a:cubicBezTo>
+                <a:cubicBezTo>
+                  <a:pt x="5985266" y="3038288"/>
+                  <a:pt x="5929502" y="3113938"/>
+                  <a:pt x="5859314" y="3139490"/>
+                </a:cubicBezTo>
+                <a:cubicBezTo>
+                  <a:pt x="5831912" y="3149510"/>
+                  <a:pt x="5795857" y="3163538"/>
+                  <a:pt x="5800183" y="3195101"/>
+                </a:cubicBezTo>
+                <a:cubicBezTo>
+                  <a:pt x="5804030" y="3234680"/>
+                  <a:pt x="5844410" y="3260231"/>
+                  <a:pt x="5882870" y="3252215"/>
+                </a:cubicBezTo>
+                <a:cubicBezTo>
+                  <a:pt x="6002574" y="3227164"/>
+                  <a:pt x="6109777" y="3283277"/>
+                  <a:pt x="6232848" y="3274760"/>
+                </a:cubicBezTo>
+                <a:cubicBezTo>
+                  <a:pt x="6125643" y="3298808"/>
+                  <a:pt x="6018918" y="3323358"/>
+                  <a:pt x="5911715" y="3347407"/>
+                </a:cubicBezTo>
+                <a:cubicBezTo>
+                  <a:pt x="6070839" y="3366444"/>
+                  <a:pt x="6227559" y="3332376"/>
+                  <a:pt x="6384279" y="3312836"/>
+                </a:cubicBezTo>
+                <a:cubicBezTo>
+                  <a:pt x="6434757" y="3306824"/>
+                  <a:pt x="6513117" y="3260732"/>
+                  <a:pt x="6526097" y="3325362"/>
+                </a:cubicBezTo>
+                <a:cubicBezTo>
+                  <a:pt x="6534750" y="3368448"/>
+                  <a:pt x="6450622" y="3371454"/>
+                  <a:pt x="6403028" y="3383478"/>
+                </a:cubicBezTo>
+                <a:cubicBezTo>
+                  <a:pt x="6192945" y="3435081"/>
+                  <a:pt x="5979497" y="3465141"/>
+                  <a:pt x="5767013" y="3500713"/>
+                </a:cubicBezTo>
+                <a:cubicBezTo>
+                  <a:pt x="5746822" y="3504220"/>
+                  <a:pt x="5720381" y="3501214"/>
+                  <a:pt x="5706920" y="3511233"/>
+                </a:cubicBezTo>
+                <a:cubicBezTo>
+                  <a:pt x="5598272" y="3591895"/>
+                  <a:pt x="5460782" y="3618449"/>
+                  <a:pt x="5310793" y="3677066"/>
+                </a:cubicBezTo>
+                <a:cubicBezTo>
+                  <a:pt x="5405498" y="3704622"/>
+                  <a:pt x="5469435" y="3648007"/>
+                  <a:pt x="5548276" y="3660533"/>
+                </a:cubicBezTo>
+                <a:cubicBezTo>
+                  <a:pt x="5467993" y="3721154"/>
+                  <a:pt x="5374730" y="3732677"/>
+                  <a:pt x="5293005" y="3765743"/>
+                </a:cubicBezTo>
+                <a:cubicBezTo>
+                  <a:pt x="5234355" y="3789291"/>
+                  <a:pt x="5016580" y="3862938"/>
+                  <a:pt x="4983410" y="3883981"/>
+                </a:cubicBezTo>
+                <a:cubicBezTo>
+                  <a:pt x="4883416" y="3949110"/>
+                  <a:pt x="4756501" y="3979672"/>
+                  <a:pt x="4674775" y="4068850"/>
+                </a:cubicBezTo>
+                <a:cubicBezTo>
+                  <a:pt x="4617087" y="4131477"/>
+                  <a:pt x="4520939" y="4119952"/>
+                  <a:pt x="4453155" y="4163539"/>
+                </a:cubicBezTo>
+                <a:cubicBezTo>
+                  <a:pt x="4429119" y="4204622"/>
+                  <a:pt x="4475751" y="4215143"/>
+                  <a:pt x="4492095" y="4237188"/>
+                </a:cubicBezTo>
+                <a:cubicBezTo>
+                  <a:pt x="4513728" y="4266746"/>
+                  <a:pt x="4475269" y="4283280"/>
+                  <a:pt x="4464213" y="4318851"/>
+                </a:cubicBezTo>
+                <a:cubicBezTo>
+                  <a:pt x="4591608" y="4278771"/>
+                  <a:pt x="4713234" y="4255223"/>
+                  <a:pt x="4857456" y="4241696"/>
+                </a:cubicBezTo>
+                <a:cubicBezTo>
+                  <a:pt x="4809862" y="4299311"/>
+                  <a:pt x="4752174" y="4274261"/>
+                  <a:pt x="4713234" y="4295303"/>
+                </a:cubicBezTo>
+                <a:cubicBezTo>
+                  <a:pt x="4687756" y="4308830"/>
+                  <a:pt x="4648816" y="4314843"/>
+                  <a:pt x="4656026" y="4348410"/>
+                </a:cubicBezTo>
+                <a:cubicBezTo>
+                  <a:pt x="4661795" y="4374963"/>
+                  <a:pt x="4694486" y="4371456"/>
+                  <a:pt x="4718523" y="4368951"/>
+                </a:cubicBezTo>
+                <a:cubicBezTo>
+                  <a:pt x="4810825" y="4359433"/>
+                  <a:pt x="4900722" y="4356425"/>
+                  <a:pt x="4989178" y="4420054"/>
+                </a:cubicBezTo>
+                <a:cubicBezTo>
+                  <a:pt x="4764193" y="4512739"/>
+                  <a:pt x="4505557" y="4473661"/>
+                  <a:pt x="4304127" y="4609933"/>
+                </a:cubicBezTo>
+                <a:cubicBezTo>
+                  <a:pt x="4332491" y="4652018"/>
+                  <a:pt x="4372871" y="4629473"/>
+                  <a:pt x="4402677" y="4624463"/>
+                </a:cubicBezTo>
+                <a:cubicBezTo>
+                  <a:pt x="4598338" y="4590394"/>
+                  <a:pt x="5297331" y="4651016"/>
+                  <a:pt x="5398287" y="4608430"/>
+                </a:cubicBezTo>
+                <a:cubicBezTo>
+                  <a:pt x="5460301" y="4582379"/>
+                  <a:pt x="5525682" y="4569853"/>
+                  <a:pt x="5592504" y="4585886"/>
+                </a:cubicBezTo>
+                <a:cubicBezTo>
+                  <a:pt x="5656923" y="4601416"/>
+                  <a:pt x="5640578" y="4819353"/>
+                  <a:pt x="5411266" y="4964142"/>
+                </a:cubicBezTo>
+                <a:cubicBezTo>
+                  <a:pt x="5378575" y="4984684"/>
+                  <a:pt x="5524721" y="5014244"/>
+                  <a:pt x="5480493" y="5031277"/>
+                </a:cubicBezTo>
+                <a:cubicBezTo>
+                  <a:pt x="5445880" y="5044804"/>
+                  <a:pt x="5276179" y="5037289"/>
+                  <a:pt x="5233393" y="5047810"/>
+                </a:cubicBezTo>
+                <a:cubicBezTo>
+                  <a:pt x="5216567" y="5052318"/>
+                  <a:pt x="4701216" y="5221157"/>
+                  <a:pt x="4750251" y="5256728"/>
+                </a:cubicBezTo>
+                <a:cubicBezTo>
+                  <a:pt x="4896877" y="5363441"/>
+                  <a:pt x="5388190" y="5558833"/>
+                  <a:pt x="4508440" y="5624965"/>
+                </a:cubicBezTo>
+                <a:cubicBezTo>
+                  <a:pt x="4536323" y="5663542"/>
+                  <a:pt x="4613241" y="5638994"/>
+                  <a:pt x="4602665" y="5706629"/>
+                </a:cubicBezTo>
+                <a:cubicBezTo>
+                  <a:pt x="4485845" y="5743202"/>
+                  <a:pt x="4350758" y="5741198"/>
+                  <a:pt x="4215189" y="5797811"/>
+                </a:cubicBezTo>
+                <a:cubicBezTo>
+                  <a:pt x="4276245" y="5838893"/>
+                  <a:pt x="4346432" y="5813844"/>
+                  <a:pt x="4407966" y="5826870"/>
+                </a:cubicBezTo>
+                <a:cubicBezTo>
+                  <a:pt x="4373353" y="5878473"/>
+                  <a:pt x="4313741" y="5870457"/>
+                  <a:pt x="4265186" y="5881478"/>
+                </a:cubicBezTo>
+                <a:cubicBezTo>
+                  <a:pt x="4220479" y="5892001"/>
+                  <a:pt x="4125774" y="5981680"/>
+                  <a:pt x="4145964" y="5977170"/>
+                </a:cubicBezTo>
+                <a:cubicBezTo>
+                  <a:pt x="4332971" y="5937091"/>
+                  <a:pt x="4522862" y="5948113"/>
+                  <a:pt x="4710350" y="5909035"/>
+                </a:cubicBezTo>
+                <a:cubicBezTo>
+                  <a:pt x="4772366" y="5896009"/>
+                  <a:pt x="4842554" y="5870958"/>
+                  <a:pt x="4870916" y="5949616"/>
+                </a:cubicBezTo>
+                <a:cubicBezTo>
+                  <a:pt x="4879571" y="5972663"/>
+                  <a:pt x="4873320" y="5980177"/>
+                  <a:pt x="4960333" y="5949115"/>
+                </a:cubicBezTo>
+                <a:cubicBezTo>
+                  <a:pt x="4994466" y="5937091"/>
+                  <a:pt x="5039656" y="5924065"/>
+                  <a:pt x="5073788" y="5953623"/>
+                </a:cubicBezTo>
+                <a:cubicBezTo>
+                  <a:pt x="5052154" y="5990698"/>
+                  <a:pt x="5010331" y="5979675"/>
+                  <a:pt x="4979084" y="5990197"/>
+                </a:cubicBezTo>
+                <a:cubicBezTo>
+                  <a:pt x="4896397" y="6017250"/>
+                  <a:pt x="5180513" y="6120457"/>
+                  <a:pt x="5100228" y="6151519"/>
+                </a:cubicBezTo>
+                <a:cubicBezTo>
+                  <a:pt x="4935817" y="6215148"/>
+                  <a:pt x="4832938" y="6196611"/>
+                  <a:pt x="4666602" y="6266250"/>
+                </a:cubicBezTo>
+                <a:cubicBezTo>
+                  <a:pt x="4723331" y="6264746"/>
+                  <a:pt x="4706024" y="6288795"/>
+                  <a:pt x="4762750" y="6288795"/>
+                </a:cubicBezTo>
+                <a:cubicBezTo>
+                  <a:pt x="4788229" y="6288795"/>
+                  <a:pt x="4815151" y="6294807"/>
+                  <a:pt x="4815151" y="6322363"/>
+                </a:cubicBezTo>
+                <a:cubicBezTo>
+                  <a:pt x="4815151" y="6348414"/>
+                  <a:pt x="4516613" y="6491199"/>
+                  <a:pt x="4558918" y="6504727"/>
+                </a:cubicBezTo>
+                <a:cubicBezTo>
+                  <a:pt x="4674295" y="6541299"/>
+                  <a:pt x="4970431" y="6429075"/>
+                  <a:pt x="4899280" y="6480679"/>
+                </a:cubicBezTo>
+                <a:cubicBezTo>
+                  <a:pt x="4791114" y="6559337"/>
+                  <a:pt x="4774769" y="6574868"/>
+                  <a:pt x="4692563" y="6586391"/>
+                </a:cubicBezTo>
+                <a:cubicBezTo>
+                  <a:pt x="4621894" y="6596411"/>
+                  <a:pt x="4373353" y="6816352"/>
+                  <a:pt x="4303645" y="6834888"/>
+                </a:cubicBezTo>
+                <a:cubicBezTo>
+                  <a:pt x="4288262" y="6838896"/>
+                  <a:pt x="4291687" y="6845065"/>
+                  <a:pt x="4307829" y="6852361"/>
+                </a:cubicBezTo>
+                <a:lnTo>
+                  <a:pt x="4323786" y="6858000"/>
+                </a:lnTo>
+                <a:lnTo>
+                  <a:pt x="0" y="6858000"/>
+                </a:lnTo>
+                <a:close/>
+              </a:path>
+            </a:pathLst>
+          </a:custGeom>
+        </p:spPr>
+      </p:pic>
+      <p:sp>
+        <p:nvSpPr>
+          <p:cNvPr id="2" name="Title 1">
+            <a:extLst>
+              <a:ext uri="{FF2B5EF4-FFF2-40B4-BE49-F238E27FC236}">
+                <a16:creationId xmlns:a16="http://schemas.microsoft.com/office/drawing/2014/main" id="{7E735141-4F04-3F2A-45CB-4EC4C32D3934}"/>
+              </a:ext>
+            </a:extLst>
+          </p:cNvPr>
+          <p:cNvSpPr>
+            <a:spLocks noGrp="1"/>
+          </p:cNvSpPr>
+          <p:nvPr>
+            <p:ph type="title"/>
+          </p:nvPr>
+        </p:nvSpPr>
+        <p:spPr>
+          <a:xfrm>
+            <a:off x="5419592" y="2844618"/>
+            <a:ext cx="5966565" cy="1701570"/>
+          </a:xfrm>
+        </p:spPr>
+        <p:txBody>
+          <a:bodyPr vert="horz" lIns="91440" tIns="45720" rIns="91440" bIns="45720" rtlCol="0" anchor="b">
+            <a:normAutofit/>
+          </a:bodyPr>
+          <a:lstStyle/>
+          <a:p>
+            <a:r>
+              <a:rPr lang="en-US" altLang="zh-CN" sz="4400" dirty="0"/>
+              <a:t>Thanks</a:t>
+            </a:r>
+            <a:r>
+              <a:rPr lang="zh-CN" altLang="en-US" sz="4400" dirty="0"/>
+              <a:t> </a:t>
+            </a:r>
+            <a:r>
+              <a:rPr lang="en-US" altLang="zh-CN" sz="4400" dirty="0"/>
+              <a:t>for listening!</a:t>
+            </a:r>
+            <a:endParaRPr lang="en-US" sz="4400" dirty="0"/>
+          </a:p>
+        </p:txBody>
+      </p:sp>
+    </p:spTree>
+    <p:extLst>
+      <p:ext uri="{BB962C8B-B14F-4D97-AF65-F5344CB8AC3E}">
+        <p14:creationId xmlns:p14="http://schemas.microsoft.com/office/powerpoint/2010/main" val="3563012265"/>
+      </p:ext>
+    </p:extLst>
+  </p:cSld>
+  <p:clrMapOvr>
+    <a:masterClrMapping/>
+  </p:clrMapOvr>
+</p:sld>
+</file>
+
 <file path=ppt/slides/slide2.xml><?xml version="1.0" encoding="utf-8"?>
 <p:sld xmlns:a="http://schemas.openxmlformats.org/drawingml/2006/main" xmlns:r="http://schemas.openxmlformats.org/officeDocument/2006/relationships" xmlns:p="http://schemas.openxmlformats.org/presentationml/2006/main">
   <p:cSld>
@@ -15721,55 +18292,7 @@
           <a:p>
             <a:r>
               <a:rPr lang="en-US" altLang="zh-CN" sz="2300" dirty="0"/>
-              <a:t>I</a:t>
-            </a:r>
-            <a:r>
-              <a:rPr lang="zh-CN" altLang="en-US" sz="2300" dirty="0"/>
-              <a:t> </a:t>
-            </a:r>
-            <a:r>
-              <a:rPr lang="en-US" altLang="zh-CN" sz="2300" dirty="0"/>
-              <a:t>find</a:t>
-            </a:r>
-            <a:r>
-              <a:rPr lang="zh-CN" altLang="en-US" sz="2300" dirty="0"/>
-              <a:t> </a:t>
-            </a:r>
-            <a:r>
-              <a:rPr lang="en-US" altLang="zh-CN" sz="2300" dirty="0"/>
-              <a:t>it</a:t>
-            </a:r>
-            <a:r>
-              <a:rPr lang="zh-CN" altLang="en-US" sz="2300" dirty="0"/>
-              <a:t> </a:t>
-            </a:r>
-            <a:r>
-              <a:rPr lang="en-US" altLang="zh-CN" sz="2300" dirty="0"/>
-              <a:t>very</a:t>
-            </a:r>
-            <a:r>
-              <a:rPr lang="zh-CN" altLang="en-US" sz="2300" dirty="0"/>
-              <a:t> </a:t>
-            </a:r>
-            <a:r>
-              <a:rPr lang="en-US" altLang="zh-CN" sz="2300" dirty="0"/>
-              <a:t>important</a:t>
-            </a:r>
-            <a:r>
-              <a:rPr lang="zh-CN" altLang="en-US" sz="2300" dirty="0"/>
-              <a:t> </a:t>
-            </a:r>
-            <a:r>
-              <a:rPr lang="en-US" altLang="zh-CN" sz="2300" dirty="0"/>
-              <a:t>because</a:t>
-            </a:r>
-            <a:r>
-              <a:rPr lang="zh-CN" altLang="en-US" sz="2300" dirty="0"/>
-              <a:t> </a:t>
-            </a:r>
-            <a:r>
-              <a:rPr lang="en-US" altLang="zh-CN" sz="2300" dirty="0"/>
-              <a:t>as</a:t>
+              <a:t>As</a:t>
             </a:r>
             <a:r>
               <a:rPr lang="zh-CN" altLang="en-US" sz="2300" dirty="0"/>
@@ -15809,7 +18332,7 @@
             </a:r>
             <a:r>
               <a:rPr lang="en-US" altLang="zh-CN" sz="2300" dirty="0"/>
-              <a:t>it</a:t>
+              <a:t>new</a:t>
             </a:r>
             <a:r>
               <a:rPr lang="zh-CN" altLang="en-US" sz="2300" dirty="0"/>
@@ -15817,7 +18340,7 @@
             </a:r>
             <a:r>
               <a:rPr lang="en-US" altLang="zh-CN" sz="2300" dirty="0"/>
-              <a:t>is</a:t>
+              <a:t>type</a:t>
             </a:r>
             <a:r>
               <a:rPr lang="zh-CN" altLang="en-US" sz="2300" dirty="0"/>
@@ -15825,7 +18348,7 @@
             </a:r>
             <a:r>
               <a:rPr lang="en-US" altLang="zh-CN" sz="2300" dirty="0"/>
-              <a:t>possible</a:t>
+              <a:t>of</a:t>
             </a:r>
             <a:r>
               <a:rPr lang="zh-CN" altLang="en-US" sz="2300" dirty="0"/>
@@ -15833,7 +18356,7 @@
             </a:r>
             <a:r>
               <a:rPr lang="en-US" altLang="zh-CN" sz="2300" dirty="0"/>
-              <a:t>that</a:t>
+              <a:t>fungi</a:t>
             </a:r>
             <a:r>
               <a:rPr lang="zh-CN" altLang="en-US" sz="2300" dirty="0"/>
@@ -15841,7 +18364,7 @@
             </a:r>
             <a:r>
               <a:rPr lang="en-US" altLang="zh-CN" sz="2300" dirty="0"/>
-              <a:t>one</a:t>
+              <a:t>come</a:t>
             </a:r>
             <a:r>
               <a:rPr lang="zh-CN" altLang="en-US" sz="2300" dirty="0"/>
@@ -15849,7 +18372,165 @@
             </a:r>
             <a:r>
               <a:rPr lang="en-US" altLang="zh-CN" sz="2300" dirty="0"/>
-              <a:t>day</a:t>
+              <a:t>out,</a:t>
+            </a:r>
+            <a:r>
+              <a:rPr lang="zh-CN" altLang="en-US" sz="2300" dirty="0"/>
+              <a:t> </a:t>
+            </a:r>
+            <a:r>
+              <a:rPr lang="en-US" altLang="zh-CN" sz="2300" dirty="0"/>
+              <a:t>but</a:t>
+            </a:r>
+            <a:r>
+              <a:rPr lang="zh-CN" altLang="en-US" sz="2300" dirty="0"/>
+              <a:t> </a:t>
+            </a:r>
+            <a:r>
+              <a:rPr lang="en-US" altLang="zh-CN" sz="2300" dirty="0"/>
+              <a:t>how</a:t>
+            </a:r>
+            <a:r>
+              <a:rPr lang="zh-CN" altLang="en-US" sz="2300" dirty="0"/>
+              <a:t> </a:t>
+            </a:r>
+            <a:r>
+              <a:rPr lang="en-US" altLang="zh-CN" sz="2300" dirty="0"/>
+              <a:t>do</a:t>
+            </a:r>
+            <a:r>
+              <a:rPr lang="zh-CN" altLang="en-US" sz="2300" dirty="0"/>
+              <a:t> </a:t>
+            </a:r>
+            <a:r>
+              <a:rPr lang="en-US" altLang="zh-CN" sz="2300" dirty="0"/>
+              <a:t>we</a:t>
+            </a:r>
+            <a:r>
+              <a:rPr lang="zh-CN" altLang="en-US" sz="2300" dirty="0"/>
+              <a:t> </a:t>
+            </a:r>
+            <a:r>
+              <a:rPr lang="en-US" altLang="zh-CN" sz="2300" dirty="0"/>
+              <a:t>know</a:t>
+            </a:r>
+            <a:r>
+              <a:rPr lang="zh-CN" altLang="en-US" sz="2300" dirty="0"/>
+              <a:t> </a:t>
+            </a:r>
+            <a:r>
+              <a:rPr lang="en-US" altLang="zh-CN" sz="2300" dirty="0"/>
+              <a:t>if</a:t>
+            </a:r>
+            <a:r>
+              <a:rPr lang="zh-CN" altLang="en-US" sz="2300" dirty="0"/>
+              <a:t> </a:t>
+            </a:r>
+            <a:r>
+              <a:rPr lang="en-US" altLang="zh-CN" sz="2300" dirty="0"/>
+              <a:t>we</a:t>
+            </a:r>
+            <a:r>
+              <a:rPr lang="zh-CN" altLang="en-US" sz="2300" dirty="0"/>
+              <a:t> </a:t>
+            </a:r>
+            <a:r>
+              <a:rPr lang="en-US" altLang="zh-CN" sz="2300" dirty="0"/>
+              <a:t>are</a:t>
+            </a:r>
+            <a:r>
+              <a:rPr lang="zh-CN" altLang="en-US" sz="2300" dirty="0"/>
+              <a:t> </a:t>
+            </a:r>
+            <a:r>
+              <a:rPr lang="en-US" altLang="zh-CN" sz="2300" dirty="0"/>
+              <a:t>safe</a:t>
+            </a:r>
+            <a:r>
+              <a:rPr lang="zh-CN" altLang="en-US" sz="2300" dirty="0"/>
+              <a:t> </a:t>
+            </a:r>
+            <a:r>
+              <a:rPr lang="en-US" altLang="zh-CN" sz="2300" dirty="0"/>
+              <a:t>to</a:t>
+            </a:r>
+            <a:r>
+              <a:rPr lang="zh-CN" altLang="en-US" sz="2300" dirty="0"/>
+              <a:t> </a:t>
+            </a:r>
+            <a:r>
+              <a:rPr lang="en-US" altLang="zh-CN" sz="2300" dirty="0"/>
+              <a:t>eat</a:t>
+            </a:r>
+            <a:r>
+              <a:rPr lang="zh-CN" altLang="en-US" sz="2300" dirty="0"/>
+              <a:t> </a:t>
+            </a:r>
+            <a:r>
+              <a:rPr lang="en-US" altLang="zh-CN" sz="2300" dirty="0"/>
+              <a:t>it?</a:t>
+            </a:r>
+          </a:p>
+          <a:p>
+            <a:r>
+              <a:rPr lang="en-US" altLang="zh-CN" sz="2300" dirty="0"/>
+              <a:t>Create</a:t>
+            </a:r>
+            <a:r>
+              <a:rPr lang="zh-CN" altLang="en-US" sz="2300" dirty="0"/>
+              <a:t> </a:t>
+            </a:r>
+            <a:r>
+              <a:rPr lang="en-US" altLang="zh-CN" sz="2300" dirty="0"/>
+              <a:t>an</a:t>
+            </a:r>
+            <a:r>
+              <a:rPr lang="zh-CN" altLang="en-US" sz="2300" dirty="0"/>
+              <a:t> </a:t>
+            </a:r>
+            <a:r>
+              <a:rPr lang="en-US" altLang="zh-CN" sz="2300" dirty="0"/>
+              <a:t>app</a:t>
+            </a:r>
+            <a:r>
+              <a:rPr lang="zh-CN" altLang="en-US" sz="2300" dirty="0"/>
+              <a:t> </a:t>
+            </a:r>
+            <a:r>
+              <a:rPr lang="en-US" altLang="zh-CN" sz="2300" dirty="0"/>
+              <a:t>for</a:t>
+            </a:r>
+            <a:r>
+              <a:rPr lang="zh-CN" altLang="en-US" sz="2300" dirty="0"/>
+              <a:t> </a:t>
+            </a:r>
+            <a:r>
+              <a:rPr lang="en-US" altLang="zh-CN" sz="2300" dirty="0"/>
+              <a:t>people</a:t>
+            </a:r>
+            <a:r>
+              <a:rPr lang="zh-CN" altLang="en-US" sz="2300" dirty="0"/>
+              <a:t> </a:t>
+            </a:r>
+            <a:r>
+              <a:rPr lang="en-US" altLang="zh-CN" sz="2300" dirty="0"/>
+              <a:t>who</a:t>
+            </a:r>
+            <a:r>
+              <a:rPr lang="zh-CN" altLang="en-US" sz="2300" dirty="0"/>
+              <a:t> </a:t>
+            </a:r>
+            <a:r>
+              <a:rPr lang="en-US" altLang="zh-CN" sz="2300" dirty="0"/>
+              <a:t>are</a:t>
+            </a:r>
+            <a:r>
+              <a:rPr lang="zh-CN" altLang="en-US" sz="2300" dirty="0"/>
+              <a:t> </a:t>
+            </a:r>
+            <a:r>
+              <a:rPr lang="en-US" altLang="zh-CN" sz="2300" dirty="0"/>
+              <a:t>interested</a:t>
             </a:r>
             <a:r>
               <a:rPr lang="zh-CN" altLang="en-US" sz="2300" dirty="0"/>
@@ -15865,244 +18546,6 @@
             </a:r>
             <a:r>
               <a:rPr lang="en-US" altLang="zh-CN" sz="2300" dirty="0"/>
-              <a:t>the</a:t>
-            </a:r>
-            <a:r>
-              <a:rPr lang="zh-CN" altLang="en-US" sz="2300" dirty="0"/>
-              <a:t> </a:t>
-            </a:r>
-            <a:r>
-              <a:rPr lang="en-US" altLang="zh-CN" sz="2300" dirty="0"/>
-              <a:t>future</a:t>
-            </a:r>
-            <a:r>
-              <a:rPr lang="zh-CN" altLang="en-US" sz="2300" dirty="0"/>
-              <a:t> </a:t>
-            </a:r>
-            <a:r>
-              <a:rPr lang="en-US" altLang="zh-CN" sz="2300" dirty="0"/>
-              <a:t>there</a:t>
-            </a:r>
-            <a:r>
-              <a:rPr lang="zh-CN" altLang="en-US" sz="2300" dirty="0"/>
-              <a:t> </a:t>
-            </a:r>
-            <a:r>
-              <a:rPr lang="en-US" altLang="zh-CN" sz="2300" dirty="0"/>
-              <a:t>comes</a:t>
-            </a:r>
-            <a:r>
-              <a:rPr lang="zh-CN" altLang="en-US" sz="2300" dirty="0"/>
-              <a:t> </a:t>
-            </a:r>
-            <a:r>
-              <a:rPr lang="en-US" altLang="zh-CN" sz="2300" dirty="0"/>
-              <a:t>a</a:t>
-            </a:r>
-            <a:r>
-              <a:rPr lang="zh-CN" altLang="en-US" sz="2300" dirty="0"/>
-              <a:t> </a:t>
-            </a:r>
-            <a:r>
-              <a:rPr lang="en-US" altLang="zh-CN" sz="2300" dirty="0"/>
-              <a:t>new</a:t>
-            </a:r>
-            <a:r>
-              <a:rPr lang="zh-CN" altLang="en-US" sz="2300" dirty="0"/>
-              <a:t> </a:t>
-            </a:r>
-            <a:r>
-              <a:rPr lang="en-US" altLang="zh-CN" sz="2300" dirty="0"/>
-              <a:t>type</a:t>
-            </a:r>
-            <a:r>
-              <a:rPr lang="zh-CN" altLang="en-US" sz="2300" dirty="0"/>
-              <a:t> </a:t>
-            </a:r>
-            <a:r>
-              <a:rPr lang="en-US" altLang="zh-CN" sz="2300" dirty="0"/>
-              <a:t>of</a:t>
-            </a:r>
-            <a:r>
-              <a:rPr lang="zh-CN" altLang="en-US" sz="2300" dirty="0"/>
-              <a:t> </a:t>
-            </a:r>
-            <a:r>
-              <a:rPr lang="en-US" altLang="zh-CN" sz="2300" dirty="0"/>
-              <a:t>fungi,</a:t>
-            </a:r>
-            <a:r>
-              <a:rPr lang="zh-CN" altLang="en-US" sz="2300" dirty="0"/>
-              <a:t> </a:t>
-            </a:r>
-            <a:r>
-              <a:rPr lang="en-US" altLang="zh-CN" sz="2300" dirty="0"/>
-              <a:t>but</a:t>
-            </a:r>
-            <a:r>
-              <a:rPr lang="zh-CN" altLang="en-US" sz="2300" dirty="0"/>
-              <a:t> </a:t>
-            </a:r>
-            <a:r>
-              <a:rPr lang="en-US" altLang="zh-CN" sz="2300" dirty="0"/>
-              <a:t>how</a:t>
-            </a:r>
-            <a:r>
-              <a:rPr lang="zh-CN" altLang="en-US" sz="2300" dirty="0"/>
-              <a:t> </a:t>
-            </a:r>
-            <a:r>
-              <a:rPr lang="en-US" altLang="zh-CN" sz="2300" dirty="0"/>
-              <a:t>do</a:t>
-            </a:r>
-            <a:r>
-              <a:rPr lang="zh-CN" altLang="en-US" sz="2300" dirty="0"/>
-              <a:t> </a:t>
-            </a:r>
-            <a:r>
-              <a:rPr lang="en-US" altLang="zh-CN" sz="2300" dirty="0"/>
-              <a:t>we</a:t>
-            </a:r>
-            <a:r>
-              <a:rPr lang="zh-CN" altLang="en-US" sz="2300" dirty="0"/>
-              <a:t> </a:t>
-            </a:r>
-            <a:r>
-              <a:rPr lang="en-US" altLang="zh-CN" sz="2300" dirty="0"/>
-              <a:t>know</a:t>
-            </a:r>
-            <a:r>
-              <a:rPr lang="zh-CN" altLang="en-US" sz="2300" dirty="0"/>
-              <a:t> </a:t>
-            </a:r>
-            <a:r>
-              <a:rPr lang="en-US" altLang="zh-CN" sz="2300" dirty="0"/>
-              <a:t>if</a:t>
-            </a:r>
-            <a:r>
-              <a:rPr lang="zh-CN" altLang="en-US" sz="2300" dirty="0"/>
-              <a:t> </a:t>
-            </a:r>
-            <a:r>
-              <a:rPr lang="en-US" altLang="zh-CN" sz="2300" dirty="0"/>
-              <a:t>we</a:t>
-            </a:r>
-            <a:r>
-              <a:rPr lang="zh-CN" altLang="en-US" sz="2300" dirty="0"/>
-              <a:t> </a:t>
-            </a:r>
-            <a:r>
-              <a:rPr lang="en-US" altLang="zh-CN" sz="2300" dirty="0"/>
-              <a:t>are</a:t>
-            </a:r>
-            <a:r>
-              <a:rPr lang="zh-CN" altLang="en-US" sz="2300" dirty="0"/>
-              <a:t> </a:t>
-            </a:r>
-            <a:r>
-              <a:rPr lang="en-US" altLang="zh-CN" sz="2300" dirty="0"/>
-              <a:t>safe</a:t>
-            </a:r>
-            <a:r>
-              <a:rPr lang="zh-CN" altLang="en-US" sz="2300" dirty="0"/>
-              <a:t> </a:t>
-            </a:r>
-            <a:r>
-              <a:rPr lang="en-US" altLang="zh-CN" sz="2300" dirty="0"/>
-              <a:t>to</a:t>
-            </a:r>
-            <a:r>
-              <a:rPr lang="zh-CN" altLang="en-US" sz="2300" dirty="0"/>
-              <a:t> </a:t>
-            </a:r>
-            <a:r>
-              <a:rPr lang="en-US" altLang="zh-CN" sz="2300" dirty="0"/>
-              <a:t>eat</a:t>
-            </a:r>
-            <a:r>
-              <a:rPr lang="zh-CN" altLang="en-US" sz="2300" dirty="0"/>
-              <a:t> </a:t>
-            </a:r>
-            <a:r>
-              <a:rPr lang="en-US" altLang="zh-CN" sz="2300" dirty="0"/>
-              <a:t>it?</a:t>
-            </a:r>
-          </a:p>
-          <a:p>
-            <a:r>
-              <a:rPr lang="en-US" altLang="zh-CN" sz="2300" dirty="0"/>
-              <a:t>Create</a:t>
-            </a:r>
-            <a:r>
-              <a:rPr lang="zh-CN" altLang="en-US" sz="2300" dirty="0"/>
-              <a:t> </a:t>
-            </a:r>
-            <a:r>
-              <a:rPr lang="en-US" altLang="zh-CN" sz="2300" dirty="0"/>
-              <a:t>an</a:t>
-            </a:r>
-            <a:r>
-              <a:rPr lang="zh-CN" altLang="en-US" sz="2300" dirty="0"/>
-              <a:t> </a:t>
-            </a:r>
-            <a:r>
-              <a:rPr lang="en-US" altLang="zh-CN" sz="2300" dirty="0"/>
-              <a:t>app</a:t>
-            </a:r>
-            <a:r>
-              <a:rPr lang="zh-CN" altLang="en-US" sz="2300" dirty="0"/>
-              <a:t> </a:t>
-            </a:r>
-            <a:r>
-              <a:rPr lang="en-US" altLang="zh-CN" sz="2300" dirty="0"/>
-              <a:t>for</a:t>
-            </a:r>
-            <a:r>
-              <a:rPr lang="zh-CN" altLang="en-US" sz="2300" dirty="0"/>
-              <a:t> </a:t>
-            </a:r>
-            <a:r>
-              <a:rPr lang="en-US" altLang="zh-CN" sz="2300" dirty="0"/>
-              <a:t>people</a:t>
-            </a:r>
-            <a:r>
-              <a:rPr lang="zh-CN" altLang="en-US" sz="2300" dirty="0"/>
-              <a:t> </a:t>
-            </a:r>
-            <a:r>
-              <a:rPr lang="en-US" altLang="zh-CN" sz="2300" dirty="0"/>
-              <a:t>who</a:t>
-            </a:r>
-            <a:r>
-              <a:rPr lang="zh-CN" altLang="en-US" sz="2300" dirty="0"/>
-              <a:t> </a:t>
-            </a:r>
-            <a:r>
-              <a:rPr lang="en-US" altLang="zh-CN" sz="2300" dirty="0"/>
-              <a:t>are</a:t>
-            </a:r>
-            <a:r>
-              <a:rPr lang="zh-CN" altLang="en-US" sz="2300" dirty="0"/>
-              <a:t> </a:t>
-            </a:r>
-            <a:r>
-              <a:rPr lang="en-US" altLang="zh-CN" sz="2300" dirty="0"/>
-              <a:t>interested</a:t>
-            </a:r>
-            <a:r>
-              <a:rPr lang="zh-CN" altLang="en-US" sz="2300" dirty="0"/>
-              <a:t> </a:t>
-            </a:r>
-            <a:r>
-              <a:rPr lang="en-US" altLang="zh-CN" sz="2300" dirty="0"/>
-              <a:t>in</a:t>
-            </a:r>
-            <a:r>
-              <a:rPr lang="zh-CN" altLang="en-US" sz="2300" dirty="0"/>
-              <a:t> </a:t>
-            </a:r>
-            <a:r>
-              <a:rPr lang="en-US" altLang="zh-CN" sz="2300" dirty="0"/>
               <a:t>picking</a:t>
             </a:r>
             <a:r>
@@ -16129,6 +18572,11 @@
               <a:rPr lang="en-US" altLang="zh-CN" sz="2300" dirty="0"/>
               <a:t>themselves.</a:t>
             </a:r>
+            <a:r>
+              <a:rPr lang="zh-CN" altLang="en-US" sz="2300" dirty="0"/>
+              <a:t> </a:t>
+            </a:r>
+            <a:endParaRPr lang="en-US" altLang="zh-CN" sz="2300" dirty="0"/>
           </a:p>
           <a:p>
             <a:r>
@@ -16383,8 +18831,8 @@
         </p:nvSpPr>
         <p:spPr>
           <a:xfrm>
-            <a:off x="391886" y="2333297"/>
-            <a:ext cx="5562600" cy="3843666"/>
+            <a:off x="322345" y="2308245"/>
+            <a:ext cx="6529391" cy="3843666"/>
           </a:xfrm>
         </p:spPr>
         <p:txBody>
@@ -16395,7 +18843,7 @@
           <a:p>
             <a:r>
               <a:rPr lang="en-US" altLang="zh-CN" sz="2400" dirty="0"/>
-              <a:t>This</a:t>
+              <a:t>Classification</a:t>
             </a:r>
             <a:r>
               <a:rPr lang="zh-CN" altLang="en-US" sz="2400" dirty="0"/>
@@ -16403,7 +18851,7 @@
             </a:r>
             <a:r>
               <a:rPr lang="en-US" altLang="zh-CN" sz="2400" dirty="0"/>
-              <a:t>dataset</a:t>
+              <a:t>problem</a:t>
             </a:r>
             <a:r>
               <a:rPr lang="zh-CN" altLang="en-US" sz="2400" dirty="0"/>
@@ -16411,7 +18859,7 @@
             </a:r>
             <a:r>
               <a:rPr lang="en-US" altLang="zh-CN" sz="2400" dirty="0"/>
-              <a:t>will</a:t>
+              <a:t>identifying</a:t>
             </a:r>
             <a:r>
               <a:rPr lang="zh-CN" altLang="en-US" sz="2400" dirty="0"/>
@@ -16419,7 +18867,7 @@
             </a:r>
             <a:r>
               <a:rPr lang="en-US" altLang="zh-CN" sz="2400" dirty="0"/>
-              <a:t>be</a:t>
+              <a:t>if</a:t>
             </a:r>
             <a:r>
               <a:rPr lang="zh-CN" altLang="en-US" sz="2400" dirty="0"/>
@@ -16435,46 +18883,6 @@
             </a:r>
             <a:r>
               <a:rPr lang="en-US" altLang="zh-CN" sz="2400" dirty="0"/>
-              <a:t>classification</a:t>
-            </a:r>
-            <a:r>
-              <a:rPr lang="zh-CN" altLang="en-US" sz="2400" dirty="0"/>
-              <a:t> </a:t>
-            </a:r>
-            <a:r>
-              <a:rPr lang="en-US" altLang="zh-CN" sz="2400" dirty="0"/>
-              <a:t>problem</a:t>
-            </a:r>
-            <a:r>
-              <a:rPr lang="zh-CN" altLang="en-US" sz="2400" dirty="0"/>
-              <a:t> </a:t>
-            </a:r>
-            <a:r>
-              <a:rPr lang="en-US" altLang="zh-CN" sz="2400" dirty="0"/>
-              <a:t>identifying</a:t>
-            </a:r>
-            <a:r>
-              <a:rPr lang="zh-CN" altLang="en-US" sz="2400" dirty="0"/>
-              <a:t> </a:t>
-            </a:r>
-            <a:r>
-              <a:rPr lang="en-US" altLang="zh-CN" sz="2400" dirty="0"/>
-              <a:t>if</a:t>
-            </a:r>
-            <a:r>
-              <a:rPr lang="zh-CN" altLang="en-US" sz="2400" dirty="0"/>
-              <a:t> </a:t>
-            </a:r>
-            <a:r>
-              <a:rPr lang="en-US" altLang="zh-CN" sz="2400" dirty="0"/>
-              <a:t>a</a:t>
-            </a:r>
-            <a:r>
-              <a:rPr lang="zh-CN" altLang="en-US" sz="2400" dirty="0"/>
-              <a:t> </a:t>
-            </a:r>
-            <a:r>
-              <a:rPr lang="en-US" altLang="zh-CN" sz="2400" dirty="0"/>
               <a:t>new</a:t>
             </a:r>
             <a:r>
@@ -16517,11 +18925,16 @@
               <a:rPr lang="en-US" altLang="zh-CN" sz="2400" dirty="0"/>
               <a:t>not.</a:t>
             </a:r>
+            <a:r>
+              <a:rPr lang="zh-CN" altLang="en-US" sz="2400" dirty="0"/>
+              <a:t> </a:t>
+            </a:r>
+            <a:endParaRPr lang="en-US" altLang="zh-CN" sz="2400" dirty="0"/>
           </a:p>
           <a:p>
             <a:r>
               <a:rPr lang="en-US" altLang="zh-CN" sz="2400" dirty="0"/>
-              <a:t>I</a:t>
+              <a:t>‘class’</a:t>
             </a:r>
             <a:r>
               <a:rPr lang="zh-CN" altLang="en-US" sz="2400" dirty="0"/>
@@ -16529,7 +18942,7 @@
             </a:r>
             <a:r>
               <a:rPr lang="en-US" altLang="zh-CN" sz="2400" dirty="0"/>
-              <a:t>get</a:t>
+              <a:t>feature</a:t>
             </a:r>
             <a:r>
               <a:rPr lang="zh-CN" altLang="en-US" sz="2400" dirty="0"/>
@@ -16537,7 +18950,7 @@
             </a:r>
             <a:r>
               <a:rPr lang="en-US" altLang="zh-CN" sz="2400" dirty="0"/>
-              <a:t>this</a:t>
+              <a:t>as</a:t>
             </a:r>
             <a:r>
               <a:rPr lang="zh-CN" altLang="en-US" sz="2400" dirty="0"/>
@@ -16545,7 +18958,21 @@
             </a:r>
             <a:r>
               <a:rPr lang="en-US" altLang="zh-CN" sz="2400" dirty="0"/>
-              <a:t>data</a:t>
+              <a:t>target</a:t>
+            </a:r>
+            <a:r>
+              <a:rPr lang="zh-CN" altLang="en-US" sz="2400" dirty="0"/>
+              <a:t> </a:t>
+            </a:r>
+            <a:r>
+              <a:rPr lang="en-US" altLang="zh-CN" sz="2400" dirty="0"/>
+              <a:t>variable.</a:t>
+            </a:r>
+          </a:p>
+          <a:p>
+            <a:r>
+              <a:rPr lang="en-US" altLang="zh-CN" sz="2400" dirty="0"/>
+              <a:t>Data</a:t>
             </a:r>
             <a:r>
               <a:rPr lang="zh-CN" altLang="en-US" sz="2400" dirty="0"/>
@@ -16571,6 +18998,38 @@
             </a:r>
             <a:r>
               <a:rPr lang="en-US" altLang="zh-CN" sz="2400" dirty="0"/>
+              <a:t>collected</a:t>
+            </a:r>
+            <a:r>
+              <a:rPr lang="zh-CN" altLang="en-US" sz="2400" dirty="0"/>
+              <a:t> </a:t>
+            </a:r>
+            <a:r>
+              <a:rPr lang="en-US" altLang="zh-CN" sz="2400" dirty="0"/>
+              <a:t>from</a:t>
+            </a:r>
+            <a:r>
+              <a:rPr lang="zh-CN" altLang="en-US" sz="2400" dirty="0"/>
+              <a:t> </a:t>
+            </a:r>
+            <a:r>
+              <a:rPr lang="en-US" altLang="zh-CN" sz="2400" dirty="0"/>
+              <a:t>Patrick Hardin’s</a:t>
+            </a:r>
+            <a:r>
+              <a:rPr lang="zh-CN" altLang="en-US" sz="2400" dirty="0"/>
+              <a:t> </a:t>
+            </a:r>
+            <a:r>
+              <a:rPr lang="en-US" altLang="zh-CN" sz="2400" dirty="0"/>
+              <a:t>Mushrooms &amp; Toadstools,</a:t>
+            </a:r>
+            <a:r>
+              <a:rPr lang="zh-CN" altLang="en-US" sz="2400" dirty="0"/>
+              <a:t> </a:t>
+            </a:r>
+            <a:r>
+              <a:rPr lang="en-US" altLang="zh-CN" sz="2400" dirty="0"/>
               <a:t>and</a:t>
             </a:r>
             <a:r>
@@ -16579,7 +19038,7 @@
             </a:r>
             <a:r>
               <a:rPr lang="en-US" altLang="zh-CN" sz="2400" dirty="0"/>
-              <a:t>it</a:t>
+              <a:t>inspired</a:t>
             </a:r>
             <a:r>
               <a:rPr lang="zh-CN" altLang="en-US" sz="2400" dirty="0"/>
@@ -16587,7 +19046,7 @@
             </a:r>
             <a:r>
               <a:rPr lang="en-US" altLang="zh-CN" sz="2400" dirty="0"/>
-              <a:t>was</a:t>
+              <a:t>by</a:t>
             </a:r>
             <a:r>
               <a:rPr lang="zh-CN" altLang="en-US" sz="2400" dirty="0"/>
@@ -16595,7 +19054,65 @@
             </a:r>
             <a:r>
               <a:rPr lang="en-US" altLang="zh-CN" sz="2400" dirty="0"/>
-              <a:t>includes 61069 hypothetical mushrooms with caps based on 173 species.</a:t>
+              <a:t>Jeff </a:t>
+            </a:r>
+            <a:r>
+              <a:rPr lang="en-US" altLang="zh-CN" sz="2400" dirty="0" err="1"/>
+              <a:t>Schlimmer’s</a:t>
+            </a:r>
+            <a:r>
+              <a:rPr lang="zh-CN" altLang="en-US" sz="2400" dirty="0"/>
+              <a:t> </a:t>
+            </a:r>
+            <a:r>
+              <a:rPr lang="en-US" altLang="zh-CN" sz="2400" dirty="0"/>
+              <a:t>Mushroom Data Set.</a:t>
+            </a:r>
+          </a:p>
+          <a:p>
+            <a:r>
+              <a:rPr lang="en-US" altLang="zh-CN" sz="2400" dirty="0"/>
+              <a:t>Original</a:t>
+            </a:r>
+            <a:r>
+              <a:rPr lang="zh-CN" altLang="en-US" sz="2400" dirty="0"/>
+              <a:t> </a:t>
+            </a:r>
+            <a:r>
+              <a:rPr lang="en-US" altLang="zh-CN" sz="2400" dirty="0"/>
+              <a:t>Data:</a:t>
+            </a:r>
+            <a:r>
+              <a:rPr lang="zh-CN" altLang="en-US" sz="2400" dirty="0"/>
+              <a:t> </a:t>
+            </a:r>
+            <a:r>
+              <a:rPr lang="en-US" altLang="zh-CN" sz="2400" dirty="0"/>
+              <a:t>61069</a:t>
+            </a:r>
+            <a:r>
+              <a:rPr lang="zh-CN" altLang="en-US" sz="2400" dirty="0"/>
+              <a:t> </a:t>
+            </a:r>
+            <a:r>
+              <a:rPr lang="en-US" altLang="zh-CN" sz="2400" dirty="0"/>
+              <a:t>rows,</a:t>
+            </a:r>
+            <a:r>
+              <a:rPr lang="zh-CN" altLang="en-US" sz="2400" dirty="0"/>
+              <a:t> </a:t>
+            </a:r>
+            <a:r>
+              <a:rPr lang="en-US" altLang="zh-CN" sz="2400" dirty="0"/>
+              <a:t>21</a:t>
+            </a:r>
+            <a:r>
+              <a:rPr lang="zh-CN" altLang="en-US" sz="2400" dirty="0"/>
+              <a:t> </a:t>
+            </a:r>
+            <a:r>
+              <a:rPr lang="en-US" altLang="zh-CN" sz="2400" dirty="0"/>
+              <a:t>columns.</a:t>
             </a:r>
             <a:endParaRPr lang="en-US" sz="2400" dirty="0"/>
           </a:p>
@@ -16628,7 +19145,7 @@
         </p:blipFill>
         <p:spPr>
           <a:xfrm>
-            <a:off x="5874226" y="10"/>
+            <a:off x="6502449" y="10"/>
             <a:ext cx="6706612" cy="6857990"/>
           </a:xfrm>
           <a:custGeom>
@@ -17172,36 +19689,6 @@
       </p:sp>
       <p:pic>
         <p:nvPicPr>
-          <p:cNvPr id="5" name="Picture 4" descr="A graph with green and pink bars&#10;&#10;Description automatically generated">
-            <a:extLst>
-              <a:ext uri="{FF2B5EF4-FFF2-40B4-BE49-F238E27FC236}">
-                <a16:creationId xmlns:a16="http://schemas.microsoft.com/office/drawing/2014/main" id="{196BC289-8626-6983-891D-700161BEC8A5}"/>
-              </a:ext>
-            </a:extLst>
-          </p:cNvPr>
-          <p:cNvPicPr>
-            <a:picLocks noChangeAspect="1"/>
-          </p:cNvPicPr>
-          <p:nvPr/>
-        </p:nvPicPr>
-        <p:blipFill>
-          <a:blip r:embed="rId2"/>
-          <a:stretch>
-            <a:fillRect/>
-          </a:stretch>
-        </p:blipFill>
-        <p:spPr>
-          <a:xfrm>
-            <a:off x="2949200" y="1430590"/>
-            <a:ext cx="7385286" cy="5334643"/>
-          </a:xfrm>
-          <a:prstGeom prst="rect">
-            <a:avLst/>
-          </a:prstGeom>
-        </p:spPr>
-      </p:pic>
-      <p:pic>
-        <p:nvPicPr>
           <p:cNvPr id="2050" name="Picture 2" descr="Buff Color HEX Code: #f0dc82">
             <a:extLst>
               <a:ext uri="{FF2B5EF4-FFF2-40B4-BE49-F238E27FC236}">
@@ -17215,7 +19702,7 @@
           <p:nvPr/>
         </p:nvPicPr>
         <p:blipFill rotWithShape="1">
-          <a:blip r:embed="rId3">
+          <a:blip r:embed="rId2">
             <a:extLst>
               <a:ext uri="{28A0092B-C50C-407E-A947-70E740481C1C}">
                 <a14:useLocalDpi xmlns:a14="http://schemas.microsoft.com/office/drawing/2010/main" val="0"/>
@@ -17260,7 +19747,7 @@
           <p:nvPr/>
         </p:nvPicPr>
         <p:blipFill>
-          <a:blip r:embed="rId4">
+          <a:blip r:embed="rId3">
             <a:extLst>
               <a:ext uri="{28A0092B-C50C-407E-A947-70E740481C1C}">
                 <a14:useLocalDpi xmlns:a14="http://schemas.microsoft.com/office/drawing/2010/main" val="0"/>
@@ -17307,7 +19794,7 @@
           <p:nvPr/>
         </p:nvPicPr>
         <p:blipFill rotWithShape="1">
-          <a:blip r:embed="rId5">
+          <a:blip r:embed="rId4">
             <a:extLst>
               <a:ext uri="{28A0092B-C50C-407E-A947-70E740481C1C}">
                 <a14:useLocalDpi xmlns:a14="http://schemas.microsoft.com/office/drawing/2010/main" val="0"/>
@@ -17335,6 +19822,36 @@
               </a14:hiddenFill>
             </a:ext>
           </a:extLst>
+        </p:spPr>
+      </p:pic>
+      <p:pic>
+        <p:nvPicPr>
+          <p:cNvPr id="10" name="Picture 9" descr="A graph with green and pink bars&#10;&#10;Description automatically generated">
+            <a:extLst>
+              <a:ext uri="{FF2B5EF4-FFF2-40B4-BE49-F238E27FC236}">
+                <a16:creationId xmlns:a16="http://schemas.microsoft.com/office/drawing/2014/main" id="{984A74E1-005A-3CBB-64DB-6D8AC1481F98}"/>
+              </a:ext>
+            </a:extLst>
+          </p:cNvPr>
+          <p:cNvPicPr>
+            <a:picLocks noChangeAspect="1"/>
+          </p:cNvPicPr>
+          <p:nvPr/>
+        </p:nvPicPr>
+        <p:blipFill>
+          <a:blip r:embed="rId5"/>
+          <a:stretch>
+            <a:fillRect/>
+          </a:stretch>
+        </p:blipFill>
+        <p:spPr>
+          <a:xfrm>
+            <a:off x="2819732" y="1284761"/>
+            <a:ext cx="7514754" cy="5428162"/>
+          </a:xfrm>
+          <a:prstGeom prst="rect">
+            <a:avLst/>
+          </a:prstGeom>
         </p:spPr>
       </p:pic>
     </p:spTree>
@@ -17409,36 +19926,6 @@
       </p:sp>
       <p:pic>
         <p:nvPicPr>
-          <p:cNvPr id="7" name="Picture 6" descr="A graph of green and pink bars&#10;&#10;Description automatically generated">
-            <a:extLst>
-              <a:ext uri="{FF2B5EF4-FFF2-40B4-BE49-F238E27FC236}">
-                <a16:creationId xmlns:a16="http://schemas.microsoft.com/office/drawing/2014/main" id="{4AB79231-2146-EB72-914C-D53E2BC3AE75}"/>
-              </a:ext>
-            </a:extLst>
-          </p:cNvPr>
-          <p:cNvPicPr>
-            <a:picLocks noChangeAspect="1"/>
-          </p:cNvPicPr>
-          <p:nvPr/>
-        </p:nvPicPr>
-        <p:blipFill>
-          <a:blip r:embed="rId2"/>
-          <a:stretch>
-            <a:fillRect/>
-          </a:stretch>
-        </p:blipFill>
-        <p:spPr>
-          <a:xfrm>
-            <a:off x="2205520" y="1232508"/>
-            <a:ext cx="7780959" cy="5260367"/>
-          </a:xfrm>
-          <a:prstGeom prst="rect">
-            <a:avLst/>
-          </a:prstGeom>
-        </p:spPr>
-      </p:pic>
-      <p:pic>
-        <p:nvPicPr>
           <p:cNvPr id="3074" name="Picture 2" descr="Urban Fungus Gallery—and ID challenge! - WNPS Blog - Botanical Rambles">
             <a:extLst>
               <a:ext uri="{FF2B5EF4-FFF2-40B4-BE49-F238E27FC236}">
@@ -17452,7 +19939,7 @@
           <p:nvPr/>
         </p:nvPicPr>
         <p:blipFill>
-          <a:blip r:embed="rId3">
+          <a:blip r:embed="rId2">
             <a:extLst>
               <a:ext uri="{28A0092B-C50C-407E-A947-70E740481C1C}">
                 <a14:useLocalDpi xmlns:a14="http://schemas.microsoft.com/office/drawing/2010/main" val="0"/>
@@ -17482,6 +19969,36 @@
               </a14:hiddenFill>
             </a:ext>
           </a:extLst>
+        </p:spPr>
+      </p:pic>
+      <p:pic>
+        <p:nvPicPr>
+          <p:cNvPr id="9" name="Picture 8" descr="A graph of green and pink bars&#10;&#10;Description automatically generated">
+            <a:extLst>
+              <a:ext uri="{FF2B5EF4-FFF2-40B4-BE49-F238E27FC236}">
+                <a16:creationId xmlns:a16="http://schemas.microsoft.com/office/drawing/2014/main" id="{53AD433E-113D-B8F2-B694-E65D4779C55F}"/>
+              </a:ext>
+            </a:extLst>
+          </p:cNvPr>
+          <p:cNvPicPr>
+            <a:picLocks noChangeAspect="1"/>
+          </p:cNvPicPr>
+          <p:nvPr/>
+        </p:nvPicPr>
+        <p:blipFill>
+          <a:blip r:embed="rId3"/>
+          <a:stretch>
+            <a:fillRect/>
+          </a:stretch>
+        </p:blipFill>
+        <p:spPr>
+          <a:xfrm>
+            <a:off x="2226066" y="1258293"/>
+            <a:ext cx="8282900" cy="5599707"/>
+          </a:xfrm>
+          <a:prstGeom prst="rect">
+            <a:avLst/>
+          </a:prstGeom>
         </p:spPr>
       </p:pic>
     </p:spTree>
@@ -17570,8 +20087,8 @@
         </p:blipFill>
         <p:spPr>
           <a:xfrm>
-            <a:off x="3561844" y="1470516"/>
-            <a:ext cx="7791956" cy="5194637"/>
+            <a:off x="3436583" y="1249308"/>
+            <a:ext cx="8413039" cy="5608692"/>
           </a:xfrm>
           <a:prstGeom prst="rect">
             <a:avLst/>
@@ -17860,7 +20377,7 @@
             </a:r>
             <a:r>
               <a:rPr lang="en-US" altLang="zh-CN" dirty="0"/>
-              <a:t>15%</a:t>
+              <a:t>20%</a:t>
             </a:r>
             <a:r>
               <a:rPr lang="zh-CN" altLang="en-US" dirty="0"/>
@@ -17940,7 +20457,7 @@
             </a:r>
             <a:r>
               <a:rPr lang="en-US" altLang="zh-CN" dirty="0"/>
-              <a:t>85%</a:t>
+              <a:t>80%</a:t>
             </a:r>
             <a:r>
               <a:rPr lang="zh-CN" altLang="en-US" dirty="0"/>
@@ -18017,7 +20534,15 @@
             </a:r>
             <a:r>
               <a:rPr lang="en-US" dirty="0"/>
-              <a:t>(51908, 20), </a:t>
+              <a:t>(</a:t>
+            </a:r>
+            <a:r>
+              <a:rPr lang="en-US" altLang="zh-CN" dirty="0"/>
+              <a:t>48855</a:t>
+            </a:r>
+            <a:r>
+              <a:rPr lang="en-US" dirty="0"/>
+              <a:t>, 20), </a:t>
             </a:r>
             <a:r>
               <a:rPr lang="en-US" b="1" dirty="0" err="1"/>
@@ -18029,7 +20554,15 @@
             </a:r>
             <a:r>
               <a:rPr lang="en-US" dirty="0"/>
-              <a:t>(9161, 20) </a:t>
+              <a:t>(</a:t>
+            </a:r>
+            <a:r>
+              <a:rPr lang="en-US" altLang="zh-CN" dirty="0"/>
+              <a:t>12214</a:t>
+            </a:r>
+            <a:r>
+              <a:rPr lang="en-US" dirty="0"/>
+              <a:t>, 20) </a:t>
             </a:r>
             <a:br>
               <a:rPr lang="en-US" dirty="0"/>
@@ -18044,7 +20577,15 @@
             </a:r>
             <a:r>
               <a:rPr lang="en-US" dirty="0"/>
-              <a:t>(51908,)</a:t>
+              <a:t>(</a:t>
+            </a:r>
+            <a:r>
+              <a:rPr lang="en-US" altLang="zh-CN" dirty="0"/>
+              <a:t>48855</a:t>
+            </a:r>
+            <a:r>
+              <a:rPr lang="en-US" dirty="0"/>
+              <a:t>,)</a:t>
             </a:r>
             <a:r>
               <a:rPr lang="zh-CN" altLang="en-US" dirty="0"/>
@@ -18064,7 +20605,15 @@
             </a:r>
             <a:r>
               <a:rPr lang="en-US" dirty="0"/>
-              <a:t>(9161,)</a:t>
+              <a:t>(</a:t>
+            </a:r>
+            <a:r>
+              <a:rPr lang="en-US" altLang="zh-CN" dirty="0"/>
+              <a:t>12214</a:t>
+            </a:r>
+            <a:r>
+              <a:rPr lang="en-US" dirty="0"/>
+              <a:t>,)</a:t>
             </a:r>
           </a:p>
         </p:txBody>
@@ -18146,7 +20695,7 @@
         </p:nvSpPr>
         <p:spPr>
           <a:xfrm>
-            <a:off x="598004" y="1690688"/>
+            <a:off x="472744" y="1690688"/>
             <a:ext cx="11593996" cy="4356652"/>
           </a:xfrm>
         </p:spPr>
@@ -18226,23 +20775,31 @@
               <a:t> </a:t>
             </a:r>
             <a:r>
-              <a:rPr lang="en-US" altLang="zh-CN" dirty="0"/>
+              <a:rPr lang="en-US" altLang="zh-CN" b="1" dirty="0"/>
               <a:t>one-hot</a:t>
             </a:r>
             <a:r>
+              <a:rPr lang="zh-CN" altLang="en-US" b="1" dirty="0"/>
+              <a:t> </a:t>
+            </a:r>
+            <a:r>
+              <a:rPr lang="en-US" altLang="zh-CN" b="1" dirty="0"/>
+              <a:t>encoder</a:t>
+            </a:r>
+            <a:br>
+              <a:rPr lang="en-US" altLang="zh-CN" dirty="0"/>
+            </a:br>
+            <a:r>
+              <a:rPr lang="en-US" altLang="zh-CN" dirty="0"/>
+              <a:t>	(ii)</a:t>
+            </a:r>
+            <a:r>
               <a:rPr lang="zh-CN" altLang="en-US" dirty="0"/>
               <a:t> </a:t>
             </a:r>
             <a:r>
               <a:rPr lang="en-US" altLang="zh-CN" dirty="0"/>
-              <a:t>encoder</a:t>
-            </a:r>
-            <a:br>
-              <a:rPr lang="en-US" altLang="zh-CN" dirty="0"/>
-            </a:br>
-            <a:r>
-              <a:rPr lang="en-US" altLang="zh-CN" dirty="0"/>
-              <a:t>	(ii)</a:t>
+              <a:t>Continuous</a:t>
             </a:r>
             <a:r>
               <a:rPr lang="zh-CN" altLang="en-US" dirty="0"/>
@@ -18250,37 +20807,29 @@
             </a:r>
             <a:r>
               <a:rPr lang="en-US" altLang="zh-CN" dirty="0"/>
-              <a:t>Continuous</a:t>
+              <a:t>features:</a:t>
             </a:r>
             <a:r>
               <a:rPr lang="zh-CN" altLang="en-US" dirty="0"/>
               <a:t> </a:t>
             </a:r>
             <a:r>
-              <a:rPr lang="en-US" altLang="zh-CN" dirty="0"/>
-              <a:t>features:</a:t>
-            </a:r>
-            <a:r>
-              <a:rPr lang="zh-CN" altLang="en-US" dirty="0"/>
-              <a:t> </a:t>
-            </a:r>
-            <a:r>
-              <a:rPr lang="en-US" altLang="zh-CN" dirty="0"/>
+              <a:rPr lang="en-US" altLang="zh-CN" b="1" dirty="0"/>
               <a:t>Standard</a:t>
             </a:r>
             <a:r>
-              <a:rPr lang="zh-CN" altLang="en-US" dirty="0"/>
-              <a:t> </a:t>
-            </a:r>
-            <a:r>
-              <a:rPr lang="en-US" altLang="zh-CN" dirty="0"/>
+              <a:rPr lang="zh-CN" altLang="en-US" b="1" dirty="0"/>
+              <a:t> </a:t>
+            </a:r>
+            <a:r>
+              <a:rPr lang="en-US" altLang="zh-CN" b="1" dirty="0"/>
               <a:t>Scalar</a:t>
             </a:r>
           </a:p>
           <a:p>
             <a:r>
               <a:rPr lang="en-US" altLang="zh-CN" dirty="0"/>
-              <a:t>The</a:t>
+              <a:t>Most</a:t>
             </a:r>
             <a:r>
               <a:rPr lang="zh-CN" altLang="en-US" dirty="0"/>
@@ -18288,7 +20837,7 @@
             </a:r>
             <a:r>
               <a:rPr lang="en-US" altLang="zh-CN" dirty="0"/>
-              <a:t>continuous</a:t>
+              <a:t>of</a:t>
             </a:r>
             <a:r>
               <a:rPr lang="zh-CN" altLang="en-US" dirty="0"/>
@@ -18296,6 +20845,14 @@
             </a:r>
             <a:r>
               <a:rPr lang="en-US" altLang="zh-CN" dirty="0"/>
+              <a:t>the</a:t>
+            </a:r>
+            <a:r>
+              <a:rPr lang="zh-CN" altLang="en-US" dirty="0"/>
+              <a:t> </a:t>
+            </a:r>
+            <a:r>
+              <a:rPr lang="en-US" altLang="zh-CN" dirty="0"/>
               <a:t>features</a:t>
             </a:r>
             <a:r>
@@ -18312,7 +20869,7 @@
             </a:r>
             <a:r>
               <a:rPr lang="en-US" altLang="zh-CN" dirty="0"/>
-              <a:t>heavy</a:t>
+              <a:t>categorical</a:t>
             </a:r>
             <a:r>
               <a:rPr lang="zh-CN" altLang="en-US" dirty="0"/>
@@ -18320,7 +20877,7 @@
             </a:r>
             <a:r>
               <a:rPr lang="en-US" altLang="zh-CN" dirty="0"/>
-              <a:t>tailed,</a:t>
+              <a:t>data</a:t>
             </a:r>
             <a:r>
               <a:rPr lang="zh-CN" altLang="en-US" dirty="0"/>
@@ -18328,7 +20885,7 @@
             </a:r>
             <a:r>
               <a:rPr lang="en-US" altLang="zh-CN" dirty="0"/>
-              <a:t>thus</a:t>
+              <a:t>and</a:t>
             </a:r>
             <a:r>
               <a:rPr lang="zh-CN" altLang="en-US" dirty="0"/>
@@ -18336,7 +20893,14 @@
             </a:r>
             <a:r>
               <a:rPr lang="en-US" altLang="zh-CN" dirty="0"/>
-              <a:t>choose</a:t>
+              <a:t>unordered:</a:t>
+            </a:r>
+            <a:br>
+              <a:rPr lang="en-US" altLang="zh-CN" dirty="0"/>
+            </a:br>
+            <a:r>
+              <a:rPr lang="en-US" altLang="zh-CN" dirty="0"/>
+              <a:t>e.g.</a:t>
             </a:r>
             <a:r>
               <a:rPr lang="zh-CN" altLang="en-US" dirty="0"/>
@@ -18344,7 +20908,7 @@
             </a:r>
             <a:r>
               <a:rPr lang="en-US" altLang="zh-CN" dirty="0"/>
-              <a:t>standard</a:t>
+              <a:t>color,</a:t>
             </a:r>
             <a:r>
               <a:rPr lang="zh-CN" altLang="en-US" dirty="0"/>
@@ -18352,41 +20916,128 @@
             </a:r>
             <a:r>
               <a:rPr lang="en-US" altLang="zh-CN" dirty="0"/>
-              <a:t>scalar</a:t>
-            </a:r>
+              <a:t>shape,</a:t>
+            </a:r>
+            <a:r>
+              <a:rPr lang="zh-CN" altLang="en-US" dirty="0"/>
+              <a:t> </a:t>
+            </a:r>
+            <a:r>
+              <a:rPr lang="en-US" altLang="zh-CN" dirty="0"/>
+              <a:t>surface,</a:t>
+            </a:r>
+            <a:r>
+              <a:rPr lang="zh-CN" altLang="en-US" dirty="0"/>
+              <a:t> </a:t>
+            </a:r>
+            <a:r>
+              <a:rPr lang="en-US" altLang="zh-CN" dirty="0"/>
+              <a:t>etc.</a:t>
+            </a:r>
+          </a:p>
+          <a:p>
+            <a:r>
+              <a:rPr lang="en-US" altLang="zh-CN" dirty="0"/>
+              <a:t>Two</a:t>
+            </a:r>
+            <a:r>
+              <a:rPr lang="zh-CN" altLang="en-US" dirty="0"/>
+              <a:t> </a:t>
+            </a:r>
+            <a:r>
+              <a:rPr lang="en-US" altLang="zh-CN" dirty="0"/>
+              <a:t>binary</a:t>
+            </a:r>
+            <a:r>
+              <a:rPr lang="zh-CN" altLang="en-US" dirty="0"/>
+              <a:t> </a:t>
+            </a:r>
+            <a:r>
+              <a:rPr lang="en-US" altLang="zh-CN" dirty="0"/>
+              <a:t>features</a:t>
+            </a:r>
+            <a:r>
+              <a:rPr lang="zh-CN" altLang="en-US" dirty="0"/>
+              <a:t> </a:t>
+            </a:r>
+            <a:r>
+              <a:rPr lang="en-US" altLang="zh-CN" dirty="0"/>
+              <a:t>-</a:t>
+            </a:r>
+            <a:r>
+              <a:rPr lang="zh-CN" altLang="en-US" dirty="0"/>
+              <a:t> </a:t>
+            </a:r>
+            <a:r>
+              <a:rPr lang="en-US" altLang="zh-CN" b="1" dirty="0"/>
+              <a:t>does-bruise-or-bleed</a:t>
+            </a:r>
+            <a:r>
+              <a:rPr lang="zh-CN" altLang="en-US" dirty="0"/>
+              <a:t> </a:t>
+            </a:r>
+            <a:r>
+              <a:rPr lang="en-US" altLang="zh-CN" dirty="0"/>
+              <a:t>and </a:t>
+            </a:r>
+            <a:r>
+              <a:rPr lang="en-US" altLang="zh-CN" b="1" dirty="0"/>
+              <a:t>has-ring</a:t>
+            </a:r>
+            <a:r>
+              <a:rPr lang="zh-CN" altLang="en-US" dirty="0"/>
+              <a:t> </a:t>
+            </a:r>
+            <a:r>
+              <a:rPr lang="en-US" altLang="zh-CN" dirty="0"/>
+              <a:t>–</a:t>
+            </a:r>
+            <a:r>
+              <a:rPr lang="zh-CN" altLang="en-US" dirty="0"/>
+              <a:t> </a:t>
+            </a:r>
+            <a:r>
+              <a:rPr lang="en-US" altLang="zh-CN" dirty="0"/>
+              <a:t>will</a:t>
+            </a:r>
+            <a:r>
+              <a:rPr lang="zh-CN" altLang="en-US" dirty="0"/>
+              <a:t> </a:t>
+            </a:r>
+            <a:r>
+              <a:rPr lang="en-US" altLang="zh-CN" dirty="0"/>
+              <a:t>not</a:t>
+            </a:r>
+            <a:r>
+              <a:rPr lang="zh-CN" altLang="en-US" dirty="0"/>
+              <a:t> </a:t>
+            </a:r>
+            <a:r>
+              <a:rPr lang="en-US" altLang="zh-CN" dirty="0"/>
+              <a:t>perform</a:t>
+            </a:r>
+            <a:r>
+              <a:rPr lang="zh-CN" altLang="en-US" dirty="0"/>
+              <a:t> </a:t>
+            </a:r>
+            <a:r>
+              <a:rPr lang="en-US" altLang="zh-CN" dirty="0"/>
+              <a:t>any</a:t>
+            </a:r>
+            <a:r>
+              <a:rPr lang="zh-CN" altLang="en-US" dirty="0"/>
+              <a:t> </a:t>
+            </a:r>
+            <a:r>
+              <a:rPr lang="en-US" altLang="zh-CN" dirty="0"/>
+              <a:t>encoders</a:t>
+            </a:r>
+          </a:p>
+          <a:p>
+            <a:endParaRPr lang="en-US" altLang="zh-CN" dirty="0"/>
           </a:p>
         </p:txBody>
       </p:sp>
-      <p:pic>
-        <p:nvPicPr>
-          <p:cNvPr id="7" name="Picture 6" descr="A graph of a height&#10;&#10;Description automatically generated with medium confidence">
-            <a:extLst>
-              <a:ext uri="{FF2B5EF4-FFF2-40B4-BE49-F238E27FC236}">
-                <a16:creationId xmlns:a16="http://schemas.microsoft.com/office/drawing/2014/main" id="{2994E964-15A5-6E4F-4D18-0CE6E8F07658}"/>
-              </a:ext>
-            </a:extLst>
-          </p:cNvPr>
-          <p:cNvPicPr>
-            <a:picLocks noChangeAspect="1"/>
-          </p:cNvPicPr>
-          <p:nvPr/>
-        </p:nvPicPr>
-        <p:blipFill>
-          <a:blip r:embed="rId2"/>
-          <a:stretch>
-            <a:fillRect/>
-          </a:stretch>
-        </p:blipFill>
-        <p:spPr>
-          <a:xfrm>
-            <a:off x="2125707" y="3816626"/>
-            <a:ext cx="9772536" cy="2948609"/>
-          </a:xfrm>
-          <a:prstGeom prst="rect">
-            <a:avLst/>
-          </a:prstGeom>
-        </p:spPr>
-      </p:pic>
     </p:spTree>
     <p:extLst>
       <p:ext uri="{BB962C8B-B14F-4D97-AF65-F5344CB8AC3E}">
@@ -18422,7 +21073,7 @@
           <p:cNvPr id="2" name="Title 1">
             <a:extLst>
               <a:ext uri="{FF2B5EF4-FFF2-40B4-BE49-F238E27FC236}">
-                <a16:creationId xmlns:a16="http://schemas.microsoft.com/office/drawing/2014/main" id="{73DF73C2-E9E7-EAB9-C4D1-11F2C4A31997}"/>
+                <a16:creationId xmlns:a16="http://schemas.microsoft.com/office/drawing/2014/main" id="{9F59E464-85BB-22A4-64BE-02CFE86CA7AC}"/>
               </a:ext>
             </a:extLst>
           </p:cNvPr>
@@ -18440,7 +21091,7 @@
           <a:p>
             <a:r>
               <a:rPr lang="en-US" dirty="0"/>
-              <a:t>After</a:t>
+              <a:t>Standard</a:t>
             </a:r>
             <a:r>
               <a:rPr lang="zh-CN" altLang="en-US" dirty="0"/>
@@ -18448,23 +21099,7 @@
             </a:r>
             <a:r>
               <a:rPr lang="en-US" altLang="zh-CN" dirty="0"/>
-              <a:t>Splitting</a:t>
-            </a:r>
-            <a:r>
-              <a:rPr lang="zh-CN" altLang="en-US" dirty="0"/>
-              <a:t> </a:t>
-            </a:r>
-            <a:r>
-              <a:rPr lang="en-US" altLang="zh-CN" dirty="0"/>
-              <a:t>and</a:t>
-            </a:r>
-            <a:r>
-              <a:rPr lang="zh-CN" altLang="en-US" dirty="0"/>
-              <a:t> </a:t>
-            </a:r>
-            <a:r>
-              <a:rPr lang="en-US" altLang="zh-CN" dirty="0"/>
-              <a:t>Preprocessing…</a:t>
+              <a:t>Scalar</a:t>
             </a:r>
             <a:endParaRPr lang="en-US" dirty="0"/>
           </a:p>
@@ -18475,7 +21110,7 @@
           <p:cNvPr id="3" name="Content Placeholder 2">
             <a:extLst>
               <a:ext uri="{FF2B5EF4-FFF2-40B4-BE49-F238E27FC236}">
-                <a16:creationId xmlns:a16="http://schemas.microsoft.com/office/drawing/2014/main" id="{763CACBB-D7DE-A4D4-F781-73E4BB028231}"/>
+                <a16:creationId xmlns:a16="http://schemas.microsoft.com/office/drawing/2014/main" id="{8088BA19-2666-29BC-4BD2-398055CD0224}"/>
               </a:ext>
             </a:extLst>
           </p:cNvPr>
@@ -18493,64 +21128,53 @@
           <a:p>
             <a:r>
               <a:rPr lang="en-US" dirty="0"/>
-              <a:t>Shape of </a:t>
+              <a:t>'</a:t>
+            </a:r>
+            <a:r>
+              <a:rPr lang="en-US" b="1" dirty="0"/>
+              <a:t>cap-diameter</a:t>
+            </a:r>
+            <a:r>
+              <a:rPr lang="en-US" dirty="0"/>
+              <a:t>',</a:t>
+            </a:r>
+            <a:r>
+              <a:rPr lang="zh-CN" altLang="en-US" dirty="0"/>
+              <a:t> </a:t>
+            </a:r>
+            <a:r>
+              <a:rPr lang="en-US" dirty="0"/>
+              <a:t>'</a:t>
+            </a:r>
+            <a:r>
+              <a:rPr lang="en-US" b="1" dirty="0"/>
+              <a:t>stem-</a:t>
+            </a:r>
+            <a:r>
+              <a:rPr lang="en-US" b="1" dirty="0" err="1"/>
+              <a:t>height</a:t>
             </a:r>
             <a:r>
               <a:rPr lang="en-US" dirty="0" err="1"/>
-              <a:t>X_other</a:t>
+              <a:t>‘,'</a:t>
+            </a:r>
+            <a:r>
+              <a:rPr lang="en-US" b="1" dirty="0" err="1"/>
+              <a:t>stem</a:t>
+            </a:r>
+            <a:r>
+              <a:rPr lang="en-US" b="1" dirty="0"/>
+              <a:t>-width</a:t>
             </a:r>
             <a:r>
               <a:rPr lang="en-US" dirty="0"/>
-              <a:t> </a:t>
-            </a:r>
-            <a:r>
-              <a:rPr lang="en-US" b="1" dirty="0"/>
-              <a:t>before</a:t>
-            </a:r>
-            <a:r>
-              <a:rPr lang="en-US" dirty="0"/>
-              <a:t> transformation: (51908, 20) </a:t>
-            </a:r>
-            <a:br>
-              <a:rPr lang="en-US" dirty="0"/>
-            </a:br>
-            <a:r>
-              <a:rPr lang="en-US" dirty="0"/>
-              <a:t>Shape of </a:t>
-            </a:r>
-            <a:r>
-              <a:rPr lang="en-US" dirty="0" err="1"/>
-              <a:t>X_</a:t>
-            </a:r>
-            <a:r>
-              <a:rPr lang="en-US" altLang="zh-CN" dirty="0" err="1"/>
-              <a:t>other</a:t>
-            </a:r>
-            <a:r>
-              <a:rPr lang="en-US" dirty="0"/>
-              <a:t> </a:t>
-            </a:r>
-            <a:r>
-              <a:rPr lang="en-US" b="1" dirty="0"/>
-              <a:t>after</a:t>
-            </a:r>
-            <a:r>
-              <a:rPr lang="en-US" dirty="0"/>
-              <a:t> transformation: (51908, 12</a:t>
-            </a:r>
-            <a:r>
-              <a:rPr lang="en-US" altLang="zh-CN" dirty="0"/>
-              <a:t>4</a:t>
-            </a:r>
-            <a:r>
-              <a:rPr lang="en-US" dirty="0"/>
-              <a:t>)</a:t>
+              <a:t>'</a:t>
             </a:r>
           </a:p>
           <a:p>
             <a:r>
               <a:rPr lang="en-US" altLang="zh-CN" dirty="0"/>
-              <a:t>Most</a:t>
+              <a:t>The</a:t>
             </a:r>
             <a:r>
               <a:rPr lang="zh-CN" altLang="en-US" dirty="0"/>
@@ -18558,7 +21182,7 @@
             </a:r>
             <a:r>
               <a:rPr lang="en-US" altLang="zh-CN" dirty="0"/>
-              <a:t>of</a:t>
+              <a:t>features</a:t>
             </a:r>
             <a:r>
               <a:rPr lang="zh-CN" altLang="en-US" dirty="0"/>
@@ -18566,7 +21190,7 @@
             </a:r>
             <a:r>
               <a:rPr lang="en-US" altLang="zh-CN" dirty="0"/>
-              <a:t>the</a:t>
+              <a:t>are</a:t>
             </a:r>
             <a:r>
               <a:rPr lang="zh-CN" altLang="en-US" dirty="0"/>
@@ -18574,7 +21198,7 @@
             </a:r>
             <a:r>
               <a:rPr lang="en-US" altLang="zh-CN" dirty="0"/>
-              <a:t>features</a:t>
+              <a:t>heavy</a:t>
             </a:r>
             <a:r>
               <a:rPr lang="zh-CN" altLang="en-US" dirty="0"/>
@@ -18582,7 +21206,7 @@
             </a:r>
             <a:r>
               <a:rPr lang="en-US" altLang="zh-CN" dirty="0"/>
-              <a:t>are</a:t>
+              <a:t>tailed,</a:t>
             </a:r>
             <a:r>
               <a:rPr lang="zh-CN" altLang="en-US" dirty="0"/>
@@ -18590,7 +21214,7 @@
             </a:r>
             <a:r>
               <a:rPr lang="en-US" altLang="zh-CN" dirty="0"/>
-              <a:t>categorical</a:t>
+              <a:t>thus</a:t>
             </a:r>
             <a:r>
               <a:rPr lang="zh-CN" altLang="en-US" dirty="0"/>
@@ -18598,7 +21222,7 @@
             </a:r>
             <a:r>
               <a:rPr lang="en-US" altLang="zh-CN" dirty="0"/>
-              <a:t>data,</a:t>
+              <a:t>choose</a:t>
             </a:r>
             <a:r>
               <a:rPr lang="zh-CN" altLang="en-US" dirty="0"/>
@@ -18606,7 +21230,7 @@
             </a:r>
             <a:r>
               <a:rPr lang="en-US" altLang="zh-CN" dirty="0"/>
-              <a:t>thus</a:t>
+              <a:t>standard</a:t>
             </a:r>
             <a:r>
               <a:rPr lang="zh-CN" altLang="en-US" dirty="0"/>
@@ -18614,110 +21238,48 @@
             </a:r>
             <a:r>
               <a:rPr lang="en-US" altLang="zh-CN" dirty="0"/>
-              <a:t>the</a:t>
-            </a:r>
-            <a:r>
-              <a:rPr lang="zh-CN" altLang="en-US" dirty="0"/>
-              <a:t> </a:t>
-            </a:r>
-            <a:r>
-              <a:rPr lang="en-US" altLang="zh-CN" dirty="0"/>
-              <a:t>number</a:t>
-            </a:r>
-            <a:r>
-              <a:rPr lang="zh-CN" altLang="en-US" dirty="0"/>
-              <a:t> </a:t>
-            </a:r>
-            <a:r>
-              <a:rPr lang="en-US" altLang="zh-CN" dirty="0"/>
-              <a:t>of</a:t>
-            </a:r>
-            <a:r>
-              <a:rPr lang="zh-CN" altLang="en-US" dirty="0"/>
-              <a:t> </a:t>
-            </a:r>
-            <a:r>
-              <a:rPr lang="en-US" altLang="zh-CN" dirty="0"/>
-              <a:t>features</a:t>
-            </a:r>
-            <a:r>
-              <a:rPr lang="zh-CN" altLang="en-US" dirty="0"/>
-              <a:t> </a:t>
-            </a:r>
-            <a:r>
-              <a:rPr lang="en-US" altLang="zh-CN" dirty="0"/>
-              <a:t>after</a:t>
-            </a:r>
-            <a:r>
-              <a:rPr lang="zh-CN" altLang="en-US" dirty="0"/>
-              <a:t> </a:t>
-            </a:r>
-            <a:r>
-              <a:rPr lang="en-US" altLang="zh-CN" dirty="0"/>
-              <a:t>preprocessing</a:t>
-            </a:r>
-            <a:r>
-              <a:rPr lang="zh-CN" altLang="en-US" dirty="0"/>
-              <a:t> </a:t>
-            </a:r>
-            <a:r>
-              <a:rPr lang="en-US" altLang="zh-CN" dirty="0"/>
-              <a:t>increases</a:t>
+              <a:t>scalar</a:t>
             </a:r>
           </a:p>
           <a:p>
-            <a:r>
-              <a:rPr lang="en-US" altLang="zh-CN" dirty="0"/>
-              <a:t>Decide</a:t>
-            </a:r>
-            <a:r>
-              <a:rPr lang="zh-CN" altLang="en-US" dirty="0"/>
-              <a:t> </a:t>
-            </a:r>
-            <a:r>
-              <a:rPr lang="en-US" altLang="zh-CN" dirty="0"/>
-              <a:t>not</a:t>
-            </a:r>
-            <a:r>
-              <a:rPr lang="zh-CN" altLang="en-US" dirty="0"/>
-              <a:t> </a:t>
-            </a:r>
-            <a:r>
-              <a:rPr lang="en-US" altLang="zh-CN" dirty="0"/>
-              <a:t>to</a:t>
-            </a:r>
-            <a:r>
-              <a:rPr lang="zh-CN" altLang="en-US" dirty="0"/>
-              <a:t> </a:t>
-            </a:r>
-            <a:r>
-              <a:rPr lang="en-US" altLang="zh-CN" dirty="0"/>
-              <a:t>drop</a:t>
-            </a:r>
-            <a:r>
-              <a:rPr lang="zh-CN" altLang="en-US" dirty="0"/>
-              <a:t> </a:t>
-            </a:r>
-            <a:r>
-              <a:rPr lang="en-US" altLang="zh-CN" dirty="0"/>
-              <a:t>any</a:t>
-            </a:r>
-            <a:r>
-              <a:rPr lang="zh-CN" altLang="en-US" dirty="0"/>
-              <a:t> </a:t>
-            </a:r>
-            <a:r>
-              <a:rPr lang="en-US" altLang="zh-CN" dirty="0"/>
-              <a:t>features</a:t>
-            </a:r>
             <a:endParaRPr lang="en-US" dirty="0"/>
           </a:p>
         </p:txBody>
       </p:sp>
+      <p:pic>
+        <p:nvPicPr>
+          <p:cNvPr id="4" name="Picture 3" descr="A graph of a height&#10;&#10;Description automatically generated with medium confidence">
+            <a:extLst>
+              <a:ext uri="{FF2B5EF4-FFF2-40B4-BE49-F238E27FC236}">
+                <a16:creationId xmlns:a16="http://schemas.microsoft.com/office/drawing/2014/main" id="{0DF399B1-833B-0F27-EE00-0E6664B52AC6}"/>
+              </a:ext>
+            </a:extLst>
+          </p:cNvPr>
+          <p:cNvPicPr>
+            <a:picLocks noChangeAspect="1"/>
+          </p:cNvPicPr>
+          <p:nvPr/>
+        </p:nvPicPr>
+        <p:blipFill>
+          <a:blip r:embed="rId2"/>
+          <a:stretch>
+            <a:fillRect/>
+          </a:stretch>
+        </p:blipFill>
+        <p:spPr>
+          <a:xfrm>
+            <a:off x="1028303" y="3298057"/>
+            <a:ext cx="10588543" cy="3194818"/>
+          </a:xfrm>
+          <a:prstGeom prst="rect">
+            <a:avLst/>
+          </a:prstGeom>
+        </p:spPr>
+      </p:pic>
     </p:spTree>
     <p:extLst>
       <p:ext uri="{BB962C8B-B14F-4D97-AF65-F5344CB8AC3E}">
-        <p14:creationId xmlns:p14="http://schemas.microsoft.com/office/powerpoint/2010/main" val="1423192065"/>
+        <p14:creationId xmlns:p14="http://schemas.microsoft.com/office/powerpoint/2010/main" val="4112923655"/>
       </p:ext>
     </p:extLst>
   </p:cSld>

</xml_diff>

<commit_message>
10.19 submission for midterm
</commit_message>
<xml_diff>
--- a/midterm_presentation.pptx
+++ b/midterm_presentation.pptx
@@ -14416,8 +14416,8 @@
           <a:p>
             <a:pPr algn="ctr"/>
             <a:r>
-              <a:rPr lang="en-US" altLang="zh-CN" dirty="0"/>
-              <a:t>Kathy</a:t>
+              <a:rPr lang="en-US" altLang="zh-CN" dirty="0" err="1"/>
+              <a:t>Yanfeiyun</a:t>
             </a:r>
             <a:r>
               <a:rPr lang="zh-CN" altLang="en-US" dirty="0"/>
@@ -14426,6 +14426,14 @@
             <a:r>
               <a:rPr lang="en-US" altLang="zh-CN" dirty="0"/>
               <a:t>Wu</a:t>
+            </a:r>
+            <a:r>
+              <a:rPr lang="zh-CN" altLang="en-US" dirty="0"/>
+              <a:t> </a:t>
+            </a:r>
+            <a:r>
+              <a:rPr lang="en-US" altLang="zh-CN" dirty="0"/>
+              <a:t>(Kathy)</a:t>
             </a:r>
           </a:p>
           <a:p>
@@ -15078,7 +15086,7 @@
             </a:r>
             <a:r>
               <a:rPr lang="en-US" altLang="zh-CN" dirty="0"/>
-              <a:t>Value</a:t>
+              <a:t>Values</a:t>
             </a:r>
             <a:endParaRPr lang="en-US" dirty="0"/>
           </a:p>
@@ -15102,7 +15110,7 @@
         </p:nvSpPr>
         <p:spPr>
           <a:xfrm>
-            <a:off x="419100" y="1603005"/>
+            <a:off x="419100" y="1690688"/>
             <a:ext cx="11353800" cy="4160520"/>
           </a:xfrm>
         </p:spPr>
@@ -15121,8 +15129,24 @@
               <a:t> </a:t>
             </a:r>
             <a:r>
+              <a:rPr lang="en-US" altLang="zh-CN" b="1" dirty="0"/>
+              <a:t>20</a:t>
+            </a:r>
+            <a:r>
+              <a:rPr lang="zh-CN" altLang="en-US" b="1" dirty="0"/>
+              <a:t> </a:t>
+            </a:r>
+            <a:r>
+              <a:rPr lang="en-US" altLang="zh-CN" b="1" dirty="0"/>
+              <a:t>features</a:t>
+            </a:r>
+            <a:r>
+              <a:rPr lang="zh-CN" altLang="en-US" b="1" dirty="0"/>
+              <a:t> </a:t>
+            </a:r>
+            <a:r>
               <a:rPr lang="en-US" altLang="zh-CN" dirty="0"/>
-              <a:t>20</a:t>
+              <a:t>(exclude</a:t>
             </a:r>
             <a:r>
               <a:rPr lang="zh-CN" altLang="en-US" dirty="0"/>
@@ -15130,7 +15154,7 @@
             </a:r>
             <a:r>
               <a:rPr lang="en-US" altLang="zh-CN" dirty="0"/>
-              <a:t>features,</a:t>
+              <a:t>the</a:t>
             </a:r>
             <a:r>
               <a:rPr lang="zh-CN" altLang="en-US" dirty="0"/>
@@ -15138,18 +15162,34 @@
             </a:r>
             <a:r>
               <a:rPr lang="en-US" altLang="zh-CN" dirty="0"/>
+              <a:t>target</a:t>
+            </a:r>
+            <a:r>
+              <a:rPr lang="zh-CN" altLang="en-US" dirty="0"/>
+              <a:t> </a:t>
+            </a:r>
+            <a:r>
+              <a:rPr lang="en-US" altLang="zh-CN" dirty="0"/>
+              <a:t>variable),</a:t>
+            </a:r>
+            <a:r>
+              <a:rPr lang="zh-CN" altLang="en-US" dirty="0"/>
+              <a:t> </a:t>
+            </a:r>
+            <a:r>
+              <a:rPr lang="en-US" altLang="zh-CN" b="1" dirty="0"/>
               <a:t>9</a:t>
             </a:r>
             <a:r>
-              <a:rPr lang="zh-CN" altLang="en-US" dirty="0"/>
-              <a:t> </a:t>
-            </a:r>
-            <a:r>
-              <a:rPr lang="en-US" altLang="zh-CN" dirty="0"/>
+              <a:rPr lang="zh-CN" altLang="en-US" b="1" dirty="0"/>
+              <a:t> </a:t>
+            </a:r>
+            <a:r>
+              <a:rPr lang="en-US" altLang="zh-CN" b="1" dirty="0"/>
               <a:t>features</a:t>
             </a:r>
             <a:r>
-              <a:rPr lang="zh-CN" altLang="en-US" dirty="0"/>
+              <a:rPr lang="zh-CN" altLang="en-US" b="1" dirty="0"/>
               <a:t> </a:t>
             </a:r>
             <a:r>
@@ -15224,13 +15264,13 @@
             </a:r>
             <a:r>
               <a:rPr lang="en-US" altLang="zh-CN" dirty="0"/>
-              <a:t>data.</a:t>
+              <a:t>features.</a:t>
             </a:r>
           </a:p>
           <a:p>
             <a:r>
               <a:rPr lang="en-US" b="1" dirty="0"/>
-              <a:t>cap-surface</a:t>
+              <a:t>stem-root</a:t>
             </a:r>
             <a:r>
               <a:rPr lang="en-US" altLang="zh-CN" dirty="0"/>
@@ -15242,7 +15282,7 @@
             </a:r>
             <a:r>
               <a:rPr lang="en-US" b="1" dirty="0"/>
-              <a:t>gill-attachment</a:t>
+              <a:t>veil-type</a:t>
             </a:r>
             <a:r>
               <a:rPr lang="en-US" altLang="zh-CN" dirty="0"/>
@@ -15254,7 +15294,7 @@
             </a:r>
             <a:r>
               <a:rPr lang="en-US" b="1" dirty="0"/>
-              <a:t>gill-spacing</a:t>
+              <a:t>veil-color</a:t>
             </a:r>
             <a:r>
               <a:rPr lang="en-US" altLang="zh-CN" dirty="0"/>
@@ -15266,7 +15306,11 @@
             </a:r>
             <a:r>
               <a:rPr lang="en-US" b="1" dirty="0"/>
-              <a:t>ring-type</a:t>
+              <a:t>spore-print-colo</a:t>
+            </a:r>
+            <a:r>
+              <a:rPr lang="en-US" altLang="zh-CN" b="1" dirty="0"/>
+              <a:t>r</a:t>
             </a:r>
             <a:r>
               <a:rPr lang="zh-CN" altLang="en-US" dirty="0"/>
@@ -15282,7 +15326,7 @@
             </a:r>
             <a:r>
               <a:rPr lang="en-US" altLang="zh-CN" dirty="0"/>
-              <a:t>less</a:t>
+              <a:t>more</a:t>
             </a:r>
             <a:r>
               <a:rPr lang="zh-CN" altLang="en-US" dirty="0"/>
@@ -15298,7 +15342,7 @@
             </a:r>
             <a:r>
               <a:rPr lang="en-US" altLang="zh-CN" dirty="0"/>
-              <a:t>50%</a:t>
+              <a:t>80%</a:t>
             </a:r>
             <a:r>
               <a:rPr lang="zh-CN" altLang="en-US" dirty="0"/>
@@ -15316,111 +15360,13 @@
               <a:rPr lang="en-US" altLang="zh-CN" dirty="0"/>
               <a:t>missing</a:t>
             </a:r>
-          </a:p>
-          <a:p>
-            <a:r>
-              <a:rPr lang="en-US" b="1" dirty="0"/>
-              <a:t>stem-root</a:t>
+            <a:r>
+              <a:rPr lang="zh-CN" altLang="en-US" dirty="0"/>
+              <a:t> </a:t>
             </a:r>
             <a:r>
               <a:rPr lang="en-US" altLang="zh-CN" dirty="0"/>
-              <a:t>,</a:t>
-            </a:r>
-            <a:r>
-              <a:rPr lang="zh-CN" altLang="en-US" dirty="0"/>
-              <a:t> </a:t>
-            </a:r>
-            <a:r>
-              <a:rPr lang="en-US" b="1" dirty="0"/>
-              <a:t>stem-surface</a:t>
-            </a:r>
-            <a:r>
-              <a:rPr lang="en-US" altLang="zh-CN" dirty="0"/>
-              <a:t>,</a:t>
-            </a:r>
-            <a:r>
-              <a:rPr lang="zh-CN" altLang="en-US" dirty="0"/>
-              <a:t> </a:t>
-            </a:r>
-            <a:r>
-              <a:rPr lang="en-US" b="1" dirty="0"/>
-              <a:t>veil-type</a:t>
-            </a:r>
-            <a:r>
-              <a:rPr lang="en-US" altLang="zh-CN" dirty="0"/>
-              <a:t>,</a:t>
-            </a:r>
-            <a:r>
-              <a:rPr lang="zh-CN" altLang="en-US" dirty="0"/>
-              <a:t> </a:t>
-            </a:r>
-            <a:r>
-              <a:rPr lang="en-US" b="1" dirty="0"/>
-              <a:t>veil-color</a:t>
-            </a:r>
-            <a:r>
-              <a:rPr lang="en-US" altLang="zh-CN" dirty="0"/>
-              <a:t>,</a:t>
-            </a:r>
-            <a:r>
-              <a:rPr lang="zh-CN" altLang="en-US" dirty="0"/>
-              <a:t> </a:t>
-            </a:r>
-            <a:r>
-              <a:rPr lang="en-US" b="1" dirty="0"/>
-              <a:t>spore-print-colo</a:t>
-            </a:r>
-            <a:r>
-              <a:rPr lang="en-US" altLang="zh-CN" b="1" dirty="0"/>
-              <a:t>r</a:t>
-            </a:r>
-            <a:r>
-              <a:rPr lang="zh-CN" altLang="en-US" dirty="0"/>
-              <a:t> </a:t>
-            </a:r>
-            <a:r>
-              <a:rPr lang="en-US" altLang="zh-CN" dirty="0"/>
-              <a:t>have</a:t>
-            </a:r>
-            <a:r>
-              <a:rPr lang="zh-CN" altLang="en-US" dirty="0"/>
-              <a:t> </a:t>
-            </a:r>
-            <a:r>
-              <a:rPr lang="en-US" altLang="zh-CN" dirty="0"/>
-              <a:t>more</a:t>
-            </a:r>
-            <a:r>
-              <a:rPr lang="zh-CN" altLang="en-US" dirty="0"/>
-              <a:t> </a:t>
-            </a:r>
-            <a:r>
-              <a:rPr lang="en-US" altLang="zh-CN" dirty="0"/>
-              <a:t>than</a:t>
-            </a:r>
-            <a:r>
-              <a:rPr lang="zh-CN" altLang="en-US" dirty="0"/>
-              <a:t> </a:t>
-            </a:r>
-            <a:r>
-              <a:rPr lang="en-US" altLang="zh-CN" dirty="0"/>
-              <a:t>50%</a:t>
-            </a:r>
-            <a:r>
-              <a:rPr lang="zh-CN" altLang="en-US" dirty="0"/>
-              <a:t> </a:t>
-            </a:r>
-            <a:r>
-              <a:rPr lang="en-US" altLang="zh-CN" dirty="0"/>
-              <a:t>of</a:t>
-            </a:r>
-            <a:r>
-              <a:rPr lang="zh-CN" altLang="en-US" dirty="0"/>
-              <a:t> </a:t>
-            </a:r>
-            <a:r>
-              <a:rPr lang="en-US" altLang="zh-CN" dirty="0"/>
-              <a:t>missing</a:t>
+              <a:t>values</a:t>
             </a:r>
             <a:endParaRPr lang="en-US" dirty="0"/>
           </a:p>
@@ -15448,8 +15394,8 @@
         </p:blipFill>
         <p:spPr>
           <a:xfrm>
-            <a:off x="8178800" y="4292600"/>
-            <a:ext cx="4013200" cy="2565400"/>
+            <a:off x="6876588" y="3728079"/>
+            <a:ext cx="4896312" cy="3129921"/>
           </a:xfrm>
           <a:prstGeom prst="rect">
             <a:avLst/>
@@ -15627,12 +15573,9 @@
             </a:r>
             <a:r>
               <a:rPr lang="en-US" dirty="0"/>
-              <a:t> transformation: 12</a:t>
-            </a:r>
-            <a:r>
-              <a:rPr lang="en-US" altLang="zh-CN" dirty="0"/>
-              <a:t>4</a:t>
-            </a:r>
+              <a:t> transformation: 126</a:t>
+            </a:r>
+            <a:endParaRPr lang="en-US" altLang="zh-CN" dirty="0"/>
           </a:p>
           <a:p>
             <a:r>
@@ -18138,7 +18081,7 @@
         </p:nvSpPr>
         <p:spPr>
           <a:xfrm>
-            <a:off x="5225143" y="1855088"/>
+            <a:off x="5212617" y="2240308"/>
             <a:ext cx="6847113" cy="4757530"/>
           </a:xfrm>
         </p:spPr>
@@ -18474,7 +18417,7 @@
           <a:p>
             <a:r>
               <a:rPr lang="en-US" altLang="zh-CN" sz="2300" dirty="0"/>
-              <a:t>Create</a:t>
+              <a:t>Help</a:t>
             </a:r>
             <a:r>
               <a:rPr lang="zh-CN" altLang="en-US" sz="2300" dirty="0"/>
@@ -18482,7 +18425,7 @@
             </a:r>
             <a:r>
               <a:rPr lang="en-US" altLang="zh-CN" sz="2300" dirty="0"/>
-              <a:t>an</a:t>
+              <a:t>them</a:t>
             </a:r>
             <a:r>
               <a:rPr lang="zh-CN" altLang="en-US" sz="2300" dirty="0"/>
@@ -18490,7 +18433,7 @@
             </a:r>
             <a:r>
               <a:rPr lang="en-US" altLang="zh-CN" sz="2300" dirty="0"/>
-              <a:t>app</a:t>
+              <a:t>to</a:t>
             </a:r>
             <a:r>
               <a:rPr lang="zh-CN" altLang="en-US" sz="2300" dirty="0"/>
@@ -18498,7 +18441,7 @@
             </a:r>
             <a:r>
               <a:rPr lang="en-US" altLang="zh-CN" sz="2300" dirty="0"/>
-              <a:t>for</a:t>
+              <a:t>identify</a:t>
             </a:r>
             <a:r>
               <a:rPr lang="zh-CN" altLang="en-US" sz="2300" dirty="0"/>
@@ -18506,7 +18449,7 @@
             </a:r>
             <a:r>
               <a:rPr lang="en-US" altLang="zh-CN" sz="2300" dirty="0"/>
-              <a:t>people</a:t>
+              <a:t>if</a:t>
             </a:r>
             <a:r>
               <a:rPr lang="zh-CN" altLang="en-US" sz="2300" dirty="0"/>
@@ -18514,47 +18457,7 @@
             </a:r>
             <a:r>
               <a:rPr lang="en-US" altLang="zh-CN" sz="2300" dirty="0"/>
-              <a:t>who</a:t>
-            </a:r>
-            <a:r>
-              <a:rPr lang="zh-CN" altLang="en-US" sz="2300" dirty="0"/>
-              <a:t> </a:t>
-            </a:r>
-            <a:r>
-              <a:rPr lang="en-US" altLang="zh-CN" sz="2300" dirty="0"/>
-              <a:t>are</a:t>
-            </a:r>
-            <a:r>
-              <a:rPr lang="zh-CN" altLang="en-US" sz="2300" dirty="0"/>
-              <a:t> </a:t>
-            </a:r>
-            <a:r>
-              <a:rPr lang="en-US" altLang="zh-CN" sz="2300" dirty="0"/>
-              <a:t>interested</a:t>
-            </a:r>
-            <a:r>
-              <a:rPr lang="zh-CN" altLang="en-US" sz="2300" dirty="0"/>
-              <a:t> </a:t>
-            </a:r>
-            <a:r>
-              <a:rPr lang="en-US" altLang="zh-CN" sz="2300" dirty="0"/>
-              <a:t>in</a:t>
-            </a:r>
-            <a:r>
-              <a:rPr lang="zh-CN" altLang="en-US" sz="2300" dirty="0"/>
-              <a:t> </a:t>
-            </a:r>
-            <a:r>
-              <a:rPr lang="en-US" altLang="zh-CN" sz="2300" dirty="0"/>
-              <a:t>picking</a:t>
-            </a:r>
-            <a:r>
-              <a:rPr lang="zh-CN" altLang="en-US" sz="2300" dirty="0"/>
-              <a:t> </a:t>
-            </a:r>
-            <a:r>
-              <a:rPr lang="en-US" altLang="zh-CN" sz="2300" dirty="0"/>
-              <a:t>wild</a:t>
+              <a:t>the</a:t>
             </a:r>
             <a:r>
               <a:rPr lang="zh-CN" altLang="en-US" sz="2300" dirty="0"/>
@@ -18570,7 +18473,31 @@
             </a:r>
             <a:r>
               <a:rPr lang="en-US" altLang="zh-CN" sz="2300" dirty="0"/>
-              <a:t>themselves.</a:t>
+              <a:t>is</a:t>
+            </a:r>
+            <a:r>
+              <a:rPr lang="zh-CN" altLang="en-US" sz="2300" dirty="0"/>
+              <a:t> </a:t>
+            </a:r>
+            <a:r>
+              <a:rPr lang="en-US" altLang="zh-CN" sz="2300" dirty="0"/>
+              <a:t>safe</a:t>
+            </a:r>
+            <a:r>
+              <a:rPr lang="zh-CN" altLang="en-US" sz="2300" dirty="0"/>
+              <a:t> </a:t>
+            </a:r>
+            <a:r>
+              <a:rPr lang="en-US" altLang="zh-CN" sz="2300" dirty="0"/>
+              <a:t>to</a:t>
+            </a:r>
+            <a:r>
+              <a:rPr lang="zh-CN" altLang="en-US" sz="2300" dirty="0"/>
+              <a:t> </a:t>
+            </a:r>
+            <a:r>
+              <a:rPr lang="en-US" altLang="zh-CN" sz="2300" dirty="0"/>
+              <a:t>consume.</a:t>
             </a:r>
             <a:r>
               <a:rPr lang="zh-CN" altLang="en-US" sz="2300" dirty="0"/>
@@ -18581,7 +18508,7 @@
           <a:p>
             <a:r>
               <a:rPr lang="en-US" altLang="zh-CN" sz="2300" dirty="0"/>
-              <a:t>Help</a:t>
+              <a:t>Reduce</a:t>
             </a:r>
             <a:r>
               <a:rPr lang="zh-CN" altLang="en-US" sz="2300" dirty="0"/>
@@ -18589,7 +18516,55 @@
             </a:r>
             <a:r>
               <a:rPr lang="en-US" altLang="zh-CN" sz="2300" dirty="0"/>
-              <a:t>them</a:t>
+              <a:t>the</a:t>
+            </a:r>
+            <a:r>
+              <a:rPr lang="zh-CN" altLang="en-US" sz="2300" dirty="0"/>
+              <a:t> </a:t>
+            </a:r>
+            <a:r>
+              <a:rPr lang="en-US" altLang="zh-CN" sz="2300" dirty="0"/>
+              <a:t>risk</a:t>
+            </a:r>
+            <a:r>
+              <a:rPr lang="zh-CN" altLang="en-US" sz="2300" dirty="0"/>
+              <a:t> </a:t>
+            </a:r>
+            <a:r>
+              <a:rPr lang="en-US" altLang="zh-CN" sz="2300" dirty="0"/>
+              <a:t>of</a:t>
+            </a:r>
+            <a:r>
+              <a:rPr lang="zh-CN" altLang="en-US" sz="2300" dirty="0"/>
+              <a:t> </a:t>
+            </a:r>
+            <a:r>
+              <a:rPr lang="en-US" altLang="zh-CN" sz="2300" dirty="0"/>
+              <a:t>death</a:t>
+            </a:r>
+            <a:r>
+              <a:rPr lang="zh-CN" altLang="en-US" sz="2300" dirty="0"/>
+              <a:t> </a:t>
+            </a:r>
+            <a:r>
+              <a:rPr lang="en-US" altLang="zh-CN" sz="2300" dirty="0"/>
+              <a:t>and</a:t>
+            </a:r>
+            <a:r>
+              <a:rPr lang="zh-CN" altLang="en-US" sz="2300" dirty="0"/>
+              <a:t> </a:t>
+            </a:r>
+            <a:r>
+              <a:rPr lang="en-US" altLang="zh-CN" sz="2300" dirty="0"/>
+              <a:t>intoxication</a:t>
+            </a:r>
+            <a:r>
+              <a:rPr lang="zh-CN" altLang="en-US" sz="2300" dirty="0"/>
+              <a:t> </a:t>
+            </a:r>
+            <a:r>
+              <a:rPr lang="en-US" altLang="zh-CN" sz="2300" dirty="0"/>
+              <a:t>due</a:t>
             </a:r>
             <a:r>
               <a:rPr lang="zh-CN" altLang="en-US" sz="2300" dirty="0"/>
@@ -18605,7 +18580,7 @@
             </a:r>
             <a:r>
               <a:rPr lang="en-US" altLang="zh-CN" sz="2300" dirty="0"/>
-              <a:t>identify</a:t>
+              <a:t>poisonous</a:t>
             </a:r>
             <a:r>
               <a:rPr lang="zh-CN" altLang="en-US" sz="2300" dirty="0"/>
@@ -18613,60 +18588,13 @@
             </a:r>
             <a:r>
               <a:rPr lang="en-US" altLang="zh-CN" sz="2300" dirty="0"/>
-              <a:t>if</a:t>
-            </a:r>
-            <a:r>
-              <a:rPr lang="zh-CN" altLang="en-US" sz="2300" dirty="0"/>
-              <a:t> </a:t>
-            </a:r>
-            <a:r>
-              <a:rPr lang="en-US" altLang="zh-CN" sz="2300" dirty="0"/>
-              <a:t>the</a:t>
-            </a:r>
-            <a:r>
-              <a:rPr lang="zh-CN" altLang="en-US" sz="2300" dirty="0"/>
-              <a:t> </a:t>
-            </a:r>
-            <a:r>
-              <a:rPr lang="en-US" altLang="zh-CN" sz="2300" dirty="0"/>
-              <a:t>mushroom</a:t>
-            </a:r>
-            <a:r>
-              <a:rPr lang="zh-CN" altLang="en-US" sz="2300" dirty="0"/>
-              <a:t> </a:t>
-            </a:r>
-            <a:r>
-              <a:rPr lang="en-US" altLang="zh-CN" sz="2300" dirty="0"/>
-              <a:t>is</a:t>
-            </a:r>
-            <a:r>
-              <a:rPr lang="zh-CN" altLang="en-US" sz="2300" dirty="0"/>
-              <a:t> </a:t>
-            </a:r>
-            <a:r>
-              <a:rPr lang="en-US" altLang="zh-CN" sz="2300" dirty="0"/>
-              <a:t>safe</a:t>
-            </a:r>
-            <a:r>
-              <a:rPr lang="zh-CN" altLang="en-US" sz="2300" dirty="0"/>
-              <a:t> </a:t>
-            </a:r>
-            <a:r>
-              <a:rPr lang="en-US" altLang="zh-CN" sz="2300" dirty="0"/>
-              <a:t>to</a:t>
-            </a:r>
-            <a:r>
-              <a:rPr lang="zh-CN" altLang="en-US" sz="2300" dirty="0"/>
-              <a:t> </a:t>
-            </a:r>
-            <a:r>
-              <a:rPr lang="en-US" altLang="zh-CN" sz="2300" dirty="0"/>
-              <a:t>consume.</a:t>
-            </a:r>
-            <a:r>
-              <a:rPr lang="zh-CN" altLang="en-US" sz="2300" dirty="0"/>
-              <a:t> </a:t>
-            </a:r>
+              <a:t>mushrooms.</a:t>
+            </a:r>
+          </a:p>
+          <a:p>
+            <a:pPr marL="0" indent="0">
+              <a:buNone/>
+            </a:pPr>
             <a:endParaRPr lang="en-US" altLang="zh-CN" sz="2300" dirty="0"/>
           </a:p>
         </p:txBody>
@@ -18787,8 +18715,8 @@
         </p:nvSpPr>
         <p:spPr>
           <a:xfrm>
-            <a:off x="838201" y="365125"/>
-            <a:ext cx="3816095" cy="1807305"/>
+            <a:off x="322345" y="250470"/>
+            <a:ext cx="5913328" cy="1807305"/>
           </a:xfrm>
         </p:spPr>
         <p:txBody>
@@ -18958,7 +18886,7 @@
             </a:r>
             <a:r>
               <a:rPr lang="en-US" altLang="zh-CN" sz="2400" dirty="0"/>
-              <a:t>target</a:t>
+              <a:t>Target</a:t>
             </a:r>
             <a:r>
               <a:rPr lang="zh-CN" altLang="en-US" sz="2400" dirty="0"/>
@@ -18966,7 +18894,7 @@
             </a:r>
             <a:r>
               <a:rPr lang="en-US" altLang="zh-CN" sz="2400" dirty="0"/>
-              <a:t>variable.</a:t>
+              <a:t>Variable.</a:t>
             </a:r>
           </a:p>
           <a:p>
@@ -19623,6 +19551,68 @@
           </a:custGeom>
         </p:spPr>
       </p:pic>
+      <p:sp>
+        <p:nvSpPr>
+          <p:cNvPr id="4" name="TextBox 3">
+            <a:extLst>
+              <a:ext uri="{FF2B5EF4-FFF2-40B4-BE49-F238E27FC236}">
+                <a16:creationId xmlns:a16="http://schemas.microsoft.com/office/drawing/2014/main" id="{6412F033-E031-22A8-5DDD-A7C7F1803232}"/>
+              </a:ext>
+            </a:extLst>
+          </p:cNvPr>
+          <p:cNvSpPr txBox="1"/>
+          <p:nvPr/>
+        </p:nvSpPr>
+        <p:spPr>
+          <a:xfrm>
+            <a:off x="322345" y="6212568"/>
+            <a:ext cx="6899527" cy="584775"/>
+          </a:xfrm>
+          <a:prstGeom prst="rect">
+            <a:avLst/>
+          </a:prstGeom>
+          <a:noFill/>
+        </p:spPr>
+        <p:txBody>
+          <a:bodyPr wrap="square" rtlCol="0">
+            <a:spAutoFit/>
+          </a:bodyPr>
+          <a:lstStyle/>
+          <a:p>
+            <a:r>
+              <a:rPr lang="en-US" sz="1600" dirty="0">
+                <a:hlinkClick r:id="rId4"/>
+              </a:rPr>
+              <a:t>https://</a:t>
+            </a:r>
+            <a:r>
+              <a:rPr lang="en-US" sz="1600" dirty="0" err="1">
+                <a:hlinkClick r:id="rId4"/>
+              </a:rPr>
+              <a:t>www.kaggle.com</a:t>
+            </a:r>
+            <a:r>
+              <a:rPr lang="en-US" sz="1600" dirty="0">
+                <a:hlinkClick r:id="rId4"/>
+              </a:rPr>
+              <a:t>/datasets/</a:t>
+            </a:r>
+            <a:r>
+              <a:rPr lang="en-US" sz="1600" dirty="0" err="1">
+                <a:hlinkClick r:id="rId4"/>
+              </a:rPr>
+              <a:t>devzohaib</a:t>
+            </a:r>
+            <a:r>
+              <a:rPr lang="en-US" sz="1600" dirty="0">
+                <a:hlinkClick r:id="rId4"/>
+              </a:rPr>
+              <a:t>/mushroom-edibility-classification/data</a:t>
+            </a:r>
+            <a:endParaRPr lang="en-US" sz="1600" dirty="0"/>
+          </a:p>
+        </p:txBody>
+      </p:sp>
     </p:spTree>
     <p:extLst>
       <p:ext uri="{BB962C8B-B14F-4D97-AF65-F5344CB8AC3E}">
@@ -19677,11 +19667,11 @@
           <a:lstStyle/>
           <a:p>
             <a:r>
-              <a:rPr lang="en-US" dirty="0"/>
-              <a:t>By Cap Colors - Stacked Bar Plot</a:t>
+              <a:rPr lang="en-US"/>
+              <a:t>Boxplot of Cap Diameter</a:t>
             </a:r>
             <a:br>
-              <a:rPr lang="en-US" dirty="0"/>
+              <a:rPr lang="en-US"/>
             </a:br>
             <a:endParaRPr lang="en-US" dirty="0"/>
           </a:p>
@@ -19689,10 +19679,10 @@
       </p:sp>
       <p:pic>
         <p:nvPicPr>
-          <p:cNvPr id="2050" name="Picture 2" descr="Buff Color HEX Code: #f0dc82">
+          <p:cNvPr id="2056" name="Picture 8" descr="113 Bell Shaped Mushrooms Stock Photos - Free &amp; Royalty-Free Stock Photos  from Dreamstime">
             <a:extLst>
               <a:ext uri="{FF2B5EF4-FFF2-40B4-BE49-F238E27FC236}">
-                <a16:creationId xmlns:a16="http://schemas.microsoft.com/office/drawing/2014/main" id="{F687097C-5A05-3D21-B3E6-320C8484C6F8}"/>
+                <a16:creationId xmlns:a16="http://schemas.microsoft.com/office/drawing/2014/main" id="{94DF77A0-E2C0-F68F-1C85-A431F2B67244}"/>
               </a:ext>
             </a:extLst>
           </p:cNvPr>
@@ -19701,7 +19691,7 @@
           </p:cNvPicPr>
           <p:nvPr/>
         </p:nvPicPr>
-        <p:blipFill rotWithShape="1">
+        <p:blipFill>
           <a:blip r:embed="rId2">
             <a:extLst>
               <a:ext uri="{28A0092B-C50C-407E-A947-70E740481C1C}">
@@ -19709,13 +19699,15 @@
               </a:ext>
             </a:extLst>
           </a:blip>
-          <a:srcRect l="23919" t="29479" r="3237" b="5598"/>
-          <a:stretch/>
+          <a:srcRect/>
+          <a:stretch>
+            <a:fillRect/>
+          </a:stretch>
         </p:blipFill>
         <p:spPr bwMode="auto">
           <a:xfrm>
-            <a:off x="291548" y="1895061"/>
-            <a:ext cx="1775792" cy="861392"/>
+            <a:off x="0" y="1415441"/>
+            <a:ext cx="1801632" cy="2693096"/>
           </a:xfrm>
           <a:prstGeom prst="rect">
             <a:avLst/>
@@ -19732,12 +19724,84 @@
           </a:extLst>
         </p:spPr>
       </p:pic>
+      <p:sp>
+        <p:nvSpPr>
+          <p:cNvPr id="13" name="TextBox 12">
+            <a:extLst>
+              <a:ext uri="{FF2B5EF4-FFF2-40B4-BE49-F238E27FC236}">
+                <a16:creationId xmlns:a16="http://schemas.microsoft.com/office/drawing/2014/main" id="{00A0B5E3-D83C-29D1-D0DB-20C08BA5F2EB}"/>
+              </a:ext>
+            </a:extLst>
+          </p:cNvPr>
+          <p:cNvSpPr txBox="1"/>
+          <p:nvPr/>
+        </p:nvSpPr>
+        <p:spPr>
+          <a:xfrm>
+            <a:off x="0" y="6492875"/>
+            <a:ext cx="10972800" cy="400110"/>
+          </a:xfrm>
+          <a:prstGeom prst="rect">
+            <a:avLst/>
+          </a:prstGeom>
+          <a:noFill/>
+        </p:spPr>
+        <p:txBody>
+          <a:bodyPr wrap="square" rtlCol="0">
+            <a:spAutoFit/>
+          </a:bodyPr>
+          <a:lstStyle/>
+          <a:p>
+            <a:r>
+              <a:rPr lang="en-US" sz="1000"/>
+              <a:t>@Dreamstime, https://thumbs.dreamstime.com/b/bell-shaped-mushrooms-12113748.jpg</a:t>
+            </a:r>
+          </a:p>
+          <a:p>
+            <a:r>
+              <a:rPr lang="en-US" sz="1000"/>
+              <a:t>@Alamy Stock Photo, https://c8.alamy.com/comp/2M3R75X/giant-puffball-giant-stag-fungus-spherical-whitish-fruiting-body-in-green-meadow-2M3R75X.jpg</a:t>
+            </a:r>
+            <a:endParaRPr lang="en-US" sz="1000" dirty="0"/>
+          </a:p>
+        </p:txBody>
+      </p:sp>
       <p:pic>
         <p:nvPicPr>
-          <p:cNvPr id="2052" name="Picture 4" descr="Stropharia aeruginosa - Wikipedia">
+          <p:cNvPr id="15" name="Picture 14" descr="A diagram of a box diagram&#10;&#10;Description automatically generated">
             <a:extLst>
               <a:ext uri="{FF2B5EF4-FFF2-40B4-BE49-F238E27FC236}">
-                <a16:creationId xmlns:a16="http://schemas.microsoft.com/office/drawing/2014/main" id="{A1EF7EFB-28EE-9ADE-4AD4-FCFC56F5CFF2}"/>
+                <a16:creationId xmlns:a16="http://schemas.microsoft.com/office/drawing/2014/main" id="{502ADE4D-5CC1-9359-4F52-6D8E87D9B755}"/>
+              </a:ext>
+            </a:extLst>
+          </p:cNvPr>
+          <p:cNvPicPr>
+            <a:picLocks noChangeAspect="1"/>
+          </p:cNvPicPr>
+          <p:nvPr/>
+        </p:nvPicPr>
+        <p:blipFill>
+          <a:blip r:embed="rId3"/>
+          <a:stretch>
+            <a:fillRect/>
+          </a:stretch>
+        </p:blipFill>
+        <p:spPr>
+          <a:xfrm>
+            <a:off x="1801632" y="1041241"/>
+            <a:ext cx="8872813" cy="5451634"/>
+          </a:xfrm>
+          <a:prstGeom prst="rect">
+            <a:avLst/>
+          </a:prstGeom>
+        </p:spPr>
+      </p:pic>
+      <p:pic>
+        <p:nvPicPr>
+          <p:cNvPr id="2058" name="Picture 10" descr="Spherical fungus hi-res stock photography and images - Alamy">
+            <a:extLst>
+              <a:ext uri="{FF2B5EF4-FFF2-40B4-BE49-F238E27FC236}">
+                <a16:creationId xmlns:a16="http://schemas.microsoft.com/office/drawing/2014/main" id="{D72A4756-C192-FF00-2F27-12450EBE2DEA}"/>
               </a:ext>
             </a:extLst>
           </p:cNvPr>
@@ -19746,23 +19810,21 @@
           </p:cNvPicPr>
           <p:nvPr/>
         </p:nvPicPr>
-        <p:blipFill>
-          <a:blip r:embed="rId3">
+        <p:blipFill rotWithShape="1">
+          <a:blip r:embed="rId4">
             <a:extLst>
               <a:ext uri="{28A0092B-C50C-407E-A947-70E740481C1C}">
                 <a14:useLocalDpi xmlns:a14="http://schemas.microsoft.com/office/drawing/2010/main" val="0"/>
               </a:ext>
             </a:extLst>
           </a:blip>
-          <a:srcRect/>
-          <a:stretch>
-            <a:fillRect/>
-          </a:stretch>
+          <a:srcRect l="10822" t="5324" r="10193" b="12329"/>
+          <a:stretch/>
         </p:blipFill>
         <p:spPr bwMode="auto">
           <a:xfrm>
-            <a:off x="10334486" y="3998842"/>
-            <a:ext cx="1844261" cy="2766391"/>
+            <a:off x="9708859" y="36997"/>
+            <a:ext cx="2483141" cy="1903956"/>
           </a:xfrm>
           <a:prstGeom prst="rect">
             <a:avLst/>
@@ -19779,81 +19841,126 @@
           </a:extLst>
         </p:spPr>
       </p:pic>
-      <p:pic>
-        <p:nvPicPr>
-          <p:cNvPr id="2054" name="Picture 6" descr="Cuphophyllus pratensis - Wikipedia">
+      <p:sp>
+        <p:nvSpPr>
+          <p:cNvPr id="16" name="TextBox 15">
             <a:extLst>
               <a:ext uri="{FF2B5EF4-FFF2-40B4-BE49-F238E27FC236}">
-                <a16:creationId xmlns:a16="http://schemas.microsoft.com/office/drawing/2014/main" id="{D7E1F903-9249-52BC-705D-BFDF62B96BDD}"/>
+                <a16:creationId xmlns:a16="http://schemas.microsoft.com/office/drawing/2014/main" id="{CE6F70FE-5D0C-57E5-D440-190075BEE544}"/>
               </a:ext>
             </a:extLst>
           </p:cNvPr>
-          <p:cNvPicPr>
-            <a:picLocks noChangeAspect="1" noChangeArrowheads="1"/>
-          </p:cNvPicPr>
+          <p:cNvSpPr txBox="1"/>
           <p:nvPr/>
-        </p:nvPicPr>
-        <p:blipFill rotWithShape="1">
-          <a:blip r:embed="rId4">
-            <a:extLst>
-              <a:ext uri="{28A0092B-C50C-407E-A947-70E740481C1C}">
-                <a14:useLocalDpi xmlns:a14="http://schemas.microsoft.com/office/drawing/2010/main" val="0"/>
-              </a:ext>
-            </a:extLst>
-          </a:blip>
-          <a:srcRect l="3444" t="3285" r="17249" b="1353"/>
-          <a:stretch/>
-        </p:blipFill>
-        <p:spPr bwMode="auto">
-          <a:xfrm flipH="1">
-            <a:off x="0" y="3187147"/>
-            <a:ext cx="2914671" cy="2663685"/>
+        </p:nvSpPr>
+        <p:spPr>
+          <a:xfrm>
+            <a:off x="175518" y="4113405"/>
+            <a:ext cx="1327759" cy="369332"/>
           </a:xfrm>
           <a:prstGeom prst="rect">
             <a:avLst/>
           </a:prstGeom>
           <a:noFill/>
-          <a:extLst>
-            <a:ext uri="{909E8E84-426E-40DD-AFC4-6F175D3DCCD1}">
-              <a14:hiddenFill xmlns:a14="http://schemas.microsoft.com/office/drawing/2010/main">
-                <a:solidFill>
-                  <a:srgbClr val="FFFFFF"/>
-                </a:solidFill>
-              </a14:hiddenFill>
-            </a:ext>
-          </a:extLst>
         </p:spPr>
-      </p:pic>
-      <p:pic>
-        <p:nvPicPr>
-          <p:cNvPr id="10" name="Picture 9" descr="A graph with green and pink bars&#10;&#10;Description automatically generated">
+        <p:txBody>
+          <a:bodyPr wrap="square" rtlCol="0">
+            <a:spAutoFit/>
+          </a:bodyPr>
+          <a:lstStyle/>
+          <a:p>
+            <a:r>
+              <a:rPr lang="en-US" altLang="zh-CN" dirty="0">
+                <a:highlight>
+                  <a:srgbClr val="C0C0C0"/>
+                </a:highlight>
+              </a:rPr>
+              <a:t>Bell</a:t>
+            </a:r>
+            <a:r>
+              <a:rPr lang="zh-CN" altLang="en-US" dirty="0">
+                <a:highlight>
+                  <a:srgbClr val="C0C0C0"/>
+                </a:highlight>
+              </a:rPr>
+              <a:t> </a:t>
+            </a:r>
+            <a:r>
+              <a:rPr lang="en-US" altLang="zh-CN" dirty="0">
+                <a:highlight>
+                  <a:srgbClr val="C0C0C0"/>
+                </a:highlight>
+              </a:rPr>
+              <a:t>shape</a:t>
+            </a:r>
+            <a:endParaRPr lang="en-US" dirty="0">
+              <a:highlight>
+                <a:srgbClr val="C0C0C0"/>
+              </a:highlight>
+            </a:endParaRPr>
+          </a:p>
+        </p:txBody>
+      </p:sp>
+      <p:sp>
+        <p:nvSpPr>
+          <p:cNvPr id="17" name="TextBox 16">
             <a:extLst>
               <a:ext uri="{FF2B5EF4-FFF2-40B4-BE49-F238E27FC236}">
-                <a16:creationId xmlns:a16="http://schemas.microsoft.com/office/drawing/2014/main" id="{984A74E1-005A-3CBB-64DB-6D8AC1481F98}"/>
+                <a16:creationId xmlns:a16="http://schemas.microsoft.com/office/drawing/2014/main" id="{5AA32876-C366-1B91-4CA5-A918C47CAEB3}"/>
               </a:ext>
             </a:extLst>
           </p:cNvPr>
-          <p:cNvPicPr>
-            <a:picLocks noChangeAspect="1"/>
-          </p:cNvPicPr>
+          <p:cNvSpPr txBox="1"/>
           <p:nvPr/>
-        </p:nvPicPr>
-        <p:blipFill>
-          <a:blip r:embed="rId5"/>
-          <a:stretch>
-            <a:fillRect/>
-          </a:stretch>
-        </p:blipFill>
+        </p:nvSpPr>
         <p:spPr>
           <a:xfrm>
-            <a:off x="2819732" y="1284761"/>
-            <a:ext cx="7514754" cy="5428162"/>
+            <a:off x="9943741" y="1997472"/>
+            <a:ext cx="2140763" cy="369332"/>
           </a:xfrm>
           <a:prstGeom prst="rect">
             <a:avLst/>
           </a:prstGeom>
+          <a:noFill/>
         </p:spPr>
-      </p:pic>
+        <p:txBody>
+          <a:bodyPr wrap="square" rtlCol="0">
+            <a:spAutoFit/>
+          </a:bodyPr>
+          <a:lstStyle/>
+          <a:p>
+            <a:r>
+              <a:rPr lang="en-US" altLang="zh-CN" dirty="0">
+                <a:highlight>
+                  <a:srgbClr val="C0C0C0"/>
+                </a:highlight>
+              </a:rPr>
+              <a:t>Spherical</a:t>
+            </a:r>
+            <a:r>
+              <a:rPr lang="zh-CN" altLang="en-US" dirty="0">
+                <a:highlight>
+                  <a:srgbClr val="C0C0C0"/>
+                </a:highlight>
+              </a:rPr>
+              <a:t> </a:t>
+            </a:r>
+            <a:r>
+              <a:rPr lang="en-US" altLang="zh-CN" dirty="0">
+                <a:highlight>
+                  <a:srgbClr val="C0C0C0"/>
+                </a:highlight>
+              </a:rPr>
+              <a:t>shape</a:t>
+            </a:r>
+            <a:endParaRPr lang="en-US" dirty="0">
+              <a:highlight>
+                <a:srgbClr val="C0C0C0"/>
+              </a:highlight>
+            </a:endParaRPr>
+          </a:p>
+        </p:txBody>
+      </p:sp>
     </p:spTree>
     <p:extLst>
       <p:ext uri="{BB962C8B-B14F-4D97-AF65-F5344CB8AC3E}">
@@ -19954,7 +20061,7 @@
         <p:spPr bwMode="auto">
           <a:xfrm>
             <a:off x="164548" y="2511770"/>
-            <a:ext cx="1838136" cy="1834460"/>
+            <a:ext cx="1745727" cy="1742236"/>
           </a:xfrm>
           <a:prstGeom prst="rect">
             <a:avLst/>
@@ -19971,12 +20078,77 @@
           </a:extLst>
         </p:spPr>
       </p:pic>
+      <p:sp>
+        <p:nvSpPr>
+          <p:cNvPr id="10" name="TextBox 9">
+            <a:extLst>
+              <a:ext uri="{FF2B5EF4-FFF2-40B4-BE49-F238E27FC236}">
+                <a16:creationId xmlns:a16="http://schemas.microsoft.com/office/drawing/2014/main" id="{B86A992E-8904-C227-87CD-E2DCC38F04A1}"/>
+              </a:ext>
+            </a:extLst>
+          </p:cNvPr>
+          <p:cNvSpPr txBox="1"/>
+          <p:nvPr/>
+        </p:nvSpPr>
+        <p:spPr>
+          <a:xfrm>
+            <a:off x="0" y="6434813"/>
+            <a:ext cx="12526027" cy="461665"/>
+          </a:xfrm>
+          <a:prstGeom prst="rect">
+            <a:avLst/>
+          </a:prstGeom>
+          <a:noFill/>
+        </p:spPr>
+        <p:txBody>
+          <a:bodyPr wrap="square" rtlCol="0">
+            <a:spAutoFit/>
+          </a:bodyPr>
+          <a:lstStyle/>
+          <a:p>
+            <a:r>
+              <a:rPr lang="en-US" sz="1200" dirty="0"/>
+              <a:t>@Botanical Rambles, </a:t>
+            </a:r>
+            <a:r>
+              <a:rPr lang="en-US" sz="1200" dirty="0">
+                <a:hlinkClick r:id="rId3"/>
+              </a:rPr>
+              <a:t>https://www.wnps.org/content/images/blog_articles/312/b2ap3_large_stalkedpuffball_brick.png</a:t>
+            </a:r>
+            <a:endParaRPr lang="en-US" sz="1200" dirty="0"/>
+          </a:p>
+          <a:p>
+            <a:r>
+              <a:rPr lang="en-US" altLang="zh-CN" sz="1200" dirty="0"/>
+              <a:t>@</a:t>
+            </a:r>
+            <a:r>
+              <a:rPr lang="en-US" altLang="zh-CN" sz="1200" dirty="0" err="1"/>
+              <a:t>Alamy</a:t>
+            </a:r>
+            <a:r>
+              <a:rPr lang="en-US" altLang="zh-CN" sz="1200" dirty="0"/>
+              <a:t>,</a:t>
+            </a:r>
+            <a:r>
+              <a:rPr lang="zh-CN" altLang="en-US" sz="1200" dirty="0"/>
+              <a:t> </a:t>
+            </a:r>
+            <a:r>
+              <a:rPr lang="en-US" altLang="zh-CN" sz="1200" dirty="0"/>
+              <a:t>https://c8.alamy.com/comp/MB1YAD/path-running-through-mixed-forest-habitat-tara-national-park-serbia-october-MB1YAD.jpg</a:t>
+            </a:r>
+            <a:endParaRPr lang="en-US" sz="1200" dirty="0"/>
+          </a:p>
+        </p:txBody>
+      </p:sp>
       <p:pic>
         <p:nvPicPr>
-          <p:cNvPr id="9" name="Picture 8" descr="A graph of green and pink bars&#10;&#10;Description automatically generated">
+          <p:cNvPr id="12" name="Picture 11" descr="A graph of green and pink bars&#10;&#10;Description automatically generated">
             <a:extLst>
               <a:ext uri="{FF2B5EF4-FFF2-40B4-BE49-F238E27FC236}">
-                <a16:creationId xmlns:a16="http://schemas.microsoft.com/office/drawing/2014/main" id="{53AD433E-113D-B8F2-B694-E65D4779C55F}"/>
+                <a16:creationId xmlns:a16="http://schemas.microsoft.com/office/drawing/2014/main" id="{1D02F109-A05C-89F4-C003-9E04D296DE52}"/>
               </a:ext>
             </a:extLst>
           </p:cNvPr>
@@ -19986,21 +20158,184 @@
           <p:nvPr/>
         </p:nvPicPr>
         <p:blipFill>
-          <a:blip r:embed="rId3"/>
+          <a:blip r:embed="rId4"/>
           <a:stretch>
             <a:fillRect/>
           </a:stretch>
         </p:blipFill>
         <p:spPr>
           <a:xfrm>
-            <a:off x="2226066" y="1258293"/>
-            <a:ext cx="8282900" cy="5599707"/>
+            <a:off x="2029338" y="1009688"/>
+            <a:ext cx="8110547" cy="5483187"/>
           </a:xfrm>
           <a:prstGeom prst="rect">
             <a:avLst/>
           </a:prstGeom>
         </p:spPr>
       </p:pic>
+      <p:sp>
+        <p:nvSpPr>
+          <p:cNvPr id="13" name="TextBox 12">
+            <a:extLst>
+              <a:ext uri="{FF2B5EF4-FFF2-40B4-BE49-F238E27FC236}">
+                <a16:creationId xmlns:a16="http://schemas.microsoft.com/office/drawing/2014/main" id="{C229549B-2F9B-5156-9B26-1BF8AC9E7912}"/>
+              </a:ext>
+            </a:extLst>
+          </p:cNvPr>
+          <p:cNvSpPr txBox="1"/>
+          <p:nvPr/>
+        </p:nvSpPr>
+        <p:spPr>
+          <a:xfrm>
+            <a:off x="120406" y="4346229"/>
+            <a:ext cx="1834010" cy="646331"/>
+          </a:xfrm>
+          <a:prstGeom prst="rect">
+            <a:avLst/>
+          </a:prstGeom>
+          <a:noFill/>
+        </p:spPr>
+        <p:txBody>
+          <a:bodyPr wrap="square" rtlCol="0">
+            <a:spAutoFit/>
+          </a:bodyPr>
+          <a:lstStyle/>
+          <a:p>
+            <a:r>
+              <a:rPr lang="en-US" dirty="0">
+                <a:highlight>
+                  <a:srgbClr val="C0C0C0"/>
+                </a:highlight>
+              </a:rPr>
+              <a:t>Urban</a:t>
+            </a:r>
+            <a:r>
+              <a:rPr lang="zh-CN" altLang="en-US" dirty="0">
+                <a:highlight>
+                  <a:srgbClr val="C0C0C0"/>
+                </a:highlight>
+              </a:rPr>
+              <a:t> </a:t>
+            </a:r>
+            <a:r>
+              <a:rPr lang="en-US" altLang="zh-CN" dirty="0">
+                <a:highlight>
+                  <a:srgbClr val="C0C0C0"/>
+                </a:highlight>
+              </a:rPr>
+              <a:t>habitat</a:t>
+            </a:r>
+          </a:p>
+          <a:p>
+            <a:endParaRPr lang="en-US" dirty="0"/>
+          </a:p>
+        </p:txBody>
+      </p:sp>
+      <p:pic>
+        <p:nvPicPr>
+          <p:cNvPr id="3076" name="Picture 4" descr="Path running through mixed forest habitat, Tara National Park, Serbia,  October Stock Photo - Alamy">
+            <a:extLst>
+              <a:ext uri="{FF2B5EF4-FFF2-40B4-BE49-F238E27FC236}">
+                <a16:creationId xmlns:a16="http://schemas.microsoft.com/office/drawing/2014/main" id="{96E950FC-2F36-CBE4-95C6-77A839DD799F}"/>
+              </a:ext>
+            </a:extLst>
+          </p:cNvPr>
+          <p:cNvPicPr>
+            <a:picLocks noChangeAspect="1" noChangeArrowheads="1"/>
+          </p:cNvPicPr>
+          <p:nvPr/>
+        </p:nvPicPr>
+        <p:blipFill rotWithShape="1">
+          <a:blip r:embed="rId5">
+            <a:extLst>
+              <a:ext uri="{28A0092B-C50C-407E-A947-70E740481C1C}">
+                <a14:useLocalDpi xmlns:a14="http://schemas.microsoft.com/office/drawing/2010/main" val="0"/>
+              </a:ext>
+            </a:extLst>
+          </a:blip>
+          <a:srcRect l="16983" t="55160" r="622" b="10503"/>
+          <a:stretch/>
+        </p:blipFill>
+        <p:spPr bwMode="auto">
+          <a:xfrm>
+            <a:off x="9838581" y="3568900"/>
+            <a:ext cx="2353419" cy="1574529"/>
+          </a:xfrm>
+          <a:prstGeom prst="rect">
+            <a:avLst/>
+          </a:prstGeom>
+          <a:noFill/>
+          <a:extLst>
+            <a:ext uri="{909E8E84-426E-40DD-AFC4-6F175D3DCCD1}">
+              <a14:hiddenFill xmlns:a14="http://schemas.microsoft.com/office/drawing/2010/main">
+                <a:solidFill>
+                  <a:srgbClr val="FFFFFF"/>
+                </a:solidFill>
+              </a14:hiddenFill>
+            </a:ext>
+          </a:extLst>
+        </p:spPr>
+      </p:pic>
+      <p:sp>
+        <p:nvSpPr>
+          <p:cNvPr id="14" name="TextBox 13">
+            <a:extLst>
+              <a:ext uri="{FF2B5EF4-FFF2-40B4-BE49-F238E27FC236}">
+                <a16:creationId xmlns:a16="http://schemas.microsoft.com/office/drawing/2014/main" id="{2F482D4A-8523-3C36-0E03-873C477A5266}"/>
+              </a:ext>
+            </a:extLst>
+          </p:cNvPr>
+          <p:cNvSpPr txBox="1"/>
+          <p:nvPr/>
+        </p:nvSpPr>
+        <p:spPr>
+          <a:xfrm>
+            <a:off x="10139885" y="5238075"/>
+            <a:ext cx="1979112" cy="369332"/>
+          </a:xfrm>
+          <a:prstGeom prst="rect">
+            <a:avLst/>
+          </a:prstGeom>
+          <a:noFill/>
+        </p:spPr>
+        <p:txBody>
+          <a:bodyPr wrap="square" rtlCol="0">
+            <a:spAutoFit/>
+          </a:bodyPr>
+          <a:lstStyle/>
+          <a:p>
+            <a:r>
+              <a:rPr lang="en-US" dirty="0">
+                <a:highlight>
+                  <a:srgbClr val="C0C0C0"/>
+                </a:highlight>
+              </a:rPr>
+              <a:t>Path</a:t>
+            </a:r>
+            <a:r>
+              <a:rPr lang="zh-CN" altLang="en-US" dirty="0">
+                <a:highlight>
+                  <a:srgbClr val="C0C0C0"/>
+                </a:highlight>
+              </a:rPr>
+              <a:t> </a:t>
+            </a:r>
+            <a:r>
+              <a:rPr lang="en-US" altLang="zh-CN" dirty="0">
+                <a:highlight>
+                  <a:srgbClr val="C0C0C0"/>
+                </a:highlight>
+              </a:rPr>
+              <a:t>habitat</a:t>
+            </a:r>
+            <a:endParaRPr lang="en-US" dirty="0">
+              <a:highlight>
+                <a:srgbClr val="C0C0C0"/>
+              </a:highlight>
+            </a:endParaRPr>
+          </a:p>
+        </p:txBody>
+      </p:sp>
     </p:spTree>
     <p:extLst>
       <p:ext uri="{BB962C8B-B14F-4D97-AF65-F5344CB8AC3E}">
@@ -20067,36 +20402,6 @@
       </p:sp>
       <p:pic>
         <p:nvPicPr>
-          <p:cNvPr id="5" name="Picture 4" descr="A graph of a graph&#10;&#10;Description automatically generated">
-            <a:extLst>
-              <a:ext uri="{FF2B5EF4-FFF2-40B4-BE49-F238E27FC236}">
-                <a16:creationId xmlns:a16="http://schemas.microsoft.com/office/drawing/2014/main" id="{35F2B4AF-F7DB-D948-5A4D-77C9DA6A2790}"/>
-              </a:ext>
-            </a:extLst>
-          </p:cNvPr>
-          <p:cNvPicPr>
-            <a:picLocks noChangeAspect="1"/>
-          </p:cNvPicPr>
-          <p:nvPr/>
-        </p:nvPicPr>
-        <p:blipFill>
-          <a:blip r:embed="rId2"/>
-          <a:stretch>
-            <a:fillRect/>
-          </a:stretch>
-        </p:blipFill>
-        <p:spPr>
-          <a:xfrm>
-            <a:off x="3436583" y="1249308"/>
-            <a:ext cx="8413039" cy="5608692"/>
-          </a:xfrm>
-          <a:prstGeom prst="rect">
-            <a:avLst/>
-          </a:prstGeom>
-        </p:spPr>
-      </p:pic>
-      <p:pic>
-        <p:nvPicPr>
           <p:cNvPr id="1026" name="Picture 2" descr="Mushroom Identification Basics - Yellow Elanor">
             <a:extLst>
               <a:ext uri="{FF2B5EF4-FFF2-40B4-BE49-F238E27FC236}">
@@ -20110,7 +20415,7 @@
           <p:nvPr/>
         </p:nvPicPr>
         <p:blipFill rotWithShape="1">
-          <a:blip r:embed="rId3">
+          <a:blip r:embed="rId2">
             <a:extLst>
               <a:ext uri="{28A0092B-C50C-407E-A947-70E740481C1C}">
                 <a14:useLocalDpi xmlns:a14="http://schemas.microsoft.com/office/drawing/2010/main" val="0"/>
@@ -20140,6 +20445,87 @@
           </a:extLst>
         </p:spPr>
       </p:pic>
+      <p:pic>
+        <p:nvPicPr>
+          <p:cNvPr id="7" name="Picture 6" descr="A graph of a graph&#10;&#10;Description automatically generated">
+            <a:extLst>
+              <a:ext uri="{FF2B5EF4-FFF2-40B4-BE49-F238E27FC236}">
+                <a16:creationId xmlns:a16="http://schemas.microsoft.com/office/drawing/2014/main" id="{F56CE657-5F79-56C4-385C-09771959D9D5}"/>
+              </a:ext>
+            </a:extLst>
+          </p:cNvPr>
+          <p:cNvPicPr>
+            <a:picLocks noChangeAspect="1"/>
+          </p:cNvPicPr>
+          <p:nvPr/>
+        </p:nvPicPr>
+        <p:blipFill>
+          <a:blip r:embed="rId3"/>
+          <a:stretch>
+            <a:fillRect/>
+          </a:stretch>
+        </p:blipFill>
+        <p:spPr>
+          <a:xfrm>
+            <a:off x="3286539" y="1119786"/>
+            <a:ext cx="8330339" cy="5553559"/>
+          </a:xfrm>
+          <a:prstGeom prst="rect">
+            <a:avLst/>
+          </a:prstGeom>
+        </p:spPr>
+      </p:pic>
+      <p:sp>
+        <p:nvSpPr>
+          <p:cNvPr id="8" name="TextBox 7">
+            <a:extLst>
+              <a:ext uri="{FF2B5EF4-FFF2-40B4-BE49-F238E27FC236}">
+                <a16:creationId xmlns:a16="http://schemas.microsoft.com/office/drawing/2014/main" id="{91047415-D76E-B2DE-94C2-F578F6F1B6AD}"/>
+              </a:ext>
+            </a:extLst>
+          </p:cNvPr>
+          <p:cNvSpPr txBox="1"/>
+          <p:nvPr/>
+        </p:nvSpPr>
+        <p:spPr>
+          <a:xfrm>
+            <a:off x="-21056" y="6606053"/>
+            <a:ext cx="9294312" cy="276999"/>
+          </a:xfrm>
+          <a:prstGeom prst="rect">
+            <a:avLst/>
+          </a:prstGeom>
+          <a:noFill/>
+        </p:spPr>
+        <p:txBody>
+          <a:bodyPr wrap="square" rtlCol="0">
+            <a:spAutoFit/>
+          </a:bodyPr>
+          <a:lstStyle/>
+          <a:p>
+            <a:r>
+              <a:rPr lang="en-US" sz="1200" dirty="0"/>
+              <a:t>@</a:t>
+            </a:r>
+            <a:r>
+              <a:rPr lang="en-US" sz="1200" dirty="0" err="1"/>
+              <a:t>fungitownpod</a:t>
+            </a:r>
+            <a:r>
+              <a:rPr lang="en-US" sz="1200" dirty="0"/>
+              <a:t>, https://</a:t>
+            </a:r>
+            <a:r>
+              <a:rPr lang="en-US" sz="1200" dirty="0" err="1"/>
+              <a:t>fungitownpod.home.blog</a:t>
+            </a:r>
+            <a:r>
+              <a:rPr lang="en-US" sz="1200" dirty="0"/>
+              <a:t>/2018/03/14/episode-02-how-to-id-mushrooms/</a:t>
+            </a:r>
+          </a:p>
+        </p:txBody>
+      </p:sp>
     </p:spTree>
     <p:extLst>
       <p:ext uri="{BB962C8B-B14F-4D97-AF65-F5344CB8AC3E}">
@@ -20352,11 +20738,11 @@
               <a:t> </a:t>
             </a:r>
             <a:r>
-              <a:rPr lang="en-US" altLang="zh-CN" dirty="0" err="1"/>
+              <a:rPr lang="en-US" altLang="zh-CN" b="1" dirty="0" err="1"/>
               <a:t>train_test_split</a:t>
             </a:r>
             <a:r>
-              <a:rPr lang="zh-CN" altLang="en-US" dirty="0"/>
+              <a:rPr lang="zh-CN" altLang="en-US" b="1" dirty="0"/>
               <a:t> </a:t>
             </a:r>
             <a:r>
@@ -20488,38 +20874,42 @@
               <a:t> </a:t>
             </a:r>
             <a:r>
-              <a:rPr lang="en-US" altLang="zh-CN" dirty="0" err="1"/>
+              <a:rPr lang="en-US" altLang="zh-CN" b="1" dirty="0" err="1"/>
               <a:t>Kfold</a:t>
             </a:r>
             <a:r>
-              <a:rPr lang="zh-CN" altLang="en-US" dirty="0"/>
-              <a:t> </a:t>
+              <a:rPr lang="zh-CN" altLang="en-US" b="1" dirty="0"/>
+              <a:t> </a:t>
+            </a:r>
+            <a:r>
+              <a:rPr lang="en-US" altLang="zh-CN" b="1" dirty="0"/>
+              <a:t>Cross</a:t>
+            </a:r>
+            <a:r>
+              <a:rPr lang="zh-CN" altLang="en-US" b="1" dirty="0"/>
+              <a:t> </a:t>
+            </a:r>
+            <a:r>
+              <a:rPr lang="en-US" altLang="zh-CN" b="1" dirty="0"/>
+              <a:t>Validation</a:t>
             </a:r>
             <a:r>
               <a:rPr lang="en-US" altLang="zh-CN" dirty="0"/>
-              <a:t>Cross</a:t>
-            </a:r>
-            <a:r>
-              <a:rPr lang="zh-CN" altLang="en-US" dirty="0"/>
-              <a:t> </a:t>
-            </a:r>
-            <a:r>
-              <a:rPr lang="en-US" altLang="zh-CN" dirty="0"/>
-              <a:t>Validation.</a:t>
+              <a:t>.</a:t>
             </a:r>
           </a:p>
           <a:p>
             <a:r>
               <a:rPr lang="en-US" dirty="0"/>
-              <a:t>The shape of each train, </a:t>
-            </a:r>
-            <a:r>
-              <a:rPr lang="en-US" dirty="0" err="1"/>
-              <a:t>val</a:t>
+              <a:t>The shape of each </a:t>
+            </a:r>
+            <a:r>
+              <a:rPr lang="en-US" altLang="zh-CN" dirty="0"/>
+              <a:t>other</a:t>
             </a:r>
             <a:r>
               <a:rPr lang="en-US" dirty="0"/>
-              <a:t>, and test set are the following:</a:t>
+              <a:t> and test set are the following:</a:t>
             </a:r>
             <a:br>
               <a:rPr lang="en-US" dirty="0"/>
@@ -21030,7 +21420,7 @@
             </a:r>
             <a:r>
               <a:rPr lang="en-US" altLang="zh-CN" dirty="0"/>
-              <a:t>encoders</a:t>
+              <a:t>encoders.</a:t>
             </a:r>
           </a:p>
           <a:p>
@@ -21121,55 +21511,41 @@
             <p:ph idx="1"/>
           </p:nvPr>
         </p:nvSpPr>
-        <p:spPr/>
+        <p:spPr>
+          <a:xfrm>
+            <a:off x="838199" y="1823790"/>
+            <a:ext cx="10515600" cy="4160520"/>
+          </a:xfrm>
+        </p:spPr>
         <p:txBody>
           <a:bodyPr/>
           <a:lstStyle/>
           <a:p>
             <a:r>
-              <a:rPr lang="en-US" dirty="0"/>
-              <a:t>'</a:t>
-            </a:r>
-            <a:r>
               <a:rPr lang="en-US" b="1" dirty="0"/>
               <a:t>cap-diameter</a:t>
             </a:r>
             <a:r>
               <a:rPr lang="en-US" dirty="0"/>
-              <a:t>',</a:t>
+              <a:t>,</a:t>
             </a:r>
             <a:r>
               <a:rPr lang="zh-CN" altLang="en-US" dirty="0"/>
               <a:t> </a:t>
             </a:r>
             <a:r>
+              <a:rPr lang="en-US" b="1" dirty="0"/>
+              <a:t>stem-height</a:t>
+            </a:r>
+            <a:r>
               <a:rPr lang="en-US" dirty="0"/>
-              <a:t>'</a:t>
+              <a:t>, </a:t>
             </a:r>
             <a:r>
               <a:rPr lang="en-US" b="1" dirty="0"/>
-              <a:t>stem-</a:t>
-            </a:r>
-            <a:r>
-              <a:rPr lang="en-US" b="1" dirty="0" err="1"/>
-              <a:t>height</a:t>
-            </a:r>
-            <a:r>
-              <a:rPr lang="en-US" dirty="0" err="1"/>
-              <a:t>‘,'</a:t>
-            </a:r>
-            <a:r>
-              <a:rPr lang="en-US" b="1" dirty="0" err="1"/>
-              <a:t>stem</a:t>
-            </a:r>
-            <a:r>
-              <a:rPr lang="en-US" b="1" dirty="0"/>
-              <a:t>-width</a:t>
-            </a:r>
-            <a:r>
-              <a:rPr lang="en-US" dirty="0"/>
-              <a:t>'</a:t>
-            </a:r>
+              <a:t>stem-width</a:t>
+            </a:r>
+            <a:endParaRPr lang="en-US" dirty="0"/>
           </a:p>
           <a:p>
             <a:r>
@@ -21248,10 +21624,10 @@
       </p:sp>
       <p:pic>
         <p:nvPicPr>
-          <p:cNvPr id="4" name="Picture 3" descr="A graph of a height&#10;&#10;Description automatically generated with medium confidence">
+          <p:cNvPr id="6" name="Picture 5" descr="A graph of a tall column&#10;&#10;Description automatically generated with medium confidence">
             <a:extLst>
               <a:ext uri="{FF2B5EF4-FFF2-40B4-BE49-F238E27FC236}">
-                <a16:creationId xmlns:a16="http://schemas.microsoft.com/office/drawing/2014/main" id="{0DF399B1-833B-0F27-EE00-0E6664B52AC6}"/>
+                <a16:creationId xmlns:a16="http://schemas.microsoft.com/office/drawing/2014/main" id="{7ED43681-794E-B38B-7C1B-A44FB4A6B10E}"/>
               </a:ext>
             </a:extLst>
           </p:cNvPr>
@@ -21268,8 +21644,8 @@
         </p:blipFill>
         <p:spPr>
           <a:xfrm>
-            <a:off x="1028303" y="3298057"/>
-            <a:ext cx="10588543" cy="3194818"/>
+            <a:off x="368137" y="3294345"/>
+            <a:ext cx="11455725" cy="3456468"/>
           </a:xfrm>
           <a:prstGeom prst="rect">
             <a:avLst/>

</xml_diff>